<commit_message>
update v2 design+ scris
</commit_message>
<xml_diff>
--- a/bdoo.pptx
+++ b/bdoo.pptx
@@ -28,6 +28,15 @@
     <p:sldId id="276" r:id="rId22"/>
     <p:sldId id="277" r:id="rId23"/>
     <p:sldId id="278" r:id="rId24"/>
+    <p:sldId id="279" r:id="rId25"/>
+    <p:sldId id="280" r:id="rId26"/>
+    <p:sldId id="282" r:id="rId27"/>
+    <p:sldId id="283" r:id="rId28"/>
+    <p:sldId id="284" r:id="rId29"/>
+    <p:sldId id="285" r:id="rId30"/>
+    <p:sldId id="286" r:id="rId31"/>
+    <p:sldId id="287" r:id="rId32"/>
+    <p:sldId id="281" r:id="rId33"/>
   </p:sldIdLst>
   <p:sldSz cx="9144000" cy="6858000" type="screen4x3"/>
   <p:notesSz cx="6858000" cy="9144000"/>
@@ -10659,6 +10668,2661 @@
 </p:sld>
 </file>
 
+<file path=ppt/slides/slide24.xml><?xml version="1.0" encoding="utf-8"?>
+<p:sld xmlns:a="http://schemas.openxmlformats.org/drawingml/2006/main" xmlns:r="http://schemas.openxmlformats.org/officeDocument/2006/relationships" xmlns:p="http://schemas.openxmlformats.org/presentationml/2006/main">
+  <p:cSld>
+    <p:spTree>
+      <p:nvGrpSpPr>
+        <p:cNvPr id="1" name=""/>
+        <p:cNvGrpSpPr/>
+        <p:nvPr/>
+      </p:nvGrpSpPr>
+      <p:grpSpPr>
+        <a:xfrm>
+          <a:off x="0" y="0"/>
+          <a:ext cx="0" cy="0"/>
+          <a:chOff x="0" y="0"/>
+          <a:chExt cx="0" cy="0"/>
+        </a:xfrm>
+      </p:grpSpPr>
+      <p:sp>
+        <p:nvSpPr>
+          <p:cNvPr id="2" name="Title 1"/>
+          <p:cNvSpPr>
+            <a:spLocks noGrp="1"/>
+          </p:cNvSpPr>
+          <p:nvPr>
+            <p:ph type="title"/>
+          </p:nvPr>
+        </p:nvSpPr>
+        <p:spPr/>
+        <p:txBody>
+          <a:bodyPr>
+            <a:normAutofit fontScale="90000"/>
+          </a:bodyPr>
+          <a:lstStyle/>
+          <a:p>
+            <a:br>
+              <a:rPr lang="en-GB" dirty="0"/>
+            </a:br>
+            <a:endParaRPr lang="en-GB" dirty="0"/>
+          </a:p>
+        </p:txBody>
+      </p:sp>
+      <p:sp>
+        <p:nvSpPr>
+          <p:cNvPr id="3" name="Content Placeholder 2"/>
+          <p:cNvSpPr>
+            <a:spLocks noGrp="1"/>
+          </p:cNvSpPr>
+          <p:nvPr>
+            <p:ph idx="1"/>
+          </p:nvPr>
+        </p:nvSpPr>
+        <p:spPr/>
+        <p:txBody>
+          <a:bodyPr>
+            <a:normAutofit fontScale="47500" lnSpcReduction="20000"/>
+          </a:bodyPr>
+          <a:lstStyle/>
+          <a:p>
+            <a:pPr marL="0" indent="0">
+              <a:buNone/>
+            </a:pPr>
+            <a:endParaRPr lang="ro-RO" dirty="0"/>
+          </a:p>
+          <a:p>
+            <a:r>
+              <a:rPr lang="ro-RO" dirty="0"/>
+              <a:t>Se poate modifica dinamic, funcție de cerințele aplicației</a:t>
+            </a:r>
+          </a:p>
+          <a:p>
+            <a:r>
+              <a:rPr lang="ro-RO" dirty="0"/>
+              <a:t>-</a:t>
+            </a:r>
+          </a:p>
+          <a:p>
+            <a:r>
+              <a:rPr lang="ro-RO" dirty="0"/>
+              <a:t>Modificările:</a:t>
+            </a:r>
+          </a:p>
+          <a:p>
+            <a:r>
+              <a:rPr lang="ro-RO" dirty="0"/>
+              <a:t>-trebuie:-specificate-implementate-</a:t>
+            </a:r>
+          </a:p>
+          <a:p>
+            <a:r>
+              <a:rPr lang="ro-RO" dirty="0"/>
+              <a:t>două tipuri:</a:t>
+            </a:r>
+          </a:p>
+          <a:p>
+            <a:r>
+              <a:rPr lang="ro-RO" dirty="0"/>
+              <a:t>-</a:t>
+            </a:r>
+          </a:p>
+          <a:p>
+            <a:r>
+              <a:rPr lang="ro-RO" dirty="0"/>
+              <a:t>modificări ale clasei (definiția, atributele, metodele)</a:t>
+            </a:r>
+          </a:p>
+          <a:p>
+            <a:r>
+              <a:rPr lang="ro-RO" dirty="0"/>
+              <a:t>-</a:t>
+            </a:r>
+          </a:p>
+          <a:p>
+            <a:r>
+              <a:rPr lang="ro-RO" dirty="0"/>
+              <a:t>modificări ale ierarhiei claselor</a:t>
+            </a:r>
+          </a:p>
+          <a:p>
+            <a:r>
+              <a:rPr lang="ro-RO" dirty="0"/>
+              <a:t>Schema bazei de date</a:t>
+            </a:r>
+          </a:p>
+          <a:p>
+            <a:r>
+              <a:rPr lang="ro-RO" dirty="0"/>
+              <a:t>-</a:t>
+            </a:r>
+          </a:p>
+          <a:p>
+            <a:r>
+              <a:rPr lang="ro-RO" dirty="0"/>
+              <a:t>extinsă prin adăugarea de noi clase</a:t>
+            </a:r>
+          </a:p>
+          <a:p>
+            <a:r>
+              <a:rPr lang="ro-RO" dirty="0"/>
+              <a:t>Obiectul</a:t>
+            </a:r>
+          </a:p>
+          <a:p>
+            <a:r>
+              <a:rPr lang="ro-RO" dirty="0"/>
+              <a:t>-</a:t>
+            </a:r>
+          </a:p>
+          <a:p>
+            <a:r>
+              <a:rPr lang="ro-RO" dirty="0"/>
+              <a:t> încorporează structura și metodele clasei</a:t>
+            </a:r>
+          </a:p>
+          <a:p>
+            <a:r>
+              <a:rPr lang="ro-RO" dirty="0"/>
+              <a:t>-are asociat un identificator unic, conferit de sistem</a:t>
+            </a:r>
+          </a:p>
+          <a:p>
+            <a:endParaRPr lang="ro-RO" dirty="0"/>
+          </a:p>
+          <a:p>
+            <a:pPr algn="just">
+              <a:buFont typeface="Wingdings" panose="05000000000000000000" pitchFamily="2" charset="2"/>
+              <a:buChar char="§"/>
+            </a:pPr>
+            <a:endParaRPr lang="en-GB" dirty="0">
+              <a:latin typeface="Times New Roman" panose="02020603050405020304" pitchFamily="18" charset="0"/>
+              <a:cs typeface="Times New Roman" panose="02020603050405020304" pitchFamily="18" charset="0"/>
+            </a:endParaRPr>
+          </a:p>
+        </p:txBody>
+      </p:sp>
+      <p:sp>
+        <p:nvSpPr>
+          <p:cNvPr id="5" name="Rectangle 4"/>
+          <p:cNvSpPr/>
+          <p:nvPr/>
+        </p:nvSpPr>
+        <p:spPr>
+          <a:xfrm>
+            <a:off x="-15239" y="534145"/>
+            <a:ext cx="9159239" cy="739300"/>
+          </a:xfrm>
+          <a:prstGeom prst="rect">
+            <a:avLst/>
+          </a:prstGeom>
+          <a:solidFill>
+            <a:schemeClr val="bg1">
+              <a:lumMod val="50000"/>
+            </a:schemeClr>
+          </a:solidFill>
+          <a:ln>
+            <a:noFill/>
+          </a:ln>
+        </p:spPr>
+        <p:style>
+          <a:lnRef idx="2">
+            <a:schemeClr val="accent1">
+              <a:shade val="50000"/>
+            </a:schemeClr>
+          </a:lnRef>
+          <a:fillRef idx="1">
+            <a:schemeClr val="accent1"/>
+          </a:fillRef>
+          <a:effectRef idx="0">
+            <a:schemeClr val="accent1"/>
+          </a:effectRef>
+          <a:fontRef idx="minor">
+            <a:schemeClr val="lt1"/>
+          </a:fontRef>
+        </p:style>
+        <p:txBody>
+          <a:bodyPr rtlCol="0" anchor="ctr"/>
+          <a:lstStyle/>
+          <a:p>
+            <a:r>
+              <a:rPr lang="ro-RO" sz="2400" dirty="0">
+                <a:latin typeface="Times New Roman" panose="02020603050405020304" pitchFamily="18" charset="0"/>
+                <a:cs typeface="Times New Roman" panose="02020603050405020304" pitchFamily="18" charset="0"/>
+              </a:rPr>
+              <a:t>	Schema</a:t>
+            </a:r>
+          </a:p>
+        </p:txBody>
+      </p:sp>
+    </p:spTree>
+    <p:extLst>
+      <p:ext uri="{BB962C8B-B14F-4D97-AF65-F5344CB8AC3E}">
+        <p14:creationId xmlns:p14="http://schemas.microsoft.com/office/powerpoint/2010/main" val="1142242769"/>
+      </p:ext>
+    </p:extLst>
+  </p:cSld>
+  <p:clrMapOvr>
+    <a:masterClrMapping/>
+  </p:clrMapOvr>
+</p:sld>
+</file>
+
+<file path=ppt/slides/slide25.xml><?xml version="1.0" encoding="utf-8"?>
+<p:sld xmlns:a="http://schemas.openxmlformats.org/drawingml/2006/main" xmlns:r="http://schemas.openxmlformats.org/officeDocument/2006/relationships" xmlns:p="http://schemas.openxmlformats.org/presentationml/2006/main">
+  <p:cSld>
+    <p:spTree>
+      <p:nvGrpSpPr>
+        <p:cNvPr id="1" name=""/>
+        <p:cNvGrpSpPr/>
+        <p:nvPr/>
+      </p:nvGrpSpPr>
+      <p:grpSpPr>
+        <a:xfrm>
+          <a:off x="0" y="0"/>
+          <a:ext cx="0" cy="0"/>
+          <a:chOff x="0" y="0"/>
+          <a:chExt cx="0" cy="0"/>
+        </a:xfrm>
+      </p:grpSpPr>
+      <p:sp>
+        <p:nvSpPr>
+          <p:cNvPr id="2" name="Title 1"/>
+          <p:cNvSpPr>
+            <a:spLocks noGrp="1"/>
+          </p:cNvSpPr>
+          <p:nvPr>
+            <p:ph type="title"/>
+          </p:nvPr>
+        </p:nvSpPr>
+        <p:spPr/>
+        <p:txBody>
+          <a:bodyPr>
+            <a:normAutofit fontScale="90000"/>
+          </a:bodyPr>
+          <a:lstStyle/>
+          <a:p>
+            <a:br>
+              <a:rPr lang="en-GB" dirty="0"/>
+            </a:br>
+            <a:endParaRPr lang="en-GB" dirty="0"/>
+          </a:p>
+        </p:txBody>
+      </p:sp>
+      <p:sp>
+        <p:nvSpPr>
+          <p:cNvPr id="3" name="Content Placeholder 2"/>
+          <p:cNvSpPr>
+            <a:spLocks noGrp="1"/>
+          </p:cNvSpPr>
+          <p:nvPr>
+            <p:ph idx="1"/>
+          </p:nvPr>
+        </p:nvSpPr>
+        <p:spPr/>
+        <p:txBody>
+          <a:bodyPr/>
+          <a:lstStyle/>
+          <a:p>
+            <a:pPr marL="0" indent="0">
+              <a:buNone/>
+            </a:pPr>
+            <a:endParaRPr lang="en-GB" dirty="0"/>
+          </a:p>
+          <a:p>
+            <a:pPr marL="0" indent="0">
+              <a:buNone/>
+            </a:pPr>
+            <a:endParaRPr lang="en-GB" dirty="0"/>
+          </a:p>
+        </p:txBody>
+      </p:sp>
+      <p:sp>
+        <p:nvSpPr>
+          <p:cNvPr id="5" name="Rectangle 4"/>
+          <p:cNvSpPr/>
+          <p:nvPr/>
+        </p:nvSpPr>
+        <p:spPr>
+          <a:xfrm>
+            <a:off x="-15239" y="534145"/>
+            <a:ext cx="9159239" cy="739300"/>
+          </a:xfrm>
+          <a:prstGeom prst="rect">
+            <a:avLst/>
+          </a:prstGeom>
+          <a:solidFill>
+            <a:schemeClr val="bg1">
+              <a:lumMod val="50000"/>
+            </a:schemeClr>
+          </a:solidFill>
+          <a:ln>
+            <a:noFill/>
+          </a:ln>
+        </p:spPr>
+        <p:style>
+          <a:lnRef idx="2">
+            <a:schemeClr val="accent1">
+              <a:shade val="50000"/>
+            </a:schemeClr>
+          </a:lnRef>
+          <a:fillRef idx="1">
+            <a:schemeClr val="accent1"/>
+          </a:fillRef>
+          <a:effectRef idx="0">
+            <a:schemeClr val="accent1"/>
+          </a:effectRef>
+          <a:fontRef idx="minor">
+            <a:schemeClr val="lt1"/>
+          </a:fontRef>
+        </p:style>
+        <p:txBody>
+          <a:bodyPr rtlCol="0" anchor="ctr"/>
+          <a:lstStyle/>
+          <a:p>
+            <a:r>
+              <a:rPr lang="ro-RO" sz="2400" dirty="0">
+                <a:latin typeface="Times New Roman" panose="02020603050405020304" pitchFamily="18" charset="0"/>
+                <a:cs typeface="Times New Roman" panose="02020603050405020304" pitchFamily="18" charset="0"/>
+              </a:rPr>
+              <a:t>	Schema unei BDOO</a:t>
+            </a:r>
+          </a:p>
+        </p:txBody>
+      </p:sp>
+      <p:sp>
+        <p:nvSpPr>
+          <p:cNvPr id="4" name="TextBox 3"/>
+          <p:cNvSpPr txBox="1"/>
+          <p:nvPr/>
+        </p:nvSpPr>
+        <p:spPr>
+          <a:xfrm>
+            <a:off x="457200" y="2057400"/>
+            <a:ext cx="8229600" cy="3139321"/>
+          </a:xfrm>
+          <a:prstGeom prst="rect">
+            <a:avLst/>
+          </a:prstGeom>
+          <a:noFill/>
+        </p:spPr>
+        <p:txBody>
+          <a:bodyPr wrap="square" rtlCol="0">
+            <a:spAutoFit/>
+          </a:bodyPr>
+          <a:lstStyle/>
+          <a:p>
+            <a:r>
+              <a:rPr lang="ro-RO" dirty="0"/>
+              <a:t>O schemă completă a unei baze de date orientată pe obiecte poate consta din una</a:t>
+            </a:r>
+          </a:p>
+          <a:p>
+            <a:r>
+              <a:rPr lang="ro-RO" dirty="0"/>
+              <a:t>sau mai multe ierarhii de clasă, împreună cu relaţiile structurale. Modificarea</a:t>
+            </a:r>
+          </a:p>
+          <a:p>
+            <a:r>
+              <a:rPr lang="ro-RO" dirty="0"/>
+              <a:t>schemei presupune:</a:t>
+            </a:r>
+          </a:p>
+          <a:p>
+            <a:r>
+              <a:rPr lang="ro-RO" dirty="0"/>
+              <a:t>1. definirea unei taxonomii şi a unui model al schimbărilor. Taxonomia defineşte un</a:t>
+            </a:r>
+          </a:p>
+          <a:p>
+            <a:r>
+              <a:rPr lang="ro-RO" dirty="0"/>
+              <a:t>set de schimbări semnificative ale schemei, iar modelul furnizează o bază pentru</a:t>
+            </a:r>
+          </a:p>
+          <a:p>
+            <a:r>
+              <a:rPr lang="ro-RO" dirty="0"/>
+              <a:t>specificarea semanticilor schimbărilor schemei;</a:t>
+            </a:r>
+          </a:p>
+          <a:p>
+            <a:r>
+              <a:rPr lang="ro-RO" dirty="0"/>
+              <a:t>2. implementarea schimbărilor schemei. Aceste schimbări pot fi: referitoare la</a:t>
+            </a:r>
+          </a:p>
+          <a:p>
+            <a:r>
+              <a:rPr lang="ro-RO" dirty="0"/>
+              <a:t>modul de definire al unei clase - includ schimbările atributelor şi metodelor definite</a:t>
+            </a:r>
+          </a:p>
+          <a:p>
+            <a:r>
+              <a:rPr lang="ro-RO" dirty="0"/>
+              <a:t>pentru o clasă; schimbări referitoare la structura ierarhiei de clase - includ</a:t>
+            </a:r>
+          </a:p>
+          <a:p>
+            <a:r>
+              <a:rPr lang="ro-RO" dirty="0"/>
+              <a:t>adăugarea sau ştergerea unei clase şi schimbarea relaţiilor superclasă/subclasă dintre</a:t>
+            </a:r>
+          </a:p>
+          <a:p>
+            <a:r>
+              <a:rPr lang="ro-RO" dirty="0"/>
+              <a:t>o pereche de clase. </a:t>
+            </a:r>
+            <a:endParaRPr lang="ro-RO" dirty="0"/>
+          </a:p>
+        </p:txBody>
+      </p:sp>
+    </p:spTree>
+    <p:extLst>
+      <p:ext uri="{BB962C8B-B14F-4D97-AF65-F5344CB8AC3E}">
+        <p14:creationId xmlns:p14="http://schemas.microsoft.com/office/powerpoint/2010/main" val="1930288637"/>
+      </p:ext>
+    </p:extLst>
+  </p:cSld>
+  <p:clrMapOvr>
+    <a:masterClrMapping/>
+  </p:clrMapOvr>
+</p:sld>
+</file>
+
+<file path=ppt/slides/slide26.xml><?xml version="1.0" encoding="utf-8"?>
+<p:sld xmlns:a="http://schemas.openxmlformats.org/drawingml/2006/main" xmlns:r="http://schemas.openxmlformats.org/officeDocument/2006/relationships" xmlns:p="http://schemas.openxmlformats.org/presentationml/2006/main">
+  <p:cSld>
+    <p:spTree>
+      <p:nvGrpSpPr>
+        <p:cNvPr id="1" name=""/>
+        <p:cNvGrpSpPr/>
+        <p:nvPr/>
+      </p:nvGrpSpPr>
+      <p:grpSpPr>
+        <a:xfrm>
+          <a:off x="0" y="0"/>
+          <a:ext cx="0" cy="0"/>
+          <a:chOff x="0" y="0"/>
+          <a:chExt cx="0" cy="0"/>
+        </a:xfrm>
+      </p:grpSpPr>
+      <p:sp>
+        <p:nvSpPr>
+          <p:cNvPr id="2" name="Title 1"/>
+          <p:cNvSpPr>
+            <a:spLocks noGrp="1"/>
+          </p:cNvSpPr>
+          <p:nvPr>
+            <p:ph type="title"/>
+          </p:nvPr>
+        </p:nvSpPr>
+        <p:spPr/>
+        <p:txBody>
+          <a:bodyPr>
+            <a:normAutofit fontScale="90000"/>
+          </a:bodyPr>
+          <a:lstStyle/>
+          <a:p>
+            <a:br>
+              <a:rPr lang="en-GB" dirty="0"/>
+            </a:br>
+            <a:endParaRPr lang="en-GB" dirty="0"/>
+          </a:p>
+        </p:txBody>
+      </p:sp>
+      <p:sp>
+        <p:nvSpPr>
+          <p:cNvPr id="3" name="Content Placeholder 2"/>
+          <p:cNvSpPr>
+            <a:spLocks noGrp="1"/>
+          </p:cNvSpPr>
+          <p:nvPr>
+            <p:ph idx="1"/>
+          </p:nvPr>
+        </p:nvSpPr>
+        <p:spPr/>
+        <p:txBody>
+          <a:bodyPr>
+            <a:normAutofit fontScale="92500" lnSpcReduction="20000"/>
+          </a:bodyPr>
+          <a:lstStyle/>
+          <a:p>
+            <a:pPr algn="just">
+              <a:buFont typeface="Wingdings" panose="05000000000000000000" pitchFamily="2" charset="2"/>
+              <a:buChar char="§"/>
+            </a:pPr>
+            <a:r>
+              <a:rPr lang="en-GB" dirty="0">
+                <a:latin typeface="Times New Roman" panose="02020603050405020304" pitchFamily="18" charset="0"/>
+                <a:cs typeface="Times New Roman" panose="02020603050405020304" pitchFamily="18" charset="0"/>
+              </a:rPr>
+              <a:t>-</a:t>
+            </a:r>
+            <a:r>
+              <a:rPr lang="en-GB" dirty="0" err="1">
+                <a:latin typeface="Times New Roman" panose="02020603050405020304" pitchFamily="18" charset="0"/>
+                <a:cs typeface="Times New Roman" panose="02020603050405020304" pitchFamily="18" charset="0"/>
+              </a:rPr>
+              <a:t>creare</a:t>
+            </a:r>
+            <a:r>
+              <a:rPr lang="en-GB" dirty="0">
+                <a:latin typeface="Times New Roman" panose="02020603050405020304" pitchFamily="18" charset="0"/>
+                <a:cs typeface="Times New Roman" panose="02020603050405020304" pitchFamily="18" charset="0"/>
+              </a:rPr>
+              <a:t> de </a:t>
+            </a:r>
+            <a:r>
+              <a:rPr lang="en-GB" dirty="0" err="1">
+                <a:latin typeface="Times New Roman" panose="02020603050405020304" pitchFamily="18" charset="0"/>
+                <a:cs typeface="Times New Roman" panose="02020603050405020304" pitchFamily="18" charset="0"/>
+              </a:rPr>
+              <a:t>clase</a:t>
+            </a:r>
+            <a:endParaRPr lang="en-GB" dirty="0">
+              <a:latin typeface="Times New Roman" panose="02020603050405020304" pitchFamily="18" charset="0"/>
+              <a:cs typeface="Times New Roman" panose="02020603050405020304" pitchFamily="18" charset="0"/>
+            </a:endParaRPr>
+          </a:p>
+          <a:p>
+            <a:pPr algn="just">
+              <a:buFont typeface="Wingdings" panose="05000000000000000000" pitchFamily="2" charset="2"/>
+              <a:buChar char="§"/>
+            </a:pPr>
+            <a:r>
+              <a:rPr lang="en-GB" dirty="0" err="1">
+                <a:latin typeface="Times New Roman" panose="02020603050405020304" pitchFamily="18" charset="0"/>
+                <a:cs typeface="Times New Roman" panose="02020603050405020304" pitchFamily="18" charset="0"/>
+              </a:rPr>
+              <a:t>actualizarea</a:t>
+            </a:r>
+            <a:r>
+              <a:rPr lang="en-GB" dirty="0">
+                <a:latin typeface="Times New Roman" panose="02020603050405020304" pitchFamily="18" charset="0"/>
+                <a:cs typeface="Times New Roman" panose="02020603050405020304" pitchFamily="18" charset="0"/>
+              </a:rPr>
+              <a:t> </a:t>
+            </a:r>
+            <a:r>
+              <a:rPr lang="en-GB" dirty="0" err="1">
+                <a:latin typeface="Times New Roman" panose="02020603050405020304" pitchFamily="18" charset="0"/>
+                <a:cs typeface="Times New Roman" panose="02020603050405020304" pitchFamily="18" charset="0"/>
+              </a:rPr>
+              <a:t>claselor</a:t>
+            </a:r>
+            <a:r>
+              <a:rPr lang="en-GB" dirty="0">
+                <a:latin typeface="Times New Roman" panose="02020603050405020304" pitchFamily="18" charset="0"/>
+                <a:cs typeface="Times New Roman" panose="02020603050405020304" pitchFamily="18" charset="0"/>
+              </a:rPr>
+              <a:t> (</a:t>
+            </a:r>
+            <a:r>
+              <a:rPr lang="en-GB" dirty="0" err="1">
+                <a:latin typeface="Times New Roman" panose="02020603050405020304" pitchFamily="18" charset="0"/>
+                <a:cs typeface="Times New Roman" panose="02020603050405020304" pitchFamily="18" charset="0"/>
+              </a:rPr>
+              <a:t>modificarea</a:t>
+            </a:r>
+            <a:r>
+              <a:rPr lang="en-GB" dirty="0">
+                <a:latin typeface="Times New Roman" panose="02020603050405020304" pitchFamily="18" charset="0"/>
+                <a:cs typeface="Times New Roman" panose="02020603050405020304" pitchFamily="18" charset="0"/>
+              </a:rPr>
+              <a:t>, </a:t>
+            </a:r>
+            <a:r>
+              <a:rPr lang="en-GB" dirty="0" err="1">
+                <a:latin typeface="Times New Roman" panose="02020603050405020304" pitchFamily="18" charset="0"/>
+                <a:cs typeface="Times New Roman" panose="02020603050405020304" pitchFamily="18" charset="0"/>
+              </a:rPr>
+              <a:t>ștergerea</a:t>
+            </a:r>
+            <a:r>
+              <a:rPr lang="en-GB" dirty="0">
+                <a:latin typeface="Times New Roman" panose="02020603050405020304" pitchFamily="18" charset="0"/>
+                <a:cs typeface="Times New Roman" panose="02020603050405020304" pitchFamily="18" charset="0"/>
+              </a:rPr>
+              <a:t>)</a:t>
+            </a:r>
+          </a:p>
+          <a:p>
+            <a:pPr algn="just">
+              <a:buFont typeface="Wingdings" panose="05000000000000000000" pitchFamily="2" charset="2"/>
+              <a:buChar char="§"/>
+            </a:pPr>
+            <a:r>
+              <a:rPr lang="en-GB" dirty="0">
+                <a:latin typeface="Times New Roman" panose="02020603050405020304" pitchFamily="18" charset="0"/>
+                <a:cs typeface="Times New Roman" panose="02020603050405020304" pitchFamily="18" charset="0"/>
+              </a:rPr>
+              <a:t>-</a:t>
+            </a:r>
+            <a:r>
+              <a:rPr lang="en-GB" dirty="0" err="1">
+                <a:latin typeface="Times New Roman" panose="02020603050405020304" pitchFamily="18" charset="0"/>
+                <a:cs typeface="Times New Roman" panose="02020603050405020304" pitchFamily="18" charset="0"/>
+              </a:rPr>
+              <a:t>modificarea</a:t>
+            </a:r>
+            <a:r>
+              <a:rPr lang="en-GB" dirty="0">
+                <a:latin typeface="Times New Roman" panose="02020603050405020304" pitchFamily="18" charset="0"/>
+                <a:cs typeface="Times New Roman" panose="02020603050405020304" pitchFamily="18" charset="0"/>
+              </a:rPr>
+              <a:t> </a:t>
+            </a:r>
+            <a:r>
+              <a:rPr lang="en-GB" dirty="0" err="1">
+                <a:latin typeface="Times New Roman" panose="02020603050405020304" pitchFamily="18" charset="0"/>
+                <a:cs typeface="Times New Roman" panose="02020603050405020304" pitchFamily="18" charset="0"/>
+              </a:rPr>
+              <a:t>metodelor</a:t>
+            </a:r>
+            <a:r>
+              <a:rPr lang="en-GB" dirty="0">
+                <a:latin typeface="Times New Roman" panose="02020603050405020304" pitchFamily="18" charset="0"/>
+                <a:cs typeface="Times New Roman" panose="02020603050405020304" pitchFamily="18" charset="0"/>
+              </a:rPr>
+              <a:t> -</a:t>
+            </a:r>
+            <a:r>
+              <a:rPr lang="en-GB" dirty="0" err="1">
+                <a:latin typeface="Times New Roman" panose="02020603050405020304" pitchFamily="18" charset="0"/>
+                <a:cs typeface="Times New Roman" panose="02020603050405020304" pitchFamily="18" charset="0"/>
+              </a:rPr>
+              <a:t>modificarea</a:t>
+            </a:r>
+            <a:r>
+              <a:rPr lang="en-GB" dirty="0">
+                <a:latin typeface="Times New Roman" panose="02020603050405020304" pitchFamily="18" charset="0"/>
+                <a:cs typeface="Times New Roman" panose="02020603050405020304" pitchFamily="18" charset="0"/>
+              </a:rPr>
+              <a:t> </a:t>
+            </a:r>
+            <a:r>
+              <a:rPr lang="en-GB" dirty="0" err="1">
+                <a:latin typeface="Times New Roman" panose="02020603050405020304" pitchFamily="18" charset="0"/>
+                <a:cs typeface="Times New Roman" panose="02020603050405020304" pitchFamily="18" charset="0"/>
+              </a:rPr>
+              <a:t>obiectelor</a:t>
+            </a:r>
+            <a:r>
+              <a:rPr lang="en-GB" dirty="0">
+                <a:latin typeface="Times New Roman" panose="02020603050405020304" pitchFamily="18" charset="0"/>
+                <a:cs typeface="Times New Roman" panose="02020603050405020304" pitchFamily="18" charset="0"/>
+              </a:rPr>
+              <a:t> (</a:t>
+            </a:r>
+            <a:r>
+              <a:rPr lang="en-GB" dirty="0" err="1">
+                <a:latin typeface="Times New Roman" panose="02020603050405020304" pitchFamily="18" charset="0"/>
+                <a:cs typeface="Times New Roman" panose="02020603050405020304" pitchFamily="18" charset="0"/>
+              </a:rPr>
+              <a:t>utilizând</a:t>
+            </a:r>
+            <a:r>
+              <a:rPr lang="en-GB" dirty="0">
+                <a:latin typeface="Times New Roman" panose="02020603050405020304" pitchFamily="18" charset="0"/>
+                <a:cs typeface="Times New Roman" panose="02020603050405020304" pitchFamily="18" charset="0"/>
+              </a:rPr>
+              <a:t> </a:t>
+            </a:r>
+            <a:r>
+              <a:rPr lang="en-GB" dirty="0" err="1">
+                <a:latin typeface="Times New Roman" panose="02020603050405020304" pitchFamily="18" charset="0"/>
+                <a:cs typeface="Times New Roman" panose="02020603050405020304" pitchFamily="18" charset="0"/>
+              </a:rPr>
+              <a:t>metode</a:t>
+            </a:r>
+            <a:r>
+              <a:rPr lang="en-GB" dirty="0">
+                <a:latin typeface="Times New Roman" panose="02020603050405020304" pitchFamily="18" charset="0"/>
+                <a:cs typeface="Times New Roman" panose="02020603050405020304" pitchFamily="18" charset="0"/>
+              </a:rPr>
+              <a:t> dedicate)-</a:t>
+            </a:r>
+            <a:r>
+              <a:rPr lang="en-GB" dirty="0" err="1">
+                <a:latin typeface="Times New Roman" panose="02020603050405020304" pitchFamily="18" charset="0"/>
+                <a:cs typeface="Times New Roman" panose="02020603050405020304" pitchFamily="18" charset="0"/>
+              </a:rPr>
+              <a:t>comunicarea</a:t>
+            </a:r>
+            <a:r>
+              <a:rPr lang="en-GB" dirty="0">
+                <a:latin typeface="Times New Roman" panose="02020603050405020304" pitchFamily="18" charset="0"/>
+                <a:cs typeface="Times New Roman" panose="02020603050405020304" pitchFamily="18" charset="0"/>
+              </a:rPr>
+              <a:t> </a:t>
+            </a:r>
+            <a:r>
+              <a:rPr lang="en-GB" dirty="0" err="1">
+                <a:latin typeface="Times New Roman" panose="02020603050405020304" pitchFamily="18" charset="0"/>
+                <a:cs typeface="Times New Roman" panose="02020603050405020304" pitchFamily="18" charset="0"/>
+              </a:rPr>
+              <a:t>între</a:t>
+            </a:r>
+            <a:r>
+              <a:rPr lang="en-GB" dirty="0">
+                <a:latin typeface="Times New Roman" panose="02020603050405020304" pitchFamily="18" charset="0"/>
+                <a:cs typeface="Times New Roman" panose="02020603050405020304" pitchFamily="18" charset="0"/>
+              </a:rPr>
+              <a:t> </a:t>
+            </a:r>
+            <a:r>
+              <a:rPr lang="en-GB" dirty="0" err="1">
+                <a:latin typeface="Times New Roman" panose="02020603050405020304" pitchFamily="18" charset="0"/>
+                <a:cs typeface="Times New Roman" panose="02020603050405020304" pitchFamily="18" charset="0"/>
+              </a:rPr>
+              <a:t>obiecte</a:t>
+            </a:r>
+            <a:r>
+              <a:rPr lang="en-GB" dirty="0">
+                <a:latin typeface="Times New Roman" panose="02020603050405020304" pitchFamily="18" charset="0"/>
+                <a:cs typeface="Times New Roman" panose="02020603050405020304" pitchFamily="18" charset="0"/>
+              </a:rPr>
+              <a:t>, </a:t>
+            </a:r>
+            <a:r>
+              <a:rPr lang="en-GB" dirty="0" err="1">
+                <a:latin typeface="Times New Roman" panose="02020603050405020304" pitchFamily="18" charset="0"/>
+                <a:cs typeface="Times New Roman" panose="02020603050405020304" pitchFamily="18" charset="0"/>
+              </a:rPr>
+              <a:t>prin</a:t>
+            </a:r>
+            <a:r>
+              <a:rPr lang="en-GB" dirty="0">
+                <a:latin typeface="Times New Roman" panose="02020603050405020304" pitchFamily="18" charset="0"/>
+                <a:cs typeface="Times New Roman" panose="02020603050405020304" pitchFamily="18" charset="0"/>
+              </a:rPr>
+              <a:t> </a:t>
+            </a:r>
+            <a:r>
+              <a:rPr lang="en-GB" dirty="0" err="1">
+                <a:latin typeface="Times New Roman" panose="02020603050405020304" pitchFamily="18" charset="0"/>
+                <a:cs typeface="Times New Roman" panose="02020603050405020304" pitchFamily="18" charset="0"/>
+              </a:rPr>
+              <a:t>mesaje</a:t>
+            </a:r>
+            <a:endParaRPr lang="en-GB" dirty="0">
+              <a:latin typeface="Times New Roman" panose="02020603050405020304" pitchFamily="18" charset="0"/>
+              <a:cs typeface="Times New Roman" panose="02020603050405020304" pitchFamily="18" charset="0"/>
+            </a:endParaRPr>
+          </a:p>
+          <a:p>
+            <a:pPr algn="just">
+              <a:buFont typeface="Wingdings" panose="05000000000000000000" pitchFamily="2" charset="2"/>
+              <a:buChar char="§"/>
+            </a:pPr>
+            <a:r>
+              <a:rPr lang="en-GB" dirty="0">
+                <a:latin typeface="Times New Roman" panose="02020603050405020304" pitchFamily="18" charset="0"/>
+                <a:cs typeface="Times New Roman" panose="02020603050405020304" pitchFamily="18" charset="0"/>
+              </a:rPr>
+              <a:t>(</a:t>
+            </a:r>
+            <a:r>
+              <a:rPr lang="en-GB" dirty="0" err="1">
+                <a:latin typeface="Times New Roman" panose="02020603050405020304" pitchFamily="18" charset="0"/>
+                <a:cs typeface="Times New Roman" panose="02020603050405020304" pitchFamily="18" charset="0"/>
+              </a:rPr>
+              <a:t>solicitări</a:t>
+            </a:r>
+            <a:r>
+              <a:rPr lang="en-GB" dirty="0">
+                <a:latin typeface="Times New Roman" panose="02020603050405020304" pitchFamily="18" charset="0"/>
+                <a:cs typeface="Times New Roman" panose="02020603050405020304" pitchFamily="18" charset="0"/>
+              </a:rPr>
+              <a:t> de </a:t>
+            </a:r>
+            <a:r>
+              <a:rPr lang="en-GB" dirty="0" err="1">
+                <a:latin typeface="Times New Roman" panose="02020603050405020304" pitchFamily="18" charset="0"/>
+                <a:cs typeface="Times New Roman" panose="02020603050405020304" pitchFamily="18" charset="0"/>
+              </a:rPr>
+              <a:t>apeluri</a:t>
+            </a:r>
+            <a:r>
+              <a:rPr lang="en-GB" dirty="0">
+                <a:latin typeface="Times New Roman" panose="02020603050405020304" pitchFamily="18" charset="0"/>
+                <a:cs typeface="Times New Roman" panose="02020603050405020304" pitchFamily="18" charset="0"/>
+              </a:rPr>
+              <a:t> ale </a:t>
+            </a:r>
+            <a:r>
+              <a:rPr lang="en-GB" dirty="0" err="1">
+                <a:latin typeface="Times New Roman" panose="02020603050405020304" pitchFamily="18" charset="0"/>
+                <a:cs typeface="Times New Roman" panose="02020603050405020304" pitchFamily="18" charset="0"/>
+              </a:rPr>
+              <a:t>anumitor</a:t>
+            </a:r>
+            <a:r>
+              <a:rPr lang="en-GB" dirty="0">
+                <a:latin typeface="Times New Roman" panose="02020603050405020304" pitchFamily="18" charset="0"/>
+                <a:cs typeface="Times New Roman" panose="02020603050405020304" pitchFamily="18" charset="0"/>
+              </a:rPr>
+              <a:t> </a:t>
+            </a:r>
+            <a:r>
+              <a:rPr lang="en-GB" dirty="0" err="1">
+                <a:latin typeface="Times New Roman" panose="02020603050405020304" pitchFamily="18" charset="0"/>
+                <a:cs typeface="Times New Roman" panose="02020603050405020304" pitchFamily="18" charset="0"/>
+              </a:rPr>
+              <a:t>metode</a:t>
+            </a:r>
+            <a:r>
+              <a:rPr lang="en-GB" dirty="0">
+                <a:latin typeface="Times New Roman" panose="02020603050405020304" pitchFamily="18" charset="0"/>
+                <a:cs typeface="Times New Roman" panose="02020603050405020304" pitchFamily="18" charset="0"/>
+              </a:rPr>
+              <a:t>)</a:t>
+            </a:r>
+          </a:p>
+          <a:p>
+            <a:pPr algn="just">
+              <a:buFont typeface="Wingdings" panose="05000000000000000000" pitchFamily="2" charset="2"/>
+              <a:buChar char="§"/>
+            </a:pPr>
+            <a:r>
+              <a:rPr lang="en-GB" dirty="0">
+                <a:latin typeface="Times New Roman" panose="02020603050405020304" pitchFamily="18" charset="0"/>
+                <a:cs typeface="Times New Roman" panose="02020603050405020304" pitchFamily="18" charset="0"/>
+              </a:rPr>
+              <a:t>-</a:t>
+            </a:r>
+            <a:r>
+              <a:rPr lang="en-GB" dirty="0" err="1">
+                <a:latin typeface="Times New Roman" panose="02020603050405020304" pitchFamily="18" charset="0"/>
+                <a:cs typeface="Times New Roman" panose="02020603050405020304" pitchFamily="18" charset="0"/>
+              </a:rPr>
+              <a:t>trimiterea</a:t>
+            </a:r>
+            <a:r>
+              <a:rPr lang="en-GB" dirty="0">
+                <a:latin typeface="Times New Roman" panose="02020603050405020304" pitchFamily="18" charset="0"/>
+                <a:cs typeface="Times New Roman" panose="02020603050405020304" pitchFamily="18" charset="0"/>
+              </a:rPr>
+              <a:t> </a:t>
+            </a:r>
+            <a:r>
+              <a:rPr lang="en-GB" dirty="0" err="1">
+                <a:latin typeface="Times New Roman" panose="02020603050405020304" pitchFamily="18" charset="0"/>
+                <a:cs typeface="Times New Roman" panose="02020603050405020304" pitchFamily="18" charset="0"/>
+              </a:rPr>
+              <a:t>unui</a:t>
+            </a:r>
+            <a:r>
+              <a:rPr lang="en-GB" dirty="0">
+                <a:latin typeface="Times New Roman" panose="02020603050405020304" pitchFamily="18" charset="0"/>
+                <a:cs typeface="Times New Roman" panose="02020603050405020304" pitchFamily="18" charset="0"/>
+              </a:rPr>
+              <a:t> </a:t>
+            </a:r>
+            <a:r>
+              <a:rPr lang="en-GB" dirty="0" err="1">
+                <a:latin typeface="Times New Roman" panose="02020603050405020304" pitchFamily="18" charset="0"/>
+                <a:cs typeface="Times New Roman" panose="02020603050405020304" pitchFamily="18" charset="0"/>
+              </a:rPr>
+              <a:t>mesaj</a:t>
+            </a:r>
+            <a:r>
+              <a:rPr lang="en-GB" dirty="0">
+                <a:latin typeface="Times New Roman" panose="02020603050405020304" pitchFamily="18" charset="0"/>
+                <a:cs typeface="Times New Roman" panose="02020603050405020304" pitchFamily="18" charset="0"/>
+              </a:rPr>
+              <a:t> </a:t>
+            </a:r>
+            <a:r>
+              <a:rPr lang="en-GB" dirty="0" err="1">
+                <a:latin typeface="Times New Roman" panose="02020603050405020304" pitchFamily="18" charset="0"/>
+                <a:cs typeface="Times New Roman" panose="02020603050405020304" pitchFamily="18" charset="0"/>
+              </a:rPr>
+              <a:t>către</a:t>
+            </a:r>
+            <a:r>
+              <a:rPr lang="en-GB" dirty="0">
+                <a:latin typeface="Times New Roman" panose="02020603050405020304" pitchFamily="18" charset="0"/>
+                <a:cs typeface="Times New Roman" panose="02020603050405020304" pitchFamily="18" charset="0"/>
+              </a:rPr>
+              <a:t> </a:t>
+            </a:r>
+            <a:r>
+              <a:rPr lang="en-GB" dirty="0" err="1">
+                <a:latin typeface="Times New Roman" panose="02020603050405020304" pitchFamily="18" charset="0"/>
+                <a:cs typeface="Times New Roman" panose="02020603050405020304" pitchFamily="18" charset="0"/>
+              </a:rPr>
+              <a:t>mai</a:t>
+            </a:r>
+            <a:r>
+              <a:rPr lang="en-GB" dirty="0">
+                <a:latin typeface="Times New Roman" panose="02020603050405020304" pitchFamily="18" charset="0"/>
+                <a:cs typeface="Times New Roman" panose="02020603050405020304" pitchFamily="18" charset="0"/>
+              </a:rPr>
+              <a:t> </a:t>
+            </a:r>
+            <a:r>
+              <a:rPr lang="en-GB" dirty="0" err="1">
+                <a:latin typeface="Times New Roman" panose="02020603050405020304" pitchFamily="18" charset="0"/>
+                <a:cs typeface="Times New Roman" panose="02020603050405020304" pitchFamily="18" charset="0"/>
+              </a:rPr>
+              <a:t>multe</a:t>
+            </a:r>
+            <a:r>
+              <a:rPr lang="en-GB" dirty="0">
+                <a:latin typeface="Times New Roman" panose="02020603050405020304" pitchFamily="18" charset="0"/>
+                <a:cs typeface="Times New Roman" panose="02020603050405020304" pitchFamily="18" charset="0"/>
+              </a:rPr>
+              <a:t> </a:t>
+            </a:r>
+            <a:r>
+              <a:rPr lang="en-GB" dirty="0" err="1">
+                <a:latin typeface="Times New Roman" panose="02020603050405020304" pitchFamily="18" charset="0"/>
+                <a:cs typeface="Times New Roman" panose="02020603050405020304" pitchFamily="18" charset="0"/>
+              </a:rPr>
+              <a:t>obiecte</a:t>
+            </a:r>
+            <a:r>
+              <a:rPr lang="en-GB" dirty="0">
+                <a:latin typeface="Times New Roman" panose="02020603050405020304" pitchFamily="18" charset="0"/>
+                <a:cs typeface="Times New Roman" panose="02020603050405020304" pitchFamily="18" charset="0"/>
+              </a:rPr>
+              <a:t>.</a:t>
+            </a:r>
+          </a:p>
+          <a:p>
+            <a:pPr algn="just">
+              <a:buFont typeface="Wingdings" panose="05000000000000000000" pitchFamily="2" charset="2"/>
+              <a:buChar char="§"/>
+            </a:pPr>
+            <a:r>
+              <a:rPr lang="en-GB" dirty="0">
+                <a:latin typeface="Times New Roman" panose="02020603050405020304" pitchFamily="18" charset="0"/>
+                <a:cs typeface="Times New Roman" panose="02020603050405020304" pitchFamily="18" charset="0"/>
+              </a:rPr>
+              <a:t>-</a:t>
+            </a:r>
+            <a:r>
+              <a:rPr lang="en-GB" dirty="0" err="1">
+                <a:latin typeface="Times New Roman" panose="02020603050405020304" pitchFamily="18" charset="0"/>
+                <a:cs typeface="Times New Roman" panose="02020603050405020304" pitchFamily="18" charset="0"/>
+              </a:rPr>
+              <a:t>același</a:t>
+            </a:r>
+            <a:r>
+              <a:rPr lang="en-GB" dirty="0">
+                <a:latin typeface="Times New Roman" panose="02020603050405020304" pitchFamily="18" charset="0"/>
+                <a:cs typeface="Times New Roman" panose="02020603050405020304" pitchFamily="18" charset="0"/>
+              </a:rPr>
+              <a:t> </a:t>
+            </a:r>
+            <a:r>
+              <a:rPr lang="en-GB" dirty="0" err="1">
+                <a:latin typeface="Times New Roman" panose="02020603050405020304" pitchFamily="18" charset="0"/>
+                <a:cs typeface="Times New Roman" panose="02020603050405020304" pitchFamily="18" charset="0"/>
+              </a:rPr>
+              <a:t>mesaj</a:t>
+            </a:r>
+            <a:r>
+              <a:rPr lang="en-GB" dirty="0">
+                <a:latin typeface="Times New Roman" panose="02020603050405020304" pitchFamily="18" charset="0"/>
+                <a:cs typeface="Times New Roman" panose="02020603050405020304" pitchFamily="18" charset="0"/>
+              </a:rPr>
+              <a:t> </a:t>
+            </a:r>
+            <a:r>
+              <a:rPr lang="en-GB" dirty="0" err="1">
+                <a:latin typeface="Times New Roman" panose="02020603050405020304" pitchFamily="18" charset="0"/>
+                <a:cs typeface="Times New Roman" panose="02020603050405020304" pitchFamily="18" charset="0"/>
+              </a:rPr>
+              <a:t>poate</a:t>
+            </a:r>
+            <a:r>
+              <a:rPr lang="en-GB" dirty="0">
+                <a:latin typeface="Times New Roman" panose="02020603050405020304" pitchFamily="18" charset="0"/>
+                <a:cs typeface="Times New Roman" panose="02020603050405020304" pitchFamily="18" charset="0"/>
+              </a:rPr>
+              <a:t> genera </a:t>
+            </a:r>
+            <a:r>
+              <a:rPr lang="en-GB" dirty="0" err="1">
+                <a:latin typeface="Times New Roman" panose="02020603050405020304" pitchFamily="18" charset="0"/>
+                <a:cs typeface="Times New Roman" panose="02020603050405020304" pitchFamily="18" charset="0"/>
+              </a:rPr>
+              <a:t>comportamente</a:t>
+            </a:r>
+            <a:r>
+              <a:rPr lang="en-GB" dirty="0">
+                <a:latin typeface="Times New Roman" panose="02020603050405020304" pitchFamily="18" charset="0"/>
+                <a:cs typeface="Times New Roman" panose="02020603050405020304" pitchFamily="18" charset="0"/>
+              </a:rPr>
+              <a:t> </a:t>
+            </a:r>
+            <a:r>
+              <a:rPr lang="en-GB" dirty="0" err="1">
+                <a:latin typeface="Times New Roman" panose="02020603050405020304" pitchFamily="18" charset="0"/>
+                <a:cs typeface="Times New Roman" panose="02020603050405020304" pitchFamily="18" charset="0"/>
+              </a:rPr>
+              <a:t>diferite</a:t>
+            </a:r>
+            <a:endParaRPr lang="en-GB" dirty="0">
+              <a:latin typeface="Times New Roman" panose="02020603050405020304" pitchFamily="18" charset="0"/>
+              <a:cs typeface="Times New Roman" panose="02020603050405020304" pitchFamily="18" charset="0"/>
+            </a:endParaRPr>
+          </a:p>
+          <a:p>
+            <a:pPr algn="just">
+              <a:buFont typeface="Wingdings" panose="05000000000000000000" pitchFamily="2" charset="2"/>
+              <a:buChar char="§"/>
+            </a:pPr>
+            <a:r>
+              <a:rPr lang="en-GB" dirty="0">
+                <a:latin typeface="Times New Roman" panose="02020603050405020304" pitchFamily="18" charset="0"/>
+                <a:cs typeface="Times New Roman" panose="02020603050405020304" pitchFamily="18" charset="0"/>
+              </a:rPr>
+              <a:t>din </a:t>
+            </a:r>
+            <a:r>
+              <a:rPr lang="en-GB" dirty="0" err="1">
+                <a:latin typeface="Times New Roman" panose="02020603050405020304" pitchFamily="18" charset="0"/>
+                <a:cs typeface="Times New Roman" panose="02020603050405020304" pitchFamily="18" charset="0"/>
+              </a:rPr>
+              <a:t>partea</a:t>
+            </a:r>
+            <a:r>
+              <a:rPr lang="en-GB" dirty="0">
+                <a:latin typeface="Times New Roman" panose="02020603050405020304" pitchFamily="18" charset="0"/>
+                <a:cs typeface="Times New Roman" panose="02020603050405020304" pitchFamily="18" charset="0"/>
+              </a:rPr>
+              <a:t> </a:t>
+            </a:r>
+            <a:r>
+              <a:rPr lang="en-GB" dirty="0" err="1">
+                <a:latin typeface="Times New Roman" panose="02020603050405020304" pitchFamily="18" charset="0"/>
+                <a:cs typeface="Times New Roman" panose="02020603050405020304" pitchFamily="18" charset="0"/>
+              </a:rPr>
+              <a:t>unor</a:t>
+            </a:r>
+            <a:r>
+              <a:rPr lang="en-GB" dirty="0">
+                <a:latin typeface="Times New Roman" panose="02020603050405020304" pitchFamily="18" charset="0"/>
+                <a:cs typeface="Times New Roman" panose="02020603050405020304" pitchFamily="18" charset="0"/>
+              </a:rPr>
+              <a:t> </a:t>
+            </a:r>
+            <a:r>
+              <a:rPr lang="en-GB" dirty="0" err="1">
+                <a:latin typeface="Times New Roman" panose="02020603050405020304" pitchFamily="18" charset="0"/>
+                <a:cs typeface="Times New Roman" panose="02020603050405020304" pitchFamily="18" charset="0"/>
+              </a:rPr>
+              <a:t>obiecte</a:t>
+            </a:r>
+            <a:r>
+              <a:rPr lang="en-GB" dirty="0">
+                <a:latin typeface="Times New Roman" panose="02020603050405020304" pitchFamily="18" charset="0"/>
+                <a:cs typeface="Times New Roman" panose="02020603050405020304" pitchFamily="18" charset="0"/>
+              </a:rPr>
+              <a:t> </a:t>
+            </a:r>
+            <a:r>
+              <a:rPr lang="en-GB" dirty="0" err="1">
+                <a:latin typeface="Times New Roman" panose="02020603050405020304" pitchFamily="18" charset="0"/>
+                <a:cs typeface="Times New Roman" panose="02020603050405020304" pitchFamily="18" charset="0"/>
+              </a:rPr>
+              <a:t>diferite</a:t>
+            </a:r>
+            <a:r>
+              <a:rPr lang="en-GB" dirty="0">
+                <a:latin typeface="Times New Roman" panose="02020603050405020304" pitchFamily="18" charset="0"/>
+                <a:cs typeface="Times New Roman" panose="02020603050405020304" pitchFamily="18" charset="0"/>
+              </a:rPr>
+              <a:t> (</a:t>
+            </a:r>
+            <a:r>
+              <a:rPr lang="en-GB" dirty="0" err="1">
+                <a:latin typeface="Times New Roman" panose="02020603050405020304" pitchFamily="18" charset="0"/>
+                <a:cs typeface="Times New Roman" panose="02020603050405020304" pitchFamily="18" charset="0"/>
+              </a:rPr>
+              <a:t>polimorfism</a:t>
+            </a:r>
+            <a:endParaRPr lang="en-GB" dirty="0">
+              <a:latin typeface="Times New Roman" panose="02020603050405020304" pitchFamily="18" charset="0"/>
+              <a:cs typeface="Times New Roman" panose="02020603050405020304" pitchFamily="18" charset="0"/>
+            </a:endParaRPr>
+          </a:p>
+        </p:txBody>
+      </p:sp>
+      <p:sp>
+        <p:nvSpPr>
+          <p:cNvPr id="5" name="Rectangle 4"/>
+          <p:cNvSpPr/>
+          <p:nvPr/>
+        </p:nvSpPr>
+        <p:spPr>
+          <a:xfrm>
+            <a:off x="-15239" y="534145"/>
+            <a:ext cx="9159239" cy="739300"/>
+          </a:xfrm>
+          <a:prstGeom prst="rect">
+            <a:avLst/>
+          </a:prstGeom>
+          <a:solidFill>
+            <a:schemeClr val="bg1">
+              <a:lumMod val="50000"/>
+            </a:schemeClr>
+          </a:solidFill>
+          <a:ln>
+            <a:noFill/>
+          </a:ln>
+        </p:spPr>
+        <p:style>
+          <a:lnRef idx="2">
+            <a:schemeClr val="accent1">
+              <a:shade val="50000"/>
+            </a:schemeClr>
+          </a:lnRef>
+          <a:fillRef idx="1">
+            <a:schemeClr val="accent1"/>
+          </a:fillRef>
+          <a:effectRef idx="0">
+            <a:schemeClr val="accent1"/>
+          </a:effectRef>
+          <a:fontRef idx="minor">
+            <a:schemeClr val="lt1"/>
+          </a:fontRef>
+        </p:style>
+        <p:txBody>
+          <a:bodyPr rtlCol="0" anchor="ctr"/>
+          <a:lstStyle/>
+          <a:p>
+            <a:pPr algn="just">
+              <a:buFont typeface="Wingdings" panose="05000000000000000000" pitchFamily="2" charset="2"/>
+              <a:buChar char="§"/>
+            </a:pPr>
+            <a:r>
+              <a:rPr lang="ro-RO" sz="2400" dirty="0">
+                <a:latin typeface="Times New Roman" panose="02020603050405020304" pitchFamily="18" charset="0"/>
+                <a:cs typeface="Times New Roman" panose="02020603050405020304" pitchFamily="18" charset="0"/>
+              </a:rPr>
+              <a:t>(Gestiunea) </a:t>
+            </a:r>
+            <a:r>
+              <a:rPr lang="en-GB" sz="2400" dirty="0" err="1">
+                <a:latin typeface="Times New Roman" panose="02020603050405020304" pitchFamily="18" charset="0"/>
+                <a:cs typeface="Times New Roman" panose="02020603050405020304" pitchFamily="18" charset="0"/>
+              </a:rPr>
+              <a:t>modelului</a:t>
+            </a:r>
+            <a:r>
+              <a:rPr lang="en-GB" sz="2400" dirty="0">
+                <a:latin typeface="Times New Roman" panose="02020603050405020304" pitchFamily="18" charset="0"/>
+                <a:cs typeface="Times New Roman" panose="02020603050405020304" pitchFamily="18" charset="0"/>
+              </a:rPr>
+              <a:t> </a:t>
+            </a:r>
+            <a:r>
+              <a:rPr lang="en-GB" sz="2400" dirty="0" err="1">
+                <a:latin typeface="Times New Roman" panose="02020603050405020304" pitchFamily="18" charset="0"/>
+                <a:cs typeface="Times New Roman" panose="02020603050405020304" pitchFamily="18" charset="0"/>
+              </a:rPr>
+              <a:t>orientat</a:t>
+            </a:r>
+            <a:r>
+              <a:rPr lang="en-GB" sz="2400" dirty="0">
+                <a:latin typeface="Times New Roman" panose="02020603050405020304" pitchFamily="18" charset="0"/>
+                <a:cs typeface="Times New Roman" panose="02020603050405020304" pitchFamily="18" charset="0"/>
+              </a:rPr>
+              <a:t> </a:t>
+            </a:r>
+            <a:r>
+              <a:rPr lang="en-GB" sz="2400" dirty="0" err="1">
+                <a:latin typeface="Times New Roman" panose="02020603050405020304" pitchFamily="18" charset="0"/>
+                <a:cs typeface="Times New Roman" panose="02020603050405020304" pitchFamily="18" charset="0"/>
+              </a:rPr>
+              <a:t>obiect</a:t>
+            </a:r>
+            <a:endParaRPr lang="en-GB" sz="2400" dirty="0">
+              <a:latin typeface="Times New Roman" panose="02020603050405020304" pitchFamily="18" charset="0"/>
+              <a:cs typeface="Times New Roman" panose="02020603050405020304" pitchFamily="18" charset="0"/>
+            </a:endParaRPr>
+          </a:p>
+        </p:txBody>
+      </p:sp>
+    </p:spTree>
+    <p:extLst>
+      <p:ext uri="{BB962C8B-B14F-4D97-AF65-F5344CB8AC3E}">
+        <p14:creationId xmlns:p14="http://schemas.microsoft.com/office/powerpoint/2010/main" val="3669740285"/>
+      </p:ext>
+    </p:extLst>
+  </p:cSld>
+  <p:clrMapOvr>
+    <a:masterClrMapping/>
+  </p:clrMapOvr>
+</p:sld>
+</file>
+
+<file path=ppt/slides/slide27.xml><?xml version="1.0" encoding="utf-8"?>
+<p:sld xmlns:a="http://schemas.openxmlformats.org/drawingml/2006/main" xmlns:r="http://schemas.openxmlformats.org/officeDocument/2006/relationships" xmlns:p="http://schemas.openxmlformats.org/presentationml/2006/main">
+  <p:cSld>
+    <p:spTree>
+      <p:nvGrpSpPr>
+        <p:cNvPr id="1" name=""/>
+        <p:cNvGrpSpPr/>
+        <p:nvPr/>
+      </p:nvGrpSpPr>
+      <p:grpSpPr>
+        <a:xfrm>
+          <a:off x="0" y="0"/>
+          <a:ext cx="0" cy="0"/>
+          <a:chOff x="0" y="0"/>
+          <a:chExt cx="0" cy="0"/>
+        </a:xfrm>
+      </p:grpSpPr>
+      <p:sp>
+        <p:nvSpPr>
+          <p:cNvPr id="2" name="Title 1"/>
+          <p:cNvSpPr>
+            <a:spLocks noGrp="1"/>
+          </p:cNvSpPr>
+          <p:nvPr>
+            <p:ph type="title"/>
+          </p:nvPr>
+        </p:nvSpPr>
+        <p:spPr/>
+        <p:txBody>
+          <a:bodyPr>
+            <a:normAutofit fontScale="90000"/>
+          </a:bodyPr>
+          <a:lstStyle/>
+          <a:p>
+            <a:br>
+              <a:rPr lang="en-GB" dirty="0"/>
+            </a:br>
+            <a:endParaRPr lang="en-GB" dirty="0"/>
+          </a:p>
+        </p:txBody>
+      </p:sp>
+      <p:sp>
+        <p:nvSpPr>
+          <p:cNvPr id="3" name="Content Placeholder 2"/>
+          <p:cNvSpPr>
+            <a:spLocks noGrp="1"/>
+          </p:cNvSpPr>
+          <p:nvPr>
+            <p:ph idx="1"/>
+          </p:nvPr>
+        </p:nvSpPr>
+        <p:spPr/>
+        <p:txBody>
+          <a:bodyPr>
+            <a:normAutofit fontScale="85000" lnSpcReduction="20000"/>
+          </a:bodyPr>
+          <a:lstStyle/>
+          <a:p>
+            <a:pPr algn="just">
+              <a:buFont typeface="Wingdings" panose="05000000000000000000" pitchFamily="2" charset="2"/>
+              <a:buChar char="§"/>
+            </a:pPr>
+            <a:r>
+              <a:rPr lang="en-GB" dirty="0">
+                <a:latin typeface="Times New Roman" panose="02020603050405020304" pitchFamily="18" charset="0"/>
+                <a:cs typeface="Times New Roman" panose="02020603050405020304" pitchFamily="18" charset="0"/>
+              </a:rPr>
+              <a:t>1.toate </a:t>
+            </a:r>
+            <a:r>
+              <a:rPr lang="en-GB" dirty="0" err="1">
+                <a:latin typeface="Times New Roman" panose="02020603050405020304" pitchFamily="18" charset="0"/>
+                <a:cs typeface="Times New Roman" panose="02020603050405020304" pitchFamily="18" charset="0"/>
+              </a:rPr>
+              <a:t>obiectele</a:t>
+            </a:r>
+            <a:r>
+              <a:rPr lang="en-GB" dirty="0">
+                <a:latin typeface="Times New Roman" panose="02020603050405020304" pitchFamily="18" charset="0"/>
+                <a:cs typeface="Times New Roman" panose="02020603050405020304" pitchFamily="18" charset="0"/>
+              </a:rPr>
+              <a:t> </a:t>
+            </a:r>
+            <a:r>
+              <a:rPr lang="en-GB" dirty="0" err="1">
+                <a:latin typeface="Times New Roman" panose="02020603050405020304" pitchFamily="18" charset="0"/>
+                <a:cs typeface="Times New Roman" panose="02020603050405020304" pitchFamily="18" charset="0"/>
+              </a:rPr>
+              <a:t>trebuie</a:t>
+            </a:r>
+            <a:r>
+              <a:rPr lang="en-GB" dirty="0">
+                <a:latin typeface="Times New Roman" panose="02020603050405020304" pitchFamily="18" charset="0"/>
+                <a:cs typeface="Times New Roman" panose="02020603050405020304" pitchFamily="18" charset="0"/>
+              </a:rPr>
+              <a:t> </a:t>
+            </a:r>
+            <a:r>
+              <a:rPr lang="en-GB" dirty="0" err="1">
+                <a:latin typeface="Times New Roman" panose="02020603050405020304" pitchFamily="18" charset="0"/>
+                <a:cs typeface="Times New Roman" panose="02020603050405020304" pitchFamily="18" charset="0"/>
+              </a:rPr>
+              <a:t>să</a:t>
+            </a:r>
+            <a:r>
+              <a:rPr lang="en-GB" dirty="0">
+                <a:latin typeface="Times New Roman" panose="02020603050405020304" pitchFamily="18" charset="0"/>
+                <a:cs typeface="Times New Roman" panose="02020603050405020304" pitchFamily="18" charset="0"/>
+              </a:rPr>
+              <a:t> </a:t>
+            </a:r>
+            <a:r>
+              <a:rPr lang="en-GB" dirty="0" err="1">
+                <a:latin typeface="Times New Roman" panose="02020603050405020304" pitchFamily="18" charset="0"/>
+                <a:cs typeface="Times New Roman" panose="02020603050405020304" pitchFamily="18" charset="0"/>
+              </a:rPr>
+              <a:t>respecte</a:t>
+            </a:r>
+            <a:r>
+              <a:rPr lang="ro-RO" dirty="0">
+                <a:latin typeface="Times New Roman" panose="02020603050405020304" pitchFamily="18" charset="0"/>
+                <a:cs typeface="Times New Roman" panose="02020603050405020304" pitchFamily="18" charset="0"/>
+              </a:rPr>
+              <a:t> </a:t>
+            </a:r>
+            <a:r>
+              <a:rPr lang="en-GB" dirty="0" err="1">
+                <a:latin typeface="Times New Roman" panose="02020603050405020304" pitchFamily="18" charset="0"/>
+                <a:cs typeface="Times New Roman" panose="02020603050405020304" pitchFamily="18" charset="0"/>
+              </a:rPr>
+              <a:t>protocolul</a:t>
+            </a:r>
+            <a:r>
+              <a:rPr lang="en-GB" dirty="0">
+                <a:latin typeface="Times New Roman" panose="02020603050405020304" pitchFamily="18" charset="0"/>
+                <a:cs typeface="Times New Roman" panose="02020603050405020304" pitchFamily="18" charset="0"/>
+              </a:rPr>
+              <a:t> </a:t>
+            </a:r>
+            <a:r>
+              <a:rPr lang="en-GB" dirty="0" err="1">
+                <a:latin typeface="Times New Roman" panose="02020603050405020304" pitchFamily="18" charset="0"/>
+                <a:cs typeface="Times New Roman" panose="02020603050405020304" pitchFamily="18" charset="0"/>
+              </a:rPr>
+              <a:t>specificat</a:t>
+            </a:r>
+            <a:r>
+              <a:rPr lang="en-GB" dirty="0">
+                <a:latin typeface="Times New Roman" panose="02020603050405020304" pitchFamily="18" charset="0"/>
+                <a:cs typeface="Times New Roman" panose="02020603050405020304" pitchFamily="18" charset="0"/>
+              </a:rPr>
+              <a:t> la </a:t>
+            </a:r>
+            <a:r>
+              <a:rPr lang="en-GB" dirty="0" err="1">
+                <a:latin typeface="Times New Roman" panose="02020603050405020304" pitchFamily="18" charset="0"/>
+                <a:cs typeface="Times New Roman" panose="02020603050405020304" pitchFamily="18" charset="0"/>
+              </a:rPr>
+              <a:t>definirea</a:t>
+            </a:r>
+            <a:r>
+              <a:rPr lang="en-GB" dirty="0">
+                <a:latin typeface="Times New Roman" panose="02020603050405020304" pitchFamily="18" charset="0"/>
+                <a:cs typeface="Times New Roman" panose="02020603050405020304" pitchFamily="18" charset="0"/>
+              </a:rPr>
+              <a:t> </a:t>
+            </a:r>
+            <a:r>
+              <a:rPr lang="en-GB" dirty="0" err="1">
+                <a:latin typeface="Times New Roman" panose="02020603050405020304" pitchFamily="18" charset="0"/>
+                <a:cs typeface="Times New Roman" panose="02020603050405020304" pitchFamily="18" charset="0"/>
+              </a:rPr>
+              <a:t>clasei</a:t>
+            </a:r>
+            <a:r>
+              <a:rPr lang="en-GB" dirty="0">
+                <a:latin typeface="Times New Roman" panose="02020603050405020304" pitchFamily="18" charset="0"/>
+                <a:cs typeface="Times New Roman" panose="02020603050405020304" pitchFamily="18" charset="0"/>
+              </a:rPr>
+              <a:t> </a:t>
+            </a:r>
+            <a:r>
+              <a:rPr lang="en-GB" dirty="0" err="1">
+                <a:latin typeface="Times New Roman" panose="02020603050405020304" pitchFamily="18" charset="0"/>
+                <a:cs typeface="Times New Roman" panose="02020603050405020304" pitchFamily="18" charset="0"/>
+              </a:rPr>
+              <a:t>lor</a:t>
+            </a:r>
+            <a:r>
+              <a:rPr lang="ro-RO" dirty="0">
+                <a:latin typeface="Times New Roman" panose="02020603050405020304" pitchFamily="18" charset="0"/>
+                <a:cs typeface="Times New Roman" panose="02020603050405020304" pitchFamily="18" charset="0"/>
+              </a:rPr>
+              <a:t>:</a:t>
+            </a:r>
+          </a:p>
+          <a:p>
+            <a:pPr algn="just">
+              <a:buFont typeface="Wingdings" panose="05000000000000000000" pitchFamily="2" charset="2"/>
+              <a:buChar char="§"/>
+            </a:pPr>
+            <a:r>
+              <a:rPr lang="en-GB" dirty="0">
+                <a:latin typeface="Times New Roman" panose="02020603050405020304" pitchFamily="18" charset="0"/>
+                <a:cs typeface="Times New Roman" panose="02020603050405020304" pitchFamily="18" charset="0"/>
+              </a:rPr>
+              <a:t> -un</a:t>
+            </a:r>
+            <a:r>
+              <a:rPr lang="ro-RO" dirty="0">
+                <a:latin typeface="Times New Roman" panose="02020603050405020304" pitchFamily="18" charset="0"/>
+                <a:cs typeface="Times New Roman" panose="02020603050405020304" pitchFamily="18" charset="0"/>
+              </a:rPr>
+              <a:t> </a:t>
+            </a:r>
+            <a:r>
+              <a:rPr lang="en-GB" dirty="0" err="1">
+                <a:latin typeface="Times New Roman" panose="02020603050405020304" pitchFamily="18" charset="0"/>
+                <a:cs typeface="Times New Roman" panose="02020603050405020304" pitchFamily="18" charset="0"/>
+              </a:rPr>
+              <a:t>obiect</a:t>
+            </a:r>
+            <a:r>
+              <a:rPr lang="en-GB" dirty="0">
+                <a:latin typeface="Times New Roman" panose="02020603050405020304" pitchFamily="18" charset="0"/>
+                <a:cs typeface="Times New Roman" panose="02020603050405020304" pitchFamily="18" charset="0"/>
+              </a:rPr>
+              <a:t> </a:t>
+            </a:r>
+            <a:r>
+              <a:rPr lang="en-GB" dirty="0" err="1">
+                <a:latin typeface="Times New Roman" panose="02020603050405020304" pitchFamily="18" charset="0"/>
+                <a:cs typeface="Times New Roman" panose="02020603050405020304" pitchFamily="18" charset="0"/>
+              </a:rPr>
+              <a:t>poate</a:t>
+            </a:r>
+            <a:r>
+              <a:rPr lang="en-GB" dirty="0">
+                <a:latin typeface="Times New Roman" panose="02020603050405020304" pitchFamily="18" charset="0"/>
+                <a:cs typeface="Times New Roman" panose="02020603050405020304" pitchFamily="18" charset="0"/>
+              </a:rPr>
+              <a:t> </a:t>
+            </a:r>
+            <a:r>
+              <a:rPr lang="en-GB" dirty="0" err="1">
+                <a:latin typeface="Times New Roman" panose="02020603050405020304" pitchFamily="18" charset="0"/>
+                <a:cs typeface="Times New Roman" panose="02020603050405020304" pitchFamily="18" charset="0"/>
+              </a:rPr>
+              <a:t>răspunde</a:t>
+            </a:r>
+            <a:r>
+              <a:rPr lang="en-GB" dirty="0">
+                <a:latin typeface="Times New Roman" panose="02020603050405020304" pitchFamily="18" charset="0"/>
+                <a:cs typeface="Times New Roman" panose="02020603050405020304" pitchFamily="18" charset="0"/>
+              </a:rPr>
+              <a:t> </a:t>
+            </a:r>
+            <a:r>
+              <a:rPr lang="en-GB" dirty="0" err="1">
+                <a:latin typeface="Times New Roman" panose="02020603050405020304" pitchFamily="18" charset="0"/>
+                <a:cs typeface="Times New Roman" panose="02020603050405020304" pitchFamily="18" charset="0"/>
+              </a:rPr>
+              <a:t>doar</a:t>
+            </a:r>
+            <a:r>
+              <a:rPr lang="en-GB" dirty="0">
+                <a:latin typeface="Times New Roman" panose="02020603050405020304" pitchFamily="18" charset="0"/>
+                <a:cs typeface="Times New Roman" panose="02020603050405020304" pitchFamily="18" charset="0"/>
+              </a:rPr>
+              <a:t> la </a:t>
+            </a:r>
+            <a:r>
+              <a:rPr lang="en-GB" dirty="0" err="1">
+                <a:latin typeface="Times New Roman" panose="02020603050405020304" pitchFamily="18" charset="0"/>
+                <a:cs typeface="Times New Roman" panose="02020603050405020304" pitchFamily="18" charset="0"/>
+              </a:rPr>
+              <a:t>mesajele</a:t>
+            </a:r>
+            <a:r>
+              <a:rPr lang="en-GB" dirty="0">
+                <a:latin typeface="Times New Roman" panose="02020603050405020304" pitchFamily="18" charset="0"/>
+                <a:cs typeface="Times New Roman" panose="02020603050405020304" pitchFamily="18" charset="0"/>
+              </a:rPr>
+              <a:t> premise</a:t>
+            </a:r>
+            <a:r>
+              <a:rPr lang="ro-RO" dirty="0">
+                <a:latin typeface="Times New Roman" panose="02020603050405020304" pitchFamily="18" charset="0"/>
+                <a:cs typeface="Times New Roman" panose="02020603050405020304" pitchFamily="18" charset="0"/>
+              </a:rPr>
+              <a:t> </a:t>
+            </a:r>
+            <a:r>
+              <a:rPr lang="en-GB" dirty="0" err="1">
+                <a:latin typeface="Times New Roman" panose="02020603050405020304" pitchFamily="18" charset="0"/>
+                <a:cs typeface="Times New Roman" panose="02020603050405020304" pitchFamily="18" charset="0"/>
+              </a:rPr>
+              <a:t>clasei</a:t>
+            </a:r>
+            <a:r>
+              <a:rPr lang="en-GB" dirty="0">
+                <a:latin typeface="Times New Roman" panose="02020603050405020304" pitchFamily="18" charset="0"/>
+                <a:cs typeface="Times New Roman" panose="02020603050405020304" pitchFamily="18" charset="0"/>
+              </a:rPr>
+              <a:t> a </a:t>
+            </a:r>
+            <a:r>
+              <a:rPr lang="en-GB" dirty="0" err="1">
+                <a:latin typeface="Times New Roman" panose="02020603050405020304" pitchFamily="18" charset="0"/>
+                <a:cs typeface="Times New Roman" panose="02020603050405020304" pitchFamily="18" charset="0"/>
+              </a:rPr>
+              <a:t>cărei</a:t>
+            </a:r>
+            <a:r>
+              <a:rPr lang="en-GB" dirty="0">
+                <a:latin typeface="Times New Roman" panose="02020603050405020304" pitchFamily="18" charset="0"/>
+                <a:cs typeface="Times New Roman" panose="02020603050405020304" pitchFamily="18" charset="0"/>
+              </a:rPr>
+              <a:t> </a:t>
+            </a:r>
+            <a:r>
+              <a:rPr lang="en-GB" dirty="0" err="1">
+                <a:latin typeface="Times New Roman" panose="02020603050405020304" pitchFamily="18" charset="0"/>
+                <a:cs typeface="Times New Roman" panose="02020603050405020304" pitchFamily="18" charset="0"/>
+              </a:rPr>
+              <a:t>instanţiere</a:t>
+            </a:r>
+            <a:r>
+              <a:rPr lang="en-GB" dirty="0">
+                <a:latin typeface="Times New Roman" panose="02020603050405020304" pitchFamily="18" charset="0"/>
+                <a:cs typeface="Times New Roman" panose="02020603050405020304" pitchFamily="18" charset="0"/>
+              </a:rPr>
+              <a:t> </a:t>
+            </a:r>
+            <a:r>
+              <a:rPr lang="en-GB" dirty="0" err="1">
+                <a:latin typeface="Times New Roman" panose="02020603050405020304" pitchFamily="18" charset="0"/>
+                <a:cs typeface="Times New Roman" panose="02020603050405020304" pitchFamily="18" charset="0"/>
+              </a:rPr>
+              <a:t>este</a:t>
+            </a:r>
+            <a:r>
+              <a:rPr lang="en-GB" dirty="0">
+                <a:latin typeface="Times New Roman" panose="02020603050405020304" pitchFamily="18" charset="0"/>
+                <a:cs typeface="Times New Roman" panose="02020603050405020304" pitchFamily="18" charset="0"/>
+              </a:rPr>
+              <a:t>.</a:t>
+            </a:r>
+          </a:p>
+          <a:p>
+            <a:pPr algn="just">
+              <a:buFont typeface="Wingdings" panose="05000000000000000000" pitchFamily="2" charset="2"/>
+              <a:buChar char="§"/>
+            </a:pPr>
+            <a:r>
+              <a:rPr lang="en-GB" dirty="0">
+                <a:latin typeface="Times New Roman" panose="02020603050405020304" pitchFamily="18" charset="0"/>
+                <a:cs typeface="Times New Roman" panose="02020603050405020304" pitchFamily="18" charset="0"/>
+              </a:rPr>
+              <a:t>2. </a:t>
+            </a:r>
+            <a:r>
+              <a:rPr lang="en-GB" dirty="0" err="1">
+                <a:latin typeface="Times New Roman" panose="02020603050405020304" pitchFamily="18" charset="0"/>
+                <a:cs typeface="Times New Roman" panose="02020603050405020304" pitchFamily="18" charset="0"/>
+              </a:rPr>
+              <a:t>accesul</a:t>
+            </a:r>
+            <a:r>
+              <a:rPr lang="en-GB" dirty="0">
+                <a:latin typeface="Times New Roman" panose="02020603050405020304" pitchFamily="18" charset="0"/>
+                <a:cs typeface="Times New Roman" panose="02020603050405020304" pitchFamily="18" charset="0"/>
+              </a:rPr>
+              <a:t> din exterior la </a:t>
+            </a:r>
+            <a:r>
+              <a:rPr lang="en-GB" dirty="0" err="1">
+                <a:latin typeface="Times New Roman" panose="02020603050405020304" pitchFamily="18" charset="0"/>
+                <a:cs typeface="Times New Roman" panose="02020603050405020304" pitchFamily="18" charset="0"/>
+              </a:rPr>
+              <a:t>obiecte</a:t>
+            </a:r>
+            <a:r>
+              <a:rPr lang="en-GB" dirty="0">
+                <a:latin typeface="Times New Roman" panose="02020603050405020304" pitchFamily="18" charset="0"/>
+                <a:cs typeface="Times New Roman" panose="02020603050405020304" pitchFamily="18" charset="0"/>
+              </a:rPr>
+              <a:t> se face </a:t>
+            </a:r>
+            <a:r>
+              <a:rPr lang="en-GB" dirty="0" err="1">
+                <a:latin typeface="Times New Roman" panose="02020603050405020304" pitchFamily="18" charset="0"/>
+                <a:cs typeface="Times New Roman" panose="02020603050405020304" pitchFamily="18" charset="0"/>
+              </a:rPr>
+              <a:t>doar</a:t>
+            </a:r>
+            <a:r>
+              <a:rPr lang="en-GB" dirty="0">
+                <a:latin typeface="Times New Roman" panose="02020603050405020304" pitchFamily="18" charset="0"/>
+                <a:cs typeface="Times New Roman" panose="02020603050405020304" pitchFamily="18" charset="0"/>
+              </a:rPr>
+              <a:t> </a:t>
+            </a:r>
+            <a:r>
+              <a:rPr lang="en-GB" dirty="0" err="1">
+                <a:latin typeface="Times New Roman" panose="02020603050405020304" pitchFamily="18" charset="0"/>
+                <a:cs typeface="Times New Roman" panose="02020603050405020304" pitchFamily="18" charset="0"/>
+              </a:rPr>
+              <a:t>prin</a:t>
+            </a:r>
+            <a:r>
+              <a:rPr lang="en-GB" dirty="0">
+                <a:latin typeface="Times New Roman" panose="02020603050405020304" pitchFamily="18" charset="0"/>
+                <a:cs typeface="Times New Roman" panose="02020603050405020304" pitchFamily="18" charset="0"/>
+              </a:rPr>
+              <a:t> </a:t>
+            </a:r>
+            <a:r>
+              <a:rPr lang="en-GB" dirty="0" err="1">
+                <a:latin typeface="Times New Roman" panose="02020603050405020304" pitchFamily="18" charset="0"/>
+                <a:cs typeface="Times New Roman" panose="02020603050405020304" pitchFamily="18" charset="0"/>
+              </a:rPr>
+              <a:t>mesajele</a:t>
+            </a:r>
+            <a:r>
+              <a:rPr lang="en-GB" dirty="0">
+                <a:latin typeface="Times New Roman" panose="02020603050405020304" pitchFamily="18" charset="0"/>
+                <a:cs typeface="Times New Roman" panose="02020603050405020304" pitchFamily="18" charset="0"/>
+              </a:rPr>
+              <a:t> premise</a:t>
+            </a:r>
+            <a:r>
+              <a:rPr lang="ro-RO" dirty="0">
+                <a:latin typeface="Times New Roman" panose="02020603050405020304" pitchFamily="18" charset="0"/>
+                <a:cs typeface="Times New Roman" panose="02020603050405020304" pitchFamily="18" charset="0"/>
+              </a:rPr>
+              <a:t>:</a:t>
+            </a:r>
+            <a:endParaRPr lang="en-GB" dirty="0">
+              <a:latin typeface="Times New Roman" panose="02020603050405020304" pitchFamily="18" charset="0"/>
+              <a:cs typeface="Times New Roman" panose="02020603050405020304" pitchFamily="18" charset="0"/>
+            </a:endParaRPr>
+          </a:p>
+          <a:p>
+            <a:pPr algn="just">
+              <a:buFont typeface="Wingdings" panose="05000000000000000000" pitchFamily="2" charset="2"/>
+              <a:buChar char="§"/>
+            </a:pPr>
+            <a:r>
+              <a:rPr lang="ro-RO" dirty="0">
+                <a:latin typeface="Times New Roman" panose="02020603050405020304" pitchFamily="18" charset="0"/>
+                <a:cs typeface="Times New Roman" panose="02020603050405020304" pitchFamily="18" charset="0"/>
+              </a:rPr>
+              <a:t>-</a:t>
+            </a:r>
+            <a:r>
+              <a:rPr lang="en-GB" dirty="0" err="1">
+                <a:latin typeface="Times New Roman" panose="02020603050405020304" pitchFamily="18" charset="0"/>
+                <a:cs typeface="Times New Roman" panose="02020603050405020304" pitchFamily="18" charset="0"/>
+              </a:rPr>
+              <a:t>restul</a:t>
+            </a:r>
+            <a:r>
+              <a:rPr lang="en-GB" dirty="0">
+                <a:latin typeface="Times New Roman" panose="02020603050405020304" pitchFamily="18" charset="0"/>
+                <a:cs typeface="Times New Roman" panose="02020603050405020304" pitchFamily="18" charset="0"/>
+              </a:rPr>
+              <a:t> </a:t>
+            </a:r>
+            <a:r>
+              <a:rPr lang="en-GB" dirty="0" err="1">
+                <a:latin typeface="Times New Roman" panose="02020603050405020304" pitchFamily="18" charset="0"/>
+                <a:cs typeface="Times New Roman" panose="02020603050405020304" pitchFamily="18" charset="0"/>
+              </a:rPr>
+              <a:t>metodelor</a:t>
+            </a:r>
+            <a:r>
+              <a:rPr lang="en-GB" dirty="0">
+                <a:latin typeface="Times New Roman" panose="02020603050405020304" pitchFamily="18" charset="0"/>
+                <a:cs typeface="Times New Roman" panose="02020603050405020304" pitchFamily="18" charset="0"/>
+              </a:rPr>
+              <a:t> / </a:t>
+            </a:r>
+            <a:r>
+              <a:rPr lang="en-GB" dirty="0" err="1">
+                <a:latin typeface="Times New Roman" panose="02020603050405020304" pitchFamily="18" charset="0"/>
+                <a:cs typeface="Times New Roman" panose="02020603050405020304" pitchFamily="18" charset="0"/>
+              </a:rPr>
+              <a:t>proprietăților</a:t>
+            </a:r>
+            <a:r>
+              <a:rPr lang="en-GB" dirty="0">
+                <a:latin typeface="Times New Roman" panose="02020603050405020304" pitchFamily="18" charset="0"/>
+                <a:cs typeface="Times New Roman" panose="02020603050405020304" pitchFamily="18" charset="0"/>
+              </a:rPr>
+              <a:t> </a:t>
+            </a:r>
+            <a:r>
+              <a:rPr lang="en-GB" dirty="0" err="1">
+                <a:latin typeface="Times New Roman" panose="02020603050405020304" pitchFamily="18" charset="0"/>
+                <a:cs typeface="Times New Roman" panose="02020603050405020304" pitchFamily="18" charset="0"/>
+              </a:rPr>
+              <a:t>sunt</a:t>
+            </a:r>
+            <a:r>
+              <a:rPr lang="en-GB" dirty="0">
+                <a:latin typeface="Times New Roman" panose="02020603050405020304" pitchFamily="18" charset="0"/>
+                <a:cs typeface="Times New Roman" panose="02020603050405020304" pitchFamily="18" charset="0"/>
+              </a:rPr>
+              <a:t> încapsulate3. </a:t>
+            </a:r>
+            <a:r>
+              <a:rPr lang="en-GB" dirty="0" err="1">
+                <a:latin typeface="Times New Roman" panose="02020603050405020304" pitchFamily="18" charset="0"/>
+                <a:cs typeface="Times New Roman" panose="02020603050405020304" pitchFamily="18" charset="0"/>
+              </a:rPr>
+              <a:t>identificatorul</a:t>
+            </a:r>
+            <a:r>
+              <a:rPr lang="en-GB" dirty="0">
+                <a:latin typeface="Times New Roman" panose="02020603050405020304" pitchFamily="18" charset="0"/>
+                <a:cs typeface="Times New Roman" panose="02020603050405020304" pitchFamily="18" charset="0"/>
+              </a:rPr>
+              <a:t> </a:t>
+            </a:r>
+            <a:r>
+              <a:rPr lang="en-GB" dirty="0" err="1">
+                <a:latin typeface="Times New Roman" panose="02020603050405020304" pitchFamily="18" charset="0"/>
+                <a:cs typeface="Times New Roman" panose="02020603050405020304" pitchFamily="18" charset="0"/>
+              </a:rPr>
+              <a:t>unui</a:t>
+            </a:r>
+            <a:r>
+              <a:rPr lang="en-GB" dirty="0">
+                <a:latin typeface="Times New Roman" panose="02020603050405020304" pitchFamily="18" charset="0"/>
+                <a:cs typeface="Times New Roman" panose="02020603050405020304" pitchFamily="18" charset="0"/>
+              </a:rPr>
+              <a:t> </a:t>
+            </a:r>
+            <a:r>
+              <a:rPr lang="en-GB" dirty="0" err="1">
+                <a:latin typeface="Times New Roman" panose="02020603050405020304" pitchFamily="18" charset="0"/>
+                <a:cs typeface="Times New Roman" panose="02020603050405020304" pitchFamily="18" charset="0"/>
+              </a:rPr>
+              <a:t>obiect</a:t>
+            </a:r>
+            <a:r>
+              <a:rPr lang="en-GB" dirty="0">
+                <a:latin typeface="Times New Roman" panose="02020603050405020304" pitchFamily="18" charset="0"/>
+                <a:cs typeface="Times New Roman" panose="02020603050405020304" pitchFamily="18" charset="0"/>
+              </a:rPr>
+              <a:t> </a:t>
+            </a:r>
+            <a:r>
+              <a:rPr lang="en-GB" dirty="0" err="1">
+                <a:latin typeface="Times New Roman" panose="02020603050405020304" pitchFamily="18" charset="0"/>
+                <a:cs typeface="Times New Roman" panose="02020603050405020304" pitchFamily="18" charset="0"/>
+              </a:rPr>
+              <a:t>asigură</a:t>
+            </a:r>
+            <a:r>
+              <a:rPr lang="en-GB" dirty="0">
+                <a:latin typeface="Times New Roman" panose="02020603050405020304" pitchFamily="18" charset="0"/>
+                <a:cs typeface="Times New Roman" panose="02020603050405020304" pitchFamily="18" charset="0"/>
+              </a:rPr>
+              <a:t> </a:t>
+            </a:r>
+            <a:r>
+              <a:rPr lang="en-GB" dirty="0" err="1">
+                <a:latin typeface="Times New Roman" panose="02020603050405020304" pitchFamily="18" charset="0"/>
+                <a:cs typeface="Times New Roman" panose="02020603050405020304" pitchFamily="18" charset="0"/>
+              </a:rPr>
+              <a:t>integritatea</a:t>
+            </a:r>
+            <a:r>
+              <a:rPr lang="en-GB" dirty="0">
+                <a:latin typeface="Times New Roman" panose="02020603050405020304" pitchFamily="18" charset="0"/>
+                <a:cs typeface="Times New Roman" panose="02020603050405020304" pitchFamily="18" charset="0"/>
+              </a:rPr>
+              <a:t> </a:t>
+            </a:r>
+            <a:r>
+              <a:rPr lang="en-GB" dirty="0" err="1">
+                <a:latin typeface="Times New Roman" panose="02020603050405020304" pitchFamily="18" charset="0"/>
+                <a:cs typeface="Times New Roman" panose="02020603050405020304" pitchFamily="18" charset="0"/>
+              </a:rPr>
+              <a:t>referirii</a:t>
+            </a:r>
+            <a:r>
+              <a:rPr lang="en-GB" dirty="0">
+                <a:latin typeface="Times New Roman" panose="02020603050405020304" pitchFamily="18" charset="0"/>
+                <a:cs typeface="Times New Roman" panose="02020603050405020304" pitchFamily="18" charset="0"/>
+              </a:rPr>
+              <a:t> la </a:t>
+            </a:r>
+            <a:r>
+              <a:rPr lang="en-GB" dirty="0" err="1">
+                <a:latin typeface="Times New Roman" panose="02020603050405020304" pitchFamily="18" charset="0"/>
+                <a:cs typeface="Times New Roman" panose="02020603050405020304" pitchFamily="18" charset="0"/>
+              </a:rPr>
+              <a:t>obiect</a:t>
+            </a:r>
+            <a:endParaRPr lang="en-GB" dirty="0">
+              <a:latin typeface="Times New Roman" panose="02020603050405020304" pitchFamily="18" charset="0"/>
+              <a:cs typeface="Times New Roman" panose="02020603050405020304" pitchFamily="18" charset="0"/>
+            </a:endParaRPr>
+          </a:p>
+          <a:p>
+            <a:pPr algn="just">
+              <a:buFont typeface="Wingdings" panose="05000000000000000000" pitchFamily="2" charset="2"/>
+              <a:buChar char="§"/>
+            </a:pPr>
+            <a:r>
+              <a:rPr lang="en-GB" dirty="0">
+                <a:latin typeface="Times New Roman" panose="02020603050405020304" pitchFamily="18" charset="0"/>
+                <a:cs typeface="Times New Roman" panose="02020603050405020304" pitchFamily="18" charset="0"/>
+              </a:rPr>
+              <a:t>-</a:t>
+            </a:r>
+            <a:r>
+              <a:rPr lang="en-GB" dirty="0" err="1">
+                <a:latin typeface="Times New Roman" panose="02020603050405020304" pitchFamily="18" charset="0"/>
+                <a:cs typeface="Times New Roman" panose="02020603050405020304" pitchFamily="18" charset="0"/>
+              </a:rPr>
+              <a:t>orice</a:t>
+            </a:r>
+            <a:r>
+              <a:rPr lang="en-GB" dirty="0">
+                <a:latin typeface="Times New Roman" panose="02020603050405020304" pitchFamily="18" charset="0"/>
+                <a:cs typeface="Times New Roman" panose="02020603050405020304" pitchFamily="18" charset="0"/>
+              </a:rPr>
+              <a:t> </a:t>
+            </a:r>
+            <a:r>
+              <a:rPr lang="en-GB" dirty="0" err="1">
+                <a:latin typeface="Times New Roman" panose="02020603050405020304" pitchFamily="18" charset="0"/>
+                <a:cs typeface="Times New Roman" panose="02020603050405020304" pitchFamily="18" charset="0"/>
+              </a:rPr>
+              <a:t>obiect</a:t>
+            </a:r>
+            <a:r>
+              <a:rPr lang="en-GB" dirty="0">
+                <a:latin typeface="Times New Roman" panose="02020603050405020304" pitchFamily="18" charset="0"/>
+                <a:cs typeface="Times New Roman" panose="02020603050405020304" pitchFamily="18" charset="0"/>
+              </a:rPr>
+              <a:t> are un </a:t>
+            </a:r>
+            <a:r>
+              <a:rPr lang="en-GB" dirty="0" err="1">
+                <a:latin typeface="Times New Roman" panose="02020603050405020304" pitchFamily="18" charset="0"/>
+                <a:cs typeface="Times New Roman" panose="02020603050405020304" pitchFamily="18" charset="0"/>
+              </a:rPr>
+              <a:t>identificator</a:t>
+            </a:r>
+            <a:r>
+              <a:rPr lang="en-GB" dirty="0">
+                <a:latin typeface="Times New Roman" panose="02020603050405020304" pitchFamily="18" charset="0"/>
+                <a:cs typeface="Times New Roman" panose="02020603050405020304" pitchFamily="18" charset="0"/>
+              </a:rPr>
+              <a:t> (</a:t>
+            </a:r>
+            <a:r>
+              <a:rPr lang="en-GB" dirty="0" err="1">
+                <a:latin typeface="Times New Roman" panose="02020603050405020304" pitchFamily="18" charset="0"/>
+                <a:cs typeface="Times New Roman" panose="02020603050405020304" pitchFamily="18" charset="0"/>
+              </a:rPr>
+              <a:t>cheie</a:t>
+            </a:r>
+            <a:r>
+              <a:rPr lang="en-GB" dirty="0">
+                <a:latin typeface="Times New Roman" panose="02020603050405020304" pitchFamily="18" charset="0"/>
+                <a:cs typeface="Times New Roman" panose="02020603050405020304" pitchFamily="18" charset="0"/>
+              </a:rPr>
+              <a:t>)-</a:t>
+            </a:r>
+            <a:r>
+              <a:rPr lang="en-GB" dirty="0" err="1">
+                <a:latin typeface="Times New Roman" panose="02020603050405020304" pitchFamily="18" charset="0"/>
+                <a:cs typeface="Times New Roman" panose="02020603050405020304" pitchFamily="18" charset="0"/>
+              </a:rPr>
+              <a:t>identificatorul</a:t>
+            </a:r>
+            <a:r>
+              <a:rPr lang="en-GB" dirty="0">
+                <a:latin typeface="Times New Roman" panose="02020603050405020304" pitchFamily="18" charset="0"/>
+                <a:cs typeface="Times New Roman" panose="02020603050405020304" pitchFamily="18" charset="0"/>
+              </a:rPr>
+              <a:t> </a:t>
+            </a:r>
+            <a:r>
+              <a:rPr lang="en-GB" dirty="0" err="1">
+                <a:latin typeface="Times New Roman" panose="02020603050405020304" pitchFamily="18" charset="0"/>
+                <a:cs typeface="Times New Roman" panose="02020603050405020304" pitchFamily="18" charset="0"/>
+              </a:rPr>
+              <a:t>este</a:t>
+            </a:r>
+            <a:r>
+              <a:rPr lang="ro-RO" dirty="0">
+                <a:latin typeface="Times New Roman" panose="02020603050405020304" pitchFamily="18" charset="0"/>
+                <a:cs typeface="Times New Roman" panose="02020603050405020304" pitchFamily="18" charset="0"/>
+              </a:rPr>
+              <a:t> </a:t>
+            </a:r>
+            <a:r>
+              <a:rPr lang="en-GB" dirty="0" err="1">
+                <a:latin typeface="Times New Roman" panose="02020603050405020304" pitchFamily="18" charset="0"/>
+                <a:cs typeface="Times New Roman" panose="02020603050405020304" pitchFamily="18" charset="0"/>
+              </a:rPr>
+              <a:t>același</a:t>
+            </a:r>
+            <a:r>
+              <a:rPr lang="en-GB" dirty="0">
+                <a:latin typeface="Times New Roman" panose="02020603050405020304" pitchFamily="18" charset="0"/>
+                <a:cs typeface="Times New Roman" panose="02020603050405020304" pitchFamily="18" charset="0"/>
+              </a:rPr>
+              <a:t> </a:t>
+            </a:r>
+            <a:r>
+              <a:rPr lang="en-GB" dirty="0" err="1">
+                <a:latin typeface="Times New Roman" panose="02020603050405020304" pitchFamily="18" charset="0"/>
+                <a:cs typeface="Times New Roman" panose="02020603050405020304" pitchFamily="18" charset="0"/>
+              </a:rPr>
+              <a:t>pe</a:t>
+            </a:r>
+            <a:r>
+              <a:rPr lang="en-GB" dirty="0">
+                <a:latin typeface="Times New Roman" panose="02020603050405020304" pitchFamily="18" charset="0"/>
+                <a:cs typeface="Times New Roman" panose="02020603050405020304" pitchFamily="18" charset="0"/>
+              </a:rPr>
+              <a:t> </a:t>
+            </a:r>
+            <a:r>
+              <a:rPr lang="en-GB" dirty="0" err="1">
+                <a:latin typeface="Times New Roman" panose="02020603050405020304" pitchFamily="18" charset="0"/>
+                <a:cs typeface="Times New Roman" panose="02020603050405020304" pitchFamily="18" charset="0"/>
+              </a:rPr>
+              <a:t>întreaga</a:t>
+            </a:r>
+            <a:r>
+              <a:rPr lang="en-GB" dirty="0">
+                <a:latin typeface="Times New Roman" panose="02020603050405020304" pitchFamily="18" charset="0"/>
+                <a:cs typeface="Times New Roman" panose="02020603050405020304" pitchFamily="18" charset="0"/>
+              </a:rPr>
+              <a:t> </a:t>
+            </a:r>
+            <a:r>
+              <a:rPr lang="en-GB" dirty="0" err="1">
+                <a:latin typeface="Times New Roman" panose="02020603050405020304" pitchFamily="18" charset="0"/>
+                <a:cs typeface="Times New Roman" panose="02020603050405020304" pitchFamily="18" charset="0"/>
+              </a:rPr>
+              <a:t>durată</a:t>
+            </a:r>
+            <a:r>
+              <a:rPr lang="en-GB" dirty="0">
+                <a:latin typeface="Times New Roman" panose="02020603050405020304" pitchFamily="18" charset="0"/>
+                <a:cs typeface="Times New Roman" panose="02020603050405020304" pitchFamily="18" charset="0"/>
+              </a:rPr>
+              <a:t> de </a:t>
+            </a:r>
+            <a:r>
+              <a:rPr lang="en-GB" dirty="0" err="1">
+                <a:latin typeface="Times New Roman" panose="02020603050405020304" pitchFamily="18" charset="0"/>
+                <a:cs typeface="Times New Roman" panose="02020603050405020304" pitchFamily="18" charset="0"/>
+              </a:rPr>
+              <a:t>viață</a:t>
+            </a:r>
+            <a:r>
+              <a:rPr lang="en-GB" dirty="0">
+                <a:latin typeface="Times New Roman" panose="02020603050405020304" pitchFamily="18" charset="0"/>
+                <a:cs typeface="Times New Roman" panose="02020603050405020304" pitchFamily="18" charset="0"/>
+              </a:rPr>
+              <a:t> a</a:t>
+            </a:r>
+            <a:r>
+              <a:rPr lang="ro-RO" dirty="0">
+                <a:latin typeface="Times New Roman" panose="02020603050405020304" pitchFamily="18" charset="0"/>
+                <a:cs typeface="Times New Roman" panose="02020603050405020304" pitchFamily="18" charset="0"/>
+              </a:rPr>
+              <a:t> </a:t>
+            </a:r>
+            <a:r>
+              <a:rPr lang="en-GB" dirty="0" err="1">
+                <a:latin typeface="Times New Roman" panose="02020603050405020304" pitchFamily="18" charset="0"/>
+                <a:cs typeface="Times New Roman" panose="02020603050405020304" pitchFamily="18" charset="0"/>
+              </a:rPr>
+              <a:t>obiectului-dacă</a:t>
+            </a:r>
+            <a:r>
+              <a:rPr lang="en-GB" dirty="0">
+                <a:latin typeface="Times New Roman" panose="02020603050405020304" pitchFamily="18" charset="0"/>
+                <a:cs typeface="Times New Roman" panose="02020603050405020304" pitchFamily="18" charset="0"/>
+              </a:rPr>
+              <a:t> un </a:t>
+            </a:r>
+            <a:r>
+              <a:rPr lang="en-GB" dirty="0" err="1">
+                <a:latin typeface="Times New Roman" panose="02020603050405020304" pitchFamily="18" charset="0"/>
+                <a:cs typeface="Times New Roman" panose="02020603050405020304" pitchFamily="18" charset="0"/>
+              </a:rPr>
+              <a:t>obiect</a:t>
+            </a:r>
+            <a:r>
+              <a:rPr lang="en-GB" dirty="0">
+                <a:latin typeface="Times New Roman" panose="02020603050405020304" pitchFamily="18" charset="0"/>
+                <a:cs typeface="Times New Roman" panose="02020603050405020304" pitchFamily="18" charset="0"/>
+              </a:rPr>
+              <a:t> </a:t>
+            </a:r>
+            <a:r>
+              <a:rPr lang="en-GB" dirty="0" err="1">
+                <a:latin typeface="Times New Roman" panose="02020603050405020304" pitchFamily="18" charset="0"/>
+                <a:cs typeface="Times New Roman" panose="02020603050405020304" pitchFamily="18" charset="0"/>
+              </a:rPr>
+              <a:t>este</a:t>
+            </a:r>
+            <a:r>
+              <a:rPr lang="en-GB" dirty="0">
+                <a:latin typeface="Times New Roman" panose="02020603050405020304" pitchFamily="18" charset="0"/>
+                <a:cs typeface="Times New Roman" panose="02020603050405020304" pitchFamily="18" charset="0"/>
+              </a:rPr>
+              <a:t> </a:t>
+            </a:r>
+            <a:r>
+              <a:rPr lang="en-GB" dirty="0" err="1">
+                <a:latin typeface="Times New Roman" panose="02020603050405020304" pitchFamily="18" charset="0"/>
+                <a:cs typeface="Times New Roman" panose="02020603050405020304" pitchFamily="18" charset="0"/>
+              </a:rPr>
+              <a:t>șters</a:t>
+            </a:r>
+            <a:r>
+              <a:rPr lang="en-GB" dirty="0">
+                <a:latin typeface="Times New Roman" panose="02020603050405020304" pitchFamily="18" charset="0"/>
+                <a:cs typeface="Times New Roman" panose="02020603050405020304" pitchFamily="18" charset="0"/>
+              </a:rPr>
+              <a:t>, se </a:t>
+            </a:r>
+            <a:r>
+              <a:rPr lang="en-GB" dirty="0" err="1">
+                <a:latin typeface="Times New Roman" panose="02020603050405020304" pitchFamily="18" charset="0"/>
+                <a:cs typeface="Times New Roman" panose="02020603050405020304" pitchFamily="18" charset="0"/>
+              </a:rPr>
+              <a:t>șterge</a:t>
+            </a:r>
+            <a:r>
+              <a:rPr lang="en-GB" dirty="0">
+                <a:latin typeface="Times New Roman" panose="02020603050405020304" pitchFamily="18" charset="0"/>
+                <a:cs typeface="Times New Roman" panose="02020603050405020304" pitchFamily="18" charset="0"/>
+              </a:rPr>
+              <a:t> </a:t>
+            </a:r>
+            <a:r>
+              <a:rPr lang="en-GB" dirty="0" err="1">
+                <a:latin typeface="Times New Roman" panose="02020603050405020304" pitchFamily="18" charset="0"/>
+                <a:cs typeface="Times New Roman" panose="02020603050405020304" pitchFamily="18" charset="0"/>
+              </a:rPr>
+              <a:t>și</a:t>
+            </a:r>
+            <a:r>
+              <a:rPr lang="en-GB" dirty="0">
+                <a:latin typeface="Times New Roman" panose="02020603050405020304" pitchFamily="18" charset="0"/>
+                <a:cs typeface="Times New Roman" panose="02020603050405020304" pitchFamily="18" charset="0"/>
+              </a:rPr>
+              <a:t> </a:t>
+            </a:r>
+            <a:r>
+              <a:rPr lang="en-GB" dirty="0" err="1">
+                <a:latin typeface="Times New Roman" panose="02020603050405020304" pitchFamily="18" charset="0"/>
+                <a:cs typeface="Times New Roman" panose="02020603050405020304" pitchFamily="18" charset="0"/>
+              </a:rPr>
+              <a:t>identificatorul</a:t>
+            </a:r>
+            <a:r>
+              <a:rPr lang="ro-RO" dirty="0">
+                <a:latin typeface="Times New Roman" panose="02020603050405020304" pitchFamily="18" charset="0"/>
+                <a:cs typeface="Times New Roman" panose="02020603050405020304" pitchFamily="18" charset="0"/>
+              </a:rPr>
+              <a:t> </a:t>
+            </a:r>
+            <a:r>
+              <a:rPr lang="en-GB" dirty="0" err="1">
+                <a:latin typeface="Times New Roman" panose="02020603050405020304" pitchFamily="18" charset="0"/>
+                <a:cs typeface="Times New Roman" panose="02020603050405020304" pitchFamily="18" charset="0"/>
+              </a:rPr>
+              <a:t>lui</a:t>
+            </a:r>
+            <a:endParaRPr lang="en-GB" dirty="0">
+              <a:latin typeface="Times New Roman" panose="02020603050405020304" pitchFamily="18" charset="0"/>
+              <a:cs typeface="Times New Roman" panose="02020603050405020304" pitchFamily="18" charset="0"/>
+            </a:endParaRPr>
+          </a:p>
+        </p:txBody>
+      </p:sp>
+      <p:sp>
+        <p:nvSpPr>
+          <p:cNvPr id="5" name="Rectangle 4"/>
+          <p:cNvSpPr/>
+          <p:nvPr/>
+        </p:nvSpPr>
+        <p:spPr>
+          <a:xfrm>
+            <a:off x="-15239" y="534145"/>
+            <a:ext cx="9159239" cy="739300"/>
+          </a:xfrm>
+          <a:prstGeom prst="rect">
+            <a:avLst/>
+          </a:prstGeom>
+          <a:solidFill>
+            <a:schemeClr val="bg1">
+              <a:lumMod val="50000"/>
+            </a:schemeClr>
+          </a:solidFill>
+          <a:ln>
+            <a:noFill/>
+          </a:ln>
+        </p:spPr>
+        <p:style>
+          <a:lnRef idx="2">
+            <a:schemeClr val="accent1">
+              <a:shade val="50000"/>
+            </a:schemeClr>
+          </a:lnRef>
+          <a:fillRef idx="1">
+            <a:schemeClr val="accent1"/>
+          </a:fillRef>
+          <a:effectRef idx="0">
+            <a:schemeClr val="accent1"/>
+          </a:effectRef>
+          <a:fontRef idx="minor">
+            <a:schemeClr val="lt1"/>
+          </a:fontRef>
+        </p:style>
+        <p:txBody>
+          <a:bodyPr rtlCol="0" anchor="ctr"/>
+          <a:lstStyle/>
+          <a:p>
+            <a:r>
+              <a:rPr lang="ro-RO" sz="2400" dirty="0">
+                <a:latin typeface="Times New Roman" panose="02020603050405020304" pitchFamily="18" charset="0"/>
+                <a:cs typeface="Times New Roman" panose="02020603050405020304" pitchFamily="18" charset="0"/>
+              </a:rPr>
+              <a:t>	</a:t>
+            </a:r>
+            <a:r>
+              <a:rPr lang="en-GB" sz="2400" dirty="0" err="1">
+                <a:latin typeface="Times New Roman" panose="02020603050405020304" pitchFamily="18" charset="0"/>
+                <a:cs typeface="Times New Roman" panose="02020603050405020304" pitchFamily="18" charset="0"/>
+              </a:rPr>
+              <a:t>Reguli</a:t>
+            </a:r>
+            <a:r>
+              <a:rPr lang="en-GB" sz="2400" dirty="0">
+                <a:latin typeface="Times New Roman" panose="02020603050405020304" pitchFamily="18" charset="0"/>
+                <a:cs typeface="Times New Roman" panose="02020603050405020304" pitchFamily="18" charset="0"/>
+              </a:rPr>
+              <a:t> de </a:t>
+            </a:r>
+            <a:r>
+              <a:rPr lang="en-GB" sz="2400" dirty="0" err="1">
+                <a:latin typeface="Times New Roman" panose="02020603050405020304" pitchFamily="18" charset="0"/>
+                <a:cs typeface="Times New Roman" panose="02020603050405020304" pitchFamily="18" charset="0"/>
+              </a:rPr>
+              <a:t>integritate</a:t>
+            </a:r>
+            <a:r>
+              <a:rPr lang="en-GB" sz="2400" dirty="0">
+                <a:latin typeface="Times New Roman" panose="02020603050405020304" pitchFamily="18" charset="0"/>
+                <a:cs typeface="Times New Roman" panose="02020603050405020304" pitchFamily="18" charset="0"/>
+              </a:rPr>
+              <a:t> al </a:t>
+            </a:r>
+            <a:r>
+              <a:rPr lang="en-GB" sz="2400" dirty="0" err="1">
+                <a:latin typeface="Times New Roman" panose="02020603050405020304" pitchFamily="18" charset="0"/>
+                <a:cs typeface="Times New Roman" panose="02020603050405020304" pitchFamily="18" charset="0"/>
+              </a:rPr>
+              <a:t>modelului</a:t>
+            </a:r>
+            <a:r>
+              <a:rPr lang="en-GB" sz="2400" dirty="0">
+                <a:latin typeface="Times New Roman" panose="02020603050405020304" pitchFamily="18" charset="0"/>
+                <a:cs typeface="Times New Roman" panose="02020603050405020304" pitchFamily="18" charset="0"/>
+              </a:rPr>
+              <a:t> </a:t>
+            </a:r>
+            <a:r>
+              <a:rPr lang="en-GB" sz="2400" dirty="0" err="1">
+                <a:latin typeface="Times New Roman" panose="02020603050405020304" pitchFamily="18" charset="0"/>
+                <a:cs typeface="Times New Roman" panose="02020603050405020304" pitchFamily="18" charset="0"/>
+              </a:rPr>
+              <a:t>orientat</a:t>
+            </a:r>
+            <a:r>
+              <a:rPr lang="en-GB" sz="2400" dirty="0">
+                <a:latin typeface="Times New Roman" panose="02020603050405020304" pitchFamily="18" charset="0"/>
+                <a:cs typeface="Times New Roman" panose="02020603050405020304" pitchFamily="18" charset="0"/>
+              </a:rPr>
+              <a:t> </a:t>
+            </a:r>
+            <a:r>
+              <a:rPr lang="en-GB" sz="2400" dirty="0" err="1">
+                <a:latin typeface="Times New Roman" panose="02020603050405020304" pitchFamily="18" charset="0"/>
+                <a:cs typeface="Times New Roman" panose="02020603050405020304" pitchFamily="18" charset="0"/>
+              </a:rPr>
+              <a:t>obiect</a:t>
+            </a:r>
+            <a:endParaRPr lang="en-GB" sz="2400" dirty="0">
+              <a:latin typeface="Times New Roman" panose="02020603050405020304" pitchFamily="18" charset="0"/>
+              <a:cs typeface="Times New Roman" panose="02020603050405020304" pitchFamily="18" charset="0"/>
+            </a:endParaRPr>
+          </a:p>
+          <a:p>
+            <a:endParaRPr lang="ro-RO" sz="2400" dirty="0">
+              <a:latin typeface="Times New Roman" panose="02020603050405020304" pitchFamily="18" charset="0"/>
+              <a:cs typeface="Times New Roman" panose="02020603050405020304" pitchFamily="18" charset="0"/>
+            </a:endParaRPr>
+          </a:p>
+        </p:txBody>
+      </p:sp>
+    </p:spTree>
+    <p:extLst>
+      <p:ext uri="{BB962C8B-B14F-4D97-AF65-F5344CB8AC3E}">
+        <p14:creationId xmlns:p14="http://schemas.microsoft.com/office/powerpoint/2010/main" val="1563225037"/>
+      </p:ext>
+    </p:extLst>
+  </p:cSld>
+  <p:clrMapOvr>
+    <a:masterClrMapping/>
+  </p:clrMapOvr>
+</p:sld>
+</file>
+
+<file path=ppt/slides/slide28.xml><?xml version="1.0" encoding="utf-8"?>
+<p:sld xmlns:a="http://schemas.openxmlformats.org/drawingml/2006/main" xmlns:r="http://schemas.openxmlformats.org/officeDocument/2006/relationships" xmlns:p="http://schemas.openxmlformats.org/presentationml/2006/main">
+  <p:cSld>
+    <p:spTree>
+      <p:nvGrpSpPr>
+        <p:cNvPr id="1" name=""/>
+        <p:cNvGrpSpPr/>
+        <p:nvPr/>
+      </p:nvGrpSpPr>
+      <p:grpSpPr>
+        <a:xfrm>
+          <a:off x="0" y="0"/>
+          <a:ext cx="0" cy="0"/>
+          <a:chOff x="0" y="0"/>
+          <a:chExt cx="0" cy="0"/>
+        </a:xfrm>
+      </p:grpSpPr>
+      <p:sp>
+        <p:nvSpPr>
+          <p:cNvPr id="2" name="Title 1"/>
+          <p:cNvSpPr>
+            <a:spLocks noGrp="1"/>
+          </p:cNvSpPr>
+          <p:nvPr>
+            <p:ph type="title"/>
+          </p:nvPr>
+        </p:nvSpPr>
+        <p:spPr/>
+        <p:txBody>
+          <a:bodyPr>
+            <a:normAutofit fontScale="90000"/>
+          </a:bodyPr>
+          <a:lstStyle/>
+          <a:p>
+            <a:br>
+              <a:rPr lang="en-GB" dirty="0"/>
+            </a:br>
+            <a:endParaRPr lang="en-GB" dirty="0"/>
+          </a:p>
+        </p:txBody>
+      </p:sp>
+      <p:sp>
+        <p:nvSpPr>
+          <p:cNvPr id="3" name="Content Placeholder 2"/>
+          <p:cNvSpPr>
+            <a:spLocks noGrp="1"/>
+          </p:cNvSpPr>
+          <p:nvPr>
+            <p:ph idx="1"/>
+          </p:nvPr>
+        </p:nvSpPr>
+        <p:spPr/>
+        <p:txBody>
+          <a:bodyPr>
+            <a:normAutofit fontScale="85000" lnSpcReduction="20000"/>
+          </a:bodyPr>
+          <a:lstStyle/>
+          <a:p>
+            <a:br>
+              <a:rPr lang="ro-RO" b="1" dirty="0"/>
+            </a:br>
+            <a:r>
+              <a:rPr lang="ro-RO" b="1" dirty="0"/>
+              <a:t>Un SGBDOO trebuie să utilizeze metode ce aparțin claselor din BDOO</a:t>
+            </a:r>
+            <a:endParaRPr lang="ro-RO" dirty="0"/>
+          </a:p>
+          <a:p>
+            <a:r>
+              <a:rPr lang="ro-RO" dirty="0"/>
+              <a:t>-</a:t>
+            </a:r>
+          </a:p>
+          <a:p>
+            <a:r>
+              <a:rPr lang="ro-RO" dirty="0"/>
+              <a:t>clasele trebuie să fie compacte, încapsulate și ermetizate</a:t>
+            </a:r>
+          </a:p>
+          <a:p>
+            <a:r>
+              <a:rPr lang="ro-RO" dirty="0"/>
+              <a:t>-încapsularea-</a:t>
+            </a:r>
+          </a:p>
+          <a:p>
+            <a:r>
+              <a:rPr lang="ro-RO" dirty="0"/>
+              <a:t>asocierea dintre metode și datele prelucrate</a:t>
+            </a:r>
+          </a:p>
+          <a:p>
+            <a:r>
+              <a:rPr lang="ro-RO" dirty="0"/>
+              <a:t>-</a:t>
+            </a:r>
+          </a:p>
+          <a:p>
+            <a:r>
+              <a:rPr lang="ro-RO" dirty="0"/>
+              <a:t>poate scădea numărul de accesuri la datele din baza de date</a:t>
+            </a:r>
+          </a:p>
+          <a:p>
+            <a:pPr algn="just">
+              <a:buFont typeface="Wingdings" panose="05000000000000000000" pitchFamily="2" charset="2"/>
+              <a:buChar char="§"/>
+            </a:pPr>
+            <a:endParaRPr lang="en-GB" dirty="0">
+              <a:latin typeface="Times New Roman" panose="02020603050405020304" pitchFamily="18" charset="0"/>
+              <a:cs typeface="Times New Roman" panose="02020603050405020304" pitchFamily="18" charset="0"/>
+            </a:endParaRPr>
+          </a:p>
+        </p:txBody>
+      </p:sp>
+      <p:sp>
+        <p:nvSpPr>
+          <p:cNvPr id="5" name="Rectangle 4"/>
+          <p:cNvSpPr/>
+          <p:nvPr/>
+        </p:nvSpPr>
+        <p:spPr>
+          <a:xfrm>
+            <a:off x="-15239" y="534145"/>
+            <a:ext cx="9159239" cy="739300"/>
+          </a:xfrm>
+          <a:prstGeom prst="rect">
+            <a:avLst/>
+          </a:prstGeom>
+          <a:solidFill>
+            <a:schemeClr val="bg1">
+              <a:lumMod val="50000"/>
+            </a:schemeClr>
+          </a:solidFill>
+          <a:ln>
+            <a:noFill/>
+          </a:ln>
+        </p:spPr>
+        <p:style>
+          <a:lnRef idx="2">
+            <a:schemeClr val="accent1">
+              <a:shade val="50000"/>
+            </a:schemeClr>
+          </a:lnRef>
+          <a:fillRef idx="1">
+            <a:schemeClr val="accent1"/>
+          </a:fillRef>
+          <a:effectRef idx="0">
+            <a:schemeClr val="accent1"/>
+          </a:effectRef>
+          <a:fontRef idx="minor">
+            <a:schemeClr val="lt1"/>
+          </a:fontRef>
+        </p:style>
+        <p:txBody>
+          <a:bodyPr rtlCol="0" anchor="ctr"/>
+          <a:lstStyle/>
+          <a:p>
+            <a:r>
+              <a:rPr lang="ro-RO" sz="2400" dirty="0">
+                <a:latin typeface="Times New Roman" panose="02020603050405020304" pitchFamily="18" charset="0"/>
+                <a:cs typeface="Times New Roman" panose="02020603050405020304" pitchFamily="18" charset="0"/>
+              </a:rPr>
+              <a:t>	</a:t>
+            </a:r>
+            <a:r>
+              <a:rPr lang="ro-RO" sz="2400" dirty="0">
+                <a:latin typeface="Times New Roman" panose="02020603050405020304" pitchFamily="18" charset="0"/>
+                <a:cs typeface="Times New Roman" panose="02020603050405020304" pitchFamily="18" charset="0"/>
+              </a:rPr>
+              <a:t>Principii de bază ale unui SGBDOO</a:t>
+            </a:r>
+            <a:endParaRPr lang="en-GB" sz="2400" dirty="0">
+              <a:latin typeface="Times New Roman" panose="02020603050405020304" pitchFamily="18" charset="0"/>
+              <a:cs typeface="Times New Roman" panose="02020603050405020304" pitchFamily="18" charset="0"/>
+            </a:endParaRPr>
+          </a:p>
+          <a:p>
+            <a:endParaRPr lang="ro-RO" sz="2400" dirty="0">
+              <a:latin typeface="Times New Roman" panose="02020603050405020304" pitchFamily="18" charset="0"/>
+              <a:cs typeface="Times New Roman" panose="02020603050405020304" pitchFamily="18" charset="0"/>
+            </a:endParaRPr>
+          </a:p>
+        </p:txBody>
+      </p:sp>
+    </p:spTree>
+    <p:extLst>
+      <p:ext uri="{BB962C8B-B14F-4D97-AF65-F5344CB8AC3E}">
+        <p14:creationId xmlns:p14="http://schemas.microsoft.com/office/powerpoint/2010/main" val="4271978423"/>
+      </p:ext>
+    </p:extLst>
+  </p:cSld>
+  <p:clrMapOvr>
+    <a:masterClrMapping/>
+  </p:clrMapOvr>
+</p:sld>
+</file>
+
+<file path=ppt/slides/slide29.xml><?xml version="1.0" encoding="utf-8"?>
+<p:sld xmlns:a="http://schemas.openxmlformats.org/drawingml/2006/main" xmlns:r="http://schemas.openxmlformats.org/officeDocument/2006/relationships" xmlns:p="http://schemas.openxmlformats.org/presentationml/2006/main">
+  <p:cSld>
+    <p:spTree>
+      <p:nvGrpSpPr>
+        <p:cNvPr id="1" name=""/>
+        <p:cNvGrpSpPr/>
+        <p:nvPr/>
+      </p:nvGrpSpPr>
+      <p:grpSpPr>
+        <a:xfrm>
+          <a:off x="0" y="0"/>
+          <a:ext cx="0" cy="0"/>
+          <a:chOff x="0" y="0"/>
+          <a:chExt cx="0" cy="0"/>
+        </a:xfrm>
+      </p:grpSpPr>
+      <p:sp>
+        <p:nvSpPr>
+          <p:cNvPr id="2" name="Title 1"/>
+          <p:cNvSpPr>
+            <a:spLocks noGrp="1"/>
+          </p:cNvSpPr>
+          <p:nvPr>
+            <p:ph type="title"/>
+          </p:nvPr>
+        </p:nvSpPr>
+        <p:spPr/>
+        <p:txBody>
+          <a:bodyPr>
+            <a:normAutofit fontScale="90000"/>
+          </a:bodyPr>
+          <a:lstStyle/>
+          <a:p>
+            <a:br>
+              <a:rPr lang="en-GB" dirty="0"/>
+            </a:br>
+            <a:endParaRPr lang="en-GB" dirty="0"/>
+          </a:p>
+        </p:txBody>
+      </p:sp>
+      <p:sp>
+        <p:nvSpPr>
+          <p:cNvPr id="3" name="Content Placeholder 2"/>
+          <p:cNvSpPr>
+            <a:spLocks noGrp="1"/>
+          </p:cNvSpPr>
+          <p:nvPr>
+            <p:ph idx="1"/>
+          </p:nvPr>
+        </p:nvSpPr>
+        <p:spPr/>
+        <p:txBody>
+          <a:bodyPr>
+            <a:normAutofit fontScale="92500" lnSpcReduction="10000"/>
+          </a:bodyPr>
+          <a:lstStyle/>
+          <a:p>
+            <a:r>
+              <a:rPr lang="ro-RO" b="1" dirty="0"/>
+              <a:t>3. SGBDOO trebuie să fie deschise către alte sisteme</a:t>
+            </a:r>
+            <a:endParaRPr lang="ro-RO" dirty="0"/>
+          </a:p>
+          <a:p>
+            <a:r>
+              <a:rPr lang="ro-RO" dirty="0"/>
+              <a:t>-</a:t>
+            </a:r>
+          </a:p>
+          <a:p>
+            <a:r>
+              <a:rPr lang="ro-RO" dirty="0"/>
+              <a:t>posibilitatea de interfațare cu baze de date din alte SGBD</a:t>
+            </a:r>
+          </a:p>
+          <a:p>
+            <a:r>
+              <a:rPr lang="ro-RO" dirty="0"/>
+              <a:t>-uri-interconectibilitate cu diverse limbaje-C#, C++, Java-</a:t>
+            </a:r>
+          </a:p>
+          <a:p>
+            <a:r>
+              <a:rPr lang="ro-RO" dirty="0"/>
+              <a:t>pentru interogări</a:t>
+            </a:r>
+          </a:p>
+          <a:p>
+            <a:r>
+              <a:rPr lang="ro-RO" dirty="0"/>
+              <a:t>-SQL</a:t>
+            </a:r>
+          </a:p>
+          <a:p>
+            <a:pPr algn="just">
+              <a:buFont typeface="Wingdings" panose="05000000000000000000" pitchFamily="2" charset="2"/>
+              <a:buChar char="§"/>
+            </a:pPr>
+            <a:endParaRPr lang="en-GB" dirty="0">
+              <a:latin typeface="Times New Roman" panose="02020603050405020304" pitchFamily="18" charset="0"/>
+              <a:cs typeface="Times New Roman" panose="02020603050405020304" pitchFamily="18" charset="0"/>
+            </a:endParaRPr>
+          </a:p>
+        </p:txBody>
+      </p:sp>
+      <p:sp>
+        <p:nvSpPr>
+          <p:cNvPr id="5" name="Rectangle 4"/>
+          <p:cNvSpPr/>
+          <p:nvPr/>
+        </p:nvSpPr>
+        <p:spPr>
+          <a:xfrm>
+            <a:off x="-15239" y="534145"/>
+            <a:ext cx="9159239" cy="739300"/>
+          </a:xfrm>
+          <a:prstGeom prst="rect">
+            <a:avLst/>
+          </a:prstGeom>
+          <a:solidFill>
+            <a:schemeClr val="bg1">
+              <a:lumMod val="50000"/>
+            </a:schemeClr>
+          </a:solidFill>
+          <a:ln>
+            <a:noFill/>
+          </a:ln>
+        </p:spPr>
+        <p:style>
+          <a:lnRef idx="2">
+            <a:schemeClr val="accent1">
+              <a:shade val="50000"/>
+            </a:schemeClr>
+          </a:lnRef>
+          <a:fillRef idx="1">
+            <a:schemeClr val="accent1"/>
+          </a:fillRef>
+          <a:effectRef idx="0">
+            <a:schemeClr val="accent1"/>
+          </a:effectRef>
+          <a:fontRef idx="minor">
+            <a:schemeClr val="lt1"/>
+          </a:fontRef>
+        </p:style>
+        <p:txBody>
+          <a:bodyPr rtlCol="0" anchor="ctr"/>
+          <a:lstStyle/>
+          <a:p>
+            <a:r>
+              <a:rPr lang="ro-RO" sz="2400" dirty="0">
+                <a:latin typeface="Times New Roman" panose="02020603050405020304" pitchFamily="18" charset="0"/>
+                <a:cs typeface="Times New Roman" panose="02020603050405020304" pitchFamily="18" charset="0"/>
+              </a:rPr>
+              <a:t>	</a:t>
+            </a:r>
+            <a:r>
+              <a:rPr lang="ro-RO" sz="2400" dirty="0">
+                <a:latin typeface="Times New Roman" panose="02020603050405020304" pitchFamily="18" charset="0"/>
+                <a:cs typeface="Times New Roman" panose="02020603050405020304" pitchFamily="18" charset="0"/>
+              </a:rPr>
+              <a:t>Principii de bază ale unui SGBDOO</a:t>
+            </a:r>
+            <a:endParaRPr lang="en-GB" sz="2400" dirty="0">
+              <a:latin typeface="Times New Roman" panose="02020603050405020304" pitchFamily="18" charset="0"/>
+              <a:cs typeface="Times New Roman" panose="02020603050405020304" pitchFamily="18" charset="0"/>
+            </a:endParaRPr>
+          </a:p>
+          <a:p>
+            <a:endParaRPr lang="ro-RO" sz="2400" dirty="0">
+              <a:latin typeface="Times New Roman" panose="02020603050405020304" pitchFamily="18" charset="0"/>
+              <a:cs typeface="Times New Roman" panose="02020603050405020304" pitchFamily="18" charset="0"/>
+            </a:endParaRPr>
+          </a:p>
+        </p:txBody>
+      </p:sp>
+    </p:spTree>
+    <p:extLst>
+      <p:ext uri="{BB962C8B-B14F-4D97-AF65-F5344CB8AC3E}">
+        <p14:creationId xmlns:p14="http://schemas.microsoft.com/office/powerpoint/2010/main" val="3895269598"/>
+      </p:ext>
+    </p:extLst>
+  </p:cSld>
+  <p:clrMapOvr>
+    <a:masterClrMapping/>
+  </p:clrMapOvr>
+</p:sld>
+</file>
+
 <file path=ppt/slides/slide3.xml><?xml version="1.0" encoding="utf-8"?>
 <p:sld xmlns:a="http://schemas.openxmlformats.org/drawingml/2006/main" xmlns:r="http://schemas.openxmlformats.org/officeDocument/2006/relationships" xmlns:p="http://schemas.openxmlformats.org/presentationml/2006/main">
   <p:cSld>
@@ -11417,6 +14081,417 @@
     <p:extLst>
       <p:ext uri="{BB962C8B-B14F-4D97-AF65-F5344CB8AC3E}">
         <p14:creationId xmlns:p14="http://schemas.microsoft.com/office/powerpoint/2010/main" val="294254619"/>
+      </p:ext>
+    </p:extLst>
+  </p:cSld>
+  <p:clrMapOvr>
+    <a:masterClrMapping/>
+  </p:clrMapOvr>
+</p:sld>
+</file>
+
+<file path=ppt/slides/slide30.xml><?xml version="1.0" encoding="utf-8"?>
+<p:sld xmlns:a="http://schemas.openxmlformats.org/drawingml/2006/main" xmlns:r="http://schemas.openxmlformats.org/officeDocument/2006/relationships" xmlns:p="http://schemas.openxmlformats.org/presentationml/2006/main">
+  <p:cSld>
+    <p:spTree>
+      <p:nvGrpSpPr>
+        <p:cNvPr id="1" name=""/>
+        <p:cNvGrpSpPr/>
+        <p:nvPr/>
+      </p:nvGrpSpPr>
+      <p:grpSpPr>
+        <a:xfrm>
+          <a:off x="0" y="0"/>
+          <a:ext cx="0" cy="0"/>
+          <a:chOff x="0" y="0"/>
+          <a:chExt cx="0" cy="0"/>
+        </a:xfrm>
+      </p:grpSpPr>
+      <p:sp>
+        <p:nvSpPr>
+          <p:cNvPr id="2" name="Title 1"/>
+          <p:cNvSpPr>
+            <a:spLocks noGrp="1"/>
+          </p:cNvSpPr>
+          <p:nvPr>
+            <p:ph type="title"/>
+          </p:nvPr>
+        </p:nvSpPr>
+        <p:spPr/>
+        <p:txBody>
+          <a:bodyPr>
+            <a:normAutofit fontScale="90000"/>
+          </a:bodyPr>
+          <a:lstStyle/>
+          <a:p>
+            <a:br>
+              <a:rPr lang="en-GB" dirty="0"/>
+            </a:br>
+            <a:endParaRPr lang="en-GB" dirty="0"/>
+          </a:p>
+        </p:txBody>
+      </p:sp>
+      <p:sp>
+        <p:nvSpPr>
+          <p:cNvPr id="3" name="Content Placeholder 2"/>
+          <p:cNvSpPr>
+            <a:spLocks noGrp="1"/>
+          </p:cNvSpPr>
+          <p:nvPr>
+            <p:ph idx="1"/>
+          </p:nvPr>
+        </p:nvSpPr>
+        <p:spPr/>
+        <p:txBody>
+          <a:bodyPr>
+            <a:normAutofit fontScale="85000" lnSpcReduction="20000"/>
+          </a:bodyPr>
+          <a:lstStyle/>
+          <a:p>
+            <a:r>
+              <a:rPr lang="ro-RO" b="1" dirty="0"/>
+              <a:t>2. Un SGBDOO trebuie să aibă toate avantajele SGBD</a:t>
+            </a:r>
+            <a:endParaRPr lang="ro-RO" dirty="0"/>
+          </a:p>
+          <a:p>
+            <a:r>
+              <a:rPr lang="ro-RO" dirty="0"/>
+              <a:t>-</a:t>
+            </a:r>
+          </a:p>
+          <a:p>
+            <a:r>
+              <a:rPr lang="ro-RO" b="1" dirty="0"/>
+              <a:t>urilor relaționale</a:t>
+            </a:r>
+            <a:endParaRPr lang="ro-RO" dirty="0"/>
+          </a:p>
+          <a:p>
+            <a:r>
+              <a:rPr lang="ro-RO" dirty="0"/>
+              <a:t>-accesul la date prin intermediul unui limbaj de interogare (SQL)-</a:t>
+            </a:r>
+          </a:p>
+          <a:p>
+            <a:r>
+              <a:rPr lang="ro-RO" dirty="0"/>
+              <a:t>independența aplicațiilor față de structura datelor </a:t>
+            </a:r>
+          </a:p>
+          <a:p>
+            <a:r>
+              <a:rPr lang="ro-RO" dirty="0"/>
+              <a:t>-într-</a:t>
+            </a:r>
+          </a:p>
+          <a:p>
+            <a:r>
+              <a:rPr lang="ro-RO" dirty="0"/>
+              <a:t>un SGBDOO accesul la date se face mai mult prin interfețe cu</a:t>
+            </a:r>
+          </a:p>
+          <a:p>
+            <a:r>
+              <a:rPr lang="ro-RO" dirty="0"/>
+              <a:t>utilizatorul-</a:t>
+            </a:r>
+          </a:p>
+          <a:p>
+            <a:r>
+              <a:rPr lang="ro-RO" dirty="0"/>
+              <a:t>obiectele se accesează prin pointeri/referințe</a:t>
+            </a:r>
+          </a:p>
+          <a:p>
+            <a:pPr algn="just">
+              <a:buFont typeface="Wingdings" panose="05000000000000000000" pitchFamily="2" charset="2"/>
+              <a:buChar char="§"/>
+            </a:pPr>
+            <a:endParaRPr lang="en-GB" dirty="0">
+              <a:latin typeface="Times New Roman" panose="02020603050405020304" pitchFamily="18" charset="0"/>
+              <a:cs typeface="Times New Roman" panose="02020603050405020304" pitchFamily="18" charset="0"/>
+            </a:endParaRPr>
+          </a:p>
+        </p:txBody>
+      </p:sp>
+      <p:sp>
+        <p:nvSpPr>
+          <p:cNvPr id="5" name="Rectangle 4"/>
+          <p:cNvSpPr/>
+          <p:nvPr/>
+        </p:nvSpPr>
+        <p:spPr>
+          <a:xfrm>
+            <a:off x="-15239" y="534145"/>
+            <a:ext cx="9159239" cy="739300"/>
+          </a:xfrm>
+          <a:prstGeom prst="rect">
+            <a:avLst/>
+          </a:prstGeom>
+          <a:solidFill>
+            <a:schemeClr val="bg1">
+              <a:lumMod val="50000"/>
+            </a:schemeClr>
+          </a:solidFill>
+          <a:ln>
+            <a:noFill/>
+          </a:ln>
+        </p:spPr>
+        <p:style>
+          <a:lnRef idx="2">
+            <a:schemeClr val="accent1">
+              <a:shade val="50000"/>
+            </a:schemeClr>
+          </a:lnRef>
+          <a:fillRef idx="1">
+            <a:schemeClr val="accent1"/>
+          </a:fillRef>
+          <a:effectRef idx="0">
+            <a:schemeClr val="accent1"/>
+          </a:effectRef>
+          <a:fontRef idx="minor">
+            <a:schemeClr val="lt1"/>
+          </a:fontRef>
+        </p:style>
+        <p:txBody>
+          <a:bodyPr rtlCol="0" anchor="ctr"/>
+          <a:lstStyle/>
+          <a:p>
+            <a:r>
+              <a:rPr lang="ro-RO" sz="2400" dirty="0">
+                <a:latin typeface="Times New Roman" panose="02020603050405020304" pitchFamily="18" charset="0"/>
+                <a:cs typeface="Times New Roman" panose="02020603050405020304" pitchFamily="18" charset="0"/>
+              </a:rPr>
+              <a:t>	</a:t>
+            </a:r>
+            <a:r>
+              <a:rPr lang="ro-RO" sz="2400" dirty="0">
+                <a:latin typeface="Times New Roman" panose="02020603050405020304" pitchFamily="18" charset="0"/>
+                <a:cs typeface="Times New Roman" panose="02020603050405020304" pitchFamily="18" charset="0"/>
+              </a:rPr>
+              <a:t>Principii de bază ale unui SGBDOO</a:t>
+            </a:r>
+            <a:endParaRPr lang="en-GB" sz="2400" dirty="0">
+              <a:latin typeface="Times New Roman" panose="02020603050405020304" pitchFamily="18" charset="0"/>
+              <a:cs typeface="Times New Roman" panose="02020603050405020304" pitchFamily="18" charset="0"/>
+            </a:endParaRPr>
+          </a:p>
+          <a:p>
+            <a:endParaRPr lang="ro-RO" sz="2400" dirty="0">
+              <a:latin typeface="Times New Roman" panose="02020603050405020304" pitchFamily="18" charset="0"/>
+              <a:cs typeface="Times New Roman" panose="02020603050405020304" pitchFamily="18" charset="0"/>
+            </a:endParaRPr>
+          </a:p>
+        </p:txBody>
+      </p:sp>
+    </p:spTree>
+    <p:extLst>
+      <p:ext uri="{BB962C8B-B14F-4D97-AF65-F5344CB8AC3E}">
+        <p14:creationId xmlns:p14="http://schemas.microsoft.com/office/powerpoint/2010/main" val="863077715"/>
+      </p:ext>
+    </p:extLst>
+  </p:cSld>
+  <p:clrMapOvr>
+    <a:masterClrMapping/>
+  </p:clrMapOvr>
+</p:sld>
+</file>
+
+<file path=ppt/slides/slide31.xml><?xml version="1.0" encoding="utf-8"?>
+<p:sld xmlns:a="http://schemas.openxmlformats.org/drawingml/2006/main" xmlns:r="http://schemas.openxmlformats.org/officeDocument/2006/relationships" xmlns:p="http://schemas.openxmlformats.org/presentationml/2006/main">
+  <p:cSld>
+    <p:spTree>
+      <p:nvGrpSpPr>
+        <p:cNvPr id="1" name=""/>
+        <p:cNvGrpSpPr/>
+        <p:nvPr/>
+      </p:nvGrpSpPr>
+      <p:grpSpPr>
+        <a:xfrm>
+          <a:off x="0" y="0"/>
+          <a:ext cx="0" cy="0"/>
+          <a:chOff x="0" y="0"/>
+          <a:chExt cx="0" cy="0"/>
+        </a:xfrm>
+      </p:grpSpPr>
+      <p:sp>
+        <p:nvSpPr>
+          <p:cNvPr id="2" name="Title 1"/>
+          <p:cNvSpPr>
+            <a:spLocks noGrp="1"/>
+          </p:cNvSpPr>
+          <p:nvPr>
+            <p:ph type="title"/>
+          </p:nvPr>
+        </p:nvSpPr>
+        <p:spPr/>
+        <p:txBody>
+          <a:bodyPr>
+            <a:normAutofit fontScale="90000"/>
+          </a:bodyPr>
+          <a:lstStyle/>
+          <a:p>
+            <a:br>
+              <a:rPr lang="en-GB" dirty="0"/>
+            </a:br>
+            <a:endParaRPr lang="en-GB" dirty="0"/>
+          </a:p>
+        </p:txBody>
+      </p:sp>
+      <p:sp>
+        <p:nvSpPr>
+          <p:cNvPr id="3" name="Content Placeholder 2"/>
+          <p:cNvSpPr>
+            <a:spLocks noGrp="1"/>
+          </p:cNvSpPr>
+          <p:nvPr>
+            <p:ph idx="1"/>
+          </p:nvPr>
+        </p:nvSpPr>
+        <p:spPr/>
+        <p:txBody>
+          <a:bodyPr>
+            <a:normAutofit/>
+          </a:bodyPr>
+          <a:lstStyle/>
+          <a:p>
+            <a:pPr algn="just">
+              <a:buFont typeface="Wingdings" panose="05000000000000000000" pitchFamily="2" charset="2"/>
+              <a:buChar char="§"/>
+            </a:pPr>
+            <a:endParaRPr lang="en-GB" dirty="0">
+              <a:latin typeface="Times New Roman" panose="02020603050405020304" pitchFamily="18" charset="0"/>
+              <a:cs typeface="Times New Roman" panose="02020603050405020304" pitchFamily="18" charset="0"/>
+            </a:endParaRPr>
+          </a:p>
+        </p:txBody>
+      </p:sp>
+      <p:sp>
+        <p:nvSpPr>
+          <p:cNvPr id="5" name="Rectangle 4"/>
+          <p:cNvSpPr/>
+          <p:nvPr/>
+        </p:nvSpPr>
+        <p:spPr>
+          <a:xfrm>
+            <a:off x="-15239" y="534145"/>
+            <a:ext cx="9159239" cy="739300"/>
+          </a:xfrm>
+          <a:prstGeom prst="rect">
+            <a:avLst/>
+          </a:prstGeom>
+          <a:solidFill>
+            <a:schemeClr val="bg1">
+              <a:lumMod val="50000"/>
+            </a:schemeClr>
+          </a:solidFill>
+          <a:ln>
+            <a:noFill/>
+          </a:ln>
+        </p:spPr>
+        <p:style>
+          <a:lnRef idx="2">
+            <a:schemeClr val="accent1">
+              <a:shade val="50000"/>
+            </a:schemeClr>
+          </a:lnRef>
+          <a:fillRef idx="1">
+            <a:schemeClr val="accent1"/>
+          </a:fillRef>
+          <a:effectRef idx="0">
+            <a:schemeClr val="accent1"/>
+          </a:effectRef>
+          <a:fontRef idx="minor">
+            <a:schemeClr val="lt1"/>
+          </a:fontRef>
+        </p:style>
+        <p:txBody>
+          <a:bodyPr rtlCol="0" anchor="ctr"/>
+          <a:lstStyle/>
+          <a:p>
+            <a:r>
+              <a:rPr lang="ro-RO" sz="2400" dirty="0">
+                <a:latin typeface="Times New Roman" panose="02020603050405020304" pitchFamily="18" charset="0"/>
+                <a:cs typeface="Times New Roman" panose="02020603050405020304" pitchFamily="18" charset="0"/>
+              </a:rPr>
+              <a:t>	Dsadsa	</a:t>
+            </a:r>
+          </a:p>
+        </p:txBody>
+      </p:sp>
+    </p:spTree>
+    <p:extLst>
+      <p:ext uri="{BB962C8B-B14F-4D97-AF65-F5344CB8AC3E}">
+        <p14:creationId xmlns:p14="http://schemas.microsoft.com/office/powerpoint/2010/main" val="1428857388"/>
+      </p:ext>
+    </p:extLst>
+  </p:cSld>
+  <p:clrMapOvr>
+    <a:masterClrMapping/>
+  </p:clrMapOvr>
+</p:sld>
+</file>
+
+<file path=ppt/slides/slide32.xml><?xml version="1.0" encoding="utf-8"?>
+<p:sld xmlns:a="http://schemas.openxmlformats.org/drawingml/2006/main" xmlns:r="http://schemas.openxmlformats.org/officeDocument/2006/relationships" xmlns:p="http://schemas.openxmlformats.org/presentationml/2006/main">
+  <p:cSld>
+    <p:spTree>
+      <p:nvGrpSpPr>
+        <p:cNvPr id="1" name=""/>
+        <p:cNvGrpSpPr/>
+        <p:nvPr/>
+      </p:nvGrpSpPr>
+      <p:grpSpPr>
+        <a:xfrm>
+          <a:off x="0" y="0"/>
+          <a:ext cx="0" cy="0"/>
+          <a:chOff x="0" y="0"/>
+          <a:chExt cx="0" cy="0"/>
+        </a:xfrm>
+      </p:grpSpPr>
+      <p:sp>
+        <p:nvSpPr>
+          <p:cNvPr id="2" name="Title 1"/>
+          <p:cNvSpPr>
+            <a:spLocks noGrp="1"/>
+          </p:cNvSpPr>
+          <p:nvPr>
+            <p:ph type="title"/>
+          </p:nvPr>
+        </p:nvSpPr>
+        <p:spPr/>
+        <p:txBody>
+          <a:bodyPr/>
+          <a:lstStyle/>
+          <a:p>
+            <a:endParaRPr lang="ro-RO"/>
+          </a:p>
+        </p:txBody>
+      </p:sp>
+      <p:sp>
+        <p:nvSpPr>
+          <p:cNvPr id="3" name="Content Placeholder 2"/>
+          <p:cNvSpPr>
+            <a:spLocks noGrp="1"/>
+          </p:cNvSpPr>
+          <p:nvPr>
+            <p:ph idx="1"/>
+          </p:nvPr>
+        </p:nvSpPr>
+        <p:spPr/>
+        <p:txBody>
+          <a:bodyPr/>
+          <a:lstStyle/>
+          <a:p>
+            <a:endParaRPr lang="ro-RO"/>
+          </a:p>
+        </p:txBody>
+      </p:sp>
+    </p:spTree>
+    <p:extLst>
+      <p:ext uri="{BB962C8B-B14F-4D97-AF65-F5344CB8AC3E}">
+        <p14:creationId xmlns:p14="http://schemas.microsoft.com/office/powerpoint/2010/main" val="801297231"/>
       </p:ext>
     </p:extLst>
   </p:cSld>

</xml_diff>

<commit_message>
update cod 42+ pagini
</commit_message>
<xml_diff>
--- a/bdoo.pptx
+++ b/bdoo.pptx
@@ -35,8 +35,20 @@
     <p:sldId id="284" r:id="rId29"/>
     <p:sldId id="285" r:id="rId30"/>
     <p:sldId id="286" r:id="rId31"/>
-    <p:sldId id="287" r:id="rId32"/>
-    <p:sldId id="281" r:id="rId33"/>
+    <p:sldId id="289" r:id="rId32"/>
+    <p:sldId id="294" r:id="rId33"/>
+    <p:sldId id="290" r:id="rId34"/>
+    <p:sldId id="295" r:id="rId35"/>
+    <p:sldId id="296" r:id="rId36"/>
+    <p:sldId id="297" r:id="rId37"/>
+    <p:sldId id="298" r:id="rId38"/>
+    <p:sldId id="300" r:id="rId39"/>
+    <p:sldId id="299" r:id="rId40"/>
+    <p:sldId id="291" r:id="rId41"/>
+    <p:sldId id="301" r:id="rId42"/>
+    <p:sldId id="292" r:id="rId43"/>
+    <p:sldId id="293" r:id="rId44"/>
+    <p:sldId id="302" r:id="rId45"/>
   </p:sldIdLst>
   <p:sldSz cx="9144000" cy="6858000" type="screen4x3"/>
   <p:notesSz cx="6858000" cy="9144000"/>
@@ -11116,7 +11128,6 @@
               <a:rPr lang="ro-RO" dirty="0"/>
               <a:t>o pereche de clase. </a:t>
             </a:r>
-            <a:endParaRPr lang="ro-RO" dirty="0"/>
           </a:p>
         </p:txBody>
       </p:sp>
@@ -13099,14 +13110,7 @@
                 <a:latin typeface="Times New Roman" panose="02020603050405020304" pitchFamily="18" charset="0"/>
                 <a:cs typeface="Times New Roman" panose="02020603050405020304" pitchFamily="18" charset="0"/>
               </a:rPr>
-              <a:t>	</a:t>
-            </a:r>
-            <a:r>
-              <a:rPr lang="ro-RO" sz="2400" dirty="0">
-                <a:latin typeface="Times New Roman" panose="02020603050405020304" pitchFamily="18" charset="0"/>
-                <a:cs typeface="Times New Roman" panose="02020603050405020304" pitchFamily="18" charset="0"/>
-              </a:rPr>
-              <a:t>Principii de bază ale unui SGBDOO</a:t>
+              <a:t>	Principii de bază ale unui SGBDOO</a:t>
             </a:r>
             <a:endParaRPr lang="en-GB" sz="2400" dirty="0">
               <a:latin typeface="Times New Roman" panose="02020603050405020304" pitchFamily="18" charset="0"/>
@@ -13288,14 +13292,7 @@
                 <a:latin typeface="Times New Roman" panose="02020603050405020304" pitchFamily="18" charset="0"/>
                 <a:cs typeface="Times New Roman" panose="02020603050405020304" pitchFamily="18" charset="0"/>
               </a:rPr>
-              <a:t>	</a:t>
-            </a:r>
-            <a:r>
-              <a:rPr lang="ro-RO" sz="2400" dirty="0">
-                <a:latin typeface="Times New Roman" panose="02020603050405020304" pitchFamily="18" charset="0"/>
-                <a:cs typeface="Times New Roman" panose="02020603050405020304" pitchFamily="18" charset="0"/>
-              </a:rPr>
-              <a:t>Principii de bază ale unui SGBDOO</a:t>
+              <a:t>	Principii de bază ale unui SGBDOO</a:t>
             </a:r>
             <a:endParaRPr lang="en-GB" sz="2400" dirty="0">
               <a:latin typeface="Times New Roman" panose="02020603050405020304" pitchFamily="18" charset="0"/>
@@ -14263,14 +14260,7 @@
                 <a:latin typeface="Times New Roman" panose="02020603050405020304" pitchFamily="18" charset="0"/>
                 <a:cs typeface="Times New Roman" panose="02020603050405020304" pitchFamily="18" charset="0"/>
               </a:rPr>
-              <a:t>	</a:t>
-            </a:r>
-            <a:r>
-              <a:rPr lang="ro-RO" sz="2400" dirty="0">
-                <a:latin typeface="Times New Roman" panose="02020603050405020304" pitchFamily="18" charset="0"/>
-                <a:cs typeface="Times New Roman" panose="02020603050405020304" pitchFamily="18" charset="0"/>
-              </a:rPr>
-              <a:t>Principii de bază ale unui SGBDOO</a:t>
+              <a:t>	Principii de bază ale unui SGBDOO</a:t>
             </a:r>
             <a:endParaRPr lang="en-GB" sz="2400" dirty="0">
               <a:latin typeface="Times New Roman" panose="02020603050405020304" pitchFamily="18" charset="0"/>
@@ -14352,9 +14342,76 @@
         <p:spPr/>
         <p:txBody>
           <a:bodyPr>
-            <a:normAutofit/>
+            <a:normAutofit fontScale="70000" lnSpcReduction="20000"/>
           </a:bodyPr>
           <a:lstStyle/>
+          <a:p>
+            <a:r>
+              <a:rPr lang="ro-RO" b="1" dirty="0"/>
+              <a:t>Modificările aduse schemei pot fi greu de implementat</a:t>
+            </a:r>
+            <a:endParaRPr lang="ro-RO" dirty="0"/>
+          </a:p>
+          <a:p>
+            <a:r>
+              <a:rPr lang="ro-RO" dirty="0"/>
+              <a:t>-</a:t>
+            </a:r>
+          </a:p>
+          <a:p>
+            <a:r>
+              <a:rPr lang="ro-RO" dirty="0"/>
+              <a:t>adăugarea / modificarea unei clase persistente</a:t>
+            </a:r>
+          </a:p>
+          <a:p>
+            <a:r>
+              <a:rPr lang="ro-RO" dirty="0"/>
+              <a:t>-</a:t>
+            </a:r>
+          </a:p>
+          <a:p>
+            <a:r>
+              <a:rPr lang="ro-RO" dirty="0"/>
+              <a:t>actualizare a aplicației</a:t>
+            </a:r>
+          </a:p>
+          <a:p>
+            <a:r>
+              <a:rPr lang="ro-RO" dirty="0"/>
+              <a:t>-</a:t>
+            </a:r>
+          </a:p>
+          <a:p>
+            <a:r>
+              <a:rPr lang="ro-RO" dirty="0"/>
+              <a:t>actualizări ale claselor care interacționează cu / depind de clasa noucreată / modificată</a:t>
+            </a:r>
+          </a:p>
+          <a:p>
+            <a:r>
+              <a:rPr lang="ro-RO" dirty="0"/>
+              <a:t>-</a:t>
+            </a:r>
+          </a:p>
+          <a:p>
+            <a:r>
+              <a:rPr lang="ro-RO" dirty="0"/>
+              <a:t>actualizările pot fi consumatoare de timp</a:t>
+            </a:r>
+          </a:p>
+          <a:p>
+            <a:r>
+              <a:rPr lang="ro-RO" dirty="0"/>
+              <a:t>-</a:t>
+            </a:r>
+          </a:p>
+          <a:p>
+            <a:r>
+              <a:rPr lang="ro-RO" dirty="0"/>
+              <a:t>modificarea schemei necesită de cele mai multe ori recompilarea întregiiaplicații</a:t>
+            </a:r>
+          </a:p>
           <a:p>
             <a:pPr algn="just">
               <a:buFont typeface="Wingdings" panose="05000000000000000000" pitchFamily="2" charset="2"/>
@@ -14415,7 +14472,32 @@
                 <a:latin typeface="Times New Roman" panose="02020603050405020304" pitchFamily="18" charset="0"/>
                 <a:cs typeface="Times New Roman" panose="02020603050405020304" pitchFamily="18" charset="0"/>
               </a:rPr>
-              <a:t>	Dsadsa	</a:t>
+              <a:t>	</a:t>
+            </a:r>
+            <a:r>
+              <a:rPr lang="ro-RO" sz="2400" dirty="0">
+                <a:latin typeface="Times New Roman" panose="02020603050405020304" pitchFamily="18" charset="0"/>
+                <a:cs typeface="Times New Roman" panose="02020603050405020304" pitchFamily="18" charset="0"/>
+              </a:rPr>
+              <a:t>R</a:t>
+            </a:r>
+            <a:r>
+              <a:rPr lang="ro-RO" sz="2400" dirty="0"/>
+              <a:t>estricții legare de modificarea</a:t>
+            </a:r>
+            <a:r>
+              <a:rPr lang="ro-RO" sz="2400" dirty="0">
+                <a:latin typeface="Times New Roman" panose="02020603050405020304" pitchFamily="18" charset="0"/>
+                <a:cs typeface="Times New Roman" panose="02020603050405020304" pitchFamily="18" charset="0"/>
+              </a:rPr>
+              <a:t> unei scheme BDOO</a:t>
+            </a:r>
+            <a:r>
+              <a:rPr lang="ro-RO" sz="2400" dirty="0">
+                <a:latin typeface="Times New Roman" panose="02020603050405020304" pitchFamily="18" charset="0"/>
+                <a:cs typeface="Times New Roman" panose="02020603050405020304" pitchFamily="18" charset="0"/>
+              </a:rPr>
+              <a:t>	</a:t>
             </a:r>
           </a:p>
         </p:txBody>
@@ -14423,7 +14505,7 @@
     </p:spTree>
     <p:extLst>
       <p:ext uri="{BB962C8B-B14F-4D97-AF65-F5344CB8AC3E}">
-        <p14:creationId xmlns:p14="http://schemas.microsoft.com/office/powerpoint/2010/main" val="1428857388"/>
+        <p14:creationId xmlns:p14="http://schemas.microsoft.com/office/powerpoint/2010/main" val="4039316353"/>
       </p:ext>
     </p:extLst>
   </p:cSld>
@@ -14462,10 +14544,15 @@
         </p:nvSpPr>
         <p:spPr/>
         <p:txBody>
-          <a:bodyPr/>
+          <a:bodyPr>
+            <a:normAutofit fontScale="90000"/>
+          </a:bodyPr>
           <a:lstStyle/>
           <a:p>
-            <a:endParaRPr lang="ro-RO"/>
+            <a:br>
+              <a:rPr lang="en-GB" dirty="0"/>
+            </a:br>
+            <a:endParaRPr lang="en-GB" dirty="0"/>
           </a:p>
         </p:txBody>
       </p:sp>
@@ -14481,746 +14568,86 @@
         </p:nvSpPr>
         <p:spPr/>
         <p:txBody>
-          <a:bodyPr/>
-          <a:lstStyle/>
-          <a:p>
-            <a:endParaRPr lang="ro-RO"/>
-          </a:p>
-        </p:txBody>
-      </p:sp>
-    </p:spTree>
-    <p:extLst>
-      <p:ext uri="{BB962C8B-B14F-4D97-AF65-F5344CB8AC3E}">
-        <p14:creationId xmlns:p14="http://schemas.microsoft.com/office/powerpoint/2010/main" val="801297231"/>
-      </p:ext>
-    </p:extLst>
-  </p:cSld>
-  <p:clrMapOvr>
-    <a:masterClrMapping/>
-  </p:clrMapOvr>
-</p:sld>
-</file>
-
-<file path=ppt/slides/slide4.xml><?xml version="1.0" encoding="utf-8"?>
-<p:sld xmlns:a="http://schemas.openxmlformats.org/drawingml/2006/main" xmlns:r="http://schemas.openxmlformats.org/officeDocument/2006/relationships" xmlns:p="http://schemas.openxmlformats.org/presentationml/2006/main">
-  <p:cSld>
-    <p:spTree>
-      <p:nvGrpSpPr>
-        <p:cNvPr id="1" name=""/>
-        <p:cNvGrpSpPr/>
-        <p:nvPr/>
-      </p:nvGrpSpPr>
-      <p:grpSpPr>
-        <a:xfrm>
-          <a:off x="0" y="0"/>
-          <a:ext cx="0" cy="0"/>
-          <a:chOff x="0" y="0"/>
-          <a:chExt cx="0" cy="0"/>
-        </a:xfrm>
-      </p:grpSpPr>
-      <p:sp>
-        <p:nvSpPr>
-          <p:cNvPr id="2" name="Title 1"/>
-          <p:cNvSpPr>
-            <a:spLocks noGrp="1"/>
-          </p:cNvSpPr>
-          <p:nvPr>
-            <p:ph type="title"/>
-          </p:nvPr>
-        </p:nvSpPr>
-        <p:spPr/>
-        <p:txBody>
           <a:bodyPr>
-            <a:normAutofit fontScale="90000"/>
+            <a:normAutofit fontScale="77500" lnSpcReduction="20000"/>
           </a:bodyPr>
           <a:lstStyle/>
           <a:p>
-            <a:br>
+            <a:r>
+              <a:rPr lang="ro-RO" b="1" dirty="0"/>
+              <a:t>Obiecte și relații compuse</a:t>
+            </a:r>
+            <a:endParaRPr lang="ro-RO" dirty="0"/>
+          </a:p>
+          <a:p>
+            <a:r>
               <a:rPr lang="ro-RO" dirty="0"/>
-            </a:br>
-            <a:endParaRPr lang="en-GB" dirty="0"/>
-          </a:p>
-        </p:txBody>
-      </p:sp>
-      <p:sp>
-        <p:nvSpPr>
-          <p:cNvPr id="3" name="Content Placeholder 2"/>
-          <p:cNvSpPr>
-            <a:spLocks noGrp="1"/>
-          </p:cNvSpPr>
-          <p:nvPr>
-            <p:ph idx="1"/>
-          </p:nvPr>
-        </p:nvSpPr>
-        <p:spPr/>
-        <p:txBody>
-          <a:bodyPr/>
-          <a:lstStyle/>
-          <a:p>
-            <a:endParaRPr lang="ro-RO" dirty="0"/>
-          </a:p>
-          <a:p>
-            <a:endParaRPr lang="en-GB" dirty="0"/>
-          </a:p>
-        </p:txBody>
-      </p:sp>
-      <p:sp>
-        <p:nvSpPr>
-          <p:cNvPr id="5" name="TextBox 4"/>
-          <p:cNvSpPr txBox="1"/>
-          <p:nvPr/>
-        </p:nvSpPr>
-        <p:spPr>
-          <a:xfrm>
-            <a:off x="457201" y="2153741"/>
-            <a:ext cx="8229600" cy="4154984"/>
-          </a:xfrm>
-          <a:prstGeom prst="rect">
-            <a:avLst/>
-          </a:prstGeom>
-          <a:noFill/>
-        </p:spPr>
-        <p:txBody>
-          <a:bodyPr wrap="square" rtlCol="0">
-            <a:spAutoFit/>
-          </a:bodyPr>
-          <a:lstStyle/>
-          <a:p>
-            <a:pPr marL="342900" indent="-342900" algn="just">
+              <a:t>-</a:t>
+            </a:r>
+          </a:p>
+          <a:p>
+            <a:r>
+              <a:rPr lang="ro-RO" dirty="0"/>
+              <a:t>un obiect poate conține în structura sa alte obiecte</a:t>
+            </a:r>
+          </a:p>
+          <a:p>
+            <a:r>
+              <a:rPr lang="ro-RO" dirty="0"/>
+              <a:t>-</a:t>
+            </a:r>
+          </a:p>
+          <a:p>
+            <a:r>
+              <a:rPr lang="ro-RO" dirty="0"/>
+              <a:t>tip de dată complex</a:t>
+            </a:r>
+          </a:p>
+          <a:p>
+            <a:r>
+              <a:rPr lang="ro-RO" dirty="0"/>
+              <a:t>-</a:t>
+            </a:r>
+          </a:p>
+          <a:p>
+            <a:r>
+              <a:rPr lang="ro-RO" dirty="0"/>
+              <a:t>un obiect este o reprezentare mai fidelă a entității din lumea reală pe careo modelează</a:t>
+            </a:r>
+          </a:p>
+          <a:p>
+            <a:r>
+              <a:rPr lang="ro-RO" dirty="0"/>
+              <a:t>-</a:t>
+            </a:r>
+          </a:p>
+          <a:p>
+            <a:r>
+              <a:rPr lang="ro-RO" dirty="0"/>
+              <a:t>gestiunea mai bună a datelor complexe, interconectate</a:t>
+            </a:r>
+          </a:p>
+          <a:p>
+            <a:r>
+              <a:rPr lang="ro-RO" dirty="0"/>
+              <a:t>-se poate lucra cu o varietate mai mare de tipuri de date</a:t>
+            </a:r>
+          </a:p>
+          <a:p>
+            <a:pPr algn="just">
               <a:buFont typeface="Wingdings" panose="05000000000000000000" pitchFamily="2" charset="2"/>
               <a:buChar char="§"/>
             </a:pPr>
-            <a:r>
-              <a:rPr lang="en-GB" sz="2400" dirty="0" err="1">
-                <a:latin typeface="Times New Roman" pitchFamily="18" charset="0"/>
-                <a:cs typeface="Times New Roman" pitchFamily="18" charset="0"/>
-              </a:rPr>
-              <a:t>Dezvoltarea</a:t>
-            </a:r>
-            <a:r>
-              <a:rPr lang="en-GB" sz="2400" dirty="0">
-                <a:latin typeface="Times New Roman" pitchFamily="18" charset="0"/>
-                <a:cs typeface="Times New Roman" pitchFamily="18" charset="0"/>
-              </a:rPr>
-              <a:t> </a:t>
-            </a:r>
-            <a:r>
-              <a:rPr lang="en-GB" sz="2400" dirty="0" err="1">
-                <a:latin typeface="Times New Roman" pitchFamily="18" charset="0"/>
-                <a:cs typeface="Times New Roman" pitchFamily="18" charset="0"/>
-              </a:rPr>
-              <a:t>tehnologiei</a:t>
-            </a:r>
-            <a:r>
-              <a:rPr lang="en-GB" sz="2400" dirty="0">
-                <a:latin typeface="Times New Roman" pitchFamily="18" charset="0"/>
-                <a:cs typeface="Times New Roman" pitchFamily="18" charset="0"/>
-              </a:rPr>
-              <a:t> </a:t>
-            </a:r>
-            <a:r>
-              <a:rPr lang="en-GB" sz="2400" dirty="0" err="1">
-                <a:latin typeface="Times New Roman" pitchFamily="18" charset="0"/>
-                <a:cs typeface="Times New Roman" pitchFamily="18" charset="0"/>
-              </a:rPr>
-              <a:t>sistemelor</a:t>
-            </a:r>
-            <a:r>
-              <a:rPr lang="en-GB" sz="2400" dirty="0">
-                <a:latin typeface="Times New Roman" pitchFamily="18" charset="0"/>
-                <a:cs typeface="Times New Roman" pitchFamily="18" charset="0"/>
-              </a:rPr>
-              <a:t> de </a:t>
-            </a:r>
-            <a:r>
-              <a:rPr lang="en-GB" sz="2400" dirty="0" err="1">
-                <a:latin typeface="Times New Roman" pitchFamily="18" charset="0"/>
-                <a:cs typeface="Times New Roman" pitchFamily="18" charset="0"/>
-              </a:rPr>
-              <a:t>calcul</a:t>
-            </a:r>
-            <a:r>
-              <a:rPr lang="en-GB" sz="2400" dirty="0">
-                <a:latin typeface="Times New Roman" pitchFamily="18" charset="0"/>
-                <a:cs typeface="Times New Roman" pitchFamily="18" charset="0"/>
-              </a:rPr>
-              <a:t> in </a:t>
-            </a:r>
-            <a:r>
-              <a:rPr lang="en-GB" sz="2400" dirty="0" err="1">
-                <a:latin typeface="Times New Roman" pitchFamily="18" charset="0"/>
-                <a:cs typeface="Times New Roman" pitchFamily="18" charset="0"/>
-              </a:rPr>
-              <a:t>ultimii</a:t>
-            </a:r>
-            <a:r>
-              <a:rPr lang="en-GB" sz="2400" dirty="0">
-                <a:latin typeface="Times New Roman" pitchFamily="18" charset="0"/>
-                <a:cs typeface="Times New Roman" pitchFamily="18" charset="0"/>
-              </a:rPr>
-              <a:t> </a:t>
-            </a:r>
-            <a:r>
-              <a:rPr lang="en-GB" sz="2400" dirty="0" err="1">
-                <a:latin typeface="Times New Roman" pitchFamily="18" charset="0"/>
-                <a:cs typeface="Times New Roman" pitchFamily="18" charset="0"/>
-              </a:rPr>
-              <a:t>ani</a:t>
-            </a:r>
-            <a:r>
-              <a:rPr lang="en-GB" sz="2400" dirty="0">
-                <a:latin typeface="Times New Roman" pitchFamily="18" charset="0"/>
-                <a:cs typeface="Times New Roman" pitchFamily="18" charset="0"/>
-              </a:rPr>
-              <a:t> a </a:t>
-            </a:r>
-            <a:r>
-              <a:rPr lang="en-GB" sz="2400" dirty="0" err="1">
-                <a:latin typeface="Times New Roman" pitchFamily="18" charset="0"/>
-                <a:cs typeface="Times New Roman" pitchFamily="18" charset="0"/>
-              </a:rPr>
-              <a:t>condus</a:t>
-            </a:r>
-            <a:r>
-              <a:rPr lang="en-GB" sz="2400" dirty="0">
-                <a:latin typeface="Times New Roman" pitchFamily="18" charset="0"/>
-                <a:cs typeface="Times New Roman" pitchFamily="18" charset="0"/>
-              </a:rPr>
-              <a:t> la </a:t>
-            </a:r>
-            <a:r>
-              <a:rPr lang="en-GB" sz="2400" dirty="0" err="1">
-                <a:latin typeface="Times New Roman" pitchFamily="18" charset="0"/>
-                <a:cs typeface="Times New Roman" pitchFamily="18" charset="0"/>
-              </a:rPr>
-              <a:t>patrunderea</a:t>
-            </a:r>
-            <a:r>
-              <a:rPr lang="en-GB" sz="2400" dirty="0">
-                <a:latin typeface="Times New Roman" pitchFamily="18" charset="0"/>
-                <a:cs typeface="Times New Roman" pitchFamily="18" charset="0"/>
-              </a:rPr>
-              <a:t> </a:t>
-            </a:r>
-            <a:r>
-              <a:rPr lang="ro-RO" sz="2400" dirty="0">
-                <a:latin typeface="Times New Roman" pitchFamily="18" charset="0"/>
-                <a:cs typeface="Times New Roman" pitchFamily="18" charset="0"/>
-              </a:rPr>
-              <a:t>BDOO </a:t>
-            </a:r>
-            <a:r>
-              <a:rPr lang="en-GB" sz="2400" dirty="0">
-                <a:latin typeface="Times New Roman" pitchFamily="18" charset="0"/>
-                <a:cs typeface="Times New Roman" pitchFamily="18" charset="0"/>
-              </a:rPr>
-              <a:t>in tot </a:t>
-            </a:r>
-            <a:r>
-              <a:rPr lang="en-GB" sz="2400" dirty="0" err="1">
-                <a:latin typeface="Times New Roman" pitchFamily="18" charset="0"/>
-                <a:cs typeface="Times New Roman" pitchFamily="18" charset="0"/>
-              </a:rPr>
-              <a:t>mai</a:t>
-            </a:r>
-            <a:r>
-              <a:rPr lang="en-GB" sz="2400" dirty="0">
-                <a:latin typeface="Times New Roman" pitchFamily="18" charset="0"/>
-                <a:cs typeface="Times New Roman" pitchFamily="18" charset="0"/>
-              </a:rPr>
-              <a:t> </a:t>
-            </a:r>
-            <a:r>
-              <a:rPr lang="en-GB" sz="2400" dirty="0" err="1">
-                <a:latin typeface="Times New Roman" pitchFamily="18" charset="0"/>
-                <a:cs typeface="Times New Roman" pitchFamily="18" charset="0"/>
-              </a:rPr>
-              <a:t>multe</a:t>
-            </a:r>
-            <a:r>
-              <a:rPr lang="en-GB" sz="2400" dirty="0">
-                <a:latin typeface="Times New Roman" pitchFamily="18" charset="0"/>
-                <a:cs typeface="Times New Roman" pitchFamily="18" charset="0"/>
-              </a:rPr>
-              <a:t> </a:t>
-            </a:r>
-            <a:r>
-              <a:rPr lang="en-GB" sz="2400" dirty="0" err="1">
-                <a:latin typeface="Times New Roman" pitchFamily="18" charset="0"/>
-                <a:cs typeface="Times New Roman" pitchFamily="18" charset="0"/>
-              </a:rPr>
-              <a:t>domenii</a:t>
-            </a:r>
-            <a:r>
-              <a:rPr lang="en-GB" sz="2400" dirty="0">
-                <a:latin typeface="Times New Roman" pitchFamily="18" charset="0"/>
-                <a:cs typeface="Times New Roman" pitchFamily="18" charset="0"/>
-              </a:rPr>
-              <a:t> de </a:t>
-            </a:r>
-            <a:r>
-              <a:rPr lang="en-GB" sz="2400" dirty="0" err="1">
-                <a:latin typeface="Times New Roman" pitchFamily="18" charset="0"/>
-                <a:cs typeface="Times New Roman" pitchFamily="18" charset="0"/>
-              </a:rPr>
-              <a:t>activitate</a:t>
-            </a:r>
-            <a:r>
-              <a:rPr lang="en-GB" sz="2400" dirty="0">
-                <a:latin typeface="Times New Roman" pitchFamily="18" charset="0"/>
-                <a:cs typeface="Times New Roman" pitchFamily="18" charset="0"/>
-              </a:rPr>
-              <a:t>, </a:t>
-            </a:r>
-            <a:r>
-              <a:rPr lang="en-GB" sz="2400" dirty="0" err="1">
-                <a:latin typeface="Times New Roman" pitchFamily="18" charset="0"/>
-                <a:cs typeface="Times New Roman" pitchFamily="18" charset="0"/>
-              </a:rPr>
-              <a:t>avand</a:t>
-            </a:r>
-            <a:r>
-              <a:rPr lang="en-GB" sz="2400" dirty="0">
-                <a:latin typeface="Times New Roman" pitchFamily="18" charset="0"/>
-                <a:cs typeface="Times New Roman" pitchFamily="18" charset="0"/>
-              </a:rPr>
-              <a:t> de </a:t>
-            </a:r>
-            <a:r>
-              <a:rPr lang="en-GB" sz="2400" dirty="0" err="1">
-                <a:latin typeface="Times New Roman" pitchFamily="18" charset="0"/>
-                <a:cs typeface="Times New Roman" pitchFamily="18" charset="0"/>
-              </a:rPr>
-              <a:t>rezolvat</a:t>
-            </a:r>
-            <a:r>
-              <a:rPr lang="en-GB" sz="2400" dirty="0">
-                <a:latin typeface="Times New Roman" pitchFamily="18" charset="0"/>
-                <a:cs typeface="Times New Roman" pitchFamily="18" charset="0"/>
-              </a:rPr>
-              <a:t> </a:t>
-            </a:r>
-            <a:r>
-              <a:rPr lang="en-GB" sz="2400" dirty="0" err="1">
-                <a:latin typeface="Times New Roman" pitchFamily="18" charset="0"/>
-                <a:cs typeface="Times New Roman" pitchFamily="18" charset="0"/>
-              </a:rPr>
-              <a:t>probleme</a:t>
-            </a:r>
-            <a:r>
-              <a:rPr lang="en-GB" sz="2400" dirty="0">
-                <a:latin typeface="Times New Roman" pitchFamily="18" charset="0"/>
-                <a:cs typeface="Times New Roman" pitchFamily="18" charset="0"/>
-              </a:rPr>
-              <a:t> din </a:t>
-            </a:r>
-            <a:r>
-              <a:rPr lang="en-GB" sz="2400" dirty="0" err="1">
-                <a:latin typeface="Times New Roman" pitchFamily="18" charset="0"/>
-                <a:cs typeface="Times New Roman" pitchFamily="18" charset="0"/>
-              </a:rPr>
-              <a:t>cele</a:t>
-            </a:r>
-            <a:r>
-              <a:rPr lang="en-GB" sz="2400" dirty="0">
-                <a:latin typeface="Times New Roman" pitchFamily="18" charset="0"/>
-                <a:cs typeface="Times New Roman" pitchFamily="18" charset="0"/>
-              </a:rPr>
-              <a:t> </a:t>
-            </a:r>
-            <a:r>
-              <a:rPr lang="en-GB" sz="2400" dirty="0" err="1">
-                <a:latin typeface="Times New Roman" pitchFamily="18" charset="0"/>
-                <a:cs typeface="Times New Roman" pitchFamily="18" charset="0"/>
-              </a:rPr>
-              <a:t>mai</a:t>
-            </a:r>
-            <a:r>
-              <a:rPr lang="en-GB" sz="2400" dirty="0">
-                <a:latin typeface="Times New Roman" pitchFamily="18" charset="0"/>
-                <a:cs typeface="Times New Roman" pitchFamily="18" charset="0"/>
-              </a:rPr>
-              <a:t> diverse </a:t>
-            </a:r>
-            <a:r>
-              <a:rPr lang="en-GB" sz="2400" dirty="0" err="1">
-                <a:latin typeface="Times New Roman" pitchFamily="18" charset="0"/>
-                <a:cs typeface="Times New Roman" pitchFamily="18" charset="0"/>
-              </a:rPr>
-              <a:t>si</a:t>
-            </a:r>
-            <a:r>
-              <a:rPr lang="en-GB" sz="2400" dirty="0">
-                <a:latin typeface="Times New Roman" pitchFamily="18" charset="0"/>
-                <a:cs typeface="Times New Roman" pitchFamily="18" charset="0"/>
-              </a:rPr>
-              <a:t> </a:t>
-            </a:r>
-            <a:r>
-              <a:rPr lang="en-GB" sz="2400" dirty="0" err="1">
-                <a:latin typeface="Times New Roman" pitchFamily="18" charset="0"/>
-                <a:cs typeface="Times New Roman" pitchFamily="18" charset="0"/>
-              </a:rPr>
-              <a:t>mai</a:t>
-            </a:r>
-            <a:r>
-              <a:rPr lang="en-GB" sz="2400" dirty="0">
-                <a:latin typeface="Times New Roman" pitchFamily="18" charset="0"/>
-                <a:cs typeface="Times New Roman" pitchFamily="18" charset="0"/>
-              </a:rPr>
-              <a:t> </a:t>
-            </a:r>
-            <a:r>
-              <a:rPr lang="en-GB" sz="2400" dirty="0" err="1">
-                <a:latin typeface="Times New Roman" pitchFamily="18" charset="0"/>
-                <a:cs typeface="Times New Roman" pitchFamily="18" charset="0"/>
-              </a:rPr>
-              <a:t>complexe</a:t>
-            </a:r>
-            <a:r>
-              <a:rPr lang="en-GB" sz="2400" dirty="0">
-                <a:latin typeface="Times New Roman" pitchFamily="18" charset="0"/>
-                <a:cs typeface="Times New Roman" pitchFamily="18" charset="0"/>
-              </a:rPr>
-              <a:t>. </a:t>
-            </a:r>
-            <a:r>
-              <a:rPr lang="en-GB" sz="2400" dirty="0" err="1">
-                <a:latin typeface="Times New Roman" pitchFamily="18" charset="0"/>
-                <a:cs typeface="Times New Roman" pitchFamily="18" charset="0"/>
-              </a:rPr>
-              <a:t>Pentru</a:t>
-            </a:r>
-            <a:r>
-              <a:rPr lang="en-GB" sz="2400" dirty="0">
-                <a:latin typeface="Times New Roman" pitchFamily="18" charset="0"/>
-                <a:cs typeface="Times New Roman" pitchFamily="18" charset="0"/>
-              </a:rPr>
-              <a:t> </a:t>
-            </a:r>
-            <a:r>
-              <a:rPr lang="en-GB" sz="2400" dirty="0" err="1">
-                <a:latin typeface="Times New Roman" pitchFamily="18" charset="0"/>
-                <a:cs typeface="Times New Roman" pitchFamily="18" charset="0"/>
-              </a:rPr>
-              <a:t>aceasta</a:t>
-            </a:r>
-            <a:r>
-              <a:rPr lang="en-GB" sz="2400" dirty="0">
-                <a:latin typeface="Times New Roman" pitchFamily="18" charset="0"/>
-                <a:cs typeface="Times New Roman" pitchFamily="18" charset="0"/>
-              </a:rPr>
-              <a:t>, </a:t>
-            </a:r>
-            <a:r>
-              <a:rPr lang="en-GB" sz="2400" dirty="0" err="1">
-                <a:latin typeface="Times New Roman" pitchFamily="18" charset="0"/>
-                <a:cs typeface="Times New Roman" pitchFamily="18" charset="0"/>
-              </a:rPr>
-              <a:t>structurile</a:t>
-            </a:r>
-            <a:r>
-              <a:rPr lang="en-GB" sz="2400" dirty="0">
-                <a:latin typeface="Times New Roman" pitchFamily="18" charset="0"/>
-                <a:cs typeface="Times New Roman" pitchFamily="18" charset="0"/>
-              </a:rPr>
-              <a:t> </a:t>
-            </a:r>
-            <a:r>
-              <a:rPr lang="en-GB" sz="2400" dirty="0" err="1">
-                <a:latin typeface="Times New Roman" pitchFamily="18" charset="0"/>
-                <a:cs typeface="Times New Roman" pitchFamily="18" charset="0"/>
-              </a:rPr>
-              <a:t>clasice</a:t>
-            </a:r>
-            <a:r>
-              <a:rPr lang="en-GB" sz="2400" dirty="0">
-                <a:latin typeface="Times New Roman" pitchFamily="18" charset="0"/>
-                <a:cs typeface="Times New Roman" pitchFamily="18" charset="0"/>
-              </a:rPr>
-              <a:t> de date </a:t>
-            </a:r>
-            <a:r>
-              <a:rPr lang="en-GB" sz="2400" dirty="0" err="1">
-                <a:latin typeface="Times New Roman" pitchFamily="18" charset="0"/>
-                <a:cs typeface="Times New Roman" pitchFamily="18" charset="0"/>
-              </a:rPr>
-              <a:t>bazate</a:t>
-            </a:r>
-            <a:r>
-              <a:rPr lang="en-GB" sz="2400" dirty="0">
-                <a:latin typeface="Times New Roman" pitchFamily="18" charset="0"/>
-                <a:cs typeface="Times New Roman" pitchFamily="18" charset="0"/>
-              </a:rPr>
-              <a:t> </a:t>
-            </a:r>
-            <a:r>
-              <a:rPr lang="en-GB" sz="2400" dirty="0" err="1">
-                <a:latin typeface="Times New Roman" pitchFamily="18" charset="0"/>
-                <a:cs typeface="Times New Roman" pitchFamily="18" charset="0"/>
-              </a:rPr>
-              <a:t>pe</a:t>
-            </a:r>
-            <a:r>
-              <a:rPr lang="en-GB" sz="2400" dirty="0">
-                <a:latin typeface="Times New Roman" pitchFamily="18" charset="0"/>
-                <a:cs typeface="Times New Roman" pitchFamily="18" charset="0"/>
-              </a:rPr>
-              <a:t> text </a:t>
-            </a:r>
-            <a:r>
-              <a:rPr lang="en-GB" sz="2400" dirty="0" err="1">
-                <a:latin typeface="Times New Roman" pitchFamily="18" charset="0"/>
-                <a:cs typeface="Times New Roman" pitchFamily="18" charset="0"/>
-              </a:rPr>
-              <a:t>si</a:t>
-            </a:r>
-            <a:r>
-              <a:rPr lang="en-GB" sz="2400" dirty="0">
-                <a:latin typeface="Times New Roman" pitchFamily="18" charset="0"/>
-                <a:cs typeface="Times New Roman" pitchFamily="18" charset="0"/>
-              </a:rPr>
-              <a:t> </a:t>
-            </a:r>
-            <a:r>
-              <a:rPr lang="en-GB" sz="2400" dirty="0" err="1">
-                <a:latin typeface="Times New Roman" pitchFamily="18" charset="0"/>
-                <a:cs typeface="Times New Roman" pitchFamily="18" charset="0"/>
-              </a:rPr>
-              <a:t>valori</a:t>
-            </a:r>
-            <a:r>
-              <a:rPr lang="en-GB" sz="2400" dirty="0">
-                <a:latin typeface="Times New Roman" pitchFamily="18" charset="0"/>
-                <a:cs typeface="Times New Roman" pitchFamily="18" charset="0"/>
-              </a:rPr>
-              <a:t> </a:t>
-            </a:r>
-            <a:r>
-              <a:rPr lang="en-GB" sz="2400" dirty="0" err="1">
-                <a:latin typeface="Times New Roman" pitchFamily="18" charset="0"/>
-                <a:cs typeface="Times New Roman" pitchFamily="18" charset="0"/>
-              </a:rPr>
-              <a:t>numerice</a:t>
-            </a:r>
-            <a:r>
-              <a:rPr lang="en-GB" sz="2400" dirty="0">
-                <a:latin typeface="Times New Roman" pitchFamily="18" charset="0"/>
-                <a:cs typeface="Times New Roman" pitchFamily="18" charset="0"/>
-              </a:rPr>
-              <a:t> fie se </a:t>
-            </a:r>
-            <a:r>
-              <a:rPr lang="en-GB" sz="2400" dirty="0" err="1">
-                <a:latin typeface="Times New Roman" pitchFamily="18" charset="0"/>
-                <a:cs typeface="Times New Roman" pitchFamily="18" charset="0"/>
-              </a:rPr>
-              <a:t>dovedesc</a:t>
-            </a:r>
-            <a:r>
-              <a:rPr lang="en-GB" sz="2400" dirty="0">
-                <a:latin typeface="Times New Roman" pitchFamily="18" charset="0"/>
-                <a:cs typeface="Times New Roman" pitchFamily="18" charset="0"/>
-              </a:rPr>
-              <a:t> </a:t>
-            </a:r>
-            <a:r>
-              <a:rPr lang="en-GB" sz="2400" dirty="0" err="1">
-                <a:latin typeface="Times New Roman" pitchFamily="18" charset="0"/>
-                <a:cs typeface="Times New Roman" pitchFamily="18" charset="0"/>
-              </a:rPr>
-              <a:t>insuficiente</a:t>
-            </a:r>
-            <a:r>
-              <a:rPr lang="en-GB" sz="2400" dirty="0">
-                <a:latin typeface="Times New Roman" pitchFamily="18" charset="0"/>
-                <a:cs typeface="Times New Roman" pitchFamily="18" charset="0"/>
-              </a:rPr>
-              <a:t>, fie </a:t>
-            </a:r>
-            <a:r>
-              <a:rPr lang="en-GB" sz="2400" dirty="0" err="1">
-                <a:latin typeface="Times New Roman" pitchFamily="18" charset="0"/>
-                <a:cs typeface="Times New Roman" pitchFamily="18" charset="0"/>
-              </a:rPr>
-              <a:t>complexitatea</a:t>
-            </a:r>
-            <a:r>
-              <a:rPr lang="en-GB" sz="2400" dirty="0">
-                <a:latin typeface="Times New Roman" pitchFamily="18" charset="0"/>
-                <a:cs typeface="Times New Roman" pitchFamily="18" charset="0"/>
-              </a:rPr>
-              <a:t> </a:t>
-            </a:r>
-            <a:r>
-              <a:rPr lang="en-GB" sz="2400" dirty="0" err="1">
-                <a:latin typeface="Times New Roman" pitchFamily="18" charset="0"/>
-                <a:cs typeface="Times New Roman" pitchFamily="18" charset="0"/>
-              </a:rPr>
-              <a:t>lor</a:t>
-            </a:r>
-            <a:r>
-              <a:rPr lang="en-GB" sz="2400" dirty="0">
-                <a:latin typeface="Times New Roman" pitchFamily="18" charset="0"/>
-                <a:cs typeface="Times New Roman" pitchFamily="18" charset="0"/>
-              </a:rPr>
-              <a:t> </a:t>
-            </a:r>
-            <a:r>
-              <a:rPr lang="en-GB" sz="2400" dirty="0" err="1">
-                <a:latin typeface="Times New Roman" pitchFamily="18" charset="0"/>
-                <a:cs typeface="Times New Roman" pitchFamily="18" charset="0"/>
-              </a:rPr>
-              <a:t>depaseste</a:t>
-            </a:r>
-            <a:r>
-              <a:rPr lang="en-GB" sz="2400" dirty="0">
-                <a:latin typeface="Times New Roman" pitchFamily="18" charset="0"/>
-                <a:cs typeface="Times New Roman" pitchFamily="18" charset="0"/>
-              </a:rPr>
-              <a:t> </a:t>
-            </a:r>
-            <a:r>
-              <a:rPr lang="en-GB" sz="2400" dirty="0" err="1">
-                <a:latin typeface="Times New Roman" pitchFamily="18" charset="0"/>
-                <a:cs typeface="Times New Roman" pitchFamily="18" charset="0"/>
-              </a:rPr>
-              <a:t>posibilitatile</a:t>
-            </a:r>
-            <a:r>
-              <a:rPr lang="en-GB" sz="2400" dirty="0">
-                <a:latin typeface="Times New Roman" pitchFamily="18" charset="0"/>
-                <a:cs typeface="Times New Roman" pitchFamily="18" charset="0"/>
-              </a:rPr>
-              <a:t> de </a:t>
-            </a:r>
-            <a:r>
-              <a:rPr lang="en-GB" sz="2400" dirty="0" err="1">
-                <a:latin typeface="Times New Roman" pitchFamily="18" charset="0"/>
-                <a:cs typeface="Times New Roman" pitchFamily="18" charset="0"/>
-              </a:rPr>
-              <a:t>prelucrare</a:t>
-            </a:r>
-            <a:r>
-              <a:rPr lang="en-GB" sz="2400" dirty="0">
-                <a:latin typeface="Times New Roman" pitchFamily="18" charset="0"/>
-                <a:cs typeface="Times New Roman" pitchFamily="18" charset="0"/>
-              </a:rPr>
-              <a:t> </a:t>
-            </a:r>
-            <a:r>
-              <a:rPr lang="en-GB" sz="2400" dirty="0" err="1">
-                <a:latin typeface="Times New Roman" pitchFamily="18" charset="0"/>
-                <a:cs typeface="Times New Roman" pitchFamily="18" charset="0"/>
-              </a:rPr>
-              <a:t>oferite</a:t>
-            </a:r>
-            <a:r>
-              <a:rPr lang="en-GB" sz="2400" dirty="0">
-                <a:latin typeface="Times New Roman" pitchFamily="18" charset="0"/>
-                <a:cs typeface="Times New Roman" pitchFamily="18" charset="0"/>
-              </a:rPr>
-              <a:t> de </a:t>
-            </a:r>
-            <a:r>
-              <a:rPr lang="en-GB" sz="2400" dirty="0" err="1">
-                <a:latin typeface="Times New Roman" pitchFamily="18" charset="0"/>
-                <a:cs typeface="Times New Roman" pitchFamily="18" charset="0"/>
-              </a:rPr>
-              <a:t>tehnologiile</a:t>
-            </a:r>
-            <a:r>
-              <a:rPr lang="en-GB" sz="2400" dirty="0">
-                <a:latin typeface="Times New Roman" pitchFamily="18" charset="0"/>
-                <a:cs typeface="Times New Roman" pitchFamily="18" charset="0"/>
-              </a:rPr>
-              <a:t> </a:t>
-            </a:r>
-            <a:r>
-              <a:rPr lang="en-GB" sz="2400" dirty="0" err="1">
-                <a:latin typeface="Times New Roman" pitchFamily="18" charset="0"/>
-                <a:cs typeface="Times New Roman" pitchFamily="18" charset="0"/>
-              </a:rPr>
-              <a:t>clasice</a:t>
-            </a:r>
-            <a:r>
-              <a:rPr lang="en-GB" sz="2400" dirty="0">
-                <a:latin typeface="Times New Roman" pitchFamily="18" charset="0"/>
-                <a:cs typeface="Times New Roman" pitchFamily="18" charset="0"/>
-              </a:rPr>
-              <a:t>.</a:t>
-            </a:r>
-            <a:endParaRPr lang="ro-RO" sz="2400" dirty="0">
-              <a:latin typeface="Times New Roman" pitchFamily="18" charset="0"/>
-              <a:cs typeface="Times New Roman" pitchFamily="18" charset="0"/>
+            <a:endParaRPr lang="en-GB" dirty="0">
+              <a:latin typeface="Times New Roman" panose="02020603050405020304" pitchFamily="18" charset="0"/>
+              <a:cs typeface="Times New Roman" panose="02020603050405020304" pitchFamily="18" charset="0"/>
             </a:endParaRPr>
           </a:p>
-          <a:p>
-            <a:pPr marL="342900" indent="-342900" algn="just">
-              <a:buFont typeface="Wingdings" panose="05000000000000000000" pitchFamily="2" charset="2"/>
-              <a:buChar char="§"/>
-            </a:pPr>
-            <a:r>
-              <a:rPr lang="ro-RO" sz="2400" dirty="0">
-                <a:latin typeface="Times New Roman" pitchFamily="18" charset="0"/>
-                <a:cs typeface="Times New Roman" pitchFamily="18" charset="0"/>
-              </a:rPr>
-              <a:t>Astfel, </a:t>
-            </a:r>
-            <a:r>
-              <a:rPr lang="ro-RO" sz="2400" b="1" dirty="0">
-                <a:latin typeface="Times New Roman" pitchFamily="18" charset="0"/>
-                <a:cs typeface="Times New Roman" pitchFamily="18" charset="0"/>
-              </a:rPr>
-              <a:t>l</a:t>
-            </a:r>
-            <a:r>
-              <a:rPr lang="vi-VN" sz="2400" b="1" dirty="0">
-                <a:latin typeface="Times New Roman" pitchFamily="18" charset="0"/>
-                <a:cs typeface="Times New Roman" pitchFamily="18" charset="0"/>
-              </a:rPr>
-              <a:t>imitele sistemelor relaţionale</a:t>
-            </a:r>
-            <a:r>
-              <a:rPr lang="vi-VN" sz="2400" dirty="0">
-                <a:latin typeface="Times New Roman" pitchFamily="18" charset="0"/>
-                <a:cs typeface="Times New Roman" pitchFamily="18" charset="0"/>
-              </a:rPr>
-              <a:t>, în special cele</a:t>
-            </a:r>
-            <a:r>
-              <a:rPr lang="ro-RO" sz="2400" dirty="0">
-                <a:latin typeface="Times New Roman" pitchFamily="18" charset="0"/>
-                <a:cs typeface="Times New Roman" pitchFamily="18" charset="0"/>
-              </a:rPr>
-              <a:t> </a:t>
-            </a:r>
-            <a:r>
-              <a:rPr lang="vi-VN" sz="2400" dirty="0">
-                <a:latin typeface="Times New Roman" pitchFamily="18" charset="0"/>
-                <a:cs typeface="Times New Roman" pitchFamily="18" charset="0"/>
-              </a:rPr>
-              <a:t>referitoare la volume mari de date şi complexitatea ridicată a datelor, au determinat evoluţia spre sistemele orientate obiect. </a:t>
-            </a:r>
-            <a:endParaRPr lang="ro-RO" sz="2400" dirty="0">
-              <a:latin typeface="Times New Roman" pitchFamily="18" charset="0"/>
-              <a:cs typeface="Times New Roman" pitchFamily="18" charset="0"/>
-            </a:endParaRPr>
-          </a:p>
-          <a:p>
-            <a:r>
-              <a:rPr lang="ro-RO" sz="2400" dirty="0">
-                <a:latin typeface="Times New Roman" pitchFamily="18" charset="0"/>
-                <a:cs typeface="Times New Roman" pitchFamily="18" charset="0"/>
-              </a:rPr>
-              <a:t>	</a:t>
-            </a:r>
-          </a:p>
-        </p:txBody>
-      </p:sp>
-      <p:sp>
-        <p:nvSpPr>
-          <p:cNvPr id="6" name="Rectangle 5"/>
+        </p:txBody>
+      </p:sp>
+      <p:sp>
+        <p:nvSpPr>
+          <p:cNvPr id="5" name="Rectangle 4"/>
           <p:cNvSpPr/>
           <p:nvPr/>
         </p:nvSpPr>
@@ -15266,6 +14693,2353 @@
                 <a:latin typeface="Times New Roman" panose="02020603050405020304" pitchFamily="18" charset="0"/>
                 <a:cs typeface="Times New Roman" panose="02020603050405020304" pitchFamily="18" charset="0"/>
               </a:rPr>
+              <a:t>	</a:t>
+            </a:r>
+            <a:r>
+              <a:rPr lang="ro-RO" sz="2400" dirty="0">
+                <a:latin typeface="Times New Roman" panose="02020603050405020304" pitchFamily="18" charset="0"/>
+                <a:cs typeface="Times New Roman" panose="02020603050405020304" pitchFamily="18" charset="0"/>
+              </a:rPr>
+              <a:t>R</a:t>
+            </a:r>
+            <a:r>
+              <a:rPr lang="ro-RO" sz="2400" dirty="0"/>
+              <a:t>estricții legare de modificarea</a:t>
+            </a:r>
+            <a:r>
+              <a:rPr lang="ro-RO" sz="2400" dirty="0">
+                <a:latin typeface="Times New Roman" panose="02020603050405020304" pitchFamily="18" charset="0"/>
+                <a:cs typeface="Times New Roman" panose="02020603050405020304" pitchFamily="18" charset="0"/>
+              </a:rPr>
+              <a:t> unei scheme BDOO</a:t>
+            </a:r>
+            <a:r>
+              <a:rPr lang="ro-RO" sz="2400" dirty="0">
+                <a:latin typeface="Times New Roman" panose="02020603050405020304" pitchFamily="18" charset="0"/>
+                <a:cs typeface="Times New Roman" panose="02020603050405020304" pitchFamily="18" charset="0"/>
+              </a:rPr>
+              <a:t>	</a:t>
+            </a:r>
+          </a:p>
+        </p:txBody>
+      </p:sp>
+    </p:spTree>
+    <p:extLst>
+      <p:ext uri="{BB962C8B-B14F-4D97-AF65-F5344CB8AC3E}">
+        <p14:creationId xmlns:p14="http://schemas.microsoft.com/office/powerpoint/2010/main" val="1148020578"/>
+      </p:ext>
+    </p:extLst>
+  </p:cSld>
+  <p:clrMapOvr>
+    <a:masterClrMapping/>
+  </p:clrMapOvr>
+</p:sld>
+</file>
+
+<file path=ppt/slides/slide33.xml><?xml version="1.0" encoding="utf-8"?>
+<p:sld xmlns:a="http://schemas.openxmlformats.org/drawingml/2006/main" xmlns:r="http://schemas.openxmlformats.org/officeDocument/2006/relationships" xmlns:p="http://schemas.openxmlformats.org/presentationml/2006/main">
+  <p:cSld>
+    <p:spTree>
+      <p:nvGrpSpPr>
+        <p:cNvPr id="1" name=""/>
+        <p:cNvGrpSpPr/>
+        <p:nvPr/>
+      </p:nvGrpSpPr>
+      <p:grpSpPr>
+        <a:xfrm>
+          <a:off x="0" y="0"/>
+          <a:ext cx="0" cy="0"/>
+          <a:chOff x="0" y="0"/>
+          <a:chExt cx="0" cy="0"/>
+        </a:xfrm>
+      </p:grpSpPr>
+      <p:sp>
+        <p:nvSpPr>
+          <p:cNvPr id="2" name="Title 1"/>
+          <p:cNvSpPr>
+            <a:spLocks noGrp="1"/>
+          </p:cNvSpPr>
+          <p:nvPr>
+            <p:ph type="title"/>
+          </p:nvPr>
+        </p:nvSpPr>
+        <p:spPr/>
+        <p:txBody>
+          <a:bodyPr>
+            <a:normAutofit fontScale="90000"/>
+          </a:bodyPr>
+          <a:lstStyle/>
+          <a:p>
+            <a:br>
+              <a:rPr lang="en-GB" dirty="0"/>
+            </a:br>
+            <a:endParaRPr lang="en-GB" dirty="0"/>
+          </a:p>
+        </p:txBody>
+      </p:sp>
+      <p:sp>
+        <p:nvSpPr>
+          <p:cNvPr id="3" name="Content Placeholder 2"/>
+          <p:cNvSpPr>
+            <a:spLocks noGrp="1"/>
+          </p:cNvSpPr>
+          <p:nvPr>
+            <p:ph idx="1"/>
+          </p:nvPr>
+        </p:nvSpPr>
+        <p:spPr/>
+        <p:txBody>
+          <a:bodyPr>
+            <a:normAutofit fontScale="62500" lnSpcReduction="20000"/>
+          </a:bodyPr>
+          <a:lstStyle/>
+          <a:p>
+            <a:r>
+              <a:rPr lang="ro-RO" b="1" dirty="0"/>
+              <a:t>Dependența de limbaj</a:t>
+            </a:r>
+            <a:endParaRPr lang="ro-RO" dirty="0"/>
+          </a:p>
+          <a:p>
+            <a:r>
+              <a:rPr lang="ro-RO" dirty="0"/>
+              <a:t>-</a:t>
+            </a:r>
+          </a:p>
+          <a:p>
+            <a:r>
+              <a:rPr lang="ro-RO" dirty="0"/>
+              <a:t>un SGBDOO este strâns legat de limbajul care accesează datele prin</a:t>
+            </a:r>
+          </a:p>
+          <a:p>
+            <a:r>
+              <a:rPr lang="ro-RO" dirty="0"/>
+              <a:t>intermediul API-ului (Application Programming Interface)-datele dintr-un SGBDOO sunt accesibile printr-un</a:t>
+            </a:r>
+          </a:p>
+          <a:p>
+            <a:r>
+              <a:rPr lang="ro-RO" dirty="0"/>
+              <a:t>anumit</a:t>
+            </a:r>
+          </a:p>
+          <a:p>
+            <a:r>
+              <a:rPr lang="ro-RO" dirty="0"/>
+              <a:t>limbaj, utilizând un</a:t>
+            </a:r>
+          </a:p>
+          <a:p>
+            <a:r>
+              <a:rPr lang="ro-RO" dirty="0"/>
+              <a:t>anume</a:t>
+            </a:r>
+          </a:p>
+          <a:p>
+            <a:r>
+              <a:rPr lang="ro-RO" dirty="0"/>
+              <a:t>API-</a:t>
+            </a:r>
+          </a:p>
+          <a:p>
+            <a:r>
+              <a:rPr lang="ro-RO" dirty="0"/>
+              <a:t>totuși, interfațarea inter </a:t>
+            </a:r>
+          </a:p>
+          <a:p>
+            <a:r>
+              <a:rPr lang="ro-RO" dirty="0"/>
+              <a:t>-limbaj se poate face utilizând instrumente secundare(translatoare, adaptoare,</a:t>
+            </a:r>
+          </a:p>
+          <a:p>
+            <a:r>
+              <a:rPr lang="ro-RO" dirty="0"/>
+              <a:t>marshalling,</a:t>
+            </a:r>
+          </a:p>
+          <a:p>
+            <a:r>
+              <a:rPr lang="ro-RO" dirty="0"/>
+              <a:t>etc.)</a:t>
+            </a:r>
+          </a:p>
+          <a:p>
+            <a:pPr algn="just">
+              <a:buFont typeface="Wingdings" panose="05000000000000000000" pitchFamily="2" charset="2"/>
+              <a:buChar char="§"/>
+            </a:pPr>
+            <a:endParaRPr lang="en-GB" dirty="0">
+              <a:latin typeface="Times New Roman" panose="02020603050405020304" pitchFamily="18" charset="0"/>
+              <a:cs typeface="Times New Roman" panose="02020603050405020304" pitchFamily="18" charset="0"/>
+            </a:endParaRPr>
+          </a:p>
+        </p:txBody>
+      </p:sp>
+      <p:sp>
+        <p:nvSpPr>
+          <p:cNvPr id="5" name="Rectangle 4"/>
+          <p:cNvSpPr/>
+          <p:nvPr/>
+        </p:nvSpPr>
+        <p:spPr>
+          <a:xfrm>
+            <a:off x="-15239" y="534145"/>
+            <a:ext cx="9159239" cy="739300"/>
+          </a:xfrm>
+          <a:prstGeom prst="rect">
+            <a:avLst/>
+          </a:prstGeom>
+          <a:solidFill>
+            <a:schemeClr val="bg1">
+              <a:lumMod val="50000"/>
+            </a:schemeClr>
+          </a:solidFill>
+          <a:ln>
+            <a:noFill/>
+          </a:ln>
+        </p:spPr>
+        <p:style>
+          <a:lnRef idx="2">
+            <a:schemeClr val="accent1">
+              <a:shade val="50000"/>
+            </a:schemeClr>
+          </a:lnRef>
+          <a:fillRef idx="1">
+            <a:schemeClr val="accent1"/>
+          </a:fillRef>
+          <a:effectRef idx="0">
+            <a:schemeClr val="accent1"/>
+          </a:effectRef>
+          <a:fontRef idx="minor">
+            <a:schemeClr val="lt1"/>
+          </a:fontRef>
+        </p:style>
+        <p:txBody>
+          <a:bodyPr rtlCol="0" anchor="ctr"/>
+          <a:lstStyle/>
+          <a:p>
+            <a:r>
+              <a:rPr lang="ro-RO" sz="2400" dirty="0">
+                <a:latin typeface="Times New Roman" panose="02020603050405020304" pitchFamily="18" charset="0"/>
+                <a:cs typeface="Times New Roman" panose="02020603050405020304" pitchFamily="18" charset="0"/>
+              </a:rPr>
+              <a:t>	</a:t>
+            </a:r>
+            <a:r>
+              <a:rPr lang="ro-RO" sz="2400" dirty="0">
+                <a:latin typeface="Times New Roman" panose="02020603050405020304" pitchFamily="18" charset="0"/>
+                <a:cs typeface="Times New Roman" panose="02020603050405020304" pitchFamily="18" charset="0"/>
+              </a:rPr>
+              <a:t>R</a:t>
+            </a:r>
+            <a:r>
+              <a:rPr lang="ro-RO" sz="2400" dirty="0"/>
+              <a:t>estricții legare de modificarea</a:t>
+            </a:r>
+            <a:r>
+              <a:rPr lang="ro-RO" sz="2400" dirty="0">
+                <a:latin typeface="Times New Roman" panose="02020603050405020304" pitchFamily="18" charset="0"/>
+                <a:cs typeface="Times New Roman" panose="02020603050405020304" pitchFamily="18" charset="0"/>
+              </a:rPr>
+              <a:t> unei scheme BDOO</a:t>
+            </a:r>
+            <a:r>
+              <a:rPr lang="ro-RO" sz="2400" dirty="0">
+                <a:latin typeface="Times New Roman" panose="02020603050405020304" pitchFamily="18" charset="0"/>
+                <a:cs typeface="Times New Roman" panose="02020603050405020304" pitchFamily="18" charset="0"/>
+              </a:rPr>
+              <a:t>	</a:t>
+            </a:r>
+          </a:p>
+        </p:txBody>
+      </p:sp>
+    </p:spTree>
+    <p:extLst>
+      <p:ext uri="{BB962C8B-B14F-4D97-AF65-F5344CB8AC3E}">
+        <p14:creationId xmlns:p14="http://schemas.microsoft.com/office/powerpoint/2010/main" val="4128041470"/>
+      </p:ext>
+    </p:extLst>
+  </p:cSld>
+  <p:clrMapOvr>
+    <a:masterClrMapping/>
+  </p:clrMapOvr>
+</p:sld>
+</file>
+
+<file path=ppt/slides/slide34.xml><?xml version="1.0" encoding="utf-8"?>
+<p:sld xmlns:a="http://schemas.openxmlformats.org/drawingml/2006/main" xmlns:r="http://schemas.openxmlformats.org/officeDocument/2006/relationships" xmlns:p="http://schemas.openxmlformats.org/presentationml/2006/main">
+  <p:cSld>
+    <p:spTree>
+      <p:nvGrpSpPr>
+        <p:cNvPr id="1" name=""/>
+        <p:cNvGrpSpPr/>
+        <p:nvPr/>
+      </p:nvGrpSpPr>
+      <p:grpSpPr>
+        <a:xfrm>
+          <a:off x="0" y="0"/>
+          <a:ext cx="0" cy="0"/>
+          <a:chOff x="0" y="0"/>
+          <a:chExt cx="0" cy="0"/>
+        </a:xfrm>
+      </p:grpSpPr>
+      <p:sp>
+        <p:nvSpPr>
+          <p:cNvPr id="2" name="Title 1"/>
+          <p:cNvSpPr>
+            <a:spLocks noGrp="1"/>
+          </p:cNvSpPr>
+          <p:nvPr>
+            <p:ph type="title"/>
+          </p:nvPr>
+        </p:nvSpPr>
+        <p:spPr/>
+        <p:txBody>
+          <a:bodyPr>
+            <a:normAutofit fontScale="90000"/>
+          </a:bodyPr>
+          <a:lstStyle/>
+          <a:p>
+            <a:br>
+              <a:rPr lang="en-GB" dirty="0"/>
+            </a:br>
+            <a:endParaRPr lang="en-GB" dirty="0"/>
+          </a:p>
+        </p:txBody>
+      </p:sp>
+      <p:sp>
+        <p:nvSpPr>
+          <p:cNvPr id="3" name="Content Placeholder 2"/>
+          <p:cNvSpPr>
+            <a:spLocks noGrp="1"/>
+          </p:cNvSpPr>
+          <p:nvPr>
+            <p:ph idx="1"/>
+          </p:nvPr>
+        </p:nvSpPr>
+        <p:spPr/>
+        <p:txBody>
+          <a:bodyPr>
+            <a:normAutofit fontScale="70000" lnSpcReduction="20000"/>
+          </a:bodyPr>
+          <a:lstStyle/>
+          <a:p>
+            <a:r>
+              <a:rPr lang="ro-RO" dirty="0"/>
+              <a:t>Extensibilitatea facil</a:t>
+            </a:r>
+          </a:p>
+          <a:p>
+            <a:r>
+              <a:rPr lang="ro-RO" b="1" dirty="0"/>
+              <a:t>ă</a:t>
+            </a:r>
+            <a:endParaRPr lang="ro-RO" dirty="0"/>
+          </a:p>
+          <a:p>
+            <a:r>
+              <a:rPr lang="ro-RO" dirty="0"/>
+              <a:t>-</a:t>
+            </a:r>
+          </a:p>
+          <a:p>
+            <a:r>
+              <a:rPr lang="ro-RO" dirty="0"/>
+              <a:t>SGBDOO permit crearea de noi tipuri de date pornind de la cele dejaexistente-</a:t>
+            </a:r>
+          </a:p>
+          <a:p>
+            <a:r>
+              <a:rPr lang="ro-RO" dirty="0"/>
+              <a:t>tipurile de dată nou create au adesea caracteristici comune, care pot fi</a:t>
+            </a:r>
+          </a:p>
+          <a:p>
+            <a:r>
+              <a:rPr lang="ro-RO" dirty="0"/>
+              <a:t>definite într-</a:t>
+            </a:r>
+          </a:p>
+          <a:p>
+            <a:r>
+              <a:rPr lang="ro-RO" dirty="0"/>
+              <a:t>o clasă de bază</a:t>
+            </a:r>
+          </a:p>
+          <a:p>
+            <a:r>
+              <a:rPr lang="ro-RO" dirty="0"/>
+              <a:t>-</a:t>
+            </a:r>
+          </a:p>
+          <a:p>
+            <a:r>
+              <a:rPr lang="ro-RO" dirty="0"/>
+              <a:t>reducerea redundanței la nivel de cod și operații în sistemul dezvoltat</a:t>
+            </a:r>
+          </a:p>
+          <a:p>
+            <a:r>
+              <a:rPr lang="ro-RO" dirty="0"/>
+              <a:t>-</a:t>
+            </a:r>
+          </a:p>
+          <a:p>
+            <a:r>
+              <a:rPr lang="ro-RO" dirty="0"/>
+              <a:t>reducerea efortului necesar mentenanței și actualizării sistemului</a:t>
+            </a:r>
+          </a:p>
+          <a:p>
+            <a:pPr algn="just">
+              <a:buFont typeface="Wingdings" panose="05000000000000000000" pitchFamily="2" charset="2"/>
+              <a:buChar char="§"/>
+            </a:pPr>
+            <a:endParaRPr lang="en-GB" dirty="0">
+              <a:latin typeface="Times New Roman" panose="02020603050405020304" pitchFamily="18" charset="0"/>
+              <a:cs typeface="Times New Roman" panose="02020603050405020304" pitchFamily="18" charset="0"/>
+            </a:endParaRPr>
+          </a:p>
+        </p:txBody>
+      </p:sp>
+      <p:sp>
+        <p:nvSpPr>
+          <p:cNvPr id="5" name="Rectangle 4"/>
+          <p:cNvSpPr/>
+          <p:nvPr/>
+        </p:nvSpPr>
+        <p:spPr>
+          <a:xfrm>
+            <a:off x="-15239" y="534145"/>
+            <a:ext cx="9159239" cy="739300"/>
+          </a:xfrm>
+          <a:prstGeom prst="rect">
+            <a:avLst/>
+          </a:prstGeom>
+          <a:solidFill>
+            <a:schemeClr val="bg1">
+              <a:lumMod val="50000"/>
+            </a:schemeClr>
+          </a:solidFill>
+          <a:ln>
+            <a:noFill/>
+          </a:ln>
+        </p:spPr>
+        <p:style>
+          <a:lnRef idx="2">
+            <a:schemeClr val="accent1">
+              <a:shade val="50000"/>
+            </a:schemeClr>
+          </a:lnRef>
+          <a:fillRef idx="1">
+            <a:schemeClr val="accent1"/>
+          </a:fillRef>
+          <a:effectRef idx="0">
+            <a:schemeClr val="accent1"/>
+          </a:effectRef>
+          <a:fontRef idx="minor">
+            <a:schemeClr val="lt1"/>
+          </a:fontRef>
+        </p:style>
+        <p:txBody>
+          <a:bodyPr rtlCol="0" anchor="ctr"/>
+          <a:lstStyle/>
+          <a:p>
+            <a:r>
+              <a:rPr lang="ro-RO" sz="2400" dirty="0">
+                <a:latin typeface="Times New Roman" panose="02020603050405020304" pitchFamily="18" charset="0"/>
+                <a:cs typeface="Times New Roman" panose="02020603050405020304" pitchFamily="18" charset="0"/>
+              </a:rPr>
+              <a:t>	</a:t>
+            </a:r>
+            <a:r>
+              <a:rPr lang="ro-RO" sz="2400" dirty="0">
+                <a:latin typeface="Times New Roman" panose="02020603050405020304" pitchFamily="18" charset="0"/>
+                <a:cs typeface="Times New Roman" panose="02020603050405020304" pitchFamily="18" charset="0"/>
+              </a:rPr>
+              <a:t>R</a:t>
+            </a:r>
+            <a:r>
+              <a:rPr lang="ro-RO" sz="2400" dirty="0"/>
+              <a:t>estricții legare de modificarea</a:t>
+            </a:r>
+            <a:r>
+              <a:rPr lang="ro-RO" sz="2400" dirty="0">
+                <a:latin typeface="Times New Roman" panose="02020603050405020304" pitchFamily="18" charset="0"/>
+                <a:cs typeface="Times New Roman" panose="02020603050405020304" pitchFamily="18" charset="0"/>
+              </a:rPr>
+              <a:t> unei scheme BDOO</a:t>
+            </a:r>
+            <a:r>
+              <a:rPr lang="ro-RO" sz="2400" dirty="0">
+                <a:latin typeface="Times New Roman" panose="02020603050405020304" pitchFamily="18" charset="0"/>
+                <a:cs typeface="Times New Roman" panose="02020603050405020304" pitchFamily="18" charset="0"/>
+              </a:rPr>
+              <a:t>	</a:t>
+            </a:r>
+          </a:p>
+        </p:txBody>
+      </p:sp>
+    </p:spTree>
+    <p:extLst>
+      <p:ext uri="{BB962C8B-B14F-4D97-AF65-F5344CB8AC3E}">
+        <p14:creationId xmlns:p14="http://schemas.microsoft.com/office/powerpoint/2010/main" val="3432199655"/>
+      </p:ext>
+    </p:extLst>
+  </p:cSld>
+  <p:clrMapOvr>
+    <a:masterClrMapping/>
+  </p:clrMapOvr>
+</p:sld>
+</file>
+
+<file path=ppt/slides/slide35.xml><?xml version="1.0" encoding="utf-8"?>
+<p:sld xmlns:a="http://schemas.openxmlformats.org/drawingml/2006/main" xmlns:r="http://schemas.openxmlformats.org/officeDocument/2006/relationships" xmlns:p="http://schemas.openxmlformats.org/presentationml/2006/main">
+  <p:cSld>
+    <p:spTree>
+      <p:nvGrpSpPr>
+        <p:cNvPr id="1" name=""/>
+        <p:cNvGrpSpPr/>
+        <p:nvPr/>
+      </p:nvGrpSpPr>
+      <p:grpSpPr>
+        <a:xfrm>
+          <a:off x="0" y="0"/>
+          <a:ext cx="0" cy="0"/>
+          <a:chOff x="0" y="0"/>
+          <a:chExt cx="0" cy="0"/>
+        </a:xfrm>
+      </p:grpSpPr>
+      <p:sp>
+        <p:nvSpPr>
+          <p:cNvPr id="2" name="Title 1"/>
+          <p:cNvSpPr>
+            <a:spLocks noGrp="1"/>
+          </p:cNvSpPr>
+          <p:nvPr>
+            <p:ph type="title"/>
+          </p:nvPr>
+        </p:nvSpPr>
+        <p:spPr/>
+        <p:txBody>
+          <a:bodyPr>
+            <a:normAutofit fontScale="90000"/>
+          </a:bodyPr>
+          <a:lstStyle/>
+          <a:p>
+            <a:br>
+              <a:rPr lang="en-GB" dirty="0"/>
+            </a:br>
+            <a:endParaRPr lang="en-GB" dirty="0"/>
+          </a:p>
+        </p:txBody>
+      </p:sp>
+      <p:sp>
+        <p:nvSpPr>
+          <p:cNvPr id="3" name="Content Placeholder 2"/>
+          <p:cNvSpPr>
+            <a:spLocks noGrp="1"/>
+          </p:cNvSpPr>
+          <p:nvPr>
+            <p:ph idx="1"/>
+          </p:nvPr>
+        </p:nvSpPr>
+        <p:spPr/>
+        <p:txBody>
+          <a:bodyPr>
+            <a:normAutofit fontScale="62500" lnSpcReduction="20000"/>
+          </a:bodyPr>
+          <a:lstStyle/>
+          <a:p>
+            <a:pPr marL="0" indent="0">
+              <a:buNone/>
+            </a:pPr>
+            <a:endParaRPr lang="ro-RO" dirty="0"/>
+          </a:p>
+          <a:p>
+            <a:r>
+              <a:rPr lang="ro-RO" dirty="0"/>
+              <a:t>similară</a:t>
+            </a:r>
+          </a:p>
+          <a:p>
+            <a:r>
+              <a:rPr lang="ro-RO" dirty="0"/>
+              <a:t>cu modelul din “</a:t>
+            </a:r>
+          </a:p>
+          <a:p>
+            <a:r>
+              <a:rPr lang="ro-RO" dirty="0"/>
+              <a:t>lumea reală</a:t>
+            </a:r>
+          </a:p>
+          <a:p>
+            <a:r>
+              <a:rPr lang="ro-RO" dirty="0"/>
+              <a:t>”</a:t>
+            </a:r>
+          </a:p>
+          <a:p>
+            <a:r>
+              <a:rPr lang="ro-RO" dirty="0"/>
+              <a:t>, organizată ierarhic</a:t>
+            </a:r>
+          </a:p>
+          <a:p>
+            <a:r>
+              <a:rPr lang="ro-RO" dirty="0"/>
+              <a:t>-</a:t>
+            </a:r>
+          </a:p>
+          <a:p>
+            <a:r>
+              <a:rPr lang="ro-RO" dirty="0"/>
+              <a:t>ușor de reprezentat relații de tip părinte</a:t>
+            </a:r>
+          </a:p>
+          <a:p>
+            <a:r>
+              <a:rPr lang="ro-RO" dirty="0"/>
+              <a:t> –descendent-</a:t>
+            </a:r>
+          </a:p>
+          <a:p>
+            <a:r>
+              <a:rPr lang="ro-RO" dirty="0"/>
+              <a:t>descrierea unei subcategorii (a unei subclase) nu implică copierea /repetarea proprietăților unei categorii cu grad mai înalt de generalitate</a:t>
+            </a:r>
+          </a:p>
+          <a:p>
+            <a:r>
+              <a:rPr lang="ro-RO" dirty="0"/>
+              <a:t>-</a:t>
+            </a:r>
+          </a:p>
+          <a:p>
+            <a:r>
+              <a:rPr lang="ro-RO" dirty="0"/>
+              <a:t>acces rapid și facil la componentele unei ierarhii</a:t>
+            </a:r>
+          </a:p>
+          <a:p>
+            <a:pPr algn="just">
+              <a:buFont typeface="Wingdings" panose="05000000000000000000" pitchFamily="2" charset="2"/>
+              <a:buChar char="§"/>
+            </a:pPr>
+            <a:endParaRPr lang="en-GB" dirty="0">
+              <a:latin typeface="Times New Roman" panose="02020603050405020304" pitchFamily="18" charset="0"/>
+              <a:cs typeface="Times New Roman" panose="02020603050405020304" pitchFamily="18" charset="0"/>
+            </a:endParaRPr>
+          </a:p>
+        </p:txBody>
+      </p:sp>
+      <p:sp>
+        <p:nvSpPr>
+          <p:cNvPr id="5" name="Rectangle 4"/>
+          <p:cNvSpPr/>
+          <p:nvPr/>
+        </p:nvSpPr>
+        <p:spPr>
+          <a:xfrm>
+            <a:off x="-15239" y="534145"/>
+            <a:ext cx="9159239" cy="739300"/>
+          </a:xfrm>
+          <a:prstGeom prst="rect">
+            <a:avLst/>
+          </a:prstGeom>
+          <a:solidFill>
+            <a:schemeClr val="bg1">
+              <a:lumMod val="50000"/>
+            </a:schemeClr>
+          </a:solidFill>
+          <a:ln>
+            <a:noFill/>
+          </a:ln>
+        </p:spPr>
+        <p:style>
+          <a:lnRef idx="2">
+            <a:schemeClr val="accent1">
+              <a:shade val="50000"/>
+            </a:schemeClr>
+          </a:lnRef>
+          <a:fillRef idx="1">
+            <a:schemeClr val="accent1"/>
+          </a:fillRef>
+          <a:effectRef idx="0">
+            <a:schemeClr val="accent1"/>
+          </a:effectRef>
+          <a:fontRef idx="minor">
+            <a:schemeClr val="lt1"/>
+          </a:fontRef>
+        </p:style>
+        <p:txBody>
+          <a:bodyPr rtlCol="0" anchor="ctr"/>
+          <a:lstStyle/>
+          <a:p>
+            <a:r>
+              <a:rPr lang="ro-RO" sz="2400" dirty="0">
+                <a:latin typeface="Times New Roman" panose="02020603050405020304" pitchFamily="18" charset="0"/>
+                <a:cs typeface="Times New Roman" panose="02020603050405020304" pitchFamily="18" charset="0"/>
+              </a:rPr>
+              <a:t>	</a:t>
+            </a:r>
+            <a:r>
+              <a:rPr lang="ro-RO" sz="2400" dirty="0">
+                <a:latin typeface="Times New Roman" panose="02020603050405020304" pitchFamily="18" charset="0"/>
+                <a:cs typeface="Times New Roman" panose="02020603050405020304" pitchFamily="18" charset="0"/>
+              </a:rPr>
+              <a:t>R</a:t>
+            </a:r>
+            <a:r>
+              <a:rPr lang="ro-RO" sz="2400" dirty="0"/>
+              <a:t>estricții legare de modificarea</a:t>
+            </a:r>
+            <a:r>
+              <a:rPr lang="ro-RO" sz="2400" dirty="0">
+                <a:latin typeface="Times New Roman" panose="02020603050405020304" pitchFamily="18" charset="0"/>
+                <a:cs typeface="Times New Roman" panose="02020603050405020304" pitchFamily="18" charset="0"/>
+              </a:rPr>
+              <a:t> unei scheme BDOO</a:t>
+            </a:r>
+            <a:r>
+              <a:rPr lang="ro-RO" sz="2400" dirty="0">
+                <a:latin typeface="Times New Roman" panose="02020603050405020304" pitchFamily="18" charset="0"/>
+                <a:cs typeface="Times New Roman" panose="02020603050405020304" pitchFamily="18" charset="0"/>
+              </a:rPr>
+              <a:t>	</a:t>
+            </a:r>
+          </a:p>
+        </p:txBody>
+      </p:sp>
+    </p:spTree>
+    <p:extLst>
+      <p:ext uri="{BB962C8B-B14F-4D97-AF65-F5344CB8AC3E}">
+        <p14:creationId xmlns:p14="http://schemas.microsoft.com/office/powerpoint/2010/main" val="250499839"/>
+      </p:ext>
+    </p:extLst>
+  </p:cSld>
+  <p:clrMapOvr>
+    <a:masterClrMapping/>
+  </p:clrMapOvr>
+</p:sld>
+</file>
+
+<file path=ppt/slides/slide36.xml><?xml version="1.0" encoding="utf-8"?>
+<p:sld xmlns:a="http://schemas.openxmlformats.org/drawingml/2006/main" xmlns:r="http://schemas.openxmlformats.org/officeDocument/2006/relationships" xmlns:p="http://schemas.openxmlformats.org/presentationml/2006/main">
+  <p:cSld>
+    <p:spTree>
+      <p:nvGrpSpPr>
+        <p:cNvPr id="1" name=""/>
+        <p:cNvGrpSpPr/>
+        <p:nvPr/>
+      </p:nvGrpSpPr>
+      <p:grpSpPr>
+        <a:xfrm>
+          <a:off x="0" y="0"/>
+          <a:ext cx="0" cy="0"/>
+          <a:chOff x="0" y="0"/>
+          <a:chExt cx="0" cy="0"/>
+        </a:xfrm>
+      </p:grpSpPr>
+      <p:sp>
+        <p:nvSpPr>
+          <p:cNvPr id="2" name="Title 1"/>
+          <p:cNvSpPr>
+            <a:spLocks noGrp="1"/>
+          </p:cNvSpPr>
+          <p:nvPr>
+            <p:ph type="title"/>
+          </p:nvPr>
+        </p:nvSpPr>
+        <p:spPr/>
+        <p:txBody>
+          <a:bodyPr>
+            <a:normAutofit fontScale="90000"/>
+          </a:bodyPr>
+          <a:lstStyle/>
+          <a:p>
+            <a:br>
+              <a:rPr lang="en-GB" dirty="0"/>
+            </a:br>
+            <a:endParaRPr lang="en-GB" dirty="0"/>
+          </a:p>
+        </p:txBody>
+      </p:sp>
+      <p:sp>
+        <p:nvSpPr>
+          <p:cNvPr id="3" name="Content Placeholder 2"/>
+          <p:cNvSpPr>
+            <a:spLocks noGrp="1"/>
+          </p:cNvSpPr>
+          <p:nvPr>
+            <p:ph idx="1"/>
+          </p:nvPr>
+        </p:nvSpPr>
+        <p:spPr/>
+        <p:txBody>
+          <a:bodyPr>
+            <a:normAutofit fontScale="77500" lnSpcReduction="20000"/>
+          </a:bodyPr>
+          <a:lstStyle/>
+          <a:p>
+            <a:r>
+              <a:rPr lang="ro-RO" dirty="0"/>
+              <a:t>  Avantaje</a:t>
+            </a:r>
+          </a:p>
+          <a:p>
+            <a:r>
+              <a:rPr lang="ro-RO" b="1" dirty="0"/>
+              <a:t>și limitări ale SGBDOOInterfațarea mai facilă cu sisteme / aplicații care nu sunt strâns legate de</a:t>
+            </a:r>
+            <a:endParaRPr lang="ro-RO" dirty="0"/>
+          </a:p>
+          <a:p>
+            <a:r>
+              <a:rPr lang="ro-RO" dirty="0"/>
+              <a:t>domeniul bazelor de date</a:t>
+            </a:r>
+          </a:p>
+          <a:p>
+            <a:r>
+              <a:rPr lang="ro-RO" dirty="0"/>
+              <a:t>-</a:t>
+            </a:r>
+          </a:p>
+          <a:p>
+            <a:r>
+              <a:rPr lang="ro-RO" dirty="0"/>
+              <a:t>conversia obiectelor către alte structuri / modele de gestiune a datelor e maifacilă decât în cazul tabelelor</a:t>
+            </a:r>
+          </a:p>
+          <a:p>
+            <a:r>
+              <a:rPr lang="ro-RO" dirty="0"/>
+              <a:t>-tabele sunt mai dificil de “mapat” pe alte structuri de date (multe etapeintermediare)-nu este necesar un limbaj de interogare pentru un SGBDOO (obiectele se potaccesa folosind limbaje imperative de uz general –C++, C#, Java etc.)</a:t>
+            </a:r>
+          </a:p>
+          <a:p>
+            <a:pPr algn="just">
+              <a:buFont typeface="Wingdings" panose="05000000000000000000" pitchFamily="2" charset="2"/>
+              <a:buChar char="§"/>
+            </a:pPr>
+            <a:endParaRPr lang="en-GB" dirty="0">
+              <a:latin typeface="Times New Roman" panose="02020603050405020304" pitchFamily="18" charset="0"/>
+              <a:cs typeface="Times New Roman" panose="02020603050405020304" pitchFamily="18" charset="0"/>
+            </a:endParaRPr>
+          </a:p>
+        </p:txBody>
+      </p:sp>
+      <p:sp>
+        <p:nvSpPr>
+          <p:cNvPr id="5" name="Rectangle 4"/>
+          <p:cNvSpPr/>
+          <p:nvPr/>
+        </p:nvSpPr>
+        <p:spPr>
+          <a:xfrm>
+            <a:off x="-15239" y="534145"/>
+            <a:ext cx="9159239" cy="739300"/>
+          </a:xfrm>
+          <a:prstGeom prst="rect">
+            <a:avLst/>
+          </a:prstGeom>
+          <a:solidFill>
+            <a:schemeClr val="bg1">
+              <a:lumMod val="50000"/>
+            </a:schemeClr>
+          </a:solidFill>
+          <a:ln>
+            <a:noFill/>
+          </a:ln>
+        </p:spPr>
+        <p:style>
+          <a:lnRef idx="2">
+            <a:schemeClr val="accent1">
+              <a:shade val="50000"/>
+            </a:schemeClr>
+          </a:lnRef>
+          <a:fillRef idx="1">
+            <a:schemeClr val="accent1"/>
+          </a:fillRef>
+          <a:effectRef idx="0">
+            <a:schemeClr val="accent1"/>
+          </a:effectRef>
+          <a:fontRef idx="minor">
+            <a:schemeClr val="lt1"/>
+          </a:fontRef>
+        </p:style>
+        <p:txBody>
+          <a:bodyPr rtlCol="0" anchor="ctr"/>
+          <a:lstStyle/>
+          <a:p>
+            <a:r>
+              <a:rPr lang="ro-RO" sz="2400" dirty="0">
+                <a:latin typeface="Times New Roman" panose="02020603050405020304" pitchFamily="18" charset="0"/>
+                <a:cs typeface="Times New Roman" panose="02020603050405020304" pitchFamily="18" charset="0"/>
+              </a:rPr>
+              <a:t>	</a:t>
+            </a:r>
+            <a:r>
+              <a:rPr lang="ro-RO" sz="2400" dirty="0">
+                <a:latin typeface="Times New Roman" panose="02020603050405020304" pitchFamily="18" charset="0"/>
+                <a:cs typeface="Times New Roman" panose="02020603050405020304" pitchFamily="18" charset="0"/>
+              </a:rPr>
+              <a:t>R</a:t>
+            </a:r>
+            <a:r>
+              <a:rPr lang="ro-RO" sz="2400" dirty="0"/>
+              <a:t>estricții legare de modificarea</a:t>
+            </a:r>
+            <a:r>
+              <a:rPr lang="ro-RO" sz="2400" dirty="0">
+                <a:latin typeface="Times New Roman" panose="02020603050405020304" pitchFamily="18" charset="0"/>
+                <a:cs typeface="Times New Roman" panose="02020603050405020304" pitchFamily="18" charset="0"/>
+              </a:rPr>
+              <a:t> unei scheme BDOO</a:t>
+            </a:r>
+            <a:r>
+              <a:rPr lang="ro-RO" sz="2400" dirty="0">
+                <a:latin typeface="Times New Roman" panose="02020603050405020304" pitchFamily="18" charset="0"/>
+                <a:cs typeface="Times New Roman" panose="02020603050405020304" pitchFamily="18" charset="0"/>
+              </a:rPr>
+              <a:t>	</a:t>
+            </a:r>
+          </a:p>
+        </p:txBody>
+      </p:sp>
+    </p:spTree>
+    <p:extLst>
+      <p:ext uri="{BB962C8B-B14F-4D97-AF65-F5344CB8AC3E}">
+        <p14:creationId xmlns:p14="http://schemas.microsoft.com/office/powerpoint/2010/main" val="2795080344"/>
+      </p:ext>
+    </p:extLst>
+  </p:cSld>
+  <p:clrMapOvr>
+    <a:masterClrMapping/>
+  </p:clrMapOvr>
+</p:sld>
+</file>
+
+<file path=ppt/slides/slide37.xml><?xml version="1.0" encoding="utf-8"?>
+<p:sld xmlns:a="http://schemas.openxmlformats.org/drawingml/2006/main" xmlns:r="http://schemas.openxmlformats.org/officeDocument/2006/relationships" xmlns:p="http://schemas.openxmlformats.org/presentationml/2006/main">
+  <p:cSld>
+    <p:spTree>
+      <p:nvGrpSpPr>
+        <p:cNvPr id="1" name=""/>
+        <p:cNvGrpSpPr/>
+        <p:nvPr/>
+      </p:nvGrpSpPr>
+      <p:grpSpPr>
+        <a:xfrm>
+          <a:off x="0" y="0"/>
+          <a:ext cx="0" cy="0"/>
+          <a:chOff x="0" y="0"/>
+          <a:chExt cx="0" cy="0"/>
+        </a:xfrm>
+      </p:grpSpPr>
+      <p:sp>
+        <p:nvSpPr>
+          <p:cNvPr id="2" name="Title 1"/>
+          <p:cNvSpPr>
+            <a:spLocks noGrp="1"/>
+          </p:cNvSpPr>
+          <p:nvPr>
+            <p:ph type="title"/>
+          </p:nvPr>
+        </p:nvSpPr>
+        <p:spPr/>
+        <p:txBody>
+          <a:bodyPr>
+            <a:normAutofit fontScale="90000"/>
+          </a:bodyPr>
+          <a:lstStyle/>
+          <a:p>
+            <a:br>
+              <a:rPr lang="en-GB" dirty="0"/>
+            </a:br>
+            <a:endParaRPr lang="en-GB" dirty="0"/>
+          </a:p>
+        </p:txBody>
+      </p:sp>
+      <p:sp>
+        <p:nvSpPr>
+          <p:cNvPr id="3" name="Content Placeholder 2"/>
+          <p:cNvSpPr>
+            <a:spLocks noGrp="1"/>
+          </p:cNvSpPr>
+          <p:nvPr>
+            <p:ph idx="1"/>
+          </p:nvPr>
+        </p:nvSpPr>
+        <p:spPr/>
+        <p:txBody>
+          <a:bodyPr>
+            <a:normAutofit fontScale="70000" lnSpcReduction="20000"/>
+          </a:bodyPr>
+          <a:lstStyle/>
+          <a:p>
+            <a:r>
+              <a:rPr lang="ro-RO" b="1" dirty="0"/>
+              <a:t>Identitatea obiectelor se asigură mai ușor </a:t>
+            </a:r>
+            <a:endParaRPr lang="ro-RO" dirty="0"/>
+          </a:p>
+          <a:p>
+            <a:r>
+              <a:rPr lang="ro-RO" dirty="0"/>
+              <a:t>-</a:t>
+            </a:r>
+          </a:p>
+          <a:p>
+            <a:r>
+              <a:rPr lang="ro-RO" dirty="0"/>
+              <a:t>SGBD relaționale utilizează chei, care trebuie gestionate de utilizator</a:t>
+            </a:r>
+          </a:p>
+          <a:p>
+            <a:r>
+              <a:rPr lang="ro-RO" dirty="0"/>
+              <a:t>-</a:t>
+            </a:r>
+          </a:p>
+          <a:p>
+            <a:r>
+              <a:rPr lang="ro-RO" dirty="0"/>
+              <a:t>SGBDOO asigură identitatea și unicitatea obiectelor în mod transparentfață de utilizator (prin conferirea de Object Ids</a:t>
+            </a:r>
+          </a:p>
+          <a:p>
+            <a:r>
+              <a:rPr lang="ro-RO" dirty="0"/>
+              <a:t> –OID)-</a:t>
+            </a:r>
+          </a:p>
+          <a:p>
+            <a:r>
+              <a:rPr lang="ro-RO" dirty="0"/>
+              <a:t>posibilitate redusă de apariție a erorilor </a:t>
+            </a:r>
+          </a:p>
+          <a:p>
+            <a:r>
+              <a:rPr lang="ro-RO" dirty="0"/>
+              <a:t>-</a:t>
+            </a:r>
+          </a:p>
+          <a:p>
+            <a:r>
+              <a:rPr lang="ro-RO" dirty="0"/>
+              <a:t>nu există limitări cu privire la valorile care pot fi reținute într </a:t>
+            </a:r>
+          </a:p>
+          <a:p>
+            <a:r>
+              <a:rPr lang="ro-RO" dirty="0"/>
+              <a:t>-un obiect</a:t>
+            </a:r>
+          </a:p>
+          <a:p>
+            <a:pPr algn="just">
+              <a:buFont typeface="Wingdings" panose="05000000000000000000" pitchFamily="2" charset="2"/>
+              <a:buChar char="§"/>
+            </a:pPr>
+            <a:endParaRPr lang="en-GB" dirty="0">
+              <a:latin typeface="Times New Roman" panose="02020603050405020304" pitchFamily="18" charset="0"/>
+              <a:cs typeface="Times New Roman" panose="02020603050405020304" pitchFamily="18" charset="0"/>
+            </a:endParaRPr>
+          </a:p>
+        </p:txBody>
+      </p:sp>
+      <p:sp>
+        <p:nvSpPr>
+          <p:cNvPr id="5" name="Rectangle 4"/>
+          <p:cNvSpPr/>
+          <p:nvPr/>
+        </p:nvSpPr>
+        <p:spPr>
+          <a:xfrm>
+            <a:off x="-15239" y="534145"/>
+            <a:ext cx="9159239" cy="739300"/>
+          </a:xfrm>
+          <a:prstGeom prst="rect">
+            <a:avLst/>
+          </a:prstGeom>
+          <a:solidFill>
+            <a:schemeClr val="bg1">
+              <a:lumMod val="50000"/>
+            </a:schemeClr>
+          </a:solidFill>
+          <a:ln>
+            <a:noFill/>
+          </a:ln>
+        </p:spPr>
+        <p:style>
+          <a:lnRef idx="2">
+            <a:schemeClr val="accent1">
+              <a:shade val="50000"/>
+            </a:schemeClr>
+          </a:lnRef>
+          <a:fillRef idx="1">
+            <a:schemeClr val="accent1"/>
+          </a:fillRef>
+          <a:effectRef idx="0">
+            <a:schemeClr val="accent1"/>
+          </a:effectRef>
+          <a:fontRef idx="minor">
+            <a:schemeClr val="lt1"/>
+          </a:fontRef>
+        </p:style>
+        <p:txBody>
+          <a:bodyPr rtlCol="0" anchor="ctr"/>
+          <a:lstStyle/>
+          <a:p>
+            <a:r>
+              <a:rPr lang="ro-RO" sz="2400" dirty="0">
+                <a:latin typeface="Times New Roman" panose="02020603050405020304" pitchFamily="18" charset="0"/>
+                <a:cs typeface="Times New Roman" panose="02020603050405020304" pitchFamily="18" charset="0"/>
+              </a:rPr>
+              <a:t>	</a:t>
+            </a:r>
+            <a:r>
+              <a:rPr lang="ro-RO" sz="2400" dirty="0">
+                <a:latin typeface="Times New Roman" panose="02020603050405020304" pitchFamily="18" charset="0"/>
+                <a:cs typeface="Times New Roman" panose="02020603050405020304" pitchFamily="18" charset="0"/>
+              </a:rPr>
+              <a:t>R</a:t>
+            </a:r>
+            <a:r>
+              <a:rPr lang="ro-RO" sz="2400" dirty="0"/>
+              <a:t>estricții legare de modificarea</a:t>
+            </a:r>
+            <a:r>
+              <a:rPr lang="ro-RO" sz="2400" dirty="0">
+                <a:latin typeface="Times New Roman" panose="02020603050405020304" pitchFamily="18" charset="0"/>
+                <a:cs typeface="Times New Roman" panose="02020603050405020304" pitchFamily="18" charset="0"/>
+              </a:rPr>
+              <a:t> unei scheme BDOO</a:t>
+            </a:r>
+            <a:r>
+              <a:rPr lang="ro-RO" sz="2400" dirty="0">
+                <a:latin typeface="Times New Roman" panose="02020603050405020304" pitchFamily="18" charset="0"/>
+                <a:cs typeface="Times New Roman" panose="02020603050405020304" pitchFamily="18" charset="0"/>
+              </a:rPr>
+              <a:t>	</a:t>
+            </a:r>
+          </a:p>
+        </p:txBody>
+      </p:sp>
+    </p:spTree>
+    <p:extLst>
+      <p:ext uri="{BB962C8B-B14F-4D97-AF65-F5344CB8AC3E}">
+        <p14:creationId xmlns:p14="http://schemas.microsoft.com/office/powerpoint/2010/main" val="2902713788"/>
+      </p:ext>
+    </p:extLst>
+  </p:cSld>
+  <p:clrMapOvr>
+    <a:masterClrMapping/>
+  </p:clrMapOvr>
+</p:sld>
+</file>
+
+<file path=ppt/slides/slide38.xml><?xml version="1.0" encoding="utf-8"?>
+<p:sld xmlns:a="http://schemas.openxmlformats.org/drawingml/2006/main" xmlns:r="http://schemas.openxmlformats.org/officeDocument/2006/relationships" xmlns:p="http://schemas.openxmlformats.org/presentationml/2006/main">
+  <p:cSld>
+    <p:spTree>
+      <p:nvGrpSpPr>
+        <p:cNvPr id="1" name=""/>
+        <p:cNvGrpSpPr/>
+        <p:nvPr/>
+      </p:nvGrpSpPr>
+      <p:grpSpPr>
+        <a:xfrm>
+          <a:off x="0" y="0"/>
+          <a:ext cx="0" cy="0"/>
+          <a:chOff x="0" y="0"/>
+          <a:chExt cx="0" cy="0"/>
+        </a:xfrm>
+      </p:grpSpPr>
+      <p:sp>
+        <p:nvSpPr>
+          <p:cNvPr id="2" name="Title 1"/>
+          <p:cNvSpPr>
+            <a:spLocks noGrp="1"/>
+          </p:cNvSpPr>
+          <p:nvPr>
+            <p:ph type="title"/>
+          </p:nvPr>
+        </p:nvSpPr>
+        <p:spPr/>
+        <p:txBody>
+          <a:bodyPr>
+            <a:normAutofit fontScale="90000"/>
+          </a:bodyPr>
+          <a:lstStyle/>
+          <a:p>
+            <a:br>
+              <a:rPr lang="en-GB" dirty="0"/>
+            </a:br>
+            <a:endParaRPr lang="en-GB" dirty="0"/>
+          </a:p>
+        </p:txBody>
+      </p:sp>
+      <p:sp>
+        <p:nvSpPr>
+          <p:cNvPr id="3" name="Content Placeholder 2"/>
+          <p:cNvSpPr>
+            <a:spLocks noGrp="1"/>
+          </p:cNvSpPr>
+          <p:nvPr>
+            <p:ph idx="1"/>
+          </p:nvPr>
+        </p:nvSpPr>
+        <p:spPr/>
+        <p:txBody>
+          <a:bodyPr>
+            <a:normAutofit fontScale="70000" lnSpcReduction="20000"/>
+          </a:bodyPr>
+          <a:lstStyle/>
+          <a:p>
+            <a:r>
+              <a:rPr lang="ro-RO" b="1" dirty="0"/>
+              <a:t>Eficiența BDOO</a:t>
+            </a:r>
+            <a:endParaRPr lang="ro-RO" dirty="0"/>
+          </a:p>
+          <a:p>
+            <a:r>
+              <a:rPr lang="ro-RO" dirty="0"/>
+              <a:t>-în sisteme unde unui item (unui individ, concept etc) îi corespund volumemari de dateEx:-</a:t>
+            </a:r>
+          </a:p>
+          <a:p>
+            <a:r>
+              <a:rPr lang="ro-RO" dirty="0"/>
+              <a:t>evidența populației, a clienților unei companii</a:t>
+            </a:r>
+          </a:p>
+          <a:p>
+            <a:r>
+              <a:rPr lang="ro-RO" dirty="0"/>
+              <a:t>-</a:t>
+            </a:r>
+          </a:p>
+          <a:p>
+            <a:r>
+              <a:rPr lang="ro-RO" dirty="0"/>
+              <a:t>modele din diverse domenii științifice</a:t>
+            </a:r>
+          </a:p>
+          <a:p>
+            <a:r>
+              <a:rPr lang="ro-RO" dirty="0"/>
+              <a:t> Avantaje:</a:t>
+            </a:r>
+          </a:p>
+          <a:p>
+            <a:r>
+              <a:rPr lang="ro-RO" dirty="0"/>
+              <a:t>-lucrul mai eficient cu memoria-</a:t>
+            </a:r>
+          </a:p>
+          <a:p>
+            <a:r>
+              <a:rPr lang="ro-RO" dirty="0"/>
+              <a:t>organizare mai bună a datelor </a:t>
+            </a:r>
+          </a:p>
+          <a:p>
+            <a:r>
+              <a:rPr lang="ro-RO" dirty="0"/>
+              <a:t>-</a:t>
+            </a:r>
+          </a:p>
+          <a:p>
+            <a:r>
+              <a:rPr lang="ro-RO" dirty="0"/>
+              <a:t> în multe situații, complexitate scăzută a operațiilor de căutare,</a:t>
+            </a:r>
+          </a:p>
+          <a:p>
+            <a:r>
+              <a:rPr lang="ro-RO" dirty="0"/>
+              <a:t>actualizare etc. (de la O(n) la O(1) )</a:t>
+            </a:r>
+          </a:p>
+          <a:p>
+            <a:pPr algn="just">
+              <a:buFont typeface="Wingdings" panose="05000000000000000000" pitchFamily="2" charset="2"/>
+              <a:buChar char="§"/>
+            </a:pPr>
+            <a:endParaRPr lang="en-GB" dirty="0">
+              <a:latin typeface="Times New Roman" panose="02020603050405020304" pitchFamily="18" charset="0"/>
+              <a:cs typeface="Times New Roman" panose="02020603050405020304" pitchFamily="18" charset="0"/>
+            </a:endParaRPr>
+          </a:p>
+        </p:txBody>
+      </p:sp>
+      <p:sp>
+        <p:nvSpPr>
+          <p:cNvPr id="5" name="Rectangle 4"/>
+          <p:cNvSpPr/>
+          <p:nvPr/>
+        </p:nvSpPr>
+        <p:spPr>
+          <a:xfrm>
+            <a:off x="-15239" y="534145"/>
+            <a:ext cx="9159239" cy="739300"/>
+          </a:xfrm>
+          <a:prstGeom prst="rect">
+            <a:avLst/>
+          </a:prstGeom>
+          <a:solidFill>
+            <a:schemeClr val="bg1">
+              <a:lumMod val="50000"/>
+            </a:schemeClr>
+          </a:solidFill>
+          <a:ln>
+            <a:noFill/>
+          </a:ln>
+        </p:spPr>
+        <p:style>
+          <a:lnRef idx="2">
+            <a:schemeClr val="accent1">
+              <a:shade val="50000"/>
+            </a:schemeClr>
+          </a:lnRef>
+          <a:fillRef idx="1">
+            <a:schemeClr val="accent1"/>
+          </a:fillRef>
+          <a:effectRef idx="0">
+            <a:schemeClr val="accent1"/>
+          </a:effectRef>
+          <a:fontRef idx="minor">
+            <a:schemeClr val="lt1"/>
+          </a:fontRef>
+        </p:style>
+        <p:txBody>
+          <a:bodyPr rtlCol="0" anchor="ctr"/>
+          <a:lstStyle/>
+          <a:p>
+            <a:r>
+              <a:rPr lang="ro-RO" sz="2400" dirty="0">
+                <a:latin typeface="Times New Roman" panose="02020603050405020304" pitchFamily="18" charset="0"/>
+                <a:cs typeface="Times New Roman" panose="02020603050405020304" pitchFamily="18" charset="0"/>
+              </a:rPr>
+              <a:t>	</a:t>
+            </a:r>
+            <a:r>
+              <a:rPr lang="ro-RO" sz="2400" dirty="0">
+                <a:latin typeface="Times New Roman" panose="02020603050405020304" pitchFamily="18" charset="0"/>
+                <a:cs typeface="Times New Roman" panose="02020603050405020304" pitchFamily="18" charset="0"/>
+              </a:rPr>
+              <a:t>R</a:t>
+            </a:r>
+            <a:r>
+              <a:rPr lang="ro-RO" sz="2400" dirty="0"/>
+              <a:t>estricții legare de modificarea</a:t>
+            </a:r>
+            <a:r>
+              <a:rPr lang="ro-RO" sz="2400" dirty="0">
+                <a:latin typeface="Times New Roman" panose="02020603050405020304" pitchFamily="18" charset="0"/>
+                <a:cs typeface="Times New Roman" panose="02020603050405020304" pitchFamily="18" charset="0"/>
+              </a:rPr>
+              <a:t> unei scheme BDOO</a:t>
+            </a:r>
+            <a:r>
+              <a:rPr lang="ro-RO" sz="2400" dirty="0">
+                <a:latin typeface="Times New Roman" panose="02020603050405020304" pitchFamily="18" charset="0"/>
+                <a:cs typeface="Times New Roman" panose="02020603050405020304" pitchFamily="18" charset="0"/>
+              </a:rPr>
+              <a:t>	</a:t>
+            </a:r>
+          </a:p>
+        </p:txBody>
+      </p:sp>
+    </p:spTree>
+    <p:extLst>
+      <p:ext uri="{BB962C8B-B14F-4D97-AF65-F5344CB8AC3E}">
+        <p14:creationId xmlns:p14="http://schemas.microsoft.com/office/powerpoint/2010/main" val="554891639"/>
+      </p:ext>
+    </p:extLst>
+  </p:cSld>
+  <p:clrMapOvr>
+    <a:masterClrMapping/>
+  </p:clrMapOvr>
+</p:sld>
+</file>
+
+<file path=ppt/slides/slide39.xml><?xml version="1.0" encoding="utf-8"?>
+<p:sld xmlns:a="http://schemas.openxmlformats.org/drawingml/2006/main" xmlns:r="http://schemas.openxmlformats.org/officeDocument/2006/relationships" xmlns:p="http://schemas.openxmlformats.org/presentationml/2006/main">
+  <p:cSld>
+    <p:spTree>
+      <p:nvGrpSpPr>
+        <p:cNvPr id="1" name=""/>
+        <p:cNvGrpSpPr/>
+        <p:nvPr/>
+      </p:nvGrpSpPr>
+      <p:grpSpPr>
+        <a:xfrm>
+          <a:off x="0" y="0"/>
+          <a:ext cx="0" cy="0"/>
+          <a:chOff x="0" y="0"/>
+          <a:chExt cx="0" cy="0"/>
+        </a:xfrm>
+      </p:grpSpPr>
+      <p:sp>
+        <p:nvSpPr>
+          <p:cNvPr id="2" name="Title 1"/>
+          <p:cNvSpPr>
+            <a:spLocks noGrp="1"/>
+          </p:cNvSpPr>
+          <p:nvPr>
+            <p:ph type="title"/>
+          </p:nvPr>
+        </p:nvSpPr>
+        <p:spPr/>
+        <p:txBody>
+          <a:bodyPr>
+            <a:normAutofit fontScale="90000"/>
+          </a:bodyPr>
+          <a:lstStyle/>
+          <a:p>
+            <a:br>
+              <a:rPr lang="en-GB" dirty="0"/>
+            </a:br>
+            <a:endParaRPr lang="en-GB" dirty="0"/>
+          </a:p>
+        </p:txBody>
+      </p:sp>
+      <p:sp>
+        <p:nvSpPr>
+          <p:cNvPr id="3" name="Content Placeholder 2"/>
+          <p:cNvSpPr>
+            <a:spLocks noGrp="1"/>
+          </p:cNvSpPr>
+          <p:nvPr>
+            <p:ph idx="1"/>
+          </p:nvPr>
+        </p:nvSpPr>
+        <p:spPr/>
+        <p:txBody>
+          <a:bodyPr>
+            <a:normAutofit fontScale="85000" lnSpcReduction="10000"/>
+          </a:bodyPr>
+          <a:lstStyle/>
+          <a:p>
+            <a:r>
+              <a:rPr lang="ro-RO" dirty="0"/>
+              <a:t>Un model de date unitar </a:t>
+            </a:r>
+          </a:p>
+          <a:p>
+            <a:r>
+              <a:rPr lang="ro-RO" dirty="0"/>
+              <a:t>-într-</a:t>
+            </a:r>
+          </a:p>
+          <a:p>
+            <a:r>
+              <a:rPr lang="ro-RO" dirty="0"/>
+              <a:t>un SGBDOO nu este necesară separarea modelului bazei de date demodelul aplicației</a:t>
+            </a:r>
+          </a:p>
+          <a:p>
+            <a:r>
+              <a:rPr lang="ro-RO" dirty="0"/>
+              <a:t>-</a:t>
+            </a:r>
+          </a:p>
+          <a:p>
+            <a:r>
+              <a:rPr lang="ro-RO" dirty="0"/>
+              <a:t>datele pot fi strâns corelate cu modul de gestiune al lor (cu operațiile care</a:t>
+            </a:r>
+          </a:p>
+          <a:p>
+            <a:r>
+              <a:rPr lang="ro-RO" dirty="0"/>
+              <a:t>se pot efectua cu acestea)-</a:t>
+            </a:r>
+          </a:p>
+          <a:p>
+            <a:r>
+              <a:rPr lang="ro-RO" dirty="0"/>
+              <a:t>componentele care stochează datele și cele care le gestionează pot fiobiecte diferite din același sistem</a:t>
+            </a:r>
+          </a:p>
+          <a:p>
+            <a:pPr algn="just">
+              <a:buFont typeface="Wingdings" panose="05000000000000000000" pitchFamily="2" charset="2"/>
+              <a:buChar char="§"/>
+            </a:pPr>
+            <a:endParaRPr lang="en-GB" dirty="0">
+              <a:latin typeface="Times New Roman" panose="02020603050405020304" pitchFamily="18" charset="0"/>
+              <a:cs typeface="Times New Roman" panose="02020603050405020304" pitchFamily="18" charset="0"/>
+            </a:endParaRPr>
+          </a:p>
+        </p:txBody>
+      </p:sp>
+      <p:sp>
+        <p:nvSpPr>
+          <p:cNvPr id="5" name="Rectangle 4"/>
+          <p:cNvSpPr/>
+          <p:nvPr/>
+        </p:nvSpPr>
+        <p:spPr>
+          <a:xfrm>
+            <a:off x="-15239" y="534145"/>
+            <a:ext cx="9159239" cy="739300"/>
+          </a:xfrm>
+          <a:prstGeom prst="rect">
+            <a:avLst/>
+          </a:prstGeom>
+          <a:solidFill>
+            <a:schemeClr val="bg1">
+              <a:lumMod val="50000"/>
+            </a:schemeClr>
+          </a:solidFill>
+          <a:ln>
+            <a:noFill/>
+          </a:ln>
+        </p:spPr>
+        <p:style>
+          <a:lnRef idx="2">
+            <a:schemeClr val="accent1">
+              <a:shade val="50000"/>
+            </a:schemeClr>
+          </a:lnRef>
+          <a:fillRef idx="1">
+            <a:schemeClr val="accent1"/>
+          </a:fillRef>
+          <a:effectRef idx="0">
+            <a:schemeClr val="accent1"/>
+          </a:effectRef>
+          <a:fontRef idx="minor">
+            <a:schemeClr val="lt1"/>
+          </a:fontRef>
+        </p:style>
+        <p:txBody>
+          <a:bodyPr rtlCol="0" anchor="ctr"/>
+          <a:lstStyle/>
+          <a:p>
+            <a:r>
+              <a:rPr lang="ro-RO" sz="2400" dirty="0">
+                <a:latin typeface="Times New Roman" panose="02020603050405020304" pitchFamily="18" charset="0"/>
+                <a:cs typeface="Times New Roman" panose="02020603050405020304" pitchFamily="18" charset="0"/>
+              </a:rPr>
+              <a:t>	</a:t>
+            </a:r>
+            <a:r>
+              <a:rPr lang="ro-RO" sz="2400" dirty="0">
+                <a:latin typeface="Times New Roman" panose="02020603050405020304" pitchFamily="18" charset="0"/>
+                <a:cs typeface="Times New Roman" panose="02020603050405020304" pitchFamily="18" charset="0"/>
+              </a:rPr>
+              <a:t>R</a:t>
+            </a:r>
+            <a:r>
+              <a:rPr lang="ro-RO" sz="2400" dirty="0"/>
+              <a:t>estricții legare de modificarea</a:t>
+            </a:r>
+            <a:r>
+              <a:rPr lang="ro-RO" sz="2400" dirty="0">
+                <a:latin typeface="Times New Roman" panose="02020603050405020304" pitchFamily="18" charset="0"/>
+                <a:cs typeface="Times New Roman" panose="02020603050405020304" pitchFamily="18" charset="0"/>
+              </a:rPr>
+              <a:t> unei scheme BDOO</a:t>
+            </a:r>
+            <a:r>
+              <a:rPr lang="ro-RO" sz="2400" dirty="0">
+                <a:latin typeface="Times New Roman" panose="02020603050405020304" pitchFamily="18" charset="0"/>
+                <a:cs typeface="Times New Roman" panose="02020603050405020304" pitchFamily="18" charset="0"/>
+              </a:rPr>
+              <a:t>	</a:t>
+            </a:r>
+          </a:p>
+        </p:txBody>
+      </p:sp>
+    </p:spTree>
+    <p:extLst>
+      <p:ext uri="{BB962C8B-B14F-4D97-AF65-F5344CB8AC3E}">
+        <p14:creationId xmlns:p14="http://schemas.microsoft.com/office/powerpoint/2010/main" val="3136676013"/>
+      </p:ext>
+    </p:extLst>
+  </p:cSld>
+  <p:clrMapOvr>
+    <a:masterClrMapping/>
+  </p:clrMapOvr>
+</p:sld>
+</file>
+
+<file path=ppt/slides/slide4.xml><?xml version="1.0" encoding="utf-8"?>
+<p:sld xmlns:a="http://schemas.openxmlformats.org/drawingml/2006/main" xmlns:r="http://schemas.openxmlformats.org/officeDocument/2006/relationships" xmlns:p="http://schemas.openxmlformats.org/presentationml/2006/main">
+  <p:cSld>
+    <p:spTree>
+      <p:nvGrpSpPr>
+        <p:cNvPr id="1" name=""/>
+        <p:cNvGrpSpPr/>
+        <p:nvPr/>
+      </p:nvGrpSpPr>
+      <p:grpSpPr>
+        <a:xfrm>
+          <a:off x="0" y="0"/>
+          <a:ext cx="0" cy="0"/>
+          <a:chOff x="0" y="0"/>
+          <a:chExt cx="0" cy="0"/>
+        </a:xfrm>
+      </p:grpSpPr>
+      <p:sp>
+        <p:nvSpPr>
+          <p:cNvPr id="2" name="Title 1"/>
+          <p:cNvSpPr>
+            <a:spLocks noGrp="1"/>
+          </p:cNvSpPr>
+          <p:nvPr>
+            <p:ph type="title"/>
+          </p:nvPr>
+        </p:nvSpPr>
+        <p:spPr/>
+        <p:txBody>
+          <a:bodyPr>
+            <a:normAutofit fontScale="90000"/>
+          </a:bodyPr>
+          <a:lstStyle/>
+          <a:p>
+            <a:br>
+              <a:rPr lang="ro-RO" dirty="0"/>
+            </a:br>
+            <a:endParaRPr lang="en-GB" dirty="0"/>
+          </a:p>
+        </p:txBody>
+      </p:sp>
+      <p:sp>
+        <p:nvSpPr>
+          <p:cNvPr id="3" name="Content Placeholder 2"/>
+          <p:cNvSpPr>
+            <a:spLocks noGrp="1"/>
+          </p:cNvSpPr>
+          <p:nvPr>
+            <p:ph idx="1"/>
+          </p:nvPr>
+        </p:nvSpPr>
+        <p:spPr/>
+        <p:txBody>
+          <a:bodyPr/>
+          <a:lstStyle/>
+          <a:p>
+            <a:endParaRPr lang="ro-RO" dirty="0"/>
+          </a:p>
+          <a:p>
+            <a:endParaRPr lang="en-GB" dirty="0"/>
+          </a:p>
+        </p:txBody>
+      </p:sp>
+      <p:sp>
+        <p:nvSpPr>
+          <p:cNvPr id="5" name="TextBox 4"/>
+          <p:cNvSpPr txBox="1"/>
+          <p:nvPr/>
+        </p:nvSpPr>
+        <p:spPr>
+          <a:xfrm>
+            <a:off x="457201" y="2153741"/>
+            <a:ext cx="8229600" cy="4154984"/>
+          </a:xfrm>
+          <a:prstGeom prst="rect">
+            <a:avLst/>
+          </a:prstGeom>
+          <a:noFill/>
+        </p:spPr>
+        <p:txBody>
+          <a:bodyPr wrap="square" rtlCol="0">
+            <a:spAutoFit/>
+          </a:bodyPr>
+          <a:lstStyle/>
+          <a:p>
+            <a:pPr marL="342900" indent="-342900" algn="just">
+              <a:buFont typeface="Wingdings" panose="05000000000000000000" pitchFamily="2" charset="2"/>
+              <a:buChar char="§"/>
+            </a:pPr>
+            <a:r>
+              <a:rPr lang="en-GB" sz="2400" dirty="0" err="1">
+                <a:latin typeface="Times New Roman" pitchFamily="18" charset="0"/>
+                <a:cs typeface="Times New Roman" pitchFamily="18" charset="0"/>
+              </a:rPr>
+              <a:t>Dezvoltarea</a:t>
+            </a:r>
+            <a:r>
+              <a:rPr lang="en-GB" sz="2400" dirty="0">
+                <a:latin typeface="Times New Roman" pitchFamily="18" charset="0"/>
+                <a:cs typeface="Times New Roman" pitchFamily="18" charset="0"/>
+              </a:rPr>
+              <a:t> </a:t>
+            </a:r>
+            <a:r>
+              <a:rPr lang="en-GB" sz="2400" dirty="0" err="1">
+                <a:latin typeface="Times New Roman" pitchFamily="18" charset="0"/>
+                <a:cs typeface="Times New Roman" pitchFamily="18" charset="0"/>
+              </a:rPr>
+              <a:t>tehnologiei</a:t>
+            </a:r>
+            <a:r>
+              <a:rPr lang="en-GB" sz="2400" dirty="0">
+                <a:latin typeface="Times New Roman" pitchFamily="18" charset="0"/>
+                <a:cs typeface="Times New Roman" pitchFamily="18" charset="0"/>
+              </a:rPr>
+              <a:t> </a:t>
+            </a:r>
+            <a:r>
+              <a:rPr lang="en-GB" sz="2400" dirty="0" err="1">
+                <a:latin typeface="Times New Roman" pitchFamily="18" charset="0"/>
+                <a:cs typeface="Times New Roman" pitchFamily="18" charset="0"/>
+              </a:rPr>
+              <a:t>sistemelor</a:t>
+            </a:r>
+            <a:r>
+              <a:rPr lang="en-GB" sz="2400" dirty="0">
+                <a:latin typeface="Times New Roman" pitchFamily="18" charset="0"/>
+                <a:cs typeface="Times New Roman" pitchFamily="18" charset="0"/>
+              </a:rPr>
+              <a:t> de </a:t>
+            </a:r>
+            <a:r>
+              <a:rPr lang="en-GB" sz="2400" dirty="0" err="1">
+                <a:latin typeface="Times New Roman" pitchFamily="18" charset="0"/>
+                <a:cs typeface="Times New Roman" pitchFamily="18" charset="0"/>
+              </a:rPr>
+              <a:t>calcul</a:t>
+            </a:r>
+            <a:r>
+              <a:rPr lang="en-GB" sz="2400" dirty="0">
+                <a:latin typeface="Times New Roman" pitchFamily="18" charset="0"/>
+                <a:cs typeface="Times New Roman" pitchFamily="18" charset="0"/>
+              </a:rPr>
+              <a:t> in </a:t>
+            </a:r>
+            <a:r>
+              <a:rPr lang="en-GB" sz="2400" dirty="0" err="1">
+                <a:latin typeface="Times New Roman" pitchFamily="18" charset="0"/>
+                <a:cs typeface="Times New Roman" pitchFamily="18" charset="0"/>
+              </a:rPr>
+              <a:t>ultimii</a:t>
+            </a:r>
+            <a:r>
+              <a:rPr lang="en-GB" sz="2400" dirty="0">
+                <a:latin typeface="Times New Roman" pitchFamily="18" charset="0"/>
+                <a:cs typeface="Times New Roman" pitchFamily="18" charset="0"/>
+              </a:rPr>
+              <a:t> </a:t>
+            </a:r>
+            <a:r>
+              <a:rPr lang="en-GB" sz="2400" dirty="0" err="1">
+                <a:latin typeface="Times New Roman" pitchFamily="18" charset="0"/>
+                <a:cs typeface="Times New Roman" pitchFamily="18" charset="0"/>
+              </a:rPr>
+              <a:t>ani</a:t>
+            </a:r>
+            <a:r>
+              <a:rPr lang="en-GB" sz="2400" dirty="0">
+                <a:latin typeface="Times New Roman" pitchFamily="18" charset="0"/>
+                <a:cs typeface="Times New Roman" pitchFamily="18" charset="0"/>
+              </a:rPr>
+              <a:t> a </a:t>
+            </a:r>
+            <a:r>
+              <a:rPr lang="en-GB" sz="2400" dirty="0" err="1">
+                <a:latin typeface="Times New Roman" pitchFamily="18" charset="0"/>
+                <a:cs typeface="Times New Roman" pitchFamily="18" charset="0"/>
+              </a:rPr>
+              <a:t>condus</a:t>
+            </a:r>
+            <a:r>
+              <a:rPr lang="en-GB" sz="2400" dirty="0">
+                <a:latin typeface="Times New Roman" pitchFamily="18" charset="0"/>
+                <a:cs typeface="Times New Roman" pitchFamily="18" charset="0"/>
+              </a:rPr>
+              <a:t> la </a:t>
+            </a:r>
+            <a:r>
+              <a:rPr lang="en-GB" sz="2400" dirty="0" err="1">
+                <a:latin typeface="Times New Roman" pitchFamily="18" charset="0"/>
+                <a:cs typeface="Times New Roman" pitchFamily="18" charset="0"/>
+              </a:rPr>
+              <a:t>patrunderea</a:t>
+            </a:r>
+            <a:r>
+              <a:rPr lang="en-GB" sz="2400" dirty="0">
+                <a:latin typeface="Times New Roman" pitchFamily="18" charset="0"/>
+                <a:cs typeface="Times New Roman" pitchFamily="18" charset="0"/>
+              </a:rPr>
+              <a:t> </a:t>
+            </a:r>
+            <a:r>
+              <a:rPr lang="ro-RO" sz="2400" dirty="0">
+                <a:latin typeface="Times New Roman" pitchFamily="18" charset="0"/>
+                <a:cs typeface="Times New Roman" pitchFamily="18" charset="0"/>
+              </a:rPr>
+              <a:t>BDOO </a:t>
+            </a:r>
+            <a:r>
+              <a:rPr lang="en-GB" sz="2400" dirty="0">
+                <a:latin typeface="Times New Roman" pitchFamily="18" charset="0"/>
+                <a:cs typeface="Times New Roman" pitchFamily="18" charset="0"/>
+              </a:rPr>
+              <a:t>in tot </a:t>
+            </a:r>
+            <a:r>
+              <a:rPr lang="en-GB" sz="2400" dirty="0" err="1">
+                <a:latin typeface="Times New Roman" pitchFamily="18" charset="0"/>
+                <a:cs typeface="Times New Roman" pitchFamily="18" charset="0"/>
+              </a:rPr>
+              <a:t>mai</a:t>
+            </a:r>
+            <a:r>
+              <a:rPr lang="en-GB" sz="2400" dirty="0">
+                <a:latin typeface="Times New Roman" pitchFamily="18" charset="0"/>
+                <a:cs typeface="Times New Roman" pitchFamily="18" charset="0"/>
+              </a:rPr>
+              <a:t> </a:t>
+            </a:r>
+            <a:r>
+              <a:rPr lang="en-GB" sz="2400" dirty="0" err="1">
+                <a:latin typeface="Times New Roman" pitchFamily="18" charset="0"/>
+                <a:cs typeface="Times New Roman" pitchFamily="18" charset="0"/>
+              </a:rPr>
+              <a:t>multe</a:t>
+            </a:r>
+            <a:r>
+              <a:rPr lang="en-GB" sz="2400" dirty="0">
+                <a:latin typeface="Times New Roman" pitchFamily="18" charset="0"/>
+                <a:cs typeface="Times New Roman" pitchFamily="18" charset="0"/>
+              </a:rPr>
+              <a:t> </a:t>
+            </a:r>
+            <a:r>
+              <a:rPr lang="en-GB" sz="2400" dirty="0" err="1">
+                <a:latin typeface="Times New Roman" pitchFamily="18" charset="0"/>
+                <a:cs typeface="Times New Roman" pitchFamily="18" charset="0"/>
+              </a:rPr>
+              <a:t>domenii</a:t>
+            </a:r>
+            <a:r>
+              <a:rPr lang="en-GB" sz="2400" dirty="0">
+                <a:latin typeface="Times New Roman" pitchFamily="18" charset="0"/>
+                <a:cs typeface="Times New Roman" pitchFamily="18" charset="0"/>
+              </a:rPr>
+              <a:t> de </a:t>
+            </a:r>
+            <a:r>
+              <a:rPr lang="en-GB" sz="2400" dirty="0" err="1">
+                <a:latin typeface="Times New Roman" pitchFamily="18" charset="0"/>
+                <a:cs typeface="Times New Roman" pitchFamily="18" charset="0"/>
+              </a:rPr>
+              <a:t>activitate</a:t>
+            </a:r>
+            <a:r>
+              <a:rPr lang="en-GB" sz="2400" dirty="0">
+                <a:latin typeface="Times New Roman" pitchFamily="18" charset="0"/>
+                <a:cs typeface="Times New Roman" pitchFamily="18" charset="0"/>
+              </a:rPr>
+              <a:t>, </a:t>
+            </a:r>
+            <a:r>
+              <a:rPr lang="en-GB" sz="2400" dirty="0" err="1">
+                <a:latin typeface="Times New Roman" pitchFamily="18" charset="0"/>
+                <a:cs typeface="Times New Roman" pitchFamily="18" charset="0"/>
+              </a:rPr>
+              <a:t>avand</a:t>
+            </a:r>
+            <a:r>
+              <a:rPr lang="en-GB" sz="2400" dirty="0">
+                <a:latin typeface="Times New Roman" pitchFamily="18" charset="0"/>
+                <a:cs typeface="Times New Roman" pitchFamily="18" charset="0"/>
+              </a:rPr>
+              <a:t> de </a:t>
+            </a:r>
+            <a:r>
+              <a:rPr lang="en-GB" sz="2400" dirty="0" err="1">
+                <a:latin typeface="Times New Roman" pitchFamily="18" charset="0"/>
+                <a:cs typeface="Times New Roman" pitchFamily="18" charset="0"/>
+              </a:rPr>
+              <a:t>rezolvat</a:t>
+            </a:r>
+            <a:r>
+              <a:rPr lang="en-GB" sz="2400" dirty="0">
+                <a:latin typeface="Times New Roman" pitchFamily="18" charset="0"/>
+                <a:cs typeface="Times New Roman" pitchFamily="18" charset="0"/>
+              </a:rPr>
+              <a:t> </a:t>
+            </a:r>
+            <a:r>
+              <a:rPr lang="en-GB" sz="2400" dirty="0" err="1">
+                <a:latin typeface="Times New Roman" pitchFamily="18" charset="0"/>
+                <a:cs typeface="Times New Roman" pitchFamily="18" charset="0"/>
+              </a:rPr>
+              <a:t>probleme</a:t>
+            </a:r>
+            <a:r>
+              <a:rPr lang="en-GB" sz="2400" dirty="0">
+                <a:latin typeface="Times New Roman" pitchFamily="18" charset="0"/>
+                <a:cs typeface="Times New Roman" pitchFamily="18" charset="0"/>
+              </a:rPr>
+              <a:t> din </a:t>
+            </a:r>
+            <a:r>
+              <a:rPr lang="en-GB" sz="2400" dirty="0" err="1">
+                <a:latin typeface="Times New Roman" pitchFamily="18" charset="0"/>
+                <a:cs typeface="Times New Roman" pitchFamily="18" charset="0"/>
+              </a:rPr>
+              <a:t>cele</a:t>
+            </a:r>
+            <a:r>
+              <a:rPr lang="en-GB" sz="2400" dirty="0">
+                <a:latin typeface="Times New Roman" pitchFamily="18" charset="0"/>
+                <a:cs typeface="Times New Roman" pitchFamily="18" charset="0"/>
+              </a:rPr>
+              <a:t> </a:t>
+            </a:r>
+            <a:r>
+              <a:rPr lang="en-GB" sz="2400" dirty="0" err="1">
+                <a:latin typeface="Times New Roman" pitchFamily="18" charset="0"/>
+                <a:cs typeface="Times New Roman" pitchFamily="18" charset="0"/>
+              </a:rPr>
+              <a:t>mai</a:t>
+            </a:r>
+            <a:r>
+              <a:rPr lang="en-GB" sz="2400" dirty="0">
+                <a:latin typeface="Times New Roman" pitchFamily="18" charset="0"/>
+                <a:cs typeface="Times New Roman" pitchFamily="18" charset="0"/>
+              </a:rPr>
+              <a:t> diverse </a:t>
+            </a:r>
+            <a:r>
+              <a:rPr lang="en-GB" sz="2400" dirty="0" err="1">
+                <a:latin typeface="Times New Roman" pitchFamily="18" charset="0"/>
+                <a:cs typeface="Times New Roman" pitchFamily="18" charset="0"/>
+              </a:rPr>
+              <a:t>si</a:t>
+            </a:r>
+            <a:r>
+              <a:rPr lang="en-GB" sz="2400" dirty="0">
+                <a:latin typeface="Times New Roman" pitchFamily="18" charset="0"/>
+                <a:cs typeface="Times New Roman" pitchFamily="18" charset="0"/>
+              </a:rPr>
+              <a:t> </a:t>
+            </a:r>
+            <a:r>
+              <a:rPr lang="en-GB" sz="2400" dirty="0" err="1">
+                <a:latin typeface="Times New Roman" pitchFamily="18" charset="0"/>
+                <a:cs typeface="Times New Roman" pitchFamily="18" charset="0"/>
+              </a:rPr>
+              <a:t>mai</a:t>
+            </a:r>
+            <a:r>
+              <a:rPr lang="en-GB" sz="2400" dirty="0">
+                <a:latin typeface="Times New Roman" pitchFamily="18" charset="0"/>
+                <a:cs typeface="Times New Roman" pitchFamily="18" charset="0"/>
+              </a:rPr>
+              <a:t> </a:t>
+            </a:r>
+            <a:r>
+              <a:rPr lang="en-GB" sz="2400" dirty="0" err="1">
+                <a:latin typeface="Times New Roman" pitchFamily="18" charset="0"/>
+                <a:cs typeface="Times New Roman" pitchFamily="18" charset="0"/>
+              </a:rPr>
+              <a:t>complexe</a:t>
+            </a:r>
+            <a:r>
+              <a:rPr lang="en-GB" sz="2400" dirty="0">
+                <a:latin typeface="Times New Roman" pitchFamily="18" charset="0"/>
+                <a:cs typeface="Times New Roman" pitchFamily="18" charset="0"/>
+              </a:rPr>
+              <a:t>. </a:t>
+            </a:r>
+            <a:r>
+              <a:rPr lang="en-GB" sz="2400" dirty="0" err="1">
+                <a:latin typeface="Times New Roman" pitchFamily="18" charset="0"/>
+                <a:cs typeface="Times New Roman" pitchFamily="18" charset="0"/>
+              </a:rPr>
+              <a:t>Pentru</a:t>
+            </a:r>
+            <a:r>
+              <a:rPr lang="en-GB" sz="2400" dirty="0">
+                <a:latin typeface="Times New Roman" pitchFamily="18" charset="0"/>
+                <a:cs typeface="Times New Roman" pitchFamily="18" charset="0"/>
+              </a:rPr>
+              <a:t> </a:t>
+            </a:r>
+            <a:r>
+              <a:rPr lang="en-GB" sz="2400" dirty="0" err="1">
+                <a:latin typeface="Times New Roman" pitchFamily="18" charset="0"/>
+                <a:cs typeface="Times New Roman" pitchFamily="18" charset="0"/>
+              </a:rPr>
+              <a:t>aceasta</a:t>
+            </a:r>
+            <a:r>
+              <a:rPr lang="en-GB" sz="2400" dirty="0">
+                <a:latin typeface="Times New Roman" pitchFamily="18" charset="0"/>
+                <a:cs typeface="Times New Roman" pitchFamily="18" charset="0"/>
+              </a:rPr>
+              <a:t>, </a:t>
+            </a:r>
+            <a:r>
+              <a:rPr lang="en-GB" sz="2400" dirty="0" err="1">
+                <a:latin typeface="Times New Roman" pitchFamily="18" charset="0"/>
+                <a:cs typeface="Times New Roman" pitchFamily="18" charset="0"/>
+              </a:rPr>
+              <a:t>structurile</a:t>
+            </a:r>
+            <a:r>
+              <a:rPr lang="en-GB" sz="2400" dirty="0">
+                <a:latin typeface="Times New Roman" pitchFamily="18" charset="0"/>
+                <a:cs typeface="Times New Roman" pitchFamily="18" charset="0"/>
+              </a:rPr>
+              <a:t> </a:t>
+            </a:r>
+            <a:r>
+              <a:rPr lang="en-GB" sz="2400" dirty="0" err="1">
+                <a:latin typeface="Times New Roman" pitchFamily="18" charset="0"/>
+                <a:cs typeface="Times New Roman" pitchFamily="18" charset="0"/>
+              </a:rPr>
+              <a:t>clasice</a:t>
+            </a:r>
+            <a:r>
+              <a:rPr lang="en-GB" sz="2400" dirty="0">
+                <a:latin typeface="Times New Roman" pitchFamily="18" charset="0"/>
+                <a:cs typeface="Times New Roman" pitchFamily="18" charset="0"/>
+              </a:rPr>
+              <a:t> de date </a:t>
+            </a:r>
+            <a:r>
+              <a:rPr lang="en-GB" sz="2400" dirty="0" err="1">
+                <a:latin typeface="Times New Roman" pitchFamily="18" charset="0"/>
+                <a:cs typeface="Times New Roman" pitchFamily="18" charset="0"/>
+              </a:rPr>
+              <a:t>bazate</a:t>
+            </a:r>
+            <a:r>
+              <a:rPr lang="en-GB" sz="2400" dirty="0">
+                <a:latin typeface="Times New Roman" pitchFamily="18" charset="0"/>
+                <a:cs typeface="Times New Roman" pitchFamily="18" charset="0"/>
+              </a:rPr>
+              <a:t> </a:t>
+            </a:r>
+            <a:r>
+              <a:rPr lang="en-GB" sz="2400" dirty="0" err="1">
+                <a:latin typeface="Times New Roman" pitchFamily="18" charset="0"/>
+                <a:cs typeface="Times New Roman" pitchFamily="18" charset="0"/>
+              </a:rPr>
+              <a:t>pe</a:t>
+            </a:r>
+            <a:r>
+              <a:rPr lang="en-GB" sz="2400" dirty="0">
+                <a:latin typeface="Times New Roman" pitchFamily="18" charset="0"/>
+                <a:cs typeface="Times New Roman" pitchFamily="18" charset="0"/>
+              </a:rPr>
+              <a:t> text </a:t>
+            </a:r>
+            <a:r>
+              <a:rPr lang="en-GB" sz="2400" dirty="0" err="1">
+                <a:latin typeface="Times New Roman" pitchFamily="18" charset="0"/>
+                <a:cs typeface="Times New Roman" pitchFamily="18" charset="0"/>
+              </a:rPr>
+              <a:t>si</a:t>
+            </a:r>
+            <a:r>
+              <a:rPr lang="en-GB" sz="2400" dirty="0">
+                <a:latin typeface="Times New Roman" pitchFamily="18" charset="0"/>
+                <a:cs typeface="Times New Roman" pitchFamily="18" charset="0"/>
+              </a:rPr>
+              <a:t> </a:t>
+            </a:r>
+            <a:r>
+              <a:rPr lang="en-GB" sz="2400" dirty="0" err="1">
+                <a:latin typeface="Times New Roman" pitchFamily="18" charset="0"/>
+                <a:cs typeface="Times New Roman" pitchFamily="18" charset="0"/>
+              </a:rPr>
+              <a:t>valori</a:t>
+            </a:r>
+            <a:r>
+              <a:rPr lang="en-GB" sz="2400" dirty="0">
+                <a:latin typeface="Times New Roman" pitchFamily="18" charset="0"/>
+                <a:cs typeface="Times New Roman" pitchFamily="18" charset="0"/>
+              </a:rPr>
+              <a:t> </a:t>
+            </a:r>
+            <a:r>
+              <a:rPr lang="en-GB" sz="2400" dirty="0" err="1">
+                <a:latin typeface="Times New Roman" pitchFamily="18" charset="0"/>
+                <a:cs typeface="Times New Roman" pitchFamily="18" charset="0"/>
+              </a:rPr>
+              <a:t>numerice</a:t>
+            </a:r>
+            <a:r>
+              <a:rPr lang="en-GB" sz="2400" dirty="0">
+                <a:latin typeface="Times New Roman" pitchFamily="18" charset="0"/>
+                <a:cs typeface="Times New Roman" pitchFamily="18" charset="0"/>
+              </a:rPr>
+              <a:t> fie se </a:t>
+            </a:r>
+            <a:r>
+              <a:rPr lang="en-GB" sz="2400" dirty="0" err="1">
+                <a:latin typeface="Times New Roman" pitchFamily="18" charset="0"/>
+                <a:cs typeface="Times New Roman" pitchFamily="18" charset="0"/>
+              </a:rPr>
+              <a:t>dovedesc</a:t>
+            </a:r>
+            <a:r>
+              <a:rPr lang="en-GB" sz="2400" dirty="0">
+                <a:latin typeface="Times New Roman" pitchFamily="18" charset="0"/>
+                <a:cs typeface="Times New Roman" pitchFamily="18" charset="0"/>
+              </a:rPr>
+              <a:t> </a:t>
+            </a:r>
+            <a:r>
+              <a:rPr lang="en-GB" sz="2400" dirty="0" err="1">
+                <a:latin typeface="Times New Roman" pitchFamily="18" charset="0"/>
+                <a:cs typeface="Times New Roman" pitchFamily="18" charset="0"/>
+              </a:rPr>
+              <a:t>insuficiente</a:t>
+            </a:r>
+            <a:r>
+              <a:rPr lang="en-GB" sz="2400" dirty="0">
+                <a:latin typeface="Times New Roman" pitchFamily="18" charset="0"/>
+                <a:cs typeface="Times New Roman" pitchFamily="18" charset="0"/>
+              </a:rPr>
+              <a:t>, fie </a:t>
+            </a:r>
+            <a:r>
+              <a:rPr lang="en-GB" sz="2400" dirty="0" err="1">
+                <a:latin typeface="Times New Roman" pitchFamily="18" charset="0"/>
+                <a:cs typeface="Times New Roman" pitchFamily="18" charset="0"/>
+              </a:rPr>
+              <a:t>complexitatea</a:t>
+            </a:r>
+            <a:r>
+              <a:rPr lang="en-GB" sz="2400" dirty="0">
+                <a:latin typeface="Times New Roman" pitchFamily="18" charset="0"/>
+                <a:cs typeface="Times New Roman" pitchFamily="18" charset="0"/>
+              </a:rPr>
+              <a:t> </a:t>
+            </a:r>
+            <a:r>
+              <a:rPr lang="en-GB" sz="2400" dirty="0" err="1">
+                <a:latin typeface="Times New Roman" pitchFamily="18" charset="0"/>
+                <a:cs typeface="Times New Roman" pitchFamily="18" charset="0"/>
+              </a:rPr>
+              <a:t>lor</a:t>
+            </a:r>
+            <a:r>
+              <a:rPr lang="en-GB" sz="2400" dirty="0">
+                <a:latin typeface="Times New Roman" pitchFamily="18" charset="0"/>
+                <a:cs typeface="Times New Roman" pitchFamily="18" charset="0"/>
+              </a:rPr>
+              <a:t> </a:t>
+            </a:r>
+            <a:r>
+              <a:rPr lang="en-GB" sz="2400" dirty="0" err="1">
+                <a:latin typeface="Times New Roman" pitchFamily="18" charset="0"/>
+                <a:cs typeface="Times New Roman" pitchFamily="18" charset="0"/>
+              </a:rPr>
+              <a:t>depaseste</a:t>
+            </a:r>
+            <a:r>
+              <a:rPr lang="en-GB" sz="2400" dirty="0">
+                <a:latin typeface="Times New Roman" pitchFamily="18" charset="0"/>
+                <a:cs typeface="Times New Roman" pitchFamily="18" charset="0"/>
+              </a:rPr>
+              <a:t> </a:t>
+            </a:r>
+            <a:r>
+              <a:rPr lang="en-GB" sz="2400" dirty="0" err="1">
+                <a:latin typeface="Times New Roman" pitchFamily="18" charset="0"/>
+                <a:cs typeface="Times New Roman" pitchFamily="18" charset="0"/>
+              </a:rPr>
+              <a:t>posibilitatile</a:t>
+            </a:r>
+            <a:r>
+              <a:rPr lang="en-GB" sz="2400" dirty="0">
+                <a:latin typeface="Times New Roman" pitchFamily="18" charset="0"/>
+                <a:cs typeface="Times New Roman" pitchFamily="18" charset="0"/>
+              </a:rPr>
+              <a:t> de </a:t>
+            </a:r>
+            <a:r>
+              <a:rPr lang="en-GB" sz="2400" dirty="0" err="1">
+                <a:latin typeface="Times New Roman" pitchFamily="18" charset="0"/>
+                <a:cs typeface="Times New Roman" pitchFamily="18" charset="0"/>
+              </a:rPr>
+              <a:t>prelucrare</a:t>
+            </a:r>
+            <a:r>
+              <a:rPr lang="en-GB" sz="2400" dirty="0">
+                <a:latin typeface="Times New Roman" pitchFamily="18" charset="0"/>
+                <a:cs typeface="Times New Roman" pitchFamily="18" charset="0"/>
+              </a:rPr>
+              <a:t> </a:t>
+            </a:r>
+            <a:r>
+              <a:rPr lang="en-GB" sz="2400" dirty="0" err="1">
+                <a:latin typeface="Times New Roman" pitchFamily="18" charset="0"/>
+                <a:cs typeface="Times New Roman" pitchFamily="18" charset="0"/>
+              </a:rPr>
+              <a:t>oferite</a:t>
+            </a:r>
+            <a:r>
+              <a:rPr lang="en-GB" sz="2400" dirty="0">
+                <a:latin typeface="Times New Roman" pitchFamily="18" charset="0"/>
+                <a:cs typeface="Times New Roman" pitchFamily="18" charset="0"/>
+              </a:rPr>
+              <a:t> de </a:t>
+            </a:r>
+            <a:r>
+              <a:rPr lang="en-GB" sz="2400" dirty="0" err="1">
+                <a:latin typeface="Times New Roman" pitchFamily="18" charset="0"/>
+                <a:cs typeface="Times New Roman" pitchFamily="18" charset="0"/>
+              </a:rPr>
+              <a:t>tehnologiile</a:t>
+            </a:r>
+            <a:r>
+              <a:rPr lang="en-GB" sz="2400" dirty="0">
+                <a:latin typeface="Times New Roman" pitchFamily="18" charset="0"/>
+                <a:cs typeface="Times New Roman" pitchFamily="18" charset="0"/>
+              </a:rPr>
+              <a:t> </a:t>
+            </a:r>
+            <a:r>
+              <a:rPr lang="en-GB" sz="2400" dirty="0" err="1">
+                <a:latin typeface="Times New Roman" pitchFamily="18" charset="0"/>
+                <a:cs typeface="Times New Roman" pitchFamily="18" charset="0"/>
+              </a:rPr>
+              <a:t>clasice</a:t>
+            </a:r>
+            <a:r>
+              <a:rPr lang="en-GB" sz="2400" dirty="0">
+                <a:latin typeface="Times New Roman" pitchFamily="18" charset="0"/>
+                <a:cs typeface="Times New Roman" pitchFamily="18" charset="0"/>
+              </a:rPr>
+              <a:t>.</a:t>
+            </a:r>
+            <a:endParaRPr lang="ro-RO" sz="2400" dirty="0">
+              <a:latin typeface="Times New Roman" pitchFamily="18" charset="0"/>
+              <a:cs typeface="Times New Roman" pitchFamily="18" charset="0"/>
+            </a:endParaRPr>
+          </a:p>
+          <a:p>
+            <a:pPr marL="342900" indent="-342900" algn="just">
+              <a:buFont typeface="Wingdings" panose="05000000000000000000" pitchFamily="2" charset="2"/>
+              <a:buChar char="§"/>
+            </a:pPr>
+            <a:r>
+              <a:rPr lang="ro-RO" sz="2400" dirty="0">
+                <a:latin typeface="Times New Roman" pitchFamily="18" charset="0"/>
+                <a:cs typeface="Times New Roman" pitchFamily="18" charset="0"/>
+              </a:rPr>
+              <a:t>Astfel, </a:t>
+            </a:r>
+            <a:r>
+              <a:rPr lang="ro-RO" sz="2400" b="1" dirty="0">
+                <a:latin typeface="Times New Roman" pitchFamily="18" charset="0"/>
+                <a:cs typeface="Times New Roman" pitchFamily="18" charset="0"/>
+              </a:rPr>
+              <a:t>l</a:t>
+            </a:r>
+            <a:r>
+              <a:rPr lang="vi-VN" sz="2400" b="1" dirty="0">
+                <a:latin typeface="Times New Roman" pitchFamily="18" charset="0"/>
+                <a:cs typeface="Times New Roman" pitchFamily="18" charset="0"/>
+              </a:rPr>
+              <a:t>imitele sistemelor relaţionale</a:t>
+            </a:r>
+            <a:r>
+              <a:rPr lang="vi-VN" sz="2400" dirty="0">
+                <a:latin typeface="Times New Roman" pitchFamily="18" charset="0"/>
+                <a:cs typeface="Times New Roman" pitchFamily="18" charset="0"/>
+              </a:rPr>
+              <a:t>, în special cele</a:t>
+            </a:r>
+            <a:r>
+              <a:rPr lang="ro-RO" sz="2400" dirty="0">
+                <a:latin typeface="Times New Roman" pitchFamily="18" charset="0"/>
+                <a:cs typeface="Times New Roman" pitchFamily="18" charset="0"/>
+              </a:rPr>
+              <a:t> </a:t>
+            </a:r>
+            <a:r>
+              <a:rPr lang="vi-VN" sz="2400" dirty="0">
+                <a:latin typeface="Times New Roman" pitchFamily="18" charset="0"/>
+                <a:cs typeface="Times New Roman" pitchFamily="18" charset="0"/>
+              </a:rPr>
+              <a:t>referitoare la volume mari de date şi complexitatea ridicată a datelor, au determinat evoluţia spre sistemele orientate obiect. </a:t>
+            </a:r>
+            <a:endParaRPr lang="ro-RO" sz="2400" dirty="0">
+              <a:latin typeface="Times New Roman" pitchFamily="18" charset="0"/>
+              <a:cs typeface="Times New Roman" pitchFamily="18" charset="0"/>
+            </a:endParaRPr>
+          </a:p>
+          <a:p>
+            <a:r>
+              <a:rPr lang="ro-RO" sz="2400" dirty="0">
+                <a:latin typeface="Times New Roman" pitchFamily="18" charset="0"/>
+                <a:cs typeface="Times New Roman" pitchFamily="18" charset="0"/>
+              </a:rPr>
+              <a:t>	</a:t>
+            </a:r>
+          </a:p>
+        </p:txBody>
+      </p:sp>
+      <p:sp>
+        <p:nvSpPr>
+          <p:cNvPr id="6" name="Rectangle 5"/>
+          <p:cNvSpPr/>
+          <p:nvPr/>
+        </p:nvSpPr>
+        <p:spPr>
+          <a:xfrm>
+            <a:off x="-15239" y="534145"/>
+            <a:ext cx="9159239" cy="739300"/>
+          </a:xfrm>
+          <a:prstGeom prst="rect">
+            <a:avLst/>
+          </a:prstGeom>
+          <a:solidFill>
+            <a:schemeClr val="bg1">
+              <a:lumMod val="50000"/>
+            </a:schemeClr>
+          </a:solidFill>
+          <a:ln>
+            <a:noFill/>
+          </a:ln>
+        </p:spPr>
+        <p:style>
+          <a:lnRef idx="2">
+            <a:schemeClr val="accent1">
+              <a:shade val="50000"/>
+            </a:schemeClr>
+          </a:lnRef>
+          <a:fillRef idx="1">
+            <a:schemeClr val="accent1"/>
+          </a:fillRef>
+          <a:effectRef idx="0">
+            <a:schemeClr val="accent1"/>
+          </a:effectRef>
+          <a:fontRef idx="minor">
+            <a:schemeClr val="lt1"/>
+          </a:fontRef>
+        </p:style>
+        <p:txBody>
+          <a:bodyPr rtlCol="0" anchor="ctr"/>
+          <a:lstStyle/>
+          <a:p>
+            <a:r>
+              <a:rPr lang="ro-RO" sz="2400" dirty="0">
+                <a:latin typeface="Times New Roman" panose="02020603050405020304" pitchFamily="18" charset="0"/>
+                <a:cs typeface="Times New Roman" panose="02020603050405020304" pitchFamily="18" charset="0"/>
+              </a:rPr>
               <a:t>	Ce a condus la apariția BDOO?</a:t>
             </a:r>
           </a:p>
@@ -15275,6 +17049,975 @@
     <p:extLst>
       <p:ext uri="{BB962C8B-B14F-4D97-AF65-F5344CB8AC3E}">
         <p14:creationId xmlns:p14="http://schemas.microsoft.com/office/powerpoint/2010/main" val="3231915794"/>
+      </p:ext>
+    </p:extLst>
+  </p:cSld>
+  <p:clrMapOvr>
+    <a:masterClrMapping/>
+  </p:clrMapOvr>
+</p:sld>
+</file>
+
+<file path=ppt/slides/slide40.xml><?xml version="1.0" encoding="utf-8"?>
+<p:sld xmlns:a="http://schemas.openxmlformats.org/drawingml/2006/main" xmlns:r="http://schemas.openxmlformats.org/officeDocument/2006/relationships" xmlns:p="http://schemas.openxmlformats.org/presentationml/2006/main">
+  <p:cSld>
+    <p:spTree>
+      <p:nvGrpSpPr>
+        <p:cNvPr id="1" name=""/>
+        <p:cNvGrpSpPr/>
+        <p:nvPr/>
+      </p:nvGrpSpPr>
+      <p:grpSpPr>
+        <a:xfrm>
+          <a:off x="0" y="0"/>
+          <a:ext cx="0" cy="0"/>
+          <a:chOff x="0" y="0"/>
+          <a:chExt cx="0" cy="0"/>
+        </a:xfrm>
+      </p:grpSpPr>
+      <p:sp>
+        <p:nvSpPr>
+          <p:cNvPr id="2" name="Title 1"/>
+          <p:cNvSpPr>
+            <a:spLocks noGrp="1"/>
+          </p:cNvSpPr>
+          <p:nvPr>
+            <p:ph type="title"/>
+          </p:nvPr>
+        </p:nvSpPr>
+        <p:spPr/>
+        <p:txBody>
+          <a:bodyPr>
+            <a:normAutofit fontScale="90000"/>
+          </a:bodyPr>
+          <a:lstStyle/>
+          <a:p>
+            <a:br>
+              <a:rPr lang="en-GB" dirty="0"/>
+            </a:br>
+            <a:endParaRPr lang="en-GB" dirty="0"/>
+          </a:p>
+        </p:txBody>
+      </p:sp>
+      <p:sp>
+        <p:nvSpPr>
+          <p:cNvPr id="3" name="Content Placeholder 2"/>
+          <p:cNvSpPr>
+            <a:spLocks noGrp="1"/>
+          </p:cNvSpPr>
+          <p:nvPr>
+            <p:ph idx="1"/>
+          </p:nvPr>
+        </p:nvSpPr>
+        <p:spPr/>
+        <p:txBody>
+          <a:bodyPr>
+            <a:normAutofit fontScale="77500" lnSpcReduction="20000"/>
+          </a:bodyPr>
+          <a:lstStyle/>
+          <a:p>
+            <a:r>
+              <a:rPr lang="ro-RO" b="1" dirty="0"/>
+              <a:t>Tehnologia este (încă) incompletă</a:t>
+            </a:r>
+            <a:endParaRPr lang="ro-RO" dirty="0"/>
+          </a:p>
+          <a:p>
+            <a:r>
+              <a:rPr lang="ro-RO" dirty="0"/>
+              <a:t>-</a:t>
+            </a:r>
+          </a:p>
+          <a:p>
+            <a:r>
+              <a:rPr lang="ro-RO" dirty="0"/>
+              <a:t>insuficient dezvoltat modul de gestiune al unui număr foarte mare de obiecte</a:t>
+            </a:r>
+          </a:p>
+          <a:p>
+            <a:r>
+              <a:rPr lang="ro-RO" dirty="0"/>
+              <a:t>-standardul nu e complet-limbaj de interogare incomplet -OQL (Object Query Language)-IDE-</a:t>
+            </a:r>
+          </a:p>
+          <a:p>
+            <a:r>
+              <a:rPr lang="ro-RO" dirty="0"/>
+              <a:t>urile moderne nu fac o verificare completă a semanticii și sintaxei</a:t>
+            </a:r>
+          </a:p>
+          <a:p>
+            <a:r>
+              <a:rPr lang="ro-RO" dirty="0"/>
+              <a:t>codului-</a:t>
+            </a:r>
+          </a:p>
+          <a:p>
+            <a:r>
+              <a:rPr lang="ro-RO" dirty="0"/>
+              <a:t>nu se face o verificare completă a tipului de dată (o variabilă căreiautilizatorul îi schimbă tipul de dată în mod eronat va cauza erori la runtime)</a:t>
+            </a:r>
+          </a:p>
+          <a:p>
+            <a:pPr algn="just">
+              <a:buFont typeface="Wingdings" panose="05000000000000000000" pitchFamily="2" charset="2"/>
+              <a:buChar char="§"/>
+            </a:pPr>
+            <a:endParaRPr lang="en-GB" dirty="0">
+              <a:latin typeface="Times New Roman" panose="02020603050405020304" pitchFamily="18" charset="0"/>
+              <a:cs typeface="Times New Roman" panose="02020603050405020304" pitchFamily="18" charset="0"/>
+            </a:endParaRPr>
+          </a:p>
+        </p:txBody>
+      </p:sp>
+      <p:sp>
+        <p:nvSpPr>
+          <p:cNvPr id="5" name="Rectangle 4"/>
+          <p:cNvSpPr/>
+          <p:nvPr/>
+        </p:nvSpPr>
+        <p:spPr>
+          <a:xfrm>
+            <a:off x="-15239" y="534145"/>
+            <a:ext cx="9159239" cy="739300"/>
+          </a:xfrm>
+          <a:prstGeom prst="rect">
+            <a:avLst/>
+          </a:prstGeom>
+          <a:solidFill>
+            <a:schemeClr val="bg1">
+              <a:lumMod val="50000"/>
+            </a:schemeClr>
+          </a:solidFill>
+          <a:ln>
+            <a:noFill/>
+          </a:ln>
+        </p:spPr>
+        <p:style>
+          <a:lnRef idx="2">
+            <a:schemeClr val="accent1">
+              <a:shade val="50000"/>
+            </a:schemeClr>
+          </a:lnRef>
+          <a:fillRef idx="1">
+            <a:schemeClr val="accent1"/>
+          </a:fillRef>
+          <a:effectRef idx="0">
+            <a:schemeClr val="accent1"/>
+          </a:effectRef>
+          <a:fontRef idx="minor">
+            <a:schemeClr val="lt1"/>
+          </a:fontRef>
+        </p:style>
+        <p:txBody>
+          <a:bodyPr rtlCol="0" anchor="ctr"/>
+          <a:lstStyle/>
+          <a:p>
+            <a:r>
+              <a:rPr lang="ro-RO" sz="2400" dirty="0">
+                <a:latin typeface="Times New Roman" panose="02020603050405020304" pitchFamily="18" charset="0"/>
+                <a:cs typeface="Times New Roman" panose="02020603050405020304" pitchFamily="18" charset="0"/>
+              </a:rPr>
+              <a:t>	</a:t>
+            </a:r>
+            <a:r>
+              <a:rPr lang="ro-RO" sz="2400" dirty="0">
+                <a:latin typeface="Times New Roman" panose="02020603050405020304" pitchFamily="18" charset="0"/>
+                <a:cs typeface="Times New Roman" panose="02020603050405020304" pitchFamily="18" charset="0"/>
+              </a:rPr>
+              <a:t>R</a:t>
+            </a:r>
+            <a:r>
+              <a:rPr lang="ro-RO" sz="2400" dirty="0"/>
+              <a:t>estricții legare de modificarea</a:t>
+            </a:r>
+            <a:r>
+              <a:rPr lang="ro-RO" sz="2400" dirty="0">
+                <a:latin typeface="Times New Roman" panose="02020603050405020304" pitchFamily="18" charset="0"/>
+                <a:cs typeface="Times New Roman" panose="02020603050405020304" pitchFamily="18" charset="0"/>
+              </a:rPr>
+              <a:t> unei scheme BDOO</a:t>
+            </a:r>
+            <a:r>
+              <a:rPr lang="ro-RO" sz="2400" dirty="0">
+                <a:latin typeface="Times New Roman" panose="02020603050405020304" pitchFamily="18" charset="0"/>
+                <a:cs typeface="Times New Roman" panose="02020603050405020304" pitchFamily="18" charset="0"/>
+              </a:rPr>
+              <a:t>	</a:t>
+            </a:r>
+          </a:p>
+        </p:txBody>
+      </p:sp>
+    </p:spTree>
+    <p:extLst>
+      <p:ext uri="{BB962C8B-B14F-4D97-AF65-F5344CB8AC3E}">
+        <p14:creationId xmlns:p14="http://schemas.microsoft.com/office/powerpoint/2010/main" val="1341385139"/>
+      </p:ext>
+    </p:extLst>
+  </p:cSld>
+  <p:clrMapOvr>
+    <a:masterClrMapping/>
+  </p:clrMapOvr>
+</p:sld>
+</file>
+
+<file path=ppt/slides/slide41.xml><?xml version="1.0" encoding="utf-8"?>
+<p:sld xmlns:a="http://schemas.openxmlformats.org/drawingml/2006/main" xmlns:r="http://schemas.openxmlformats.org/officeDocument/2006/relationships" xmlns:p="http://schemas.openxmlformats.org/presentationml/2006/main">
+  <p:cSld>
+    <p:spTree>
+      <p:nvGrpSpPr>
+        <p:cNvPr id="1" name=""/>
+        <p:cNvGrpSpPr/>
+        <p:nvPr/>
+      </p:nvGrpSpPr>
+      <p:grpSpPr>
+        <a:xfrm>
+          <a:off x="0" y="0"/>
+          <a:ext cx="0" cy="0"/>
+          <a:chOff x="0" y="0"/>
+          <a:chExt cx="0" cy="0"/>
+        </a:xfrm>
+      </p:grpSpPr>
+      <p:sp>
+        <p:nvSpPr>
+          <p:cNvPr id="2" name="Title 1"/>
+          <p:cNvSpPr>
+            <a:spLocks noGrp="1"/>
+          </p:cNvSpPr>
+          <p:nvPr>
+            <p:ph type="title"/>
+          </p:nvPr>
+        </p:nvSpPr>
+        <p:spPr/>
+        <p:txBody>
+          <a:bodyPr>
+            <a:normAutofit fontScale="90000"/>
+          </a:bodyPr>
+          <a:lstStyle/>
+          <a:p>
+            <a:br>
+              <a:rPr lang="en-GB" dirty="0"/>
+            </a:br>
+            <a:endParaRPr lang="en-GB" dirty="0"/>
+          </a:p>
+        </p:txBody>
+      </p:sp>
+      <p:sp>
+        <p:nvSpPr>
+          <p:cNvPr id="3" name="Content Placeholder 2"/>
+          <p:cNvSpPr>
+            <a:spLocks noGrp="1"/>
+          </p:cNvSpPr>
+          <p:nvPr>
+            <p:ph idx="1"/>
+          </p:nvPr>
+        </p:nvSpPr>
+        <p:spPr/>
+        <p:txBody>
+          <a:bodyPr>
+            <a:normAutofit fontScale="70000" lnSpcReduction="20000"/>
+          </a:bodyPr>
+          <a:lstStyle/>
+          <a:p>
+            <a:r>
+              <a:rPr lang="ro-RO" b="1" dirty="0"/>
+              <a:t>Modificările aduse schemei pot fi greu de implementat</a:t>
+            </a:r>
+            <a:endParaRPr lang="ro-RO" dirty="0"/>
+          </a:p>
+          <a:p>
+            <a:r>
+              <a:rPr lang="ro-RO" dirty="0"/>
+              <a:t>-</a:t>
+            </a:r>
+          </a:p>
+          <a:p>
+            <a:r>
+              <a:rPr lang="ro-RO" dirty="0"/>
+              <a:t>adăugarea / modificarea unei clase persistente</a:t>
+            </a:r>
+          </a:p>
+          <a:p>
+            <a:r>
+              <a:rPr lang="ro-RO" dirty="0"/>
+              <a:t>-</a:t>
+            </a:r>
+          </a:p>
+          <a:p>
+            <a:r>
+              <a:rPr lang="ro-RO" dirty="0"/>
+              <a:t>actualizare a aplicației</a:t>
+            </a:r>
+          </a:p>
+          <a:p>
+            <a:r>
+              <a:rPr lang="ro-RO" dirty="0"/>
+              <a:t>-</a:t>
+            </a:r>
+          </a:p>
+          <a:p>
+            <a:r>
+              <a:rPr lang="ro-RO" dirty="0"/>
+              <a:t>actualizări ale claselor care interacționează cu / depind de clasa noucreată / modificată</a:t>
+            </a:r>
+          </a:p>
+          <a:p>
+            <a:r>
+              <a:rPr lang="ro-RO" dirty="0"/>
+              <a:t>-</a:t>
+            </a:r>
+          </a:p>
+          <a:p>
+            <a:r>
+              <a:rPr lang="ro-RO" dirty="0"/>
+              <a:t>actualizările pot fi consumatoare de timp</a:t>
+            </a:r>
+          </a:p>
+          <a:p>
+            <a:r>
+              <a:rPr lang="ro-RO" dirty="0"/>
+              <a:t>-</a:t>
+            </a:r>
+          </a:p>
+          <a:p>
+            <a:r>
+              <a:rPr lang="ro-RO" dirty="0"/>
+              <a:t>modificarea schemei necesită de cele mai multe ori recompilarea întregiiaplicații</a:t>
+            </a:r>
+          </a:p>
+          <a:p>
+            <a:pPr algn="just">
+              <a:buFont typeface="Wingdings" panose="05000000000000000000" pitchFamily="2" charset="2"/>
+              <a:buChar char="§"/>
+            </a:pPr>
+            <a:endParaRPr lang="en-GB" dirty="0">
+              <a:latin typeface="Times New Roman" panose="02020603050405020304" pitchFamily="18" charset="0"/>
+              <a:cs typeface="Times New Roman" panose="02020603050405020304" pitchFamily="18" charset="0"/>
+            </a:endParaRPr>
+          </a:p>
+        </p:txBody>
+      </p:sp>
+      <p:sp>
+        <p:nvSpPr>
+          <p:cNvPr id="5" name="Rectangle 4"/>
+          <p:cNvSpPr/>
+          <p:nvPr/>
+        </p:nvSpPr>
+        <p:spPr>
+          <a:xfrm>
+            <a:off x="-15239" y="534145"/>
+            <a:ext cx="9159239" cy="739300"/>
+          </a:xfrm>
+          <a:prstGeom prst="rect">
+            <a:avLst/>
+          </a:prstGeom>
+          <a:solidFill>
+            <a:schemeClr val="bg1">
+              <a:lumMod val="50000"/>
+            </a:schemeClr>
+          </a:solidFill>
+          <a:ln>
+            <a:noFill/>
+          </a:ln>
+        </p:spPr>
+        <p:style>
+          <a:lnRef idx="2">
+            <a:schemeClr val="accent1">
+              <a:shade val="50000"/>
+            </a:schemeClr>
+          </a:lnRef>
+          <a:fillRef idx="1">
+            <a:schemeClr val="accent1"/>
+          </a:fillRef>
+          <a:effectRef idx="0">
+            <a:schemeClr val="accent1"/>
+          </a:effectRef>
+          <a:fontRef idx="minor">
+            <a:schemeClr val="lt1"/>
+          </a:fontRef>
+        </p:style>
+        <p:txBody>
+          <a:bodyPr rtlCol="0" anchor="ctr"/>
+          <a:lstStyle/>
+          <a:p>
+            <a:r>
+              <a:rPr lang="ro-RO" sz="2400" dirty="0">
+                <a:latin typeface="Times New Roman" panose="02020603050405020304" pitchFamily="18" charset="0"/>
+                <a:cs typeface="Times New Roman" panose="02020603050405020304" pitchFamily="18" charset="0"/>
+              </a:rPr>
+              <a:t>	</a:t>
+            </a:r>
+            <a:r>
+              <a:rPr lang="ro-RO" sz="2400" dirty="0">
+                <a:latin typeface="Times New Roman" panose="02020603050405020304" pitchFamily="18" charset="0"/>
+                <a:cs typeface="Times New Roman" panose="02020603050405020304" pitchFamily="18" charset="0"/>
+              </a:rPr>
+              <a:t>R</a:t>
+            </a:r>
+            <a:r>
+              <a:rPr lang="ro-RO" sz="2400" dirty="0"/>
+              <a:t>estricții legare de modificarea</a:t>
+            </a:r>
+            <a:r>
+              <a:rPr lang="ro-RO" sz="2400" dirty="0">
+                <a:latin typeface="Times New Roman" panose="02020603050405020304" pitchFamily="18" charset="0"/>
+                <a:cs typeface="Times New Roman" panose="02020603050405020304" pitchFamily="18" charset="0"/>
+              </a:rPr>
+              <a:t> unei scheme BDOO</a:t>
+            </a:r>
+            <a:r>
+              <a:rPr lang="ro-RO" sz="2400" dirty="0">
+                <a:latin typeface="Times New Roman" panose="02020603050405020304" pitchFamily="18" charset="0"/>
+                <a:cs typeface="Times New Roman" panose="02020603050405020304" pitchFamily="18" charset="0"/>
+              </a:rPr>
+              <a:t>	</a:t>
+            </a:r>
+          </a:p>
+        </p:txBody>
+      </p:sp>
+    </p:spTree>
+    <p:extLst>
+      <p:ext uri="{BB962C8B-B14F-4D97-AF65-F5344CB8AC3E}">
+        <p14:creationId xmlns:p14="http://schemas.microsoft.com/office/powerpoint/2010/main" val="4108764806"/>
+      </p:ext>
+    </p:extLst>
+  </p:cSld>
+  <p:clrMapOvr>
+    <a:masterClrMapping/>
+  </p:clrMapOvr>
+</p:sld>
+</file>
+
+<file path=ppt/slides/slide42.xml><?xml version="1.0" encoding="utf-8"?>
+<p:sld xmlns:a="http://schemas.openxmlformats.org/drawingml/2006/main" xmlns:r="http://schemas.openxmlformats.org/officeDocument/2006/relationships" xmlns:p="http://schemas.openxmlformats.org/presentationml/2006/main">
+  <p:cSld>
+    <p:spTree>
+      <p:nvGrpSpPr>
+        <p:cNvPr id="1" name=""/>
+        <p:cNvGrpSpPr/>
+        <p:nvPr/>
+      </p:nvGrpSpPr>
+      <p:grpSpPr>
+        <a:xfrm>
+          <a:off x="0" y="0"/>
+          <a:ext cx="0" cy="0"/>
+          <a:chOff x="0" y="0"/>
+          <a:chExt cx="0" cy="0"/>
+        </a:xfrm>
+      </p:grpSpPr>
+      <p:sp>
+        <p:nvSpPr>
+          <p:cNvPr id="2" name="Title 1"/>
+          <p:cNvSpPr>
+            <a:spLocks noGrp="1"/>
+          </p:cNvSpPr>
+          <p:nvPr>
+            <p:ph type="title"/>
+          </p:nvPr>
+        </p:nvSpPr>
+        <p:spPr/>
+        <p:txBody>
+          <a:bodyPr>
+            <a:normAutofit fontScale="90000"/>
+          </a:bodyPr>
+          <a:lstStyle/>
+          <a:p>
+            <a:br>
+              <a:rPr lang="en-GB" dirty="0"/>
+            </a:br>
+            <a:endParaRPr lang="en-GB" dirty="0"/>
+          </a:p>
+        </p:txBody>
+      </p:sp>
+      <p:sp>
+        <p:nvSpPr>
+          <p:cNvPr id="3" name="Content Placeholder 2"/>
+          <p:cNvSpPr>
+            <a:spLocks noGrp="1"/>
+          </p:cNvSpPr>
+          <p:nvPr>
+            <p:ph idx="1"/>
+          </p:nvPr>
+        </p:nvSpPr>
+        <p:spPr/>
+        <p:txBody>
+          <a:bodyPr>
+            <a:normAutofit fontScale="85000" lnSpcReduction="20000"/>
+          </a:bodyPr>
+          <a:lstStyle/>
+          <a:p>
+            <a:r>
+              <a:rPr lang="ro-RO" dirty="0"/>
+              <a:t>modificările la nivelul structurii claselor nu se propagă în restul aplicației(modificările aduse unui câmp trebuie efectuate manual în afara clasei)</a:t>
+            </a:r>
+          </a:p>
+          <a:p>
+            <a:r>
+              <a:rPr lang="ro-RO" dirty="0"/>
+              <a:t>-</a:t>
+            </a:r>
+          </a:p>
+          <a:p>
+            <a:r>
+              <a:rPr lang="ro-RO" dirty="0"/>
+              <a:t>nu există un suport explicit pentru crearea de componente din interogări</a:t>
+            </a:r>
+          </a:p>
+          <a:p>
+            <a:r>
+              <a:rPr lang="ro-RO" dirty="0"/>
+              <a:t>reutilizabile-</a:t>
+            </a:r>
+          </a:p>
+          <a:p>
+            <a:r>
+              <a:rPr lang="ro-RO" dirty="0"/>
+              <a:t>doar prin concatenarea mai multor interogări simple</a:t>
+            </a:r>
+          </a:p>
+          <a:p>
+            <a:r>
+              <a:rPr lang="ro-RO" dirty="0"/>
+              <a:t>-nu se pot “uni” dou</a:t>
+            </a:r>
+          </a:p>
+          <a:p>
+            <a:r>
+              <a:rPr lang="ro-RO" dirty="0"/>
+              <a:t>ă</a:t>
+            </a:r>
+          </a:p>
+          <a:p>
+            <a:r>
+              <a:rPr lang="ro-RO" dirty="0"/>
+              <a:t>clasela fel ca în cazul tabelelor (join)</a:t>
+            </a:r>
+          </a:p>
+          <a:p>
+            <a:pPr algn="just">
+              <a:buFont typeface="Wingdings" panose="05000000000000000000" pitchFamily="2" charset="2"/>
+              <a:buChar char="§"/>
+            </a:pPr>
+            <a:endParaRPr lang="en-GB" dirty="0">
+              <a:latin typeface="Times New Roman" panose="02020603050405020304" pitchFamily="18" charset="0"/>
+              <a:cs typeface="Times New Roman" panose="02020603050405020304" pitchFamily="18" charset="0"/>
+            </a:endParaRPr>
+          </a:p>
+        </p:txBody>
+      </p:sp>
+      <p:sp>
+        <p:nvSpPr>
+          <p:cNvPr id="5" name="Rectangle 4"/>
+          <p:cNvSpPr/>
+          <p:nvPr/>
+        </p:nvSpPr>
+        <p:spPr>
+          <a:xfrm>
+            <a:off x="-15239" y="534145"/>
+            <a:ext cx="9159239" cy="739300"/>
+          </a:xfrm>
+          <a:prstGeom prst="rect">
+            <a:avLst/>
+          </a:prstGeom>
+          <a:solidFill>
+            <a:schemeClr val="bg1">
+              <a:lumMod val="50000"/>
+            </a:schemeClr>
+          </a:solidFill>
+          <a:ln>
+            <a:noFill/>
+          </a:ln>
+        </p:spPr>
+        <p:style>
+          <a:lnRef idx="2">
+            <a:schemeClr val="accent1">
+              <a:shade val="50000"/>
+            </a:schemeClr>
+          </a:lnRef>
+          <a:fillRef idx="1">
+            <a:schemeClr val="accent1"/>
+          </a:fillRef>
+          <a:effectRef idx="0">
+            <a:schemeClr val="accent1"/>
+          </a:effectRef>
+          <a:fontRef idx="minor">
+            <a:schemeClr val="lt1"/>
+          </a:fontRef>
+        </p:style>
+        <p:txBody>
+          <a:bodyPr rtlCol="0" anchor="ctr"/>
+          <a:lstStyle/>
+          <a:p>
+            <a:r>
+              <a:rPr lang="ro-RO" sz="2400" dirty="0">
+                <a:latin typeface="Times New Roman" panose="02020603050405020304" pitchFamily="18" charset="0"/>
+                <a:cs typeface="Times New Roman" panose="02020603050405020304" pitchFamily="18" charset="0"/>
+              </a:rPr>
+              <a:t>	</a:t>
+            </a:r>
+            <a:r>
+              <a:rPr lang="ro-RO" sz="2400" dirty="0">
+                <a:latin typeface="Times New Roman" panose="02020603050405020304" pitchFamily="18" charset="0"/>
+                <a:cs typeface="Times New Roman" panose="02020603050405020304" pitchFamily="18" charset="0"/>
+              </a:rPr>
+              <a:t>R</a:t>
+            </a:r>
+            <a:r>
+              <a:rPr lang="ro-RO" sz="2400" dirty="0"/>
+              <a:t>estricții legare de modificarea</a:t>
+            </a:r>
+            <a:r>
+              <a:rPr lang="ro-RO" sz="2400" dirty="0">
+                <a:latin typeface="Times New Roman" panose="02020603050405020304" pitchFamily="18" charset="0"/>
+                <a:cs typeface="Times New Roman" panose="02020603050405020304" pitchFamily="18" charset="0"/>
+              </a:rPr>
+              <a:t> unei scheme BDOO</a:t>
+            </a:r>
+            <a:r>
+              <a:rPr lang="ro-RO" sz="2400" dirty="0">
+                <a:latin typeface="Times New Roman" panose="02020603050405020304" pitchFamily="18" charset="0"/>
+                <a:cs typeface="Times New Roman" panose="02020603050405020304" pitchFamily="18" charset="0"/>
+              </a:rPr>
+              <a:t>	</a:t>
+            </a:r>
+          </a:p>
+        </p:txBody>
+      </p:sp>
+    </p:spTree>
+    <p:extLst>
+      <p:ext uri="{BB962C8B-B14F-4D97-AF65-F5344CB8AC3E}">
+        <p14:creationId xmlns:p14="http://schemas.microsoft.com/office/powerpoint/2010/main" val="3600327291"/>
+      </p:ext>
+    </p:extLst>
+  </p:cSld>
+  <p:clrMapOvr>
+    <a:masterClrMapping/>
+  </p:clrMapOvr>
+</p:sld>
+</file>
+
+<file path=ppt/slides/slide43.xml><?xml version="1.0" encoding="utf-8"?>
+<p:sld xmlns:a="http://schemas.openxmlformats.org/drawingml/2006/main" xmlns:r="http://schemas.openxmlformats.org/officeDocument/2006/relationships" xmlns:p="http://schemas.openxmlformats.org/presentationml/2006/main">
+  <p:cSld>
+    <p:spTree>
+      <p:nvGrpSpPr>
+        <p:cNvPr id="1" name=""/>
+        <p:cNvGrpSpPr/>
+        <p:nvPr/>
+      </p:nvGrpSpPr>
+      <p:grpSpPr>
+        <a:xfrm>
+          <a:off x="0" y="0"/>
+          <a:ext cx="0" cy="0"/>
+          <a:chOff x="0" y="0"/>
+          <a:chExt cx="0" cy="0"/>
+        </a:xfrm>
+      </p:grpSpPr>
+      <p:sp>
+        <p:nvSpPr>
+          <p:cNvPr id="2" name="Title 1"/>
+          <p:cNvSpPr>
+            <a:spLocks noGrp="1"/>
+          </p:cNvSpPr>
+          <p:nvPr>
+            <p:ph type="title"/>
+          </p:nvPr>
+        </p:nvSpPr>
+        <p:spPr/>
+        <p:txBody>
+          <a:bodyPr>
+            <a:normAutofit fontScale="90000"/>
+          </a:bodyPr>
+          <a:lstStyle/>
+          <a:p>
+            <a:br>
+              <a:rPr lang="en-GB" dirty="0"/>
+            </a:br>
+            <a:endParaRPr lang="en-GB" dirty="0"/>
+          </a:p>
+        </p:txBody>
+      </p:sp>
+      <p:sp>
+        <p:nvSpPr>
+          <p:cNvPr id="3" name="Content Placeholder 2"/>
+          <p:cNvSpPr>
+            <a:spLocks noGrp="1"/>
+          </p:cNvSpPr>
+          <p:nvPr>
+            <p:ph idx="1"/>
+          </p:nvPr>
+        </p:nvSpPr>
+        <p:spPr/>
+        <p:txBody>
+          <a:bodyPr>
+            <a:normAutofit/>
+          </a:bodyPr>
+          <a:lstStyle/>
+          <a:p>
+            <a:r>
+              <a:rPr lang="ro-RO" dirty="0"/>
+              <a:t>Caracterisici obligatorii</a:t>
+            </a:r>
+          </a:p>
+          <a:p>
+            <a:r>
+              <a:rPr lang="ro-RO" dirty="0"/>
+              <a:t>-manipularea obiectelor complexe-identitatea obiectelor -încapsulare-</a:t>
+            </a:r>
+          </a:p>
+          <a:p>
+            <a:r>
+              <a:rPr lang="ro-RO" dirty="0"/>
+              <a:t>clase și tipuri</a:t>
+            </a:r>
+          </a:p>
+          <a:p>
+            <a:r>
+              <a:rPr lang="ro-RO" dirty="0"/>
+              <a:t>-ierarhii de clase sau tipuri-</a:t>
+            </a:r>
+          </a:p>
+          <a:p>
+            <a:r>
+              <a:rPr lang="ro-RO" dirty="0"/>
+              <a:t>supraîncărcare, suprapunere și legarea întârziată</a:t>
+            </a:r>
+          </a:p>
+          <a:p>
+            <a:r>
+              <a:rPr lang="ro-RO" dirty="0"/>
+              <a:t>-extensibilitate-completitudine</a:t>
+            </a:r>
+          </a:p>
+          <a:p>
+            <a:pPr algn="just">
+              <a:buFont typeface="Wingdings" panose="05000000000000000000" pitchFamily="2" charset="2"/>
+              <a:buChar char="§"/>
+            </a:pPr>
+            <a:endParaRPr lang="en-GB" dirty="0">
+              <a:latin typeface="Times New Roman" panose="02020603050405020304" pitchFamily="18" charset="0"/>
+              <a:cs typeface="Times New Roman" panose="02020603050405020304" pitchFamily="18" charset="0"/>
+            </a:endParaRPr>
+          </a:p>
+        </p:txBody>
+      </p:sp>
+      <p:sp>
+        <p:nvSpPr>
+          <p:cNvPr id="5" name="Rectangle 4"/>
+          <p:cNvSpPr/>
+          <p:nvPr/>
+        </p:nvSpPr>
+        <p:spPr>
+          <a:xfrm>
+            <a:off x="-15239" y="534145"/>
+            <a:ext cx="9159239" cy="739300"/>
+          </a:xfrm>
+          <a:prstGeom prst="rect">
+            <a:avLst/>
+          </a:prstGeom>
+          <a:solidFill>
+            <a:schemeClr val="bg1">
+              <a:lumMod val="50000"/>
+            </a:schemeClr>
+          </a:solidFill>
+          <a:ln>
+            <a:noFill/>
+          </a:ln>
+        </p:spPr>
+        <p:style>
+          <a:lnRef idx="2">
+            <a:schemeClr val="accent1">
+              <a:shade val="50000"/>
+            </a:schemeClr>
+          </a:lnRef>
+          <a:fillRef idx="1">
+            <a:schemeClr val="accent1"/>
+          </a:fillRef>
+          <a:effectRef idx="0">
+            <a:schemeClr val="accent1"/>
+          </a:effectRef>
+          <a:fontRef idx="minor">
+            <a:schemeClr val="lt1"/>
+          </a:fontRef>
+        </p:style>
+        <p:txBody>
+          <a:bodyPr rtlCol="0" anchor="ctr"/>
+          <a:lstStyle/>
+          <a:p>
+            <a:r>
+              <a:rPr lang="ro-RO" sz="2400" dirty="0">
+                <a:latin typeface="Times New Roman" panose="02020603050405020304" pitchFamily="18" charset="0"/>
+                <a:cs typeface="Times New Roman" panose="02020603050405020304" pitchFamily="18" charset="0"/>
+              </a:rPr>
+              <a:t>	</a:t>
+            </a:r>
+            <a:r>
+              <a:rPr lang="ro-RO" sz="2400" dirty="0">
+                <a:latin typeface="Times New Roman" panose="02020603050405020304" pitchFamily="18" charset="0"/>
+                <a:cs typeface="Times New Roman" panose="02020603050405020304" pitchFamily="18" charset="0"/>
+              </a:rPr>
+              <a:t>R</a:t>
+            </a:r>
+            <a:r>
+              <a:rPr lang="ro-RO" sz="2400" dirty="0"/>
+              <a:t>estricții legare de modificarea</a:t>
+            </a:r>
+            <a:r>
+              <a:rPr lang="ro-RO" sz="2400" dirty="0">
+                <a:latin typeface="Times New Roman" panose="02020603050405020304" pitchFamily="18" charset="0"/>
+                <a:cs typeface="Times New Roman" panose="02020603050405020304" pitchFamily="18" charset="0"/>
+              </a:rPr>
+              <a:t> unei scheme BDOO</a:t>
+            </a:r>
+            <a:r>
+              <a:rPr lang="ro-RO" sz="2400" dirty="0">
+                <a:latin typeface="Times New Roman" panose="02020603050405020304" pitchFamily="18" charset="0"/>
+                <a:cs typeface="Times New Roman" panose="02020603050405020304" pitchFamily="18" charset="0"/>
+              </a:rPr>
+              <a:t>	</a:t>
+            </a:r>
+          </a:p>
+        </p:txBody>
+      </p:sp>
+    </p:spTree>
+    <p:extLst>
+      <p:ext uri="{BB962C8B-B14F-4D97-AF65-F5344CB8AC3E}">
+        <p14:creationId xmlns:p14="http://schemas.microsoft.com/office/powerpoint/2010/main" val="1802865959"/>
+      </p:ext>
+    </p:extLst>
+  </p:cSld>
+  <p:clrMapOvr>
+    <a:masterClrMapping/>
+  </p:clrMapOvr>
+</p:sld>
+</file>
+
+<file path=ppt/slides/slide44.xml><?xml version="1.0" encoding="utf-8"?>
+<p:sld xmlns:a="http://schemas.openxmlformats.org/drawingml/2006/main" xmlns:r="http://schemas.openxmlformats.org/officeDocument/2006/relationships" xmlns:p="http://schemas.openxmlformats.org/presentationml/2006/main">
+  <p:cSld>
+    <p:spTree>
+      <p:nvGrpSpPr>
+        <p:cNvPr id="1" name=""/>
+        <p:cNvGrpSpPr/>
+        <p:nvPr/>
+      </p:nvGrpSpPr>
+      <p:grpSpPr>
+        <a:xfrm>
+          <a:off x="0" y="0"/>
+          <a:ext cx="0" cy="0"/>
+          <a:chOff x="0" y="0"/>
+          <a:chExt cx="0" cy="0"/>
+        </a:xfrm>
+      </p:grpSpPr>
+      <p:sp>
+        <p:nvSpPr>
+          <p:cNvPr id="2" name="Title 1"/>
+          <p:cNvSpPr>
+            <a:spLocks noGrp="1"/>
+          </p:cNvSpPr>
+          <p:nvPr>
+            <p:ph type="title"/>
+          </p:nvPr>
+        </p:nvSpPr>
+        <p:spPr/>
+        <p:txBody>
+          <a:bodyPr>
+            <a:normAutofit fontScale="90000"/>
+          </a:bodyPr>
+          <a:lstStyle/>
+          <a:p>
+            <a:br>
+              <a:rPr lang="en-GB" dirty="0"/>
+            </a:br>
+            <a:endParaRPr lang="en-GB" dirty="0"/>
+          </a:p>
+        </p:txBody>
+      </p:sp>
+      <p:sp>
+        <p:nvSpPr>
+          <p:cNvPr id="3" name="Content Placeholder 2"/>
+          <p:cNvSpPr>
+            <a:spLocks noGrp="1"/>
+          </p:cNvSpPr>
+          <p:nvPr>
+            <p:ph idx="1"/>
+          </p:nvPr>
+        </p:nvSpPr>
+        <p:spPr/>
+        <p:txBody>
+          <a:bodyPr>
+            <a:normAutofit/>
+          </a:bodyPr>
+          <a:lstStyle/>
+          <a:p>
+            <a:pPr algn="just">
+              <a:buFont typeface="Wingdings" panose="05000000000000000000" pitchFamily="2" charset="2"/>
+              <a:buChar char="§"/>
+            </a:pPr>
+            <a:endParaRPr lang="en-GB" dirty="0">
+              <a:latin typeface="Times New Roman" panose="02020603050405020304" pitchFamily="18" charset="0"/>
+              <a:cs typeface="Times New Roman" panose="02020603050405020304" pitchFamily="18" charset="0"/>
+            </a:endParaRPr>
+          </a:p>
+        </p:txBody>
+      </p:sp>
+      <p:sp>
+        <p:nvSpPr>
+          <p:cNvPr id="5" name="Rectangle 4"/>
+          <p:cNvSpPr/>
+          <p:nvPr/>
+        </p:nvSpPr>
+        <p:spPr>
+          <a:xfrm>
+            <a:off x="-15239" y="534145"/>
+            <a:ext cx="9159239" cy="739300"/>
+          </a:xfrm>
+          <a:prstGeom prst="rect">
+            <a:avLst/>
+          </a:prstGeom>
+          <a:solidFill>
+            <a:schemeClr val="bg1">
+              <a:lumMod val="50000"/>
+            </a:schemeClr>
+          </a:solidFill>
+          <a:ln>
+            <a:noFill/>
+          </a:ln>
+        </p:spPr>
+        <p:style>
+          <a:lnRef idx="2">
+            <a:schemeClr val="accent1">
+              <a:shade val="50000"/>
+            </a:schemeClr>
+          </a:lnRef>
+          <a:fillRef idx="1">
+            <a:schemeClr val="accent1"/>
+          </a:fillRef>
+          <a:effectRef idx="0">
+            <a:schemeClr val="accent1"/>
+          </a:effectRef>
+          <a:fontRef idx="minor">
+            <a:schemeClr val="lt1"/>
+          </a:fontRef>
+        </p:style>
+        <p:txBody>
+          <a:bodyPr rtlCol="0" anchor="ctr"/>
+          <a:lstStyle/>
+          <a:p>
+            <a:r>
+              <a:rPr lang="ro-RO" sz="2400" dirty="0">
+                <a:latin typeface="Times New Roman" panose="02020603050405020304" pitchFamily="18" charset="0"/>
+                <a:cs typeface="Times New Roman" panose="02020603050405020304" pitchFamily="18" charset="0"/>
+              </a:rPr>
+              <a:t>Bibliografie</a:t>
+            </a:r>
+          </a:p>
+        </p:txBody>
+      </p:sp>
+    </p:spTree>
+    <p:extLst>
+      <p:ext uri="{BB962C8B-B14F-4D97-AF65-F5344CB8AC3E}">
+        <p14:creationId xmlns:p14="http://schemas.microsoft.com/office/powerpoint/2010/main" val="1716528886"/>
       </p:ext>
     </p:extLst>
   </p:cSld>

</xml_diff>

<commit_message>
Actualizare font si bibliografie Varianta finala v2
</commit_message>
<xml_diff>
--- a/bdoo.pptx
+++ b/bdoo.pptx
@@ -11978,16 +11978,20 @@
           <a:bodyPr rtlCol="0" anchor="ctr"/>
           <a:lstStyle/>
           <a:p>
-            <a:pPr algn="just">
-              <a:buFont typeface="Wingdings" panose="05000000000000000000" pitchFamily="2" charset="2"/>
-              <a:buChar char="§"/>
-            </a:pPr>
+            <a:pPr algn="just"/>
+            <a:r>
+              <a:rPr lang="en-US" sz="2400" dirty="0">
+                <a:latin typeface="Times New Roman" panose="02020603050405020304" pitchFamily="18" charset="0"/>
+                <a:cs typeface="Times New Roman" panose="02020603050405020304" pitchFamily="18" charset="0"/>
+              </a:rPr>
+              <a:t>	</a:t>
+            </a:r>
             <a:r>
               <a:rPr lang="ro-RO" sz="2400" dirty="0">
                 <a:latin typeface="Times New Roman" panose="02020603050405020304" pitchFamily="18" charset="0"/>
                 <a:cs typeface="Times New Roman" panose="02020603050405020304" pitchFamily="18" charset="0"/>
               </a:rPr>
-              <a:t>(Gestiunea) </a:t>
+              <a:t>Gestiunea </a:t>
             </a:r>
             <a:r>
               <a:rPr lang="en-GB" sz="2400" dirty="0" err="1">
@@ -12580,7 +12584,21 @@
                 <a:latin typeface="Times New Roman" panose="02020603050405020304" pitchFamily="18" charset="0"/>
                 <a:cs typeface="Times New Roman" panose="02020603050405020304" pitchFamily="18" charset="0"/>
               </a:rPr>
-              <a:t> încapsulate3. </a:t>
+              <a:t> </a:t>
+            </a:r>
+            <a:r>
+              <a:rPr lang="en-GB" sz="2500" dirty="0" err="1">
+                <a:latin typeface="Times New Roman" panose="02020603050405020304" pitchFamily="18" charset="0"/>
+                <a:cs typeface="Times New Roman" panose="02020603050405020304" pitchFamily="18" charset="0"/>
+              </a:rPr>
+              <a:t>încapsulate</a:t>
+            </a:r>
+            <a:r>
+              <a:rPr lang="en-GB" sz="2500" dirty="0">
+                <a:latin typeface="Times New Roman" panose="02020603050405020304" pitchFamily="18" charset="0"/>
+                <a:cs typeface="Times New Roman" panose="02020603050405020304" pitchFamily="18" charset="0"/>
+              </a:rPr>
+              <a:t>. </a:t>
             </a:r>
             <a:r>
               <a:rPr lang="en-GB" sz="2500" dirty="0" err="1">
@@ -13150,7 +13168,10 @@
               <a:buNone/>
             </a:pPr>
             <a:r>
-              <a:rPr lang="ro-RO" dirty="0"/>
+              <a:rPr lang="ro-RO" dirty="0">
+                <a:latin typeface="Times New Roman" panose="02020603050405020304" pitchFamily="18" charset="0"/>
+                <a:cs typeface="Times New Roman" panose="02020603050405020304" pitchFamily="18" charset="0"/>
+              </a:rPr>
               <a:t>Un SGBDOO trebuie să utilizeze metode ce aparțin claselor din BDOO</a:t>
             </a:r>
           </a:p>
@@ -13160,7 +13181,10 @@
               <a:buChar char="§"/>
             </a:pPr>
             <a:r>
-              <a:rPr lang="ro-RO" dirty="0"/>
+              <a:rPr lang="ro-RO" dirty="0">
+                <a:latin typeface="Times New Roman" panose="02020603050405020304" pitchFamily="18" charset="0"/>
+                <a:cs typeface="Times New Roman" panose="02020603050405020304" pitchFamily="18" charset="0"/>
+              </a:rPr>
               <a:t>Clasele trebuie să fie compacte, încapsulate și ermetizate</a:t>
             </a:r>
           </a:p>
@@ -13170,7 +13194,10 @@
               <a:buChar char="§"/>
             </a:pPr>
             <a:r>
-              <a:rPr lang="ro-RO" dirty="0"/>
+              <a:rPr lang="ro-RO" dirty="0">
+                <a:latin typeface="Times New Roman" panose="02020603050405020304" pitchFamily="18" charset="0"/>
+                <a:cs typeface="Times New Roman" panose="02020603050405020304" pitchFamily="18" charset="0"/>
+              </a:rPr>
               <a:t>Încapsularea</a:t>
             </a:r>
           </a:p>
@@ -13180,7 +13207,10 @@
               <a:buChar char="§"/>
             </a:pPr>
             <a:r>
-              <a:rPr lang="ro-RO" dirty="0"/>
+              <a:rPr lang="ro-RO" dirty="0">
+                <a:latin typeface="Times New Roman" panose="02020603050405020304" pitchFamily="18" charset="0"/>
+                <a:cs typeface="Times New Roman" panose="02020603050405020304" pitchFamily="18" charset="0"/>
+              </a:rPr>
               <a:t>Asocierea dintre metode și datele prelucrate</a:t>
             </a:r>
           </a:p>
@@ -13190,7 +13220,10 @@
               <a:buChar char="§"/>
             </a:pPr>
             <a:r>
-              <a:rPr lang="ro-RO" dirty="0"/>
+              <a:rPr lang="ro-RO" dirty="0">
+                <a:latin typeface="Times New Roman" panose="02020603050405020304" pitchFamily="18" charset="0"/>
+                <a:cs typeface="Times New Roman" panose="02020603050405020304" pitchFamily="18" charset="0"/>
+              </a:rPr>
               <a:t>Poate scădea numărul de accesuri la datele din baza de date</a:t>
             </a:r>
           </a:p>
@@ -14101,7 +14134,10 @@
               <a:buNone/>
             </a:pPr>
             <a:r>
-              <a:rPr lang="ro-RO" dirty="0"/>
+              <a:rPr lang="ro-RO" dirty="0">
+                <a:latin typeface="Times New Roman" panose="02020603050405020304" pitchFamily="18" charset="0"/>
+                <a:cs typeface="Times New Roman" panose="02020603050405020304" pitchFamily="18" charset="0"/>
+              </a:rPr>
               <a:t>Un SGBDOO trebuie să fie deschise către alte sisteme</a:t>
             </a:r>
           </a:p>
@@ -14111,7 +14147,10 @@
               <a:buChar char="§"/>
             </a:pPr>
             <a:r>
-              <a:rPr lang="ro-RO" dirty="0"/>
+              <a:rPr lang="ro-RO" dirty="0">
+                <a:latin typeface="Times New Roman" panose="02020603050405020304" pitchFamily="18" charset="0"/>
+                <a:cs typeface="Times New Roman" panose="02020603050405020304" pitchFamily="18" charset="0"/>
+              </a:rPr>
               <a:t>posibilitatea de interfațare cu baze de date din alte SGBD-uri</a:t>
             </a:r>
           </a:p>
@@ -14121,7 +14160,10 @@
               <a:buChar char="§"/>
             </a:pPr>
             <a:r>
-              <a:rPr lang="ro-RO" dirty="0"/>
+              <a:rPr lang="ro-RO" dirty="0">
+                <a:latin typeface="Times New Roman" panose="02020603050405020304" pitchFamily="18" charset="0"/>
+                <a:cs typeface="Times New Roman" panose="02020603050405020304" pitchFamily="18" charset="0"/>
+              </a:rPr>
               <a:t>Interconectibilitate cu diverse limbaje: C#, C++, Java pentru interogări SQL</a:t>
             </a:r>
           </a:p>
@@ -14265,35 +14307,53 @@
               <a:buNone/>
             </a:pPr>
             <a:r>
-              <a:rPr lang="ro-RO" dirty="0"/>
+              <a:rPr lang="ro-RO" dirty="0">
+                <a:latin typeface="Times New Roman" panose="02020603050405020304" pitchFamily="18" charset="0"/>
+                <a:cs typeface="Times New Roman" panose="02020603050405020304" pitchFamily="18" charset="0"/>
+              </a:rPr>
               <a:t>Un SGBDOO trebuie să aibă toate avantajele SGBD-urilor relaționale</a:t>
             </a:r>
           </a:p>
           <a:p>
             <a:r>
-              <a:rPr lang="ro-RO" dirty="0"/>
+              <a:rPr lang="ro-RO" dirty="0">
+                <a:latin typeface="Times New Roman" panose="02020603050405020304" pitchFamily="18" charset="0"/>
+                <a:cs typeface="Times New Roman" panose="02020603050405020304" pitchFamily="18" charset="0"/>
+              </a:rPr>
               <a:t>Accesul la date prin intermediul unui limbaj de interogare (SQL)</a:t>
             </a:r>
           </a:p>
           <a:p>
             <a:r>
-              <a:rPr lang="ro-RO" dirty="0"/>
+              <a:rPr lang="ro-RO" dirty="0">
+                <a:latin typeface="Times New Roman" panose="02020603050405020304" pitchFamily="18" charset="0"/>
+                <a:cs typeface="Times New Roman" panose="02020603050405020304" pitchFamily="18" charset="0"/>
+              </a:rPr>
               <a:t>Independența aplicațiilor față de structura datelor </a:t>
             </a:r>
           </a:p>
           <a:p>
             <a:r>
-              <a:rPr lang="ro-RO" sz="3600" dirty="0"/>
+              <a:rPr lang="ro-RO" sz="3600" dirty="0">
+                <a:latin typeface="Times New Roman" panose="02020603050405020304" pitchFamily="18" charset="0"/>
+                <a:cs typeface="Times New Roman" panose="02020603050405020304" pitchFamily="18" charset="0"/>
+              </a:rPr>
               <a:t>î</a:t>
             </a:r>
             <a:r>
-              <a:rPr lang="ro-RO" dirty="0"/>
+              <a:rPr lang="ro-RO" dirty="0">
+                <a:latin typeface="Times New Roman" panose="02020603050405020304" pitchFamily="18" charset="0"/>
+                <a:cs typeface="Times New Roman" panose="02020603050405020304" pitchFamily="18" charset="0"/>
+              </a:rPr>
               <a:t>ntr-un SGBDOO accesul la date se face mai mult prin interfețe cu utilizatorul</a:t>
             </a:r>
           </a:p>
           <a:p>
             <a:r>
-              <a:rPr lang="ro-RO" dirty="0"/>
+              <a:rPr lang="ro-RO" dirty="0">
+                <a:latin typeface="Times New Roman" panose="02020603050405020304" pitchFamily="18" charset="0"/>
+                <a:cs typeface="Times New Roman" panose="02020603050405020304" pitchFamily="18" charset="0"/>
+              </a:rPr>
               <a:t>Obiectele se accesează prin pointeri/referințe</a:t>
             </a:r>
           </a:p>
@@ -14437,7 +14497,10 @@
               <a:buNone/>
             </a:pPr>
             <a:r>
-              <a:rPr lang="ro-RO" dirty="0"/>
+              <a:rPr lang="ro-RO" dirty="0">
+                <a:latin typeface="Times New Roman" panose="02020603050405020304" pitchFamily="18" charset="0"/>
+                <a:cs typeface="Times New Roman" panose="02020603050405020304" pitchFamily="18" charset="0"/>
+              </a:rPr>
               <a:t>Modificările aduse schemei pot fi greu de implementat</a:t>
             </a:r>
           </a:p>
@@ -14447,7 +14510,10 @@
               <a:buChar char="§"/>
             </a:pPr>
             <a:r>
-              <a:rPr lang="ro-RO" dirty="0"/>
+              <a:rPr lang="ro-RO" dirty="0">
+                <a:latin typeface="Times New Roman" panose="02020603050405020304" pitchFamily="18" charset="0"/>
+                <a:cs typeface="Times New Roman" panose="02020603050405020304" pitchFamily="18" charset="0"/>
+              </a:rPr>
               <a:t>Adăugarea / modificarea unei clase persistente</a:t>
             </a:r>
           </a:p>
@@ -14457,7 +14523,10 @@
               <a:buChar char="§"/>
             </a:pPr>
             <a:r>
-              <a:rPr lang="ro-RO" dirty="0"/>
+              <a:rPr lang="ro-RO" dirty="0">
+                <a:latin typeface="Times New Roman" panose="02020603050405020304" pitchFamily="18" charset="0"/>
+                <a:cs typeface="Times New Roman" panose="02020603050405020304" pitchFamily="18" charset="0"/>
+              </a:rPr>
               <a:t>Actualizare a aplicației</a:t>
             </a:r>
           </a:p>
@@ -14467,7 +14536,10 @@
               <a:buChar char="§"/>
             </a:pPr>
             <a:r>
-              <a:rPr lang="ro-RO" dirty="0"/>
+              <a:rPr lang="ro-RO" dirty="0">
+                <a:latin typeface="Times New Roman" panose="02020603050405020304" pitchFamily="18" charset="0"/>
+                <a:cs typeface="Times New Roman" panose="02020603050405020304" pitchFamily="18" charset="0"/>
+              </a:rPr>
               <a:t>actualizări ale claselor care interacționează cu / depind de clasa noucreată / modificată</a:t>
             </a:r>
           </a:p>
@@ -14477,7 +14549,10 @@
               <a:buChar char="§"/>
             </a:pPr>
             <a:r>
-              <a:rPr lang="ro-RO" dirty="0"/>
+              <a:rPr lang="ro-RO" dirty="0">
+                <a:latin typeface="Times New Roman" panose="02020603050405020304" pitchFamily="18" charset="0"/>
+                <a:cs typeface="Times New Roman" panose="02020603050405020304" pitchFamily="18" charset="0"/>
+              </a:rPr>
               <a:t>actualizările pot fi consumatoare de timp</a:t>
             </a:r>
           </a:p>
@@ -14487,7 +14562,10 @@
               <a:buChar char="§"/>
             </a:pPr>
             <a:r>
-              <a:rPr lang="ro-RO" dirty="0"/>
+              <a:rPr lang="ro-RO" dirty="0">
+                <a:latin typeface="Times New Roman" panose="02020603050405020304" pitchFamily="18" charset="0"/>
+                <a:cs typeface="Times New Roman" panose="02020603050405020304" pitchFamily="18" charset="0"/>
+              </a:rPr>
               <a:t>Modificarea schemei necesită de cele mai multe ori recompilarea întregiiaplicații</a:t>
             </a:r>
           </a:p>
@@ -14642,7 +14720,10 @@
               <a:buNone/>
             </a:pPr>
             <a:r>
-              <a:rPr lang="ro-RO" b="1" dirty="0"/>
+              <a:rPr lang="ro-RO" dirty="0">
+                <a:latin typeface="Times New Roman" panose="02020603050405020304" pitchFamily="18" charset="0"/>
+                <a:cs typeface="Times New Roman" panose="02020603050405020304" pitchFamily="18" charset="0"/>
+              </a:rPr>
               <a:t>Obiecte și relații compuse</a:t>
             </a:r>
           </a:p>
@@ -14652,7 +14733,10 @@
               <a:buChar char="§"/>
             </a:pPr>
             <a:r>
-              <a:rPr lang="ro-RO" dirty="0"/>
+              <a:rPr lang="ro-RO" dirty="0">
+                <a:latin typeface="Times New Roman" panose="02020603050405020304" pitchFamily="18" charset="0"/>
+                <a:cs typeface="Times New Roman" panose="02020603050405020304" pitchFamily="18" charset="0"/>
+              </a:rPr>
               <a:t>Un obiect poate conține în structura sa alte obiecte tip de date complexe</a:t>
             </a:r>
           </a:p>
@@ -14662,7 +14746,10 @@
               <a:buChar char="§"/>
             </a:pPr>
             <a:r>
-              <a:rPr lang="ro-RO" dirty="0"/>
+              <a:rPr lang="ro-RO" dirty="0">
+                <a:latin typeface="Times New Roman" panose="02020603050405020304" pitchFamily="18" charset="0"/>
+                <a:cs typeface="Times New Roman" panose="02020603050405020304" pitchFamily="18" charset="0"/>
+              </a:rPr>
               <a:t>Un obiect este o reprezentare mai fidelă a Entității din lumea reală pe careo modelează</a:t>
             </a:r>
           </a:p>
@@ -14672,7 +14759,10 @@
               <a:buChar char="§"/>
             </a:pPr>
             <a:r>
-              <a:rPr lang="ro-RO" dirty="0"/>
+              <a:rPr lang="ro-RO" dirty="0">
+                <a:latin typeface="Times New Roman" panose="02020603050405020304" pitchFamily="18" charset="0"/>
+                <a:cs typeface="Times New Roman" panose="02020603050405020304" pitchFamily="18" charset="0"/>
+              </a:rPr>
               <a:t>Gestiunea mai bună a datelor complexe, interconectate si se poate lucra cu o varietate mai mare de tipuri de date</a:t>
             </a:r>
           </a:p>
@@ -14827,10 +14917,12 @@
               <a:buNone/>
             </a:pPr>
             <a:r>
-              <a:rPr lang="ro-RO" b="1" dirty="0"/>
+              <a:rPr lang="ro-RO" dirty="0">
+                <a:latin typeface="Times New Roman" panose="02020603050405020304" pitchFamily="18" charset="0"/>
+                <a:cs typeface="Times New Roman" panose="02020603050405020304" pitchFamily="18" charset="0"/>
+              </a:rPr>
               <a:t>Dependența de limbaj</a:t>
             </a:r>
-            <a:endParaRPr lang="ro-RO" dirty="0"/>
           </a:p>
           <a:p>
             <a:pPr>
@@ -14838,7 +14930,10 @@
               <a:buChar char="§"/>
             </a:pPr>
             <a:r>
-              <a:rPr lang="ro-RO" dirty="0"/>
+              <a:rPr lang="ro-RO" dirty="0">
+                <a:latin typeface="Times New Roman" panose="02020603050405020304" pitchFamily="18" charset="0"/>
+                <a:cs typeface="Times New Roman" panose="02020603050405020304" pitchFamily="18" charset="0"/>
+              </a:rPr>
               <a:t>Un SGBDOO este strâns legat de limbajul care accesează datele prin intermediul API-ului (Application Programming Interface)-datele dintr-un SGBDOO sunt accesibile printr-un anumit limbaj, utilizând un anume API totuși, interfațarea  limbajului se poate face utilizând instrumente secundare(translatoare, adaptoare, marshalling, etc.)</a:t>
             </a:r>
           </a:p>
@@ -14998,7 +15093,10 @@
               <a:buNone/>
             </a:pPr>
             <a:r>
-              <a:rPr lang="ro-RO" b="1" dirty="0"/>
+              <a:rPr lang="ro-RO" dirty="0">
+                <a:latin typeface="Times New Roman" panose="02020603050405020304" pitchFamily="18" charset="0"/>
+                <a:cs typeface="Times New Roman" panose="02020603050405020304" pitchFamily="18" charset="0"/>
+              </a:rPr>
               <a:t>Extensibilitatea facilă</a:t>
             </a:r>
           </a:p>
@@ -15008,7 +15106,10 @@
               <a:buChar char="§"/>
             </a:pPr>
             <a:r>
-              <a:rPr lang="ro-RO" dirty="0"/>
+              <a:rPr lang="ro-RO" dirty="0">
+                <a:latin typeface="Times New Roman" panose="02020603050405020304" pitchFamily="18" charset="0"/>
+                <a:cs typeface="Times New Roman" panose="02020603050405020304" pitchFamily="18" charset="0"/>
+              </a:rPr>
               <a:t>SGBDOO permit crearea de noi tipuri de date pornind de la cele dejaexistente tipurile de dată nou create au adesea caracteristici comune, care pot fi definite într-o clasă de bază prin reducerea redundanței la nivel de cod și operații în sistemul dezvoltat</a:t>
             </a:r>
           </a:p>
@@ -15018,7 +15119,10 @@
               <a:buChar char="§"/>
             </a:pPr>
             <a:r>
-              <a:rPr lang="ro-RO" dirty="0"/>
+              <a:rPr lang="ro-RO" dirty="0">
+                <a:latin typeface="Times New Roman" panose="02020603050405020304" pitchFamily="18" charset="0"/>
+                <a:cs typeface="Times New Roman" panose="02020603050405020304" pitchFamily="18" charset="0"/>
+              </a:rPr>
               <a:t>Reducerea efortului necesar mentenanței și actualizării sistemului</a:t>
             </a:r>
           </a:p>
@@ -15203,7 +15307,10 @@
               <a:buNone/>
             </a:pPr>
             <a:r>
-              <a:rPr lang="ro-RO" b="1" dirty="0"/>
+              <a:rPr lang="ro-RO" dirty="0">
+                <a:latin typeface="Times New Roman" panose="02020603050405020304" pitchFamily="18" charset="0"/>
+                <a:cs typeface="Times New Roman" panose="02020603050405020304" pitchFamily="18" charset="0"/>
+              </a:rPr>
               <a:t>Este similară cu modelul din “lumea reală”, organizată ierarhic</a:t>
             </a:r>
           </a:p>
@@ -15213,7 +15320,10 @@
               <a:buChar char="§"/>
             </a:pPr>
             <a:r>
-              <a:rPr lang="ro-RO" dirty="0"/>
+              <a:rPr lang="ro-RO" dirty="0">
+                <a:latin typeface="Times New Roman" panose="02020603050405020304" pitchFamily="18" charset="0"/>
+                <a:cs typeface="Times New Roman" panose="02020603050405020304" pitchFamily="18" charset="0"/>
+              </a:rPr>
               <a:t>Ușor de reprezentat relații de tip părinte descendent</a:t>
             </a:r>
           </a:p>
@@ -15223,7 +15333,10 @@
               <a:buChar char="§"/>
             </a:pPr>
             <a:r>
-              <a:rPr lang="ro-RO" dirty="0"/>
+              <a:rPr lang="ro-RO" dirty="0">
+                <a:latin typeface="Times New Roman" panose="02020603050405020304" pitchFamily="18" charset="0"/>
+                <a:cs typeface="Times New Roman" panose="02020603050405020304" pitchFamily="18" charset="0"/>
+              </a:rPr>
               <a:t>Descrierea unei subcategorii (a unei subclase) nu implică copierea /repetarea proprietăților unei categorii cu grad mai înalt de generalitate</a:t>
             </a:r>
           </a:p>
@@ -15233,7 +15346,10 @@
               <a:buChar char="§"/>
             </a:pPr>
             <a:r>
-              <a:rPr lang="ro-RO" dirty="0"/>
+              <a:rPr lang="ro-RO" dirty="0">
+                <a:latin typeface="Times New Roman" panose="02020603050405020304" pitchFamily="18" charset="0"/>
+                <a:cs typeface="Times New Roman" panose="02020603050405020304" pitchFamily="18" charset="0"/>
+              </a:rPr>
               <a:t>Acces rapid și facil la componentele unei ierarhii</a:t>
             </a:r>
           </a:p>
@@ -15389,7 +15505,10 @@
               <a:buChar char="§"/>
             </a:pPr>
             <a:r>
-              <a:rPr lang="ro-RO" sz="2800" dirty="0"/>
+              <a:rPr lang="ro-RO" sz="2800" dirty="0">
+                <a:latin typeface="Times New Roman" panose="02020603050405020304" pitchFamily="18" charset="0"/>
+                <a:cs typeface="Times New Roman" panose="02020603050405020304" pitchFamily="18" charset="0"/>
+              </a:rPr>
               <a:t> Domeniul bazelor d Avantaje și limitări ale SGBDOOInterfațarea mai facilă cu sisteme / aplicații care nu sunt strâns legate de date</a:t>
             </a:r>
           </a:p>
@@ -15399,7 +15518,10 @@
               <a:buChar char="§"/>
             </a:pPr>
             <a:r>
-              <a:rPr lang="ro-RO" sz="2800" dirty="0"/>
+              <a:rPr lang="ro-RO" sz="2800" dirty="0">
+                <a:latin typeface="Times New Roman" panose="02020603050405020304" pitchFamily="18" charset="0"/>
+                <a:cs typeface="Times New Roman" panose="02020603050405020304" pitchFamily="18" charset="0"/>
+              </a:rPr>
               <a:t>Conversia obiectelor către alte structuri / modele de gestiune a datelor e maifacilă decât în cazul tabelelor</a:t>
             </a:r>
           </a:p>
@@ -15409,7 +15531,10 @@
               <a:buChar char="§"/>
             </a:pPr>
             <a:r>
-              <a:rPr lang="ro-RO" sz="2800" dirty="0"/>
+              <a:rPr lang="ro-RO" sz="2800" dirty="0">
+                <a:latin typeface="Times New Roman" panose="02020603050405020304" pitchFamily="18" charset="0"/>
+                <a:cs typeface="Times New Roman" panose="02020603050405020304" pitchFamily="18" charset="0"/>
+              </a:rPr>
               <a:t>Tabele sunt mai dificil de “mapat” pe alte structuri de date (multe etapeintermediare)-nu este necesar un limbaj de interogare pentru un SGBDOO (obiectele se potaccesa folosind limbaje imperative de uz general –C++, C#, Java etc.)</a:t>
             </a:r>
           </a:p>
@@ -15561,31 +15686,46 @@
           <a:lstStyle/>
           <a:p>
             <a:r>
-              <a:rPr lang="ro-RO" dirty="0"/>
+              <a:rPr lang="ro-RO" dirty="0">
+                <a:latin typeface="Times New Roman" panose="02020603050405020304" pitchFamily="18" charset="0"/>
+                <a:cs typeface="Times New Roman" panose="02020603050405020304" pitchFamily="18" charset="0"/>
+              </a:rPr>
               <a:t>Identitatea obiectelor se asigură mai ușor </a:t>
             </a:r>
           </a:p>
           <a:p>
             <a:r>
-              <a:rPr lang="ro-RO" dirty="0"/>
+              <a:rPr lang="ro-RO" dirty="0">
+                <a:latin typeface="Times New Roman" panose="02020603050405020304" pitchFamily="18" charset="0"/>
+                <a:cs typeface="Times New Roman" panose="02020603050405020304" pitchFamily="18" charset="0"/>
+              </a:rPr>
               <a:t>SGBD relaționale utilizează chei, care trebuie gestionate de utilizator</a:t>
             </a:r>
           </a:p>
           <a:p>
             <a:r>
-              <a:rPr lang="ro-RO" dirty="0"/>
+              <a:rPr lang="ro-RO" dirty="0">
+                <a:latin typeface="Times New Roman" panose="02020603050405020304" pitchFamily="18" charset="0"/>
+                <a:cs typeface="Times New Roman" panose="02020603050405020304" pitchFamily="18" charset="0"/>
+              </a:rPr>
               <a:t>SGBDOO asigură identitatea și unicitatea obiectelor în mod transparentfață de utilizator (prin conferirea de Object Ids)</a:t>
             </a:r>
           </a:p>
           <a:p>
             <a:r>
-              <a:rPr lang="ro-RO" dirty="0"/>
+              <a:rPr lang="ro-RO" dirty="0">
+                <a:latin typeface="Times New Roman" panose="02020603050405020304" pitchFamily="18" charset="0"/>
+                <a:cs typeface="Times New Roman" panose="02020603050405020304" pitchFamily="18" charset="0"/>
+              </a:rPr>
               <a:t>Posibilitate redusă de apariție a erorilor </a:t>
             </a:r>
           </a:p>
           <a:p>
             <a:r>
-              <a:rPr lang="ro-RO" dirty="0"/>
+              <a:rPr lang="ro-RO" dirty="0">
+                <a:latin typeface="Times New Roman" panose="02020603050405020304" pitchFamily="18" charset="0"/>
+                <a:cs typeface="Times New Roman" panose="02020603050405020304" pitchFamily="18" charset="0"/>
+              </a:rPr>
               <a:t>Nu există limitări cu privire la valorile care pot fi reținute într-un obiect</a:t>
             </a:r>
           </a:p>
@@ -15740,10 +15880,12 @@
               <a:buNone/>
             </a:pPr>
             <a:r>
-              <a:rPr lang="ro-RO" b="1" dirty="0"/>
+              <a:rPr lang="ro-RO" dirty="0">
+                <a:latin typeface="Times New Roman" panose="02020603050405020304" pitchFamily="18" charset="0"/>
+                <a:cs typeface="Times New Roman" panose="02020603050405020304" pitchFamily="18" charset="0"/>
+              </a:rPr>
               <a:t>Eficiența BDOO</a:t>
             </a:r>
-            <a:endParaRPr lang="ro-RO" dirty="0"/>
           </a:p>
           <a:p>
             <a:pPr>
@@ -15751,7 +15893,10 @@
               <a:buChar char="§"/>
             </a:pPr>
             <a:r>
-              <a:rPr lang="ro-RO" dirty="0"/>
+              <a:rPr lang="ro-RO" dirty="0">
+                <a:latin typeface="Times New Roman" panose="02020603050405020304" pitchFamily="18" charset="0"/>
+                <a:cs typeface="Times New Roman" panose="02020603050405020304" pitchFamily="18" charset="0"/>
+              </a:rPr>
               <a:t>În sisteme unde unui item (unui individ, concept etc) îi corespund volumemari de dateEx: evidența populației, a clienților unei companii sau a unor modele din diverse domenii științifice</a:t>
             </a:r>
           </a:p>
@@ -15761,7 +15906,10 @@
               <a:buChar char="§"/>
             </a:pPr>
             <a:r>
-              <a:rPr lang="ro-RO" dirty="0"/>
+              <a:rPr lang="ro-RO" dirty="0">
+                <a:latin typeface="Times New Roman" panose="02020603050405020304" pitchFamily="18" charset="0"/>
+                <a:cs typeface="Times New Roman" panose="02020603050405020304" pitchFamily="18" charset="0"/>
+              </a:rPr>
               <a:t>Avantaje:</a:t>
             </a:r>
           </a:p>
@@ -15770,7 +15918,10 @@
               <a:buNone/>
             </a:pPr>
             <a:r>
-              <a:rPr lang="ro-RO" dirty="0"/>
+              <a:rPr lang="ro-RO" dirty="0">
+                <a:latin typeface="Times New Roman" panose="02020603050405020304" pitchFamily="18" charset="0"/>
+                <a:cs typeface="Times New Roman" panose="02020603050405020304" pitchFamily="18" charset="0"/>
+              </a:rPr>
               <a:t>	Lucrul mai eficient cu memoria</a:t>
             </a:r>
           </a:p>
@@ -15779,7 +15930,10 @@
               <a:buNone/>
             </a:pPr>
             <a:r>
-              <a:rPr lang="ro-RO" dirty="0"/>
+              <a:rPr lang="ro-RO" dirty="0">
+                <a:latin typeface="Times New Roman" panose="02020603050405020304" pitchFamily="18" charset="0"/>
+                <a:cs typeface="Times New Roman" panose="02020603050405020304" pitchFamily="18" charset="0"/>
+              </a:rPr>
               <a:t>	Organizare mai bună a datelor </a:t>
             </a:r>
           </a:p>
@@ -15788,7 +15942,10 @@
               <a:buNone/>
             </a:pPr>
             <a:r>
-              <a:rPr lang="ro-RO" dirty="0"/>
+              <a:rPr lang="ro-RO" dirty="0">
+                <a:latin typeface="Times New Roman" panose="02020603050405020304" pitchFamily="18" charset="0"/>
+                <a:cs typeface="Times New Roman" panose="02020603050405020304" pitchFamily="18" charset="0"/>
+              </a:rPr>
               <a:t>	În multe situații, complexitate scăzută a operațiilor de căutare, actualizare etc. (de la O(n) la O(1) )</a:t>
             </a:r>
           </a:p>
@@ -16727,7 +16884,10 @@
               <a:buChar char="§"/>
             </a:pPr>
             <a:r>
-              <a:rPr lang="ro-RO" dirty="0"/>
+              <a:rPr lang="ro-RO" dirty="0">
+                <a:latin typeface="Times New Roman" panose="02020603050405020304" pitchFamily="18" charset="0"/>
+                <a:cs typeface="Times New Roman" panose="02020603050405020304" pitchFamily="18" charset="0"/>
+              </a:rPr>
               <a:t>Un model de date unitar într-un SGBDOO nu este necesară separarea modelului bazei de date demodelul aplicației</a:t>
             </a:r>
           </a:p>
@@ -16737,7 +16897,10 @@
               <a:buChar char="§"/>
             </a:pPr>
             <a:r>
-              <a:rPr lang="ro-RO" dirty="0"/>
+              <a:rPr lang="ro-RO" dirty="0">
+                <a:latin typeface="Times New Roman" panose="02020603050405020304" pitchFamily="18" charset="0"/>
+                <a:cs typeface="Times New Roman" panose="02020603050405020304" pitchFamily="18" charset="0"/>
+              </a:rPr>
               <a:t>Datele pot fi strâns corelate cu modul de gestiune al lor (cu operațiile care se pot efectua cu acestea)</a:t>
             </a:r>
           </a:p>
@@ -16747,7 +16910,10 @@
               <a:buChar char="§"/>
             </a:pPr>
             <a:r>
-              <a:rPr lang="ro-RO" dirty="0"/>
+              <a:rPr lang="ro-RO" dirty="0">
+                <a:latin typeface="Times New Roman" panose="02020603050405020304" pitchFamily="18" charset="0"/>
+                <a:cs typeface="Times New Roman" panose="02020603050405020304" pitchFamily="18" charset="0"/>
+              </a:rPr>
               <a:t>Componentele care stochează datele și cele care le gestionează pot fiobiecte diferite din același sistem</a:t>
             </a:r>
           </a:p>
@@ -16903,20 +17069,11 @@
               <a:buChar char="§"/>
             </a:pPr>
             <a:r>
-              <a:rPr lang="ro-RO" b="1" dirty="0"/>
-              <a:t>Tehnologia este (încă) incompletă  </a:t>
-            </a:r>
-            <a:r>
-              <a:rPr lang="ro-RO" dirty="0"/>
-              <a:t>și</a:t>
-            </a:r>
-            <a:r>
-              <a:rPr lang="ro-RO" b="1" dirty="0"/>
-              <a:t> </a:t>
-            </a:r>
-            <a:r>
-              <a:rPr lang="ro-RO" dirty="0"/>
-              <a:t>insuficient dezvoltată prin modul de gestiune al unui număr foarte mare de obiecte</a:t>
+              <a:rPr lang="ro-RO" dirty="0">
+                <a:latin typeface="Times New Roman" panose="02020603050405020304" pitchFamily="18" charset="0"/>
+                <a:cs typeface="Times New Roman" panose="02020603050405020304" pitchFamily="18" charset="0"/>
+              </a:rPr>
+              <a:t>Tehnologia este (încă) incompletă  și insuficient dezvoltată prin modul de gestiune al unui număr foarte mare de obiecte</a:t>
             </a:r>
           </a:p>
           <a:p>
@@ -16925,7 +17082,10 @@
               <a:buChar char="§"/>
             </a:pPr>
             <a:r>
-              <a:rPr lang="ro-RO" dirty="0"/>
+              <a:rPr lang="ro-RO" dirty="0">
+                <a:latin typeface="Times New Roman" panose="02020603050405020304" pitchFamily="18" charset="0"/>
+                <a:cs typeface="Times New Roman" panose="02020603050405020304" pitchFamily="18" charset="0"/>
+              </a:rPr>
               <a:t>Standardul nu e complet-limbaj de interogare incomplet -OQL (Object Query Language)-IDEurile moderne nu fac o verificare completă a semanticii și sintaxei codului.</a:t>
             </a:r>
           </a:p>
@@ -16935,7 +17095,10 @@
               <a:buChar char="§"/>
             </a:pPr>
             <a:r>
-              <a:rPr lang="ro-RO" dirty="0"/>
+              <a:rPr lang="ro-RO" dirty="0">
+                <a:latin typeface="Times New Roman" panose="02020603050405020304" pitchFamily="18" charset="0"/>
+                <a:cs typeface="Times New Roman" panose="02020603050405020304" pitchFamily="18" charset="0"/>
+              </a:rPr>
               <a:t>nu se face o verificare completă a tipului de dată (o variabilă căreiautilizatorul îi schimbă tipul de dată în mod eronat va cauza erori la runtime)</a:t>
             </a:r>
           </a:p>
@@ -17090,10 +17253,12 @@
               <a:buNone/>
             </a:pPr>
             <a:r>
-              <a:rPr lang="ro-RO" b="1" dirty="0"/>
+              <a:rPr lang="ro-RO" dirty="0">
+                <a:latin typeface="Times New Roman" panose="02020603050405020304" pitchFamily="18" charset="0"/>
+                <a:cs typeface="Times New Roman" panose="02020603050405020304" pitchFamily="18" charset="0"/>
+              </a:rPr>
               <a:t>Modificările aduse schemei pot fi greu de implementat</a:t>
             </a:r>
-            <a:endParaRPr lang="ro-RO" dirty="0"/>
           </a:p>
           <a:p>
             <a:pPr>
@@ -17101,7 +17266,10 @@
               <a:buChar char="§"/>
             </a:pPr>
             <a:r>
-              <a:rPr lang="ro-RO" dirty="0"/>
+              <a:rPr lang="ro-RO" dirty="0">
+                <a:latin typeface="Times New Roman" panose="02020603050405020304" pitchFamily="18" charset="0"/>
+                <a:cs typeface="Times New Roman" panose="02020603050405020304" pitchFamily="18" charset="0"/>
+              </a:rPr>
               <a:t>Adăugarea / modificarea unei clase persistente</a:t>
             </a:r>
           </a:p>
@@ -17111,7 +17279,10 @@
               <a:buChar char="§"/>
             </a:pPr>
             <a:r>
-              <a:rPr lang="ro-RO" dirty="0"/>
+              <a:rPr lang="ro-RO" dirty="0">
+                <a:latin typeface="Times New Roman" panose="02020603050405020304" pitchFamily="18" charset="0"/>
+                <a:cs typeface="Times New Roman" panose="02020603050405020304" pitchFamily="18" charset="0"/>
+              </a:rPr>
               <a:t>Actualizare a aplicației</a:t>
             </a:r>
           </a:p>
@@ -17121,7 +17292,10 @@
               <a:buChar char="§"/>
             </a:pPr>
             <a:r>
-              <a:rPr lang="ro-RO" dirty="0"/>
+              <a:rPr lang="ro-RO" dirty="0">
+                <a:latin typeface="Times New Roman" panose="02020603050405020304" pitchFamily="18" charset="0"/>
+                <a:cs typeface="Times New Roman" panose="02020603050405020304" pitchFamily="18" charset="0"/>
+              </a:rPr>
               <a:t>Actualizări ale claselor care interacționează cu / depind de clasa noucreată / modificată</a:t>
             </a:r>
           </a:p>
@@ -17131,7 +17305,10 @@
               <a:buChar char="§"/>
             </a:pPr>
             <a:r>
-              <a:rPr lang="ro-RO" dirty="0"/>
+              <a:rPr lang="ro-RO" dirty="0">
+                <a:latin typeface="Times New Roman" panose="02020603050405020304" pitchFamily="18" charset="0"/>
+                <a:cs typeface="Times New Roman" panose="02020603050405020304" pitchFamily="18" charset="0"/>
+              </a:rPr>
               <a:t>Actualizările pot fi consumatoare de timp</a:t>
             </a:r>
           </a:p>
@@ -17141,7 +17318,10 @@
               <a:buChar char="§"/>
             </a:pPr>
             <a:r>
-              <a:rPr lang="ro-RO" dirty="0"/>
+              <a:rPr lang="ro-RO" dirty="0">
+                <a:latin typeface="Times New Roman" panose="02020603050405020304" pitchFamily="18" charset="0"/>
+                <a:cs typeface="Times New Roman" panose="02020603050405020304" pitchFamily="18" charset="0"/>
+              </a:rPr>
               <a:t>Modificarea schemei necesită de cele mai multe ori recompilarea întregiiaplicații</a:t>
             </a:r>
           </a:p>
@@ -17297,7 +17477,10 @@
               <a:buChar char="§"/>
             </a:pPr>
             <a:r>
-              <a:rPr lang="ro-RO" dirty="0"/>
+              <a:rPr lang="ro-RO" dirty="0">
+                <a:latin typeface="Times New Roman" panose="02020603050405020304" pitchFamily="18" charset="0"/>
+                <a:cs typeface="Times New Roman" panose="02020603050405020304" pitchFamily="18" charset="0"/>
+              </a:rPr>
               <a:t>Modificările la nivelul structurii claselor nu se propagă în restul aplicației(modificările aduse unui câmp trebuie efectuate manual în afara clasei)</a:t>
             </a:r>
           </a:p>
@@ -17307,7 +17490,10 @@
               <a:buChar char="§"/>
             </a:pPr>
             <a:r>
-              <a:rPr lang="ro-RO" dirty="0"/>
+              <a:rPr lang="ro-RO" dirty="0">
+                <a:latin typeface="Times New Roman" panose="02020603050405020304" pitchFamily="18" charset="0"/>
+                <a:cs typeface="Times New Roman" panose="02020603050405020304" pitchFamily="18" charset="0"/>
+              </a:rPr>
               <a:t>Nu există un suport explicit pentru crearea de componente din interogări</a:t>
             </a:r>
           </a:p>
@@ -17317,7 +17503,10 @@
               <a:buChar char="§"/>
             </a:pPr>
             <a:r>
-              <a:rPr lang="ro-RO" dirty="0"/>
+              <a:rPr lang="ro-RO" dirty="0">
+                <a:latin typeface="Times New Roman" panose="02020603050405020304" pitchFamily="18" charset="0"/>
+                <a:cs typeface="Times New Roman" panose="02020603050405020304" pitchFamily="18" charset="0"/>
+              </a:rPr>
               <a:t>Reutilizabile-doar prin concatenarea mai multor interogări simple</a:t>
             </a:r>
           </a:p>
@@ -17327,7 +17516,10 @@
               <a:buChar char="§"/>
             </a:pPr>
             <a:r>
-              <a:rPr lang="ro-RO" dirty="0"/>
+              <a:rPr lang="ro-RO" dirty="0">
+                <a:latin typeface="Times New Roman" panose="02020603050405020304" pitchFamily="18" charset="0"/>
+                <a:cs typeface="Times New Roman" panose="02020603050405020304" pitchFamily="18" charset="0"/>
+              </a:rPr>
               <a:t>Nu se pot “uni” două clase la fel ca în cazul tabelelor (join).</a:t>
             </a:r>
           </a:p>
@@ -17483,7 +17675,10 @@
               <a:buChar char="§"/>
             </a:pPr>
             <a:r>
-              <a:rPr lang="ro-RO" dirty="0"/>
+              <a:rPr lang="ro-RO" dirty="0">
+                <a:latin typeface="Times New Roman" panose="02020603050405020304" pitchFamily="18" charset="0"/>
+                <a:cs typeface="Times New Roman" panose="02020603050405020304" pitchFamily="18" charset="0"/>
+              </a:rPr>
               <a:t>Caracterisici obligatorii</a:t>
             </a:r>
           </a:p>
@@ -17493,7 +17688,10 @@
               <a:buChar char="§"/>
             </a:pPr>
             <a:r>
-              <a:rPr lang="ro-RO" dirty="0"/>
+              <a:rPr lang="ro-RO" dirty="0">
+                <a:latin typeface="Times New Roman" panose="02020603050405020304" pitchFamily="18" charset="0"/>
+                <a:cs typeface="Times New Roman" panose="02020603050405020304" pitchFamily="18" charset="0"/>
+              </a:rPr>
               <a:t>Manipularea obiectelor complexe, identitatea obiectelor și încapsularea de clase și tipuri</a:t>
             </a:r>
           </a:p>
@@ -17503,7 +17701,10 @@
               <a:buChar char="§"/>
             </a:pPr>
             <a:r>
-              <a:rPr lang="ro-RO" dirty="0"/>
+              <a:rPr lang="ro-RO" dirty="0">
+                <a:latin typeface="Times New Roman" panose="02020603050405020304" pitchFamily="18" charset="0"/>
+                <a:cs typeface="Times New Roman" panose="02020603050405020304" pitchFamily="18" charset="0"/>
+              </a:rPr>
               <a:t>Ierarhii de clase sau tipuri de obiecte</a:t>
             </a:r>
           </a:p>
@@ -17513,7 +17714,10 @@
               <a:buChar char="§"/>
             </a:pPr>
             <a:r>
-              <a:rPr lang="ro-RO" dirty="0"/>
+              <a:rPr lang="ro-RO" dirty="0">
+                <a:latin typeface="Times New Roman" panose="02020603050405020304" pitchFamily="18" charset="0"/>
+                <a:cs typeface="Times New Roman" panose="02020603050405020304" pitchFamily="18" charset="0"/>
+              </a:rPr>
               <a:t>Supraîncărcare, suprapunere și legarea întârziată</a:t>
             </a:r>
           </a:p>
@@ -17523,7 +17727,10 @@
               <a:buChar char="§"/>
             </a:pPr>
             <a:r>
-              <a:rPr lang="ro-RO" dirty="0"/>
+              <a:rPr lang="ro-RO" dirty="0">
+                <a:latin typeface="Times New Roman" panose="02020603050405020304" pitchFamily="18" charset="0"/>
+                <a:cs typeface="Times New Roman" panose="02020603050405020304" pitchFamily="18" charset="0"/>
+              </a:rPr>
               <a:t>Extensibilitate-completitudine</a:t>
             </a:r>
           </a:p>
@@ -17646,14 +17853,24 @@
         <p:spPr/>
         <p:txBody>
           <a:bodyPr>
-            <a:normAutofit fontScale="90000"/>
+            <a:noAutofit/>
           </a:bodyPr>
           <a:lstStyle/>
           <a:p>
+            <a:pPr marL="742950" indent="-742950">
+              <a:buFont typeface="+mj-lt"/>
+              <a:buAutoNum type="arabicPeriod"/>
+            </a:pPr>
             <a:br>
-              <a:rPr lang="en-GB" dirty="0"/>
+              <a:rPr lang="en-GB" sz="3600" dirty="0">
+                <a:latin typeface="Times New Roman" panose="02020603050405020304" pitchFamily="18" charset="0"/>
+                <a:cs typeface="Times New Roman" panose="02020603050405020304" pitchFamily="18" charset="0"/>
+              </a:rPr>
             </a:br>
-            <a:endParaRPr lang="en-GB" dirty="0"/>
+            <a:endParaRPr lang="en-GB" sz="3600" dirty="0">
+              <a:latin typeface="Times New Roman" panose="02020603050405020304" pitchFamily="18" charset="0"/>
+              <a:cs typeface="Times New Roman" panose="02020603050405020304" pitchFamily="18" charset="0"/>
+            </a:endParaRPr>
           </a:p>
         </p:txBody>
       </p:sp>
@@ -17674,11 +17891,73 @@
           </a:bodyPr>
           <a:lstStyle/>
           <a:p>
-            <a:pPr algn="just">
-              <a:buFont typeface="Wingdings" panose="05000000000000000000" pitchFamily="2" charset="2"/>
-              <a:buChar char="§"/>
-            </a:pPr>
-            <a:endParaRPr lang="en-GB" dirty="0">
+            <a:pPr marL="514350" indent="-514350">
+              <a:buFont typeface="+mj-lt"/>
+              <a:buAutoNum type="arabicPeriod"/>
+            </a:pPr>
+            <a:r>
+              <a:rPr lang="en-US" sz="2800" u="sng">
+                <a:latin typeface="Times New Roman" panose="02020603050405020304" pitchFamily="18" charset="0"/>
+                <a:cs typeface="Times New Roman" panose="02020603050405020304" pitchFamily="18" charset="0"/>
+                <a:hlinkClick r:id="rId2"/>
+              </a:rPr>
+              <a:t>http://bd.ase.ro/uploads/bd_curs/Curs_BD_Lungu,Botha.pdf</a:t>
+            </a:r>
+            <a:endParaRPr lang="en-US" sz="2800">
+              <a:latin typeface="Times New Roman" panose="02020603050405020304" pitchFamily="18" charset="0"/>
+              <a:cs typeface="Times New Roman" panose="02020603050405020304" pitchFamily="18" charset="0"/>
+            </a:endParaRPr>
+          </a:p>
+          <a:p>
+            <a:pPr marL="514350" indent="-514350">
+              <a:buFont typeface="+mj-lt"/>
+              <a:buAutoNum type="arabicPeriod"/>
+            </a:pPr>
+            <a:r>
+              <a:rPr lang="en-US" sz="2800">
+                <a:latin typeface="Times New Roman" panose="02020603050405020304" pitchFamily="18" charset="0"/>
+                <a:cs typeface="Times New Roman" panose="02020603050405020304" pitchFamily="18" charset="0"/>
+                <a:hlinkClick r:id="rId3"/>
+              </a:rPr>
+              <a:t>http://www.scrigroup.com/calculatoare/baze-de-date/BAZE-DE-DATE-ORIENTATE-PE-OBIE33193.php</a:t>
+            </a:r>
+            <a:endParaRPr lang="en-US" sz="2800">
+              <a:latin typeface="Times New Roman" panose="02020603050405020304" pitchFamily="18" charset="0"/>
+              <a:cs typeface="Times New Roman" panose="02020603050405020304" pitchFamily="18" charset="0"/>
+            </a:endParaRPr>
+          </a:p>
+          <a:p>
+            <a:pPr marL="514350" indent="-514350">
+              <a:buFont typeface="+mj-lt"/>
+              <a:buAutoNum type="arabicPeriod"/>
+            </a:pPr>
+            <a:r>
+              <a:rPr lang="en-US" sz="2800">
+                <a:latin typeface="Times New Roman" panose="02020603050405020304" pitchFamily="18" charset="0"/>
+                <a:cs typeface="Times New Roman" panose="02020603050405020304" pitchFamily="18" charset="0"/>
+                <a:hlinkClick r:id="rId4"/>
+              </a:rPr>
+              <a:t>http://people.cs.pitt.edu/~chang/156/19oodb.html</a:t>
+            </a:r>
+            <a:endParaRPr lang="en-US" sz="2800">
+              <a:latin typeface="Times New Roman" panose="02020603050405020304" pitchFamily="18" charset="0"/>
+              <a:cs typeface="Times New Roman" panose="02020603050405020304" pitchFamily="18" charset="0"/>
+            </a:endParaRPr>
+          </a:p>
+          <a:p>
+            <a:pPr marL="514350" indent="-514350">
+              <a:buFont typeface="+mj-lt"/>
+              <a:buAutoNum type="arabicPeriod"/>
+            </a:pPr>
+            <a:r>
+              <a:rPr lang="en-US" sz="2800">
+                <a:latin typeface="Times New Roman" panose="02020603050405020304" pitchFamily="18" charset="0"/>
+                <a:cs typeface="Times New Roman" panose="02020603050405020304" pitchFamily="18" charset="0"/>
+                <a:hlinkClick r:id="rId5"/>
+              </a:rPr>
+              <a:t>https://www.academia.edu/26486533/BDOO_Slides</a:t>
+            </a:r>
+            <a:endParaRPr lang="en-US" sz="2800">
               <a:latin typeface="Times New Roman" panose="02020603050405020304" pitchFamily="18" charset="0"/>
               <a:cs typeface="Times New Roman" panose="02020603050405020304" pitchFamily="18" charset="0"/>
             </a:endParaRPr>
@@ -17729,7 +18008,7 @@
           <a:lstStyle/>
           <a:p>
             <a:r>
-              <a:rPr lang="ro-RO" sz="2400" dirty="0">
+              <a:rPr lang="ro-RO" sz="2000" dirty="0">
                 <a:latin typeface="Times New Roman" panose="02020603050405020304" pitchFamily="18" charset="0"/>
                 <a:cs typeface="Times New Roman" panose="02020603050405020304" pitchFamily="18" charset="0"/>
               </a:rPr>
@@ -17780,10 +18059,15 @@
         </p:nvSpPr>
         <p:spPr/>
         <p:txBody>
-          <a:bodyPr/>
+          <a:bodyPr>
+            <a:normAutofit fontScale="90000"/>
+          </a:bodyPr>
           <a:lstStyle/>
           <a:p>
-            <a:endParaRPr lang="ro-RO"/>
+            <a:br>
+              <a:rPr lang="en-US" dirty="0"/>
+            </a:br>
+            <a:endParaRPr lang="ro-RO" dirty="0"/>
           </a:p>
         </p:txBody>
       </p:sp>

</xml_diff>

<commit_message>
Diacritice, pana la slide 15 inclusiv
</commit_message>
<xml_diff>
--- a/bdoo.pptx
+++ b/bdoo.pptx
@@ -348,7 +348,7 @@
             <a:fld id="{1D8BD707-D9CF-40AE-B4C6-C98DA3205C09}" type="datetimeFigureOut">
               <a:rPr lang="en-US" smtClean="0"/>
               <a:pPr/>
-              <a:t>4/2/2017</a:t>
+              <a:t>4/3/2017</a:t>
             </a:fld>
             <a:endParaRPr lang="en-US"/>
           </a:p>
@@ -513,7 +513,7 @@
             <a:fld id="{1D8BD707-D9CF-40AE-B4C6-C98DA3205C09}" type="datetimeFigureOut">
               <a:rPr lang="en-US" smtClean="0"/>
               <a:pPr/>
-              <a:t>4/2/2017</a:t>
+              <a:t>4/3/2017</a:t>
             </a:fld>
             <a:endParaRPr lang="en-US"/>
           </a:p>
@@ -688,7 +688,7 @@
             <a:fld id="{1D8BD707-D9CF-40AE-B4C6-C98DA3205C09}" type="datetimeFigureOut">
               <a:rPr lang="en-US" smtClean="0"/>
               <a:pPr/>
-              <a:t>4/2/2017</a:t>
+              <a:t>4/3/2017</a:t>
             </a:fld>
             <a:endParaRPr lang="en-US"/>
           </a:p>
@@ -853,7 +853,7 @@
             <a:fld id="{1D8BD707-D9CF-40AE-B4C6-C98DA3205C09}" type="datetimeFigureOut">
               <a:rPr lang="en-US" smtClean="0"/>
               <a:pPr/>
-              <a:t>4/2/2017</a:t>
+              <a:t>4/3/2017</a:t>
             </a:fld>
             <a:endParaRPr lang="en-US"/>
           </a:p>
@@ -1095,7 +1095,7 @@
             <a:fld id="{1D8BD707-D9CF-40AE-B4C6-C98DA3205C09}" type="datetimeFigureOut">
               <a:rPr lang="en-US" smtClean="0"/>
               <a:pPr/>
-              <a:t>4/2/2017</a:t>
+              <a:t>4/3/2017</a:t>
             </a:fld>
             <a:endParaRPr lang="en-US"/>
           </a:p>
@@ -1377,7 +1377,7 @@
             <a:fld id="{1D8BD707-D9CF-40AE-B4C6-C98DA3205C09}" type="datetimeFigureOut">
               <a:rPr lang="en-US" smtClean="0"/>
               <a:pPr/>
-              <a:t>4/2/2017</a:t>
+              <a:t>4/3/2017</a:t>
             </a:fld>
             <a:endParaRPr lang="en-US"/>
           </a:p>
@@ -1793,7 +1793,7 @@
             <a:fld id="{1D8BD707-D9CF-40AE-B4C6-C98DA3205C09}" type="datetimeFigureOut">
               <a:rPr lang="en-US" smtClean="0"/>
               <a:pPr/>
-              <a:t>4/2/2017</a:t>
+              <a:t>4/3/2017</a:t>
             </a:fld>
             <a:endParaRPr lang="en-US"/>
           </a:p>
@@ -1907,7 +1907,7 @@
             <a:fld id="{1D8BD707-D9CF-40AE-B4C6-C98DA3205C09}" type="datetimeFigureOut">
               <a:rPr lang="en-US" smtClean="0"/>
               <a:pPr/>
-              <a:t>4/2/2017</a:t>
+              <a:t>4/3/2017</a:t>
             </a:fld>
             <a:endParaRPr lang="en-US"/>
           </a:p>
@@ -1999,7 +1999,7 @@
             <a:fld id="{1D8BD707-D9CF-40AE-B4C6-C98DA3205C09}" type="datetimeFigureOut">
               <a:rPr lang="en-US" smtClean="0"/>
               <a:pPr/>
-              <a:t>4/2/2017</a:t>
+              <a:t>4/3/2017</a:t>
             </a:fld>
             <a:endParaRPr lang="en-US"/>
           </a:p>
@@ -2271,7 +2271,7 @@
             <a:fld id="{1D8BD707-D9CF-40AE-B4C6-C98DA3205C09}" type="datetimeFigureOut">
               <a:rPr lang="en-US" smtClean="0"/>
               <a:pPr/>
-              <a:t>4/2/2017</a:t>
+              <a:t>4/3/2017</a:t>
             </a:fld>
             <a:endParaRPr lang="en-US"/>
           </a:p>
@@ -2520,7 +2520,7 @@
             <a:fld id="{1D8BD707-D9CF-40AE-B4C6-C98DA3205C09}" type="datetimeFigureOut">
               <a:rPr lang="en-US" smtClean="0"/>
               <a:pPr/>
-              <a:t>4/2/2017</a:t>
+              <a:t>4/3/2017</a:t>
             </a:fld>
             <a:endParaRPr lang="en-US"/>
           </a:p>
@@ -2728,7 +2728,7 @@
             <a:fld id="{1D8BD707-D9CF-40AE-B4C6-C98DA3205C09}" type="datetimeFigureOut">
               <a:rPr lang="en-US" smtClean="0"/>
               <a:pPr/>
-              <a:t>4/2/2017</a:t>
+              <a:t>4/3/2017</a:t>
             </a:fld>
             <a:endParaRPr lang="en-US"/>
           </a:p>
@@ -3714,7 +3714,7 @@
                 <a:latin typeface="Times New Roman" pitchFamily="18" charset="0"/>
                 <a:cs typeface="Times New Roman" pitchFamily="18" charset="0"/>
               </a:rPr>
-              <a:t>reprezinta</a:t>
+              <a:t>reprezintă</a:t>
             </a:r>
             <a:r>
               <a:rPr lang="fr-FR" sz="2000" dirty="0">
@@ -3742,20 +3742,34 @@
                 <a:latin typeface="Times New Roman" pitchFamily="18" charset="0"/>
                 <a:cs typeface="Times New Roman" pitchFamily="18" charset="0"/>
               </a:rPr>
-              <a:t>identificabila</a:t>
+              <a:t>identificabilă</a:t>
             </a:r>
             <a:r>
               <a:rPr lang="fr-FR" sz="2000" dirty="0">
                 <a:latin typeface="Times New Roman" pitchFamily="18" charset="0"/>
                 <a:cs typeface="Times New Roman" pitchFamily="18" charset="0"/>
               </a:rPr>
-              <a:t> si </a:t>
+              <a:t> </a:t>
             </a:r>
             <a:r>
               <a:rPr lang="fr-FR" sz="2000" dirty="0" err="1">
                 <a:latin typeface="Times New Roman" pitchFamily="18" charset="0"/>
                 <a:cs typeface="Times New Roman" pitchFamily="18" charset="0"/>
               </a:rPr>
+              <a:t>și</a:t>
+            </a:r>
+            <a:r>
+              <a:rPr lang="fr-FR" sz="2000" dirty="0">
+                <a:latin typeface="Times New Roman" pitchFamily="18" charset="0"/>
+                <a:cs typeface="Times New Roman" pitchFamily="18" charset="0"/>
+              </a:rPr>
+              <a:t> </a:t>
+            </a:r>
+            <a:r>
+              <a:rPr lang="fr-FR" sz="2000" dirty="0" err="1">
+                <a:latin typeface="Times New Roman" pitchFamily="18" charset="0"/>
+                <a:cs typeface="Times New Roman" pitchFamily="18" charset="0"/>
+              </a:rPr>
               <a:t>cu</a:t>
             </a:r>
             <a:r>
@@ -3770,7 +3784,7 @@
                 <a:latin typeface="Times New Roman" pitchFamily="18" charset="0"/>
                 <a:cs typeface="Times New Roman" pitchFamily="18" charset="0"/>
               </a:rPr>
-              <a:t>continut</a:t>
+              <a:t>conținut</a:t>
             </a:r>
             <a:r>
               <a:rPr lang="fr-FR" sz="2000" dirty="0">
@@ -3798,7 +3812,7 @@
                 <a:latin typeface="Times New Roman" pitchFamily="18" charset="0"/>
                 <a:cs typeface="Times New Roman" pitchFamily="18" charset="0"/>
               </a:rPr>
-              <a:t>deosebeste</a:t>
+              <a:t>deosebește</a:t>
             </a:r>
             <a:r>
               <a:rPr lang="fr-FR" sz="2000" dirty="0">
@@ -3826,7 +3840,7 @@
                 <a:latin typeface="Times New Roman" pitchFamily="18" charset="0"/>
                 <a:cs typeface="Times New Roman" pitchFamily="18" charset="0"/>
               </a:rPr>
-              <a:t>inconjoara</a:t>
+              <a:t>înconjoară</a:t>
             </a:r>
             <a:r>
               <a:rPr lang="fr-FR" sz="2000" dirty="0">
@@ -3874,7 +3888,7 @@
                 <a:latin typeface="Times New Roman" pitchFamily="18" charset="0"/>
                 <a:cs typeface="Times New Roman" pitchFamily="18" charset="0"/>
               </a:rPr>
-              <a:t>abstractizari</a:t>
+              <a:t>abstractizări</a:t>
             </a:r>
             <a:r>
               <a:rPr lang="fr-FR" sz="2000" dirty="0">
@@ -3888,7 +3902,7 @@
                 <a:latin typeface="Times New Roman" pitchFamily="18" charset="0"/>
                 <a:cs typeface="Times New Roman" pitchFamily="18" charset="0"/>
               </a:rPr>
-              <a:t>entitatilor</a:t>
+              <a:t>entităților</a:t>
             </a:r>
             <a:r>
               <a:rPr lang="fr-FR" sz="2000" dirty="0">
@@ -3923,27 +3937,41 @@
                 <a:latin typeface="Times New Roman" pitchFamily="18" charset="0"/>
                 <a:cs typeface="Times New Roman" pitchFamily="18" charset="0"/>
               </a:rPr>
-              <a:t> si se </a:t>
+              <a:t> </a:t>
             </a:r>
             <a:r>
               <a:rPr lang="fr-FR" sz="2000" dirty="0" err="1">
                 <a:latin typeface="Times New Roman" pitchFamily="18" charset="0"/>
                 <a:cs typeface="Times New Roman" pitchFamily="18" charset="0"/>
               </a:rPr>
-              <a:t>caracterizeaza</a:t>
+              <a:t>și</a:t>
             </a:r>
             <a:r>
               <a:rPr lang="fr-FR" sz="2000" dirty="0">
                 <a:latin typeface="Times New Roman" pitchFamily="18" charset="0"/>
                 <a:cs typeface="Times New Roman" pitchFamily="18" charset="0"/>
               </a:rPr>
-              <a:t> </a:t>
+              <a:t> se </a:t>
             </a:r>
             <a:r>
               <a:rPr lang="fr-FR" sz="2000" dirty="0" err="1">
                 <a:latin typeface="Times New Roman" pitchFamily="18" charset="0"/>
                 <a:cs typeface="Times New Roman" pitchFamily="18" charset="0"/>
               </a:rPr>
+              <a:t>caracterizează</a:t>
+            </a:r>
+            <a:r>
+              <a:rPr lang="fr-FR" sz="2000" dirty="0">
+                <a:latin typeface="Times New Roman" pitchFamily="18" charset="0"/>
+                <a:cs typeface="Times New Roman" pitchFamily="18" charset="0"/>
+              </a:rPr>
+              <a:t> </a:t>
+            </a:r>
+            <a:r>
+              <a:rPr lang="fr-FR" sz="2000" dirty="0" err="1">
+                <a:latin typeface="Times New Roman" pitchFamily="18" charset="0"/>
+                <a:cs typeface="Times New Roman" pitchFamily="18" charset="0"/>
+              </a:rPr>
               <a:t>prin</a:t>
             </a:r>
             <a:r>
@@ -3965,7 +3993,21 @@
                 <a:latin typeface="Times New Roman" pitchFamily="18" charset="0"/>
                 <a:cs typeface="Times New Roman" pitchFamily="18" charset="0"/>
               </a:rPr>
-              <a:t> si </a:t>
+              <a:t> </a:t>
+            </a:r>
+            <a:r>
+              <a:rPr lang="fr-FR" sz="2000" dirty="0" err="1">
+                <a:latin typeface="Times New Roman" pitchFamily="18" charset="0"/>
+                <a:cs typeface="Times New Roman" pitchFamily="18" charset="0"/>
+              </a:rPr>
+              <a:t>și</a:t>
+            </a:r>
+            <a:r>
+              <a:rPr lang="fr-FR" sz="2000" dirty="0">
+                <a:latin typeface="Times New Roman" pitchFamily="18" charset="0"/>
+                <a:cs typeface="Times New Roman" pitchFamily="18" charset="0"/>
+              </a:rPr>
+              <a:t> </a:t>
             </a:r>
             <a:r>
               <a:rPr lang="fr-FR" sz="2000" dirty="0" err="1">
@@ -4034,7 +4076,7 @@
                 <a:latin typeface="Times New Roman" pitchFamily="18" charset="0"/>
                 <a:cs typeface="Times New Roman" pitchFamily="18" charset="0"/>
               </a:rPr>
-              <a:t>exprimata</a:t>
+              <a:t>exprimată</a:t>
             </a:r>
             <a:r>
               <a:rPr lang="fr-FR" sz="2000" dirty="0">
@@ -4090,7 +4132,7 @@
                 <a:latin typeface="Times New Roman" pitchFamily="18" charset="0"/>
                 <a:cs typeface="Times New Roman" pitchFamily="18" charset="0"/>
               </a:rPr>
-              <a:t>Colectia</a:t>
+              <a:t>Colecția</a:t>
             </a:r>
             <a:r>
               <a:rPr lang="fr-FR" sz="2000" dirty="0">
@@ -4118,7 +4160,7 @@
                 <a:latin typeface="Times New Roman" pitchFamily="18" charset="0"/>
                 <a:cs typeface="Times New Roman" pitchFamily="18" charset="0"/>
               </a:rPr>
-              <a:t>aleasa</a:t>
+              <a:t>aleasă</a:t>
             </a:r>
             <a:r>
               <a:rPr lang="fr-FR" sz="2000" dirty="0">
@@ -4167,20 +4209,34 @@
                 <a:latin typeface="Times New Roman" pitchFamily="18" charset="0"/>
                 <a:cs typeface="Times New Roman" pitchFamily="18" charset="0"/>
               </a:rPr>
-              <a:t> sa fie </a:t>
+              <a:t> </a:t>
             </a:r>
             <a:r>
               <a:rPr lang="fr-FR" sz="2000" dirty="0" err="1">
                 <a:latin typeface="Times New Roman" pitchFamily="18" charset="0"/>
                 <a:cs typeface="Times New Roman" pitchFamily="18" charset="0"/>
               </a:rPr>
-              <a:t>suficienta</a:t>
+              <a:t>să</a:t>
             </a:r>
             <a:r>
               <a:rPr lang="fr-FR" sz="2000" dirty="0">
                 <a:latin typeface="Times New Roman" pitchFamily="18" charset="0"/>
                 <a:cs typeface="Times New Roman" pitchFamily="18" charset="0"/>
               </a:rPr>
+              <a:t> fie </a:t>
+            </a:r>
+            <a:r>
+              <a:rPr lang="fr-FR" sz="2000" dirty="0" err="1">
+                <a:latin typeface="Times New Roman" pitchFamily="18" charset="0"/>
+                <a:cs typeface="Times New Roman" pitchFamily="18" charset="0"/>
+              </a:rPr>
+              <a:t>suficientă</a:t>
+            </a:r>
+            <a:r>
+              <a:rPr lang="fr-FR" sz="2000" dirty="0">
+                <a:latin typeface="Times New Roman" pitchFamily="18" charset="0"/>
+                <a:cs typeface="Times New Roman" pitchFamily="18" charset="0"/>
+              </a:rPr>
               <a:t> </a:t>
             </a:r>
             <a:r>
@@ -4230,7 +4286,7 @@
                 <a:latin typeface="Times New Roman" pitchFamily="18" charset="0"/>
                 <a:cs typeface="Times New Roman" pitchFamily="18" charset="0"/>
               </a:rPr>
-              <a:t>adica</a:t>
+              <a:t>adică</a:t>
             </a:r>
             <a:r>
               <a:rPr lang="fr-FR" sz="2000" dirty="0">
@@ -4258,7 +4314,7 @@
                 <a:latin typeface="Times New Roman" pitchFamily="18" charset="0"/>
                 <a:cs typeface="Times New Roman" pitchFamily="18" charset="0"/>
               </a:rPr>
-              <a:t>includa</a:t>
+              <a:t>includă</a:t>
             </a:r>
             <a:r>
               <a:rPr lang="fr-FR" sz="2000" dirty="0">
@@ -4390,7 +4446,7 @@
                 <a:latin typeface="Times New Roman" pitchFamily="18" charset="0"/>
                 <a:cs typeface="Times New Roman" pitchFamily="18" charset="0"/>
               </a:rPr>
-              <a:t>reprezinta</a:t>
+              <a:t>reprezintă</a:t>
             </a:r>
             <a:r>
               <a:rPr lang="fr-FR" sz="2000" dirty="0">
@@ -4432,7 +4488,7 @@
                 <a:latin typeface="Times New Roman" pitchFamily="18" charset="0"/>
                 <a:cs typeface="Times New Roman" pitchFamily="18" charset="0"/>
               </a:rPr>
-              <a:t>operatii</a:t>
+              <a:t>operații</a:t>
             </a:r>
             <a:r>
               <a:rPr lang="fr-FR" sz="2000" dirty="0">
@@ -4446,7 +4502,7 @@
                 <a:latin typeface="Times New Roman" pitchFamily="18" charset="0"/>
                 <a:cs typeface="Times New Roman" pitchFamily="18" charset="0"/>
               </a:rPr>
-              <a:t>actioneaza</a:t>
+              <a:t>acționează</a:t>
             </a:r>
             <a:r>
               <a:rPr lang="fr-FR" sz="2000" dirty="0">
@@ -4595,7 +4651,7 @@
                 <a:latin typeface="Times New Roman" panose="02020603050405020304" pitchFamily="18" charset="0"/>
                 <a:cs typeface="Times New Roman" panose="02020603050405020304" pitchFamily="18" charset="0"/>
               </a:rPr>
-              <a:t>	Obiectivul</a:t>
+              <a:t>	Obiectul</a:t>
             </a:r>
           </a:p>
         </p:txBody>
@@ -4999,7 +5055,7 @@
                 <a:latin typeface="Times New Roman" pitchFamily="18" charset="0"/>
                 <a:cs typeface="Times New Roman" pitchFamily="18" charset="0"/>
               </a:rPr>
-              <a:t>consta</a:t>
+              <a:t>constă</a:t>
             </a:r>
             <a:r>
               <a:rPr lang="fr-FR" sz="2800" dirty="0">
@@ -5083,7 +5139,7 @@
                 <a:latin typeface="Times New Roman" pitchFamily="18" charset="0"/>
                 <a:cs typeface="Times New Roman" pitchFamily="18" charset="0"/>
               </a:rPr>
-              <a:t>instanta</a:t>
+              <a:t>instanță</a:t>
             </a:r>
             <a:r>
               <a:rPr lang="fr-FR" sz="2800" dirty="0">
@@ -5125,7 +5181,7 @@
                 <a:latin typeface="Times New Roman" pitchFamily="18" charset="0"/>
                 <a:cs typeface="Times New Roman" pitchFamily="18" charset="0"/>
               </a:rPr>
-              <a:t>consta</a:t>
+              <a:t>constă</a:t>
             </a:r>
             <a:r>
               <a:rPr lang="fr-FR" sz="2800" dirty="0">
@@ -5167,7 +5223,7 @@
                 <a:latin typeface="Times New Roman" pitchFamily="18" charset="0"/>
                 <a:cs typeface="Times New Roman" pitchFamily="18" charset="0"/>
               </a:rPr>
-              <a:t>instantele</a:t>
+              <a:t>instanțele</a:t>
             </a:r>
             <a:r>
               <a:rPr lang="fr-FR" sz="2800" dirty="0">
@@ -5195,20 +5251,34 @@
                 <a:latin typeface="Times New Roman" pitchFamily="18" charset="0"/>
                 <a:cs typeface="Times New Roman" pitchFamily="18" charset="0"/>
               </a:rPr>
-              <a:t>raspunde</a:t>
+              <a:t>răspunde</a:t>
             </a:r>
             <a:r>
               <a:rPr lang="fr-FR" sz="2800" dirty="0">
                 <a:latin typeface="Times New Roman" pitchFamily="18" charset="0"/>
                 <a:cs typeface="Times New Roman" pitchFamily="18" charset="0"/>
               </a:rPr>
-              <a:t> si un set de </a:t>
+              <a:t> </a:t>
             </a:r>
             <a:r>
               <a:rPr lang="fr-FR" sz="2800" dirty="0" err="1">
                 <a:latin typeface="Times New Roman" pitchFamily="18" charset="0"/>
                 <a:cs typeface="Times New Roman" pitchFamily="18" charset="0"/>
               </a:rPr>
+              <a:t>și</a:t>
+            </a:r>
+            <a:r>
+              <a:rPr lang="fr-FR" sz="2800" dirty="0">
+                <a:latin typeface="Times New Roman" pitchFamily="18" charset="0"/>
+                <a:cs typeface="Times New Roman" pitchFamily="18" charset="0"/>
+              </a:rPr>
+              <a:t> un set de </a:t>
+            </a:r>
+            <a:r>
+              <a:rPr lang="fr-FR" sz="2800" dirty="0" err="1">
+                <a:latin typeface="Times New Roman" pitchFamily="18" charset="0"/>
+                <a:cs typeface="Times New Roman" pitchFamily="18" charset="0"/>
+              </a:rPr>
               <a:t>metode</a:t>
             </a:r>
             <a:r>
@@ -5251,7 +5321,7 @@
                 <a:latin typeface="Times New Roman" pitchFamily="18" charset="0"/>
                 <a:cs typeface="Times New Roman" pitchFamily="18" charset="0"/>
               </a:rPr>
-              <a:t>operatii</a:t>
+              <a:t>operații</a:t>
             </a:r>
             <a:r>
               <a:rPr lang="fr-FR" sz="2800" dirty="0">
@@ -5320,7 +5390,7 @@
                 <a:latin typeface="Times New Roman" pitchFamily="18" charset="0"/>
                 <a:cs typeface="Times New Roman" pitchFamily="18" charset="0"/>
               </a:rPr>
-              <a:t>defineste</a:t>
+              <a:t>definește</a:t>
             </a:r>
             <a:r>
               <a:rPr lang="fr-FR" sz="2800" dirty="0">
@@ -5334,7 +5404,7 @@
                 <a:latin typeface="Times New Roman" pitchFamily="18" charset="0"/>
                 <a:cs typeface="Times New Roman" pitchFamily="18" charset="0"/>
               </a:rPr>
-              <a:t>atat</a:t>
+              <a:t>atât</a:t>
             </a:r>
             <a:r>
               <a:rPr lang="fr-FR" sz="2800" dirty="0">
@@ -5390,21 +5460,21 @@
                 <a:latin typeface="Times New Roman" pitchFamily="18" charset="0"/>
                 <a:cs typeface="Times New Roman" pitchFamily="18" charset="0"/>
               </a:rPr>
-              <a:t>respectiva</a:t>
+              <a:t>respectivă</a:t>
             </a:r>
             <a:r>
               <a:rPr lang="fr-FR" sz="2800" dirty="0">
                 <a:latin typeface="Times New Roman" pitchFamily="18" charset="0"/>
                 <a:cs typeface="Times New Roman" pitchFamily="18" charset="0"/>
               </a:rPr>
-              <a:t>, cat si </a:t>
+              <a:t>, </a:t>
             </a:r>
             <a:r>
               <a:rPr lang="fr-FR" sz="2800" dirty="0" err="1">
                 <a:latin typeface="Times New Roman" pitchFamily="18" charset="0"/>
                 <a:cs typeface="Times New Roman" pitchFamily="18" charset="0"/>
               </a:rPr>
-              <a:t>multimea</a:t>
+              <a:t>cât</a:t>
             </a:r>
             <a:r>
               <a:rPr lang="fr-FR" sz="2800" dirty="0">
@@ -5418,6 +5488,34 @@
                 <a:latin typeface="Times New Roman" pitchFamily="18" charset="0"/>
                 <a:cs typeface="Times New Roman" pitchFamily="18" charset="0"/>
               </a:rPr>
+              <a:t>și</a:t>
+            </a:r>
+            <a:r>
+              <a:rPr lang="fr-FR" sz="2800" dirty="0">
+                <a:latin typeface="Times New Roman" pitchFamily="18" charset="0"/>
+                <a:cs typeface="Times New Roman" pitchFamily="18" charset="0"/>
+              </a:rPr>
+              <a:t> </a:t>
+            </a:r>
+            <a:r>
+              <a:rPr lang="fr-FR" sz="2800" dirty="0" err="1">
+                <a:latin typeface="Times New Roman" pitchFamily="18" charset="0"/>
+                <a:cs typeface="Times New Roman" pitchFamily="18" charset="0"/>
+              </a:rPr>
+              <a:t>mulțimea</a:t>
+            </a:r>
+            <a:r>
+              <a:rPr lang="fr-FR" sz="2800" dirty="0">
+                <a:latin typeface="Times New Roman" pitchFamily="18" charset="0"/>
+                <a:cs typeface="Times New Roman" pitchFamily="18" charset="0"/>
+              </a:rPr>
+              <a:t> </a:t>
+            </a:r>
+            <a:r>
+              <a:rPr lang="fr-FR" sz="2800" dirty="0" err="1">
+                <a:latin typeface="Times New Roman" pitchFamily="18" charset="0"/>
+                <a:cs typeface="Times New Roman" pitchFamily="18" charset="0"/>
+              </a:rPr>
               <a:t>metodelor</a:t>
             </a:r>
             <a:r>
@@ -5530,7 +5628,7 @@
                 <a:latin typeface="Times New Roman" pitchFamily="18" charset="0"/>
                 <a:cs typeface="Times New Roman" pitchFamily="18" charset="0"/>
               </a:rPr>
-              <a:t>aceeasi</a:t>
+              <a:t>aceeași</a:t>
             </a:r>
             <a:r>
               <a:rPr lang="fr-FR" sz="2800" dirty="0">
@@ -5544,7 +5642,7 @@
                 <a:latin typeface="Times New Roman" pitchFamily="18" charset="0"/>
                 <a:cs typeface="Times New Roman" pitchFamily="18" charset="0"/>
               </a:rPr>
-              <a:t>clasa</a:t>
+              <a:t>clasă</a:t>
             </a:r>
             <a:r>
               <a:rPr lang="fr-FR" sz="2800" dirty="0">
@@ -5558,7 +5656,7 @@
                 <a:latin typeface="Times New Roman" pitchFamily="18" charset="0"/>
                 <a:cs typeface="Times New Roman" pitchFamily="18" charset="0"/>
               </a:rPr>
-              <a:t>aceleasi</a:t>
+              <a:t>aceleași</a:t>
             </a:r>
             <a:r>
               <a:rPr lang="fr-FR" sz="2800" dirty="0">
@@ -5579,14 +5677,14 @@
                 <a:latin typeface="Times New Roman" pitchFamily="18" charset="0"/>
                 <a:cs typeface="Times New Roman" pitchFamily="18" charset="0"/>
               </a:rPr>
-              <a:t> si </a:t>
+              <a:t> </a:t>
             </a:r>
             <a:r>
               <a:rPr lang="fr-FR" sz="2800" dirty="0" err="1">
                 <a:latin typeface="Times New Roman" pitchFamily="18" charset="0"/>
                 <a:cs typeface="Times New Roman" pitchFamily="18" charset="0"/>
               </a:rPr>
-              <a:t>aceleasi</a:t>
+              <a:t>și</a:t>
             </a:r>
             <a:r>
               <a:rPr lang="fr-FR" sz="2800" dirty="0">
@@ -5600,6 +5698,20 @@
                 <a:latin typeface="Times New Roman" pitchFamily="18" charset="0"/>
                 <a:cs typeface="Times New Roman" pitchFamily="18" charset="0"/>
               </a:rPr>
+              <a:t>aceleași</a:t>
+            </a:r>
+            <a:r>
+              <a:rPr lang="fr-FR" sz="2800" dirty="0">
+                <a:latin typeface="Times New Roman" pitchFamily="18" charset="0"/>
+                <a:cs typeface="Times New Roman" pitchFamily="18" charset="0"/>
+              </a:rPr>
+              <a:t> </a:t>
+            </a:r>
+            <a:r>
+              <a:rPr lang="fr-FR" sz="2800" dirty="0" err="1">
+                <a:latin typeface="Times New Roman" pitchFamily="18" charset="0"/>
+                <a:cs typeface="Times New Roman" pitchFamily="18" charset="0"/>
+              </a:rPr>
               <a:t>metode</a:t>
             </a:r>
             <a:r>
@@ -5607,20 +5719,34 @@
                 <a:latin typeface="Times New Roman" pitchFamily="18" charset="0"/>
                 <a:cs typeface="Times New Roman" pitchFamily="18" charset="0"/>
               </a:rPr>
-              <a:t> si </a:t>
+              <a:t> </a:t>
             </a:r>
             <a:r>
               <a:rPr lang="fr-FR" sz="2800" dirty="0" err="1">
                 <a:latin typeface="Times New Roman" pitchFamily="18" charset="0"/>
                 <a:cs typeface="Times New Roman" pitchFamily="18" charset="0"/>
               </a:rPr>
-              <a:t>raspund</a:t>
+              <a:t>și</a:t>
             </a:r>
             <a:r>
               <a:rPr lang="fr-FR" sz="2800" dirty="0">
                 <a:latin typeface="Times New Roman" pitchFamily="18" charset="0"/>
                 <a:cs typeface="Times New Roman" pitchFamily="18" charset="0"/>
               </a:rPr>
+              <a:t> </a:t>
+            </a:r>
+            <a:r>
+              <a:rPr lang="fr-FR" sz="2800" dirty="0" err="1">
+                <a:latin typeface="Times New Roman" pitchFamily="18" charset="0"/>
+                <a:cs typeface="Times New Roman" pitchFamily="18" charset="0"/>
+              </a:rPr>
+              <a:t>răspund</a:t>
+            </a:r>
+            <a:r>
+              <a:rPr lang="fr-FR" sz="2800" dirty="0">
+                <a:latin typeface="Times New Roman" pitchFamily="18" charset="0"/>
+                <a:cs typeface="Times New Roman" pitchFamily="18" charset="0"/>
+              </a:rPr>
               <a:t> la </a:t>
             </a:r>
             <a:r>
@@ -5628,7 +5754,7 @@
                 <a:latin typeface="Times New Roman" pitchFamily="18" charset="0"/>
                 <a:cs typeface="Times New Roman" pitchFamily="18" charset="0"/>
               </a:rPr>
-              <a:t>aceleasi</a:t>
+              <a:t>aceleași</a:t>
             </a:r>
             <a:r>
               <a:rPr lang="fr-FR" sz="2800" dirty="0">
@@ -6041,7 +6167,7 @@
         </p:nvSpPr>
         <p:spPr>
           <a:xfrm>
-            <a:off x="457200" y="1524000"/>
+            <a:off x="381000" y="1524000"/>
             <a:ext cx="8229600" cy="2862322"/>
           </a:xfrm>
           <a:prstGeom prst="rect">
@@ -6092,7 +6218,7 @@
                 <a:latin typeface="Times New Roman" pitchFamily="18" charset="0"/>
                 <a:cs typeface="Times New Roman" pitchFamily="18" charset="0"/>
               </a:rPr>
-              <a:t>si</a:t>
+              <a:t>și</a:t>
             </a:r>
             <a:r>
               <a:rPr lang="en-GB" sz="2000" dirty="0">
@@ -6120,7 +6246,7 @@
                 <a:latin typeface="Times New Roman" pitchFamily="18" charset="0"/>
                 <a:cs typeface="Times New Roman" pitchFamily="18" charset="0"/>
               </a:rPr>
-              <a:t>actiune</a:t>
+              <a:t>acțiune</a:t>
             </a:r>
             <a:r>
               <a:rPr lang="en-GB" sz="2000" dirty="0">
@@ -6162,7 +6288,7 @@
                 <a:latin typeface="Times New Roman" pitchFamily="18" charset="0"/>
                 <a:cs typeface="Times New Roman" pitchFamily="18" charset="0"/>
               </a:rPr>
-              <a:t>si</a:t>
+              <a:t>și</a:t>
             </a:r>
             <a:r>
               <a:rPr lang="en-GB" sz="2000" dirty="0">
@@ -6190,7 +6316,7 @@
                 <a:latin typeface="Times New Roman" pitchFamily="18" charset="0"/>
                 <a:cs typeface="Times New Roman" pitchFamily="18" charset="0"/>
               </a:rPr>
-              <a:t>catre</a:t>
+              <a:t>către</a:t>
             </a:r>
             <a:r>
               <a:rPr lang="en-GB" sz="2000" dirty="0">
@@ -6288,7 +6414,7 @@
                 <a:latin typeface="Times New Roman" pitchFamily="18" charset="0"/>
                 <a:cs typeface="Times New Roman" pitchFamily="18" charset="0"/>
               </a:rPr>
-              <a:t>caracteristica</a:t>
+              <a:t>caracteristică</a:t>
             </a:r>
             <a:r>
               <a:rPr lang="en-GB" sz="2000" dirty="0">
@@ -6302,7 +6428,7 @@
                 <a:latin typeface="Times New Roman" pitchFamily="18" charset="0"/>
                 <a:cs typeface="Times New Roman" pitchFamily="18" charset="0"/>
               </a:rPr>
-              <a:t>ascunsa</a:t>
+              <a:t>ascunsă</a:t>
             </a:r>
             <a:r>
               <a:rPr lang="en-GB" sz="2000" dirty="0">
@@ -6316,7 +6442,7 @@
                 <a:latin typeface="Times New Roman" pitchFamily="18" charset="0"/>
                 <a:cs typeface="Times New Roman" pitchFamily="18" charset="0"/>
               </a:rPr>
-              <a:t>starii</a:t>
+              <a:t>stării</a:t>
             </a:r>
             <a:r>
               <a:rPr lang="en-GB" sz="2000" dirty="0">
@@ -6351,7 +6477,7 @@
                 <a:latin typeface="Times New Roman" pitchFamily="18" charset="0"/>
                 <a:cs typeface="Times New Roman" pitchFamily="18" charset="0"/>
               </a:rPr>
-              <a:t>incapsulare</a:t>
+              <a:t>încapsulare</a:t>
             </a:r>
             <a:r>
               <a:rPr lang="en-GB" sz="2000" dirty="0">
@@ -6414,13 +6540,27 @@
                 <a:latin typeface="Times New Roman" pitchFamily="18" charset="0"/>
                 <a:cs typeface="Times New Roman" pitchFamily="18" charset="0"/>
               </a:rPr>
-              <a:t> in </a:t>
+              <a:t> </a:t>
             </a:r>
             <a:r>
               <a:rPr lang="en-GB" sz="2000" dirty="0" err="1">
                 <a:latin typeface="Times New Roman" pitchFamily="18" charset="0"/>
                 <a:cs typeface="Times New Roman" pitchFamily="18" charset="0"/>
               </a:rPr>
+              <a:t>în</a:t>
+            </a:r>
+            <a:r>
+              <a:rPr lang="en-GB" sz="2000" dirty="0">
+                <a:latin typeface="Times New Roman" pitchFamily="18" charset="0"/>
+                <a:cs typeface="Times New Roman" pitchFamily="18" charset="0"/>
+              </a:rPr>
+              <a:t> </a:t>
+            </a:r>
+            <a:r>
+              <a:rPr lang="en-GB" sz="2000" dirty="0" err="1">
+                <a:latin typeface="Times New Roman" pitchFamily="18" charset="0"/>
+                <a:cs typeface="Times New Roman" pitchFamily="18" charset="0"/>
+              </a:rPr>
               <a:t>doua</a:t>
             </a:r>
             <a:r>
@@ -6435,7 +6575,7 @@
                 <a:latin typeface="Times New Roman" pitchFamily="18" charset="0"/>
                 <a:cs typeface="Times New Roman" pitchFamily="18" charset="0"/>
               </a:rPr>
-              <a:t>parti</a:t>
+              <a:t>părti</a:t>
             </a:r>
             <a:r>
               <a:rPr lang="en-GB" sz="2000" dirty="0">
@@ -6449,7 +6589,7 @@
                 <a:latin typeface="Times New Roman" pitchFamily="18" charset="0"/>
                 <a:cs typeface="Times New Roman" pitchFamily="18" charset="0"/>
               </a:rPr>
-              <a:t>interfata</a:t>
+              <a:t>interfață</a:t>
             </a:r>
             <a:r>
               <a:rPr lang="en-GB" sz="2000" dirty="0">
@@ -6463,7 +6603,7 @@
                 <a:latin typeface="Times New Roman" pitchFamily="18" charset="0"/>
                 <a:cs typeface="Times New Roman" pitchFamily="18" charset="0"/>
               </a:rPr>
-              <a:t>reprezentata</a:t>
+              <a:t>reprezentată</a:t>
             </a:r>
             <a:r>
               <a:rPr lang="en-GB" sz="2000" dirty="0">
@@ -6491,27 +6631,41 @@
                 <a:latin typeface="Times New Roman" pitchFamily="18" charset="0"/>
                 <a:cs typeface="Times New Roman" pitchFamily="18" charset="0"/>
               </a:rPr>
-              <a:t>si</a:t>
+              <a:t>și</a:t>
             </a:r>
             <a:r>
               <a:rPr lang="en-GB" sz="2000" dirty="0">
                 <a:latin typeface="Times New Roman" pitchFamily="18" charset="0"/>
                 <a:cs typeface="Times New Roman" pitchFamily="18" charset="0"/>
               </a:rPr>
-              <a:t> o parte </a:t>
+              <a:t> o </a:t>
             </a:r>
             <a:r>
               <a:rPr lang="en-GB" sz="2000" dirty="0" err="1">
                 <a:latin typeface="Times New Roman" pitchFamily="18" charset="0"/>
                 <a:cs typeface="Times New Roman" pitchFamily="18" charset="0"/>
               </a:rPr>
-              <a:t>ascunsa</a:t>
+              <a:t>parte</a:t>
             </a:r>
             <a:r>
               <a:rPr lang="en-GB" sz="2000" dirty="0">
                 <a:latin typeface="Times New Roman" pitchFamily="18" charset="0"/>
                 <a:cs typeface="Times New Roman" pitchFamily="18" charset="0"/>
               </a:rPr>
+              <a:t> </a:t>
+            </a:r>
+            <a:r>
+              <a:rPr lang="en-GB" sz="2000" dirty="0" err="1">
+                <a:latin typeface="Times New Roman" pitchFamily="18" charset="0"/>
+                <a:cs typeface="Times New Roman" pitchFamily="18" charset="0"/>
+              </a:rPr>
+              <a:t>ascunsă</a:t>
+            </a:r>
+            <a:r>
+              <a:rPr lang="en-GB" sz="2000" dirty="0">
+                <a:latin typeface="Times New Roman" pitchFamily="18" charset="0"/>
+                <a:cs typeface="Times New Roman" pitchFamily="18" charset="0"/>
+              </a:rPr>
               <a:t>, de </a:t>
             </a:r>
             <a:r>
@@ -6533,7 +6687,7 @@
                 <a:latin typeface="Times New Roman" pitchFamily="18" charset="0"/>
                 <a:cs typeface="Times New Roman" pitchFamily="18" charset="0"/>
               </a:rPr>
-              <a:t>reprezentata</a:t>
+              <a:t>reprezentată</a:t>
             </a:r>
             <a:r>
               <a:rPr lang="en-GB" sz="2000" dirty="0">
@@ -6561,7 +6715,7 @@
                 <a:latin typeface="Times New Roman" pitchFamily="18" charset="0"/>
                 <a:cs typeface="Times New Roman" pitchFamily="18" charset="0"/>
               </a:rPr>
-              <a:t>interna</a:t>
+              <a:t>internă</a:t>
             </a:r>
             <a:r>
               <a:rPr lang="en-GB" sz="2000" dirty="0">
@@ -6575,7 +6729,7 @@
                 <a:latin typeface="Times New Roman" pitchFamily="18" charset="0"/>
                 <a:cs typeface="Times New Roman" pitchFamily="18" charset="0"/>
               </a:rPr>
-              <a:t>si</a:t>
+              <a:t>și</a:t>
             </a:r>
             <a:r>
               <a:rPr lang="en-GB" sz="2000" dirty="0">
@@ -6623,7 +6777,7 @@
                 <a:latin typeface="Times New Roman" pitchFamily="18" charset="0"/>
                 <a:cs typeface="Times New Roman" pitchFamily="18" charset="0"/>
               </a:rPr>
-              <a:t>Incapsularea</a:t>
+              <a:t>Încapsularea</a:t>
             </a:r>
             <a:r>
               <a:rPr lang="en-GB" sz="2000" dirty="0">
@@ -6714,13 +6868,27 @@
                 <a:latin typeface="Times New Roman" pitchFamily="18" charset="0"/>
                 <a:cs typeface="Times New Roman" pitchFamily="18" charset="0"/>
               </a:rPr>
-              <a:t> in </a:t>
+              <a:t> </a:t>
             </a:r>
             <a:r>
               <a:rPr lang="en-GB" sz="2000" dirty="0" err="1">
                 <a:latin typeface="Times New Roman" pitchFamily="18" charset="0"/>
                 <a:cs typeface="Times New Roman" pitchFamily="18" charset="0"/>
               </a:rPr>
+              <a:t>în</a:t>
+            </a:r>
+            <a:r>
+              <a:rPr lang="en-GB" sz="2000" dirty="0">
+                <a:latin typeface="Times New Roman" pitchFamily="18" charset="0"/>
+                <a:cs typeface="Times New Roman" pitchFamily="18" charset="0"/>
+              </a:rPr>
+              <a:t> </a:t>
+            </a:r>
+            <a:r>
+              <a:rPr lang="en-GB" sz="2000" dirty="0" err="1">
+                <a:latin typeface="Times New Roman" pitchFamily="18" charset="0"/>
+                <a:cs typeface="Times New Roman" pitchFamily="18" charset="0"/>
+              </a:rPr>
               <a:t>schimb</a:t>
             </a:r>
             <a:r>
@@ -6735,7 +6903,7 @@
                 <a:latin typeface="Times New Roman" pitchFamily="18" charset="0"/>
                 <a:cs typeface="Times New Roman" pitchFamily="18" charset="0"/>
               </a:rPr>
-              <a:t>functionala</a:t>
+              <a:t>funcțională</a:t>
             </a:r>
             <a:r>
               <a:rPr lang="en-GB" sz="2000" dirty="0">
@@ -6749,7 +6917,7 @@
                 <a:latin typeface="Times New Roman" pitchFamily="18" charset="0"/>
                 <a:cs typeface="Times New Roman" pitchFamily="18" charset="0"/>
               </a:rPr>
-              <a:t>simplificata</a:t>
+              <a:t>simplificată</a:t>
             </a:r>
             <a:r>
               <a:rPr lang="en-GB" sz="2000" dirty="0">
@@ -6770,13 +6938,27 @@
                 <a:latin typeface="Times New Roman" pitchFamily="18" charset="0"/>
                 <a:cs typeface="Times New Roman" pitchFamily="18" charset="0"/>
               </a:rPr>
-              <a:t>, care ii </a:t>
+              <a:t>, care </a:t>
             </a:r>
             <a:r>
               <a:rPr lang="en-GB" sz="2000" dirty="0" err="1">
                 <a:latin typeface="Times New Roman" pitchFamily="18" charset="0"/>
                 <a:cs typeface="Times New Roman" pitchFamily="18" charset="0"/>
               </a:rPr>
+              <a:t>îi</a:t>
+            </a:r>
+            <a:r>
+              <a:rPr lang="en-GB" sz="2000" dirty="0">
+                <a:latin typeface="Times New Roman" pitchFamily="18" charset="0"/>
+                <a:cs typeface="Times New Roman" pitchFamily="18" charset="0"/>
+              </a:rPr>
+              <a:t> </a:t>
+            </a:r>
+            <a:r>
+              <a:rPr lang="en-GB" sz="2000" dirty="0" err="1">
+                <a:latin typeface="Times New Roman" pitchFamily="18" charset="0"/>
+                <a:cs typeface="Times New Roman" pitchFamily="18" charset="0"/>
+              </a:rPr>
               <a:t>permite</a:t>
             </a:r>
             <a:r>
@@ -6791,7 +6973,7 @@
                 <a:latin typeface="Times New Roman" pitchFamily="18" charset="0"/>
                 <a:cs typeface="Times New Roman" pitchFamily="18" charset="0"/>
               </a:rPr>
-              <a:t>sa</a:t>
+              <a:t>să</a:t>
             </a:r>
             <a:r>
               <a:rPr lang="en-GB" sz="2000" dirty="0">
@@ -6819,7 +7001,7 @@
                 <a:latin typeface="Times New Roman" pitchFamily="18" charset="0"/>
                 <a:cs typeface="Times New Roman" pitchFamily="18" charset="0"/>
               </a:rPr>
-              <a:t>si</a:t>
+              <a:t>și</a:t>
             </a:r>
             <a:r>
               <a:rPr lang="en-GB" sz="2000" dirty="0">
@@ -6833,7 +7015,7 @@
                 <a:latin typeface="Times New Roman" pitchFamily="18" charset="0"/>
                 <a:cs typeface="Times New Roman" pitchFamily="18" charset="0"/>
               </a:rPr>
-              <a:t>sa</a:t>
+              <a:t>să</a:t>
             </a:r>
             <a:r>
               <a:rPr lang="en-GB" sz="2000" dirty="0">
@@ -13396,490 +13578,490 @@
             </a:pPr>
             <a:r>
               <a:rPr lang="en-GB" sz="2400" dirty="0">
-                <a:latin typeface="Times New Roman" pitchFamily="18" charset="0"/>
-                <a:cs typeface="Times New Roman" pitchFamily="18" charset="0"/>
+                <a:latin typeface="Times New Roman" panose="02020603050405020304" pitchFamily="18" charset="0"/>
+                <a:cs typeface="Times New Roman" panose="02020603050405020304" pitchFamily="18" charset="0"/>
               </a:rPr>
               <a:t>O </a:t>
             </a:r>
             <a:r>
               <a:rPr lang="ro-RO" sz="2400" b="1" dirty="0">
-                <a:latin typeface="Times New Roman" pitchFamily="18" charset="0"/>
-                <a:cs typeface="Times New Roman" pitchFamily="18" charset="0"/>
+                <a:latin typeface="Times New Roman" panose="02020603050405020304" pitchFamily="18" charset="0"/>
+                <a:cs typeface="Times New Roman" panose="02020603050405020304" pitchFamily="18" charset="0"/>
               </a:rPr>
               <a:t>bază</a:t>
             </a:r>
             <a:r>
               <a:rPr lang="en-GB" sz="2400" b="1" dirty="0">
-                <a:latin typeface="Times New Roman" pitchFamily="18" charset="0"/>
-                <a:cs typeface="Times New Roman" pitchFamily="18" charset="0"/>
+                <a:latin typeface="Times New Roman" panose="02020603050405020304" pitchFamily="18" charset="0"/>
+                <a:cs typeface="Times New Roman" panose="02020603050405020304" pitchFamily="18" charset="0"/>
               </a:rPr>
               <a:t> de date </a:t>
             </a:r>
             <a:r>
               <a:rPr lang="en-GB" sz="2400" b="1" dirty="0" err="1">
-                <a:latin typeface="Times New Roman" pitchFamily="18" charset="0"/>
-                <a:cs typeface="Times New Roman" pitchFamily="18" charset="0"/>
+                <a:latin typeface="Times New Roman" panose="02020603050405020304" pitchFamily="18" charset="0"/>
+                <a:cs typeface="Times New Roman" panose="02020603050405020304" pitchFamily="18" charset="0"/>
               </a:rPr>
               <a:t>orientat</a:t>
             </a:r>
             <a:r>
               <a:rPr lang="ro-RO" sz="2400" b="1" dirty="0">
-                <a:latin typeface="Times New Roman" pitchFamily="18" charset="0"/>
-                <a:cs typeface="Times New Roman" pitchFamily="18" charset="0"/>
+                <a:latin typeface="Times New Roman" panose="02020603050405020304" pitchFamily="18" charset="0"/>
+                <a:cs typeface="Times New Roman" panose="02020603050405020304" pitchFamily="18" charset="0"/>
               </a:rPr>
               <a:t>ă</a:t>
             </a:r>
             <a:r>
               <a:rPr lang="en-GB" sz="2400" b="1" dirty="0">
-                <a:latin typeface="Times New Roman" pitchFamily="18" charset="0"/>
-                <a:cs typeface="Times New Roman" pitchFamily="18" charset="0"/>
+                <a:latin typeface="Times New Roman" panose="02020603050405020304" pitchFamily="18" charset="0"/>
+                <a:cs typeface="Times New Roman" panose="02020603050405020304" pitchFamily="18" charset="0"/>
               </a:rPr>
               <a:t> </a:t>
             </a:r>
             <a:r>
               <a:rPr lang="en-GB" sz="2400" b="1" dirty="0" err="1">
-                <a:latin typeface="Times New Roman" pitchFamily="18" charset="0"/>
-                <a:cs typeface="Times New Roman" pitchFamily="18" charset="0"/>
+                <a:latin typeface="Times New Roman" panose="02020603050405020304" pitchFamily="18" charset="0"/>
+                <a:cs typeface="Times New Roman" panose="02020603050405020304" pitchFamily="18" charset="0"/>
               </a:rPr>
               <a:t>pe</a:t>
             </a:r>
             <a:r>
               <a:rPr lang="en-GB" sz="2400" b="1" dirty="0">
-                <a:latin typeface="Times New Roman" pitchFamily="18" charset="0"/>
-                <a:cs typeface="Times New Roman" pitchFamily="18" charset="0"/>
+                <a:latin typeface="Times New Roman" panose="02020603050405020304" pitchFamily="18" charset="0"/>
+                <a:cs typeface="Times New Roman" panose="02020603050405020304" pitchFamily="18" charset="0"/>
               </a:rPr>
               <a:t> </a:t>
             </a:r>
             <a:r>
               <a:rPr lang="en-GB" sz="2400" b="1" dirty="0" err="1">
-                <a:latin typeface="Times New Roman" pitchFamily="18" charset="0"/>
-                <a:cs typeface="Times New Roman" pitchFamily="18" charset="0"/>
+                <a:latin typeface="Times New Roman" panose="02020603050405020304" pitchFamily="18" charset="0"/>
+                <a:cs typeface="Times New Roman" panose="02020603050405020304" pitchFamily="18" charset="0"/>
               </a:rPr>
               <a:t>obiecte</a:t>
             </a:r>
             <a:r>
               <a:rPr lang="en-GB" sz="2400" b="1" dirty="0">
-                <a:latin typeface="Times New Roman" pitchFamily="18" charset="0"/>
-                <a:cs typeface="Times New Roman" pitchFamily="18" charset="0"/>
+                <a:latin typeface="Times New Roman" panose="02020603050405020304" pitchFamily="18" charset="0"/>
+                <a:cs typeface="Times New Roman" panose="02020603050405020304" pitchFamily="18" charset="0"/>
               </a:rPr>
               <a:t> </a:t>
             </a:r>
             <a:r>
               <a:rPr lang="en-GB" sz="2400" dirty="0" err="1">
-                <a:latin typeface="Times New Roman" pitchFamily="18" charset="0"/>
-                <a:cs typeface="Times New Roman" pitchFamily="18" charset="0"/>
+                <a:latin typeface="Times New Roman" panose="02020603050405020304" pitchFamily="18" charset="0"/>
+                <a:cs typeface="Times New Roman" panose="02020603050405020304" pitchFamily="18" charset="0"/>
               </a:rPr>
               <a:t>poate</a:t>
             </a:r>
             <a:r>
               <a:rPr lang="en-GB" sz="2400" dirty="0">
-                <a:latin typeface="Times New Roman" pitchFamily="18" charset="0"/>
-                <a:cs typeface="Times New Roman" pitchFamily="18" charset="0"/>
+                <a:latin typeface="Times New Roman" panose="02020603050405020304" pitchFamily="18" charset="0"/>
+                <a:cs typeface="Times New Roman" panose="02020603050405020304" pitchFamily="18" charset="0"/>
               </a:rPr>
               <a:t> fi </a:t>
             </a:r>
             <a:r>
               <a:rPr lang="en-GB" sz="2400" dirty="0" err="1">
-                <a:latin typeface="Times New Roman" pitchFamily="18" charset="0"/>
-                <a:cs typeface="Times New Roman" pitchFamily="18" charset="0"/>
+                <a:latin typeface="Times New Roman" panose="02020603050405020304" pitchFamily="18" charset="0"/>
+                <a:cs typeface="Times New Roman" panose="02020603050405020304" pitchFamily="18" charset="0"/>
               </a:rPr>
               <a:t>definit</a:t>
             </a:r>
             <a:r>
               <a:rPr lang="ro-RO" sz="2400" dirty="0">
-                <a:latin typeface="Times New Roman" pitchFamily="18" charset="0"/>
-                <a:cs typeface="Times New Roman" pitchFamily="18" charset="0"/>
+                <a:latin typeface="Times New Roman" panose="02020603050405020304" pitchFamily="18" charset="0"/>
+                <a:cs typeface="Times New Roman" panose="02020603050405020304" pitchFamily="18" charset="0"/>
               </a:rPr>
               <a:t>ă</a:t>
             </a:r>
             <a:r>
               <a:rPr lang="en-GB" sz="2400" dirty="0">
-                <a:latin typeface="Times New Roman" pitchFamily="18" charset="0"/>
-                <a:cs typeface="Times New Roman" pitchFamily="18" charset="0"/>
+                <a:latin typeface="Times New Roman" panose="02020603050405020304" pitchFamily="18" charset="0"/>
+                <a:cs typeface="Times New Roman" panose="02020603050405020304" pitchFamily="18" charset="0"/>
               </a:rPr>
               <a:t> </a:t>
             </a:r>
             <a:r>
               <a:rPr lang="en-GB" sz="2400" dirty="0" err="1">
-                <a:latin typeface="Times New Roman" pitchFamily="18" charset="0"/>
-                <a:cs typeface="Times New Roman" pitchFamily="18" charset="0"/>
+                <a:latin typeface="Times New Roman" panose="02020603050405020304" pitchFamily="18" charset="0"/>
+                <a:cs typeface="Times New Roman" panose="02020603050405020304" pitchFamily="18" charset="0"/>
               </a:rPr>
               <a:t>ca</a:t>
             </a:r>
             <a:r>
               <a:rPr lang="en-GB" sz="2400" dirty="0">
-                <a:latin typeface="Times New Roman" pitchFamily="18" charset="0"/>
-                <a:cs typeface="Times New Roman" pitchFamily="18" charset="0"/>
+                <a:latin typeface="Times New Roman" panose="02020603050405020304" pitchFamily="18" charset="0"/>
+                <a:cs typeface="Times New Roman" panose="02020603050405020304" pitchFamily="18" charset="0"/>
               </a:rPr>
               <a:t> </a:t>
             </a:r>
             <a:r>
               <a:rPr lang="en-GB" sz="2400" dirty="0" err="1">
-                <a:latin typeface="Times New Roman" pitchFamily="18" charset="0"/>
-                <a:cs typeface="Times New Roman" pitchFamily="18" charset="0"/>
+                <a:latin typeface="Times New Roman" panose="02020603050405020304" pitchFamily="18" charset="0"/>
+                <a:cs typeface="Times New Roman" panose="02020603050405020304" pitchFamily="18" charset="0"/>
               </a:rPr>
               <a:t>fiind</a:t>
             </a:r>
             <a:r>
               <a:rPr lang="en-GB" sz="2400" dirty="0">
-                <a:latin typeface="Times New Roman" pitchFamily="18" charset="0"/>
-                <a:cs typeface="Times New Roman" pitchFamily="18" charset="0"/>
+                <a:latin typeface="Times New Roman" panose="02020603050405020304" pitchFamily="18" charset="0"/>
+                <a:cs typeface="Times New Roman" panose="02020603050405020304" pitchFamily="18" charset="0"/>
               </a:rPr>
               <a:t> </a:t>
             </a:r>
             <a:r>
               <a:rPr lang="en-GB" sz="2400" dirty="0" err="1">
-                <a:latin typeface="Times New Roman" pitchFamily="18" charset="0"/>
-                <a:cs typeface="Times New Roman" pitchFamily="18" charset="0"/>
+                <a:latin typeface="Times New Roman" panose="02020603050405020304" pitchFamily="18" charset="0"/>
+                <a:cs typeface="Times New Roman" panose="02020603050405020304" pitchFamily="18" charset="0"/>
               </a:rPr>
               <a:t>rezultatul</a:t>
             </a:r>
             <a:r>
               <a:rPr lang="en-GB" sz="2400" dirty="0">
-                <a:latin typeface="Times New Roman" pitchFamily="18" charset="0"/>
-                <a:cs typeface="Times New Roman" pitchFamily="18" charset="0"/>
+                <a:latin typeface="Times New Roman" panose="02020603050405020304" pitchFamily="18" charset="0"/>
+                <a:cs typeface="Times New Roman" panose="02020603050405020304" pitchFamily="18" charset="0"/>
               </a:rPr>
               <a:t> </a:t>
             </a:r>
             <a:r>
               <a:rPr lang="en-GB" sz="2400" dirty="0" err="1">
-                <a:latin typeface="Times New Roman" pitchFamily="18" charset="0"/>
-                <a:cs typeface="Times New Roman" pitchFamily="18" charset="0"/>
+                <a:latin typeface="Times New Roman" panose="02020603050405020304" pitchFamily="18" charset="0"/>
+                <a:cs typeface="Times New Roman" panose="02020603050405020304" pitchFamily="18" charset="0"/>
               </a:rPr>
               <a:t>aplic</a:t>
             </a:r>
             <a:r>
               <a:rPr lang="ro-RO" sz="2400" dirty="0">
-                <a:latin typeface="Times New Roman" pitchFamily="18" charset="0"/>
-                <a:cs typeface="Times New Roman" pitchFamily="18" charset="0"/>
+                <a:latin typeface="Times New Roman" panose="02020603050405020304" pitchFamily="18" charset="0"/>
+                <a:cs typeface="Times New Roman" panose="02020603050405020304" pitchFamily="18" charset="0"/>
               </a:rPr>
               <a:t>ă</a:t>
             </a:r>
             <a:r>
               <a:rPr lang="en-GB" sz="2400" dirty="0" err="1">
-                <a:latin typeface="Times New Roman" pitchFamily="18" charset="0"/>
-                <a:cs typeface="Times New Roman" pitchFamily="18" charset="0"/>
+                <a:latin typeface="Times New Roman" panose="02020603050405020304" pitchFamily="18" charset="0"/>
+                <a:cs typeface="Times New Roman" panose="02020603050405020304" pitchFamily="18" charset="0"/>
               </a:rPr>
               <a:t>rii</a:t>
             </a:r>
             <a:r>
               <a:rPr lang="en-GB" sz="2400" dirty="0">
-                <a:latin typeface="Times New Roman" pitchFamily="18" charset="0"/>
-                <a:cs typeface="Times New Roman" pitchFamily="18" charset="0"/>
+                <a:latin typeface="Times New Roman" panose="02020603050405020304" pitchFamily="18" charset="0"/>
+                <a:cs typeface="Times New Roman" panose="02020603050405020304" pitchFamily="18" charset="0"/>
               </a:rPr>
               <a:t> </a:t>
             </a:r>
             <a:r>
               <a:rPr lang="en-GB" sz="2400" dirty="0" err="1">
-                <a:latin typeface="Times New Roman" pitchFamily="18" charset="0"/>
-                <a:cs typeface="Times New Roman" pitchFamily="18" charset="0"/>
+                <a:latin typeface="Times New Roman" panose="02020603050405020304" pitchFamily="18" charset="0"/>
+                <a:cs typeface="Times New Roman" panose="02020603050405020304" pitchFamily="18" charset="0"/>
               </a:rPr>
               <a:t>tehnologiei</a:t>
             </a:r>
             <a:r>
               <a:rPr lang="en-GB" sz="2400" dirty="0">
-                <a:latin typeface="Times New Roman" pitchFamily="18" charset="0"/>
-                <a:cs typeface="Times New Roman" pitchFamily="18" charset="0"/>
+                <a:latin typeface="Times New Roman" panose="02020603050405020304" pitchFamily="18" charset="0"/>
+                <a:cs typeface="Times New Roman" panose="02020603050405020304" pitchFamily="18" charset="0"/>
               </a:rPr>
               <a:t> orientate </a:t>
             </a:r>
             <a:r>
               <a:rPr lang="en-GB" sz="2400" dirty="0" err="1">
-                <a:latin typeface="Times New Roman" pitchFamily="18" charset="0"/>
-                <a:cs typeface="Times New Roman" pitchFamily="18" charset="0"/>
+                <a:latin typeface="Times New Roman" panose="02020603050405020304" pitchFamily="18" charset="0"/>
+                <a:cs typeface="Times New Roman" panose="02020603050405020304" pitchFamily="18" charset="0"/>
               </a:rPr>
               <a:t>pe</a:t>
             </a:r>
             <a:r>
               <a:rPr lang="en-GB" sz="2400" dirty="0">
-                <a:latin typeface="Times New Roman" pitchFamily="18" charset="0"/>
-                <a:cs typeface="Times New Roman" pitchFamily="18" charset="0"/>
+                <a:latin typeface="Times New Roman" panose="02020603050405020304" pitchFamily="18" charset="0"/>
+                <a:cs typeface="Times New Roman" panose="02020603050405020304" pitchFamily="18" charset="0"/>
               </a:rPr>
               <a:t> </a:t>
             </a:r>
             <a:r>
               <a:rPr lang="en-GB" sz="2400" dirty="0" err="1">
-                <a:latin typeface="Times New Roman" pitchFamily="18" charset="0"/>
-                <a:cs typeface="Times New Roman" pitchFamily="18" charset="0"/>
+                <a:latin typeface="Times New Roman" panose="02020603050405020304" pitchFamily="18" charset="0"/>
+                <a:cs typeface="Times New Roman" panose="02020603050405020304" pitchFamily="18" charset="0"/>
               </a:rPr>
               <a:t>obiecte</a:t>
             </a:r>
             <a:r>
               <a:rPr lang="en-GB" sz="2400" dirty="0">
-                <a:latin typeface="Times New Roman" pitchFamily="18" charset="0"/>
-                <a:cs typeface="Times New Roman" pitchFamily="18" charset="0"/>
+                <a:latin typeface="Times New Roman" panose="02020603050405020304" pitchFamily="18" charset="0"/>
+                <a:cs typeface="Times New Roman" panose="02020603050405020304" pitchFamily="18" charset="0"/>
               </a:rPr>
               <a:t> </a:t>
             </a:r>
             <a:r>
               <a:rPr lang="ro-RO" sz="2400" dirty="0">
-                <a:latin typeface="Times New Roman" pitchFamily="18" charset="0"/>
-                <a:cs typeface="Times New Roman" pitchFamily="18" charset="0"/>
+                <a:latin typeface="Times New Roman" panose="02020603050405020304" pitchFamily="18" charset="0"/>
+                <a:cs typeface="Times New Roman" panose="02020603050405020304" pitchFamily="18" charset="0"/>
               </a:rPr>
               <a:t>î</a:t>
             </a:r>
             <a:r>
               <a:rPr lang="en-GB" sz="2400" dirty="0">
-                <a:latin typeface="Times New Roman" pitchFamily="18" charset="0"/>
-                <a:cs typeface="Times New Roman" pitchFamily="18" charset="0"/>
+                <a:latin typeface="Times New Roman" panose="02020603050405020304" pitchFamily="18" charset="0"/>
+                <a:cs typeface="Times New Roman" panose="02020603050405020304" pitchFamily="18" charset="0"/>
               </a:rPr>
               <a:t>n </a:t>
             </a:r>
             <a:r>
               <a:rPr lang="en-GB" sz="2400" dirty="0" err="1">
-                <a:latin typeface="Times New Roman" pitchFamily="18" charset="0"/>
-                <a:cs typeface="Times New Roman" pitchFamily="18" charset="0"/>
+                <a:latin typeface="Times New Roman" panose="02020603050405020304" pitchFamily="18" charset="0"/>
+                <a:cs typeface="Times New Roman" panose="02020603050405020304" pitchFamily="18" charset="0"/>
               </a:rPr>
               <a:t>domeniul</a:t>
             </a:r>
             <a:r>
               <a:rPr lang="en-GB" sz="2400" dirty="0">
-                <a:latin typeface="Times New Roman" pitchFamily="18" charset="0"/>
-                <a:cs typeface="Times New Roman" pitchFamily="18" charset="0"/>
+                <a:latin typeface="Times New Roman" panose="02020603050405020304" pitchFamily="18" charset="0"/>
+                <a:cs typeface="Times New Roman" panose="02020603050405020304" pitchFamily="18" charset="0"/>
               </a:rPr>
               <a:t> </a:t>
             </a:r>
             <a:r>
               <a:rPr lang="en-GB" sz="2400" dirty="0" err="1">
-                <a:latin typeface="Times New Roman" pitchFamily="18" charset="0"/>
-                <a:cs typeface="Times New Roman" pitchFamily="18" charset="0"/>
+                <a:latin typeface="Times New Roman" panose="02020603050405020304" pitchFamily="18" charset="0"/>
+                <a:cs typeface="Times New Roman" panose="02020603050405020304" pitchFamily="18" charset="0"/>
               </a:rPr>
               <a:t>stoc</a:t>
             </a:r>
             <a:r>
               <a:rPr lang="ro-RO" sz="2400" dirty="0">
-                <a:latin typeface="Times New Roman" pitchFamily="18" charset="0"/>
-                <a:cs typeface="Times New Roman" pitchFamily="18" charset="0"/>
+                <a:latin typeface="Times New Roman" panose="02020603050405020304" pitchFamily="18" charset="0"/>
+                <a:cs typeface="Times New Roman" panose="02020603050405020304" pitchFamily="18" charset="0"/>
               </a:rPr>
               <a:t>ă</a:t>
             </a:r>
             <a:r>
               <a:rPr lang="en-GB" sz="2400" dirty="0" err="1">
-                <a:latin typeface="Times New Roman" pitchFamily="18" charset="0"/>
-                <a:cs typeface="Times New Roman" pitchFamily="18" charset="0"/>
+                <a:latin typeface="Times New Roman" panose="02020603050405020304" pitchFamily="18" charset="0"/>
+                <a:cs typeface="Times New Roman" panose="02020603050405020304" pitchFamily="18" charset="0"/>
               </a:rPr>
               <a:t>rii</a:t>
             </a:r>
             <a:r>
               <a:rPr lang="en-GB" sz="2400" dirty="0">
-                <a:latin typeface="Times New Roman" pitchFamily="18" charset="0"/>
-                <a:cs typeface="Times New Roman" pitchFamily="18" charset="0"/>
+                <a:latin typeface="Times New Roman" panose="02020603050405020304" pitchFamily="18" charset="0"/>
+                <a:cs typeface="Times New Roman" panose="02020603050405020304" pitchFamily="18" charset="0"/>
               </a:rPr>
               <a:t> </a:t>
             </a:r>
             <a:r>
               <a:rPr lang="ro-RO" sz="2400" dirty="0" err="1">
-                <a:latin typeface="Times New Roman" pitchFamily="18" charset="0"/>
-                <a:cs typeface="Times New Roman" pitchFamily="18" charset="0"/>
+                <a:latin typeface="Times New Roman" panose="02020603050405020304" pitchFamily="18" charset="0"/>
+                <a:cs typeface="Times New Roman" panose="02020603050405020304" pitchFamily="18" charset="0"/>
               </a:rPr>
               <a:t>ș</a:t>
             </a:r>
             <a:r>
               <a:rPr lang="en-GB" sz="2400" dirty="0">
-                <a:latin typeface="Times New Roman" pitchFamily="18" charset="0"/>
-                <a:cs typeface="Times New Roman" pitchFamily="18" charset="0"/>
+                <a:latin typeface="Times New Roman" panose="02020603050405020304" pitchFamily="18" charset="0"/>
+                <a:cs typeface="Times New Roman" panose="02020603050405020304" pitchFamily="18" charset="0"/>
               </a:rPr>
               <a:t>i </a:t>
             </a:r>
             <a:r>
               <a:rPr lang="en-GB" sz="2400" dirty="0" err="1">
-                <a:latin typeface="Times New Roman" pitchFamily="18" charset="0"/>
-                <a:cs typeface="Times New Roman" pitchFamily="18" charset="0"/>
+                <a:latin typeface="Times New Roman" panose="02020603050405020304" pitchFamily="18" charset="0"/>
+                <a:cs typeface="Times New Roman" panose="02020603050405020304" pitchFamily="18" charset="0"/>
               </a:rPr>
               <a:t>reg</a:t>
             </a:r>
             <a:r>
               <a:rPr lang="ro-RO" sz="2400" dirty="0">
-                <a:latin typeface="Times New Roman" pitchFamily="18" charset="0"/>
-                <a:cs typeface="Times New Roman" pitchFamily="18" charset="0"/>
+                <a:latin typeface="Times New Roman" panose="02020603050405020304" pitchFamily="18" charset="0"/>
+                <a:cs typeface="Times New Roman" panose="02020603050405020304" pitchFamily="18" charset="0"/>
               </a:rPr>
               <a:t>ă</a:t>
             </a:r>
             <a:r>
               <a:rPr lang="en-GB" sz="2400" dirty="0" err="1">
-                <a:latin typeface="Times New Roman" pitchFamily="18" charset="0"/>
-                <a:cs typeface="Times New Roman" pitchFamily="18" charset="0"/>
+                <a:latin typeface="Times New Roman" panose="02020603050405020304" pitchFamily="18" charset="0"/>
+                <a:cs typeface="Times New Roman" panose="02020603050405020304" pitchFamily="18" charset="0"/>
               </a:rPr>
               <a:t>sirii</a:t>
             </a:r>
             <a:r>
               <a:rPr lang="en-GB" sz="2400" dirty="0">
-                <a:latin typeface="Times New Roman" pitchFamily="18" charset="0"/>
-                <a:cs typeface="Times New Roman" pitchFamily="18" charset="0"/>
+                <a:latin typeface="Times New Roman" panose="02020603050405020304" pitchFamily="18" charset="0"/>
+                <a:cs typeface="Times New Roman" panose="02020603050405020304" pitchFamily="18" charset="0"/>
               </a:rPr>
               <a:t> </a:t>
             </a:r>
             <a:r>
               <a:rPr lang="en-GB" sz="2400" dirty="0" err="1">
-                <a:latin typeface="Times New Roman" pitchFamily="18" charset="0"/>
-                <a:cs typeface="Times New Roman" pitchFamily="18" charset="0"/>
+                <a:latin typeface="Times New Roman" panose="02020603050405020304" pitchFamily="18" charset="0"/>
+                <a:cs typeface="Times New Roman" panose="02020603050405020304" pitchFamily="18" charset="0"/>
               </a:rPr>
               <a:t>informa</a:t>
             </a:r>
             <a:r>
               <a:rPr lang="ro-RO" sz="2400" dirty="0">
-                <a:latin typeface="Times New Roman" pitchFamily="18" charset="0"/>
-                <a:cs typeface="Times New Roman" pitchFamily="18" charset="0"/>
+                <a:latin typeface="Times New Roman" panose="02020603050405020304" pitchFamily="18" charset="0"/>
+                <a:cs typeface="Times New Roman" panose="02020603050405020304" pitchFamily="18" charset="0"/>
               </a:rPr>
               <a:t>ț</a:t>
             </a:r>
             <a:r>
               <a:rPr lang="en-GB" sz="2400" dirty="0" err="1">
-                <a:latin typeface="Times New Roman" pitchFamily="18" charset="0"/>
-                <a:cs typeface="Times New Roman" pitchFamily="18" charset="0"/>
+                <a:latin typeface="Times New Roman" panose="02020603050405020304" pitchFamily="18" charset="0"/>
+                <a:cs typeface="Times New Roman" panose="02020603050405020304" pitchFamily="18" charset="0"/>
               </a:rPr>
               <a:t>iilor</a:t>
             </a:r>
             <a:r>
               <a:rPr lang="en-GB" sz="2400" dirty="0">
-                <a:latin typeface="Times New Roman" pitchFamily="18" charset="0"/>
-                <a:cs typeface="Times New Roman" pitchFamily="18" charset="0"/>
+                <a:latin typeface="Times New Roman" panose="02020603050405020304" pitchFamily="18" charset="0"/>
+                <a:cs typeface="Times New Roman" panose="02020603050405020304" pitchFamily="18" charset="0"/>
               </a:rPr>
               <a:t>. </a:t>
             </a:r>
             <a:r>
               <a:rPr lang="en-GB" sz="2400" dirty="0" err="1">
-                <a:latin typeface="Times New Roman" pitchFamily="18" charset="0"/>
-                <a:cs typeface="Times New Roman" pitchFamily="18" charset="0"/>
+                <a:latin typeface="Times New Roman" panose="02020603050405020304" pitchFamily="18" charset="0"/>
+                <a:cs typeface="Times New Roman" panose="02020603050405020304" pitchFamily="18" charset="0"/>
               </a:rPr>
               <a:t>Ea</a:t>
             </a:r>
             <a:r>
               <a:rPr lang="en-GB" sz="2400" dirty="0">
-                <a:latin typeface="Times New Roman" pitchFamily="18" charset="0"/>
-                <a:cs typeface="Times New Roman" pitchFamily="18" charset="0"/>
+                <a:latin typeface="Times New Roman" panose="02020603050405020304" pitchFamily="18" charset="0"/>
+                <a:cs typeface="Times New Roman" panose="02020603050405020304" pitchFamily="18" charset="0"/>
               </a:rPr>
               <a:t> </a:t>
             </a:r>
             <a:r>
               <a:rPr lang="en-GB" sz="2400" dirty="0" err="1">
-                <a:latin typeface="Times New Roman" pitchFamily="18" charset="0"/>
-                <a:cs typeface="Times New Roman" pitchFamily="18" charset="0"/>
+                <a:latin typeface="Times New Roman" panose="02020603050405020304" pitchFamily="18" charset="0"/>
+                <a:cs typeface="Times New Roman" panose="02020603050405020304" pitchFamily="18" charset="0"/>
               </a:rPr>
               <a:t>ofe</a:t>
             </a:r>
             <a:r>
               <a:rPr lang="ro-RO" sz="2400" dirty="0">
-                <a:latin typeface="Times New Roman" pitchFamily="18" charset="0"/>
-                <a:cs typeface="Times New Roman" pitchFamily="18" charset="0"/>
+                <a:latin typeface="Times New Roman" panose="02020603050405020304" pitchFamily="18" charset="0"/>
+                <a:cs typeface="Times New Roman" panose="02020603050405020304" pitchFamily="18" charset="0"/>
               </a:rPr>
               <a:t>ră</a:t>
             </a:r>
             <a:r>
               <a:rPr lang="en-GB" sz="2400" dirty="0">
-                <a:latin typeface="Times New Roman" pitchFamily="18" charset="0"/>
-                <a:cs typeface="Times New Roman" pitchFamily="18" charset="0"/>
+                <a:latin typeface="Times New Roman" panose="02020603050405020304" pitchFamily="18" charset="0"/>
+                <a:cs typeface="Times New Roman" panose="02020603050405020304" pitchFamily="18" charset="0"/>
               </a:rPr>
               <a:t> </a:t>
             </a:r>
             <a:r>
               <a:rPr lang="en-GB" sz="2400" dirty="0" err="1">
-                <a:latin typeface="Times New Roman" pitchFamily="18" charset="0"/>
-                <a:cs typeface="Times New Roman" pitchFamily="18" charset="0"/>
+                <a:latin typeface="Times New Roman" panose="02020603050405020304" pitchFamily="18" charset="0"/>
+                <a:cs typeface="Times New Roman" panose="02020603050405020304" pitchFamily="18" charset="0"/>
               </a:rPr>
               <a:t>posibilitatea</a:t>
             </a:r>
             <a:r>
               <a:rPr lang="en-GB" sz="2400" dirty="0">
-                <a:latin typeface="Times New Roman" pitchFamily="18" charset="0"/>
-                <a:cs typeface="Times New Roman" pitchFamily="18" charset="0"/>
+                <a:latin typeface="Times New Roman" panose="02020603050405020304" pitchFamily="18" charset="0"/>
+                <a:cs typeface="Times New Roman" panose="02020603050405020304" pitchFamily="18" charset="0"/>
               </a:rPr>
               <a:t> de a </a:t>
             </a:r>
             <a:r>
               <a:rPr lang="en-GB" sz="2400" dirty="0" err="1">
-                <a:latin typeface="Times New Roman" pitchFamily="18" charset="0"/>
-                <a:cs typeface="Times New Roman" pitchFamily="18" charset="0"/>
+                <a:latin typeface="Times New Roman" panose="02020603050405020304" pitchFamily="18" charset="0"/>
+                <a:cs typeface="Times New Roman" panose="02020603050405020304" pitchFamily="18" charset="0"/>
               </a:rPr>
               <a:t>reprezent</a:t>
             </a:r>
             <a:r>
               <a:rPr lang="ro-RO" sz="2400" dirty="0">
-                <a:latin typeface="Times New Roman" pitchFamily="18" charset="0"/>
-                <a:cs typeface="Times New Roman" pitchFamily="18" charset="0"/>
+                <a:latin typeface="Times New Roman" panose="02020603050405020304" pitchFamily="18" charset="0"/>
+                <a:cs typeface="Times New Roman" panose="02020603050405020304" pitchFamily="18" charset="0"/>
               </a:rPr>
               <a:t>a</a:t>
             </a:r>
             <a:r>
               <a:rPr lang="en-GB" sz="2400" dirty="0">
-                <a:latin typeface="Times New Roman" pitchFamily="18" charset="0"/>
-                <a:cs typeface="Times New Roman" pitchFamily="18" charset="0"/>
+                <a:latin typeface="Times New Roman" panose="02020603050405020304" pitchFamily="18" charset="0"/>
+                <a:cs typeface="Times New Roman" panose="02020603050405020304" pitchFamily="18" charset="0"/>
               </a:rPr>
               <a:t> </a:t>
             </a:r>
             <a:r>
               <a:rPr lang="en-GB" sz="2400" dirty="0" err="1">
-                <a:latin typeface="Times New Roman" pitchFamily="18" charset="0"/>
-                <a:cs typeface="Times New Roman" pitchFamily="18" charset="0"/>
+                <a:latin typeface="Times New Roman" panose="02020603050405020304" pitchFamily="18" charset="0"/>
+                <a:cs typeface="Times New Roman" panose="02020603050405020304" pitchFamily="18" charset="0"/>
               </a:rPr>
               <a:t>structuri</a:t>
             </a:r>
             <a:r>
               <a:rPr lang="en-GB" sz="2400" dirty="0">
-                <a:latin typeface="Times New Roman" pitchFamily="18" charset="0"/>
-                <a:cs typeface="Times New Roman" pitchFamily="18" charset="0"/>
+                <a:latin typeface="Times New Roman" panose="02020603050405020304" pitchFamily="18" charset="0"/>
+                <a:cs typeface="Times New Roman" panose="02020603050405020304" pitchFamily="18" charset="0"/>
               </a:rPr>
               <a:t> de date </a:t>
             </a:r>
             <a:r>
               <a:rPr lang="en-GB" sz="2400" dirty="0" err="1">
-                <a:latin typeface="Times New Roman" pitchFamily="18" charset="0"/>
-                <a:cs typeface="Times New Roman" pitchFamily="18" charset="0"/>
+                <a:latin typeface="Times New Roman" panose="02020603050405020304" pitchFamily="18" charset="0"/>
+                <a:cs typeface="Times New Roman" panose="02020603050405020304" pitchFamily="18" charset="0"/>
               </a:rPr>
               <a:t>foarte</a:t>
             </a:r>
             <a:r>
               <a:rPr lang="en-GB" sz="2400" dirty="0">
-                <a:latin typeface="Times New Roman" pitchFamily="18" charset="0"/>
-                <a:cs typeface="Times New Roman" pitchFamily="18" charset="0"/>
+                <a:latin typeface="Times New Roman" panose="02020603050405020304" pitchFamily="18" charset="0"/>
+                <a:cs typeface="Times New Roman" panose="02020603050405020304" pitchFamily="18" charset="0"/>
               </a:rPr>
               <a:t> </a:t>
             </a:r>
             <a:r>
               <a:rPr lang="en-GB" sz="2400" dirty="0" err="1">
-                <a:latin typeface="Times New Roman" pitchFamily="18" charset="0"/>
-                <a:cs typeface="Times New Roman" pitchFamily="18" charset="0"/>
+                <a:latin typeface="Times New Roman" panose="02020603050405020304" pitchFamily="18" charset="0"/>
+                <a:cs typeface="Times New Roman" panose="02020603050405020304" pitchFamily="18" charset="0"/>
               </a:rPr>
               <a:t>complexe</a:t>
             </a:r>
             <a:r>
               <a:rPr lang="en-GB" sz="2400" dirty="0">
-                <a:latin typeface="Times New Roman" pitchFamily="18" charset="0"/>
-                <a:cs typeface="Times New Roman" pitchFamily="18" charset="0"/>
+                <a:latin typeface="Times New Roman" panose="02020603050405020304" pitchFamily="18" charset="0"/>
+                <a:cs typeface="Times New Roman" panose="02020603050405020304" pitchFamily="18" charset="0"/>
               </a:rPr>
               <a:t> cu </a:t>
             </a:r>
             <a:r>
               <a:rPr lang="en-GB" sz="2400" dirty="0" err="1">
-                <a:latin typeface="Times New Roman" pitchFamily="18" charset="0"/>
-                <a:cs typeface="Times New Roman" pitchFamily="18" charset="0"/>
+                <a:latin typeface="Times New Roman" panose="02020603050405020304" pitchFamily="18" charset="0"/>
+                <a:cs typeface="Times New Roman" panose="02020603050405020304" pitchFamily="18" charset="0"/>
               </a:rPr>
               <a:t>ajutorul</a:t>
             </a:r>
             <a:r>
               <a:rPr lang="en-GB" sz="2400" dirty="0">
-                <a:latin typeface="Times New Roman" pitchFamily="18" charset="0"/>
-                <a:cs typeface="Times New Roman" pitchFamily="18" charset="0"/>
+                <a:latin typeface="Times New Roman" panose="02020603050405020304" pitchFamily="18" charset="0"/>
+                <a:cs typeface="Times New Roman" panose="02020603050405020304" pitchFamily="18" charset="0"/>
               </a:rPr>
               <a:t> </a:t>
             </a:r>
             <a:r>
               <a:rPr lang="en-GB" sz="2400" dirty="0" err="1">
-                <a:latin typeface="Times New Roman" pitchFamily="18" charset="0"/>
-                <a:cs typeface="Times New Roman" pitchFamily="18" charset="0"/>
+                <a:latin typeface="Times New Roman" panose="02020603050405020304" pitchFamily="18" charset="0"/>
+                <a:cs typeface="Times New Roman" panose="02020603050405020304" pitchFamily="18" charset="0"/>
               </a:rPr>
               <a:t>obiectelor</a:t>
             </a:r>
             <a:r>
               <a:rPr lang="en-GB" sz="2400" dirty="0">
-                <a:latin typeface="Times New Roman" pitchFamily="18" charset="0"/>
-                <a:cs typeface="Times New Roman" pitchFamily="18" charset="0"/>
+                <a:latin typeface="Times New Roman" panose="02020603050405020304" pitchFamily="18" charset="0"/>
+                <a:cs typeface="Times New Roman" panose="02020603050405020304" pitchFamily="18" charset="0"/>
               </a:rPr>
               <a:t>.</a:t>
             </a:r>
             <a:endParaRPr lang="ro-RO" sz="2400" dirty="0">
-              <a:latin typeface="Times New Roman" pitchFamily="18" charset="0"/>
-              <a:cs typeface="Times New Roman" pitchFamily="18" charset="0"/>
+              <a:latin typeface="Times New Roman" panose="02020603050405020304" pitchFamily="18" charset="0"/>
+              <a:cs typeface="Times New Roman" panose="02020603050405020304" pitchFamily="18" charset="0"/>
             </a:endParaRPr>
           </a:p>
           <a:p>
@@ -13888,120 +14070,225 @@
               <a:buChar char="§"/>
             </a:pPr>
             <a:r>
-              <a:rPr lang="fr-FR" sz="2400" dirty="0" err="1"/>
+              <a:rPr lang="fr-FR" sz="2400" b="1" dirty="0" err="1">
+                <a:latin typeface="Times New Roman" panose="02020603050405020304" pitchFamily="18" charset="0"/>
+                <a:cs typeface="Times New Roman" panose="02020603050405020304" pitchFamily="18" charset="0"/>
+              </a:rPr>
               <a:t>Bazele</a:t>
             </a:r>
             <a:r>
-              <a:rPr lang="fr-FR" sz="2400" dirty="0"/>
+              <a:rPr lang="fr-FR" sz="2400" b="1" dirty="0">
+                <a:latin typeface="Times New Roman" panose="02020603050405020304" pitchFamily="18" charset="0"/>
+                <a:cs typeface="Times New Roman" panose="02020603050405020304" pitchFamily="18" charset="0"/>
+              </a:rPr>
               <a:t> de date </a:t>
             </a:r>
             <a:r>
-              <a:rPr lang="fr-FR" sz="2400" dirty="0" err="1"/>
+              <a:rPr lang="fr-FR" sz="2400" b="1" dirty="0" err="1">
+                <a:latin typeface="Times New Roman" panose="02020603050405020304" pitchFamily="18" charset="0"/>
+                <a:cs typeface="Times New Roman" panose="02020603050405020304" pitchFamily="18" charset="0"/>
+              </a:rPr>
               <a:t>orientate</a:t>
             </a:r>
             <a:r>
-              <a:rPr lang="fr-FR" sz="2400" dirty="0"/>
-              <a:t> </a:t>
-            </a:r>
-            <a:r>
-              <a:rPr lang="fr-FR" sz="2400" dirty="0" err="1"/>
+              <a:rPr lang="fr-FR" sz="2400" b="1" dirty="0">
+                <a:latin typeface="Times New Roman" panose="02020603050405020304" pitchFamily="18" charset="0"/>
+                <a:cs typeface="Times New Roman" panose="02020603050405020304" pitchFamily="18" charset="0"/>
+              </a:rPr>
+              <a:t> </a:t>
+            </a:r>
+            <a:r>
+              <a:rPr lang="fr-FR" sz="2400" b="1" dirty="0" err="1">
+                <a:latin typeface="Times New Roman" panose="02020603050405020304" pitchFamily="18" charset="0"/>
+                <a:cs typeface="Times New Roman" panose="02020603050405020304" pitchFamily="18" charset="0"/>
+              </a:rPr>
               <a:t>pe</a:t>
             </a:r>
             <a:r>
-              <a:rPr lang="fr-FR" sz="2400" dirty="0"/>
-              <a:t> </a:t>
-            </a:r>
-            <a:r>
-              <a:rPr lang="fr-FR" sz="2400" dirty="0" err="1"/>
+              <a:rPr lang="fr-FR" sz="2400" b="1" dirty="0">
+                <a:latin typeface="Times New Roman" panose="02020603050405020304" pitchFamily="18" charset="0"/>
+                <a:cs typeface="Times New Roman" panose="02020603050405020304" pitchFamily="18" charset="0"/>
+              </a:rPr>
+              <a:t> </a:t>
+            </a:r>
+            <a:r>
+              <a:rPr lang="fr-FR" sz="2400" b="1" dirty="0" err="1">
+                <a:latin typeface="Times New Roman" panose="02020603050405020304" pitchFamily="18" charset="0"/>
+                <a:cs typeface="Times New Roman" panose="02020603050405020304" pitchFamily="18" charset="0"/>
+              </a:rPr>
               <a:t>obiecte</a:t>
             </a:r>
             <a:r>
-              <a:rPr lang="fr-FR" sz="2400" dirty="0"/>
-              <a:t> permit </a:t>
-            </a:r>
-            <a:r>
-              <a:rPr lang="fr-FR" sz="2400" dirty="0" err="1"/>
+              <a:rPr lang="fr-FR" sz="2400" b="1" dirty="0">
+                <a:latin typeface="Times New Roman" panose="02020603050405020304" pitchFamily="18" charset="0"/>
+                <a:cs typeface="Times New Roman" panose="02020603050405020304" pitchFamily="18" charset="0"/>
+              </a:rPr>
+              <a:t> </a:t>
+            </a:r>
+            <a:r>
+              <a:rPr lang="fr-FR" sz="2400" dirty="0">
+                <a:latin typeface="Times New Roman" panose="02020603050405020304" pitchFamily="18" charset="0"/>
+                <a:cs typeface="Times New Roman" panose="02020603050405020304" pitchFamily="18" charset="0"/>
+              </a:rPr>
+              <a:t>permit </a:t>
+            </a:r>
+            <a:r>
+              <a:rPr lang="fr-FR" sz="2400" dirty="0" err="1">
+                <a:latin typeface="Times New Roman" panose="02020603050405020304" pitchFamily="18" charset="0"/>
+                <a:cs typeface="Times New Roman" panose="02020603050405020304" pitchFamily="18" charset="0"/>
+              </a:rPr>
               <a:t>crearea</a:t>
             </a:r>
             <a:r>
-              <a:rPr lang="fr-FR" sz="2400" dirty="0"/>
+              <a:rPr lang="fr-FR" sz="2400" dirty="0">
+                <a:latin typeface="Times New Roman" panose="02020603050405020304" pitchFamily="18" charset="0"/>
+                <a:cs typeface="Times New Roman" panose="02020603050405020304" pitchFamily="18" charset="0"/>
+              </a:rPr>
               <a:t> de </a:t>
             </a:r>
             <a:r>
-              <a:rPr lang="fr-FR" sz="2400" dirty="0" err="1"/>
+              <a:rPr lang="fr-FR" sz="2400" dirty="0" err="1">
+                <a:latin typeface="Times New Roman" panose="02020603050405020304" pitchFamily="18" charset="0"/>
+                <a:cs typeface="Times New Roman" panose="02020603050405020304" pitchFamily="18" charset="0"/>
+              </a:rPr>
               <a:t>obiecte</a:t>
             </a:r>
             <a:r>
-              <a:rPr lang="fr-FR" sz="2400" dirty="0"/>
+              <a:rPr lang="fr-FR" sz="2400" dirty="0">
+                <a:latin typeface="Times New Roman" panose="02020603050405020304" pitchFamily="18" charset="0"/>
+                <a:cs typeface="Times New Roman" panose="02020603050405020304" pitchFamily="18" charset="0"/>
+              </a:rPr>
               <a:t> complexe </a:t>
             </a:r>
             <a:r>
-              <a:rPr lang="fr-FR" sz="2400" dirty="0" err="1"/>
+              <a:rPr lang="fr-FR" sz="2400" dirty="0" err="1">
+                <a:latin typeface="Times New Roman" panose="02020603050405020304" pitchFamily="18" charset="0"/>
+                <a:cs typeface="Times New Roman" panose="02020603050405020304" pitchFamily="18" charset="0"/>
+              </a:rPr>
               <a:t>din</a:t>
             </a:r>
             <a:r>
-              <a:rPr lang="fr-FR" sz="2400" dirty="0"/>
-              <a:t> </a:t>
-            </a:r>
-            <a:r>
-              <a:rPr lang="fr-FR" sz="2400" dirty="0" err="1"/>
+              <a:rPr lang="fr-FR" sz="2400" dirty="0">
+                <a:latin typeface="Times New Roman" panose="02020603050405020304" pitchFamily="18" charset="0"/>
+                <a:cs typeface="Times New Roman" panose="02020603050405020304" pitchFamily="18" charset="0"/>
+              </a:rPr>
+              <a:t> </a:t>
+            </a:r>
+            <a:r>
+              <a:rPr lang="fr-FR" sz="2400" dirty="0" err="1">
+                <a:latin typeface="Times New Roman" panose="02020603050405020304" pitchFamily="18" charset="0"/>
+                <a:cs typeface="Times New Roman" panose="02020603050405020304" pitchFamily="18" charset="0"/>
+              </a:rPr>
               <a:t>componente</a:t>
             </a:r>
             <a:r>
-              <a:rPr lang="fr-FR" sz="2400" dirty="0"/>
+              <a:rPr lang="fr-FR" sz="2400" dirty="0">
+                <a:latin typeface="Times New Roman" panose="02020603050405020304" pitchFamily="18" charset="0"/>
+                <a:cs typeface="Times New Roman" panose="02020603050405020304" pitchFamily="18" charset="0"/>
+              </a:rPr>
               <a:t> mai simple, </a:t>
             </a:r>
             <a:r>
-              <a:rPr lang="fr-FR" sz="2400" dirty="0" err="1"/>
+              <a:rPr lang="fr-FR" sz="2400" dirty="0" err="1">
+                <a:latin typeface="Times New Roman" panose="02020603050405020304" pitchFamily="18" charset="0"/>
+                <a:cs typeface="Times New Roman" panose="02020603050405020304" pitchFamily="18" charset="0"/>
+              </a:rPr>
               <a:t>fiecare</a:t>
             </a:r>
             <a:r>
-              <a:rPr lang="fr-FR" sz="2400" dirty="0"/>
-              <a:t> </a:t>
-            </a:r>
-            <a:r>
-              <a:rPr lang="fr-FR" sz="2400" dirty="0" err="1"/>
-              <a:t>avand</a:t>
-            </a:r>
-            <a:r>
-              <a:rPr lang="fr-FR" sz="2400" dirty="0"/>
-              <a:t> </a:t>
-            </a:r>
-            <a:r>
-              <a:rPr lang="fr-FR" sz="2400" dirty="0" err="1"/>
+              <a:rPr lang="fr-FR" sz="2400" dirty="0">
+                <a:latin typeface="Times New Roman" panose="02020603050405020304" pitchFamily="18" charset="0"/>
+                <a:cs typeface="Times New Roman" panose="02020603050405020304" pitchFamily="18" charset="0"/>
+              </a:rPr>
+              <a:t> </a:t>
+            </a:r>
+            <a:r>
+              <a:rPr lang="fr-FR" sz="2400" dirty="0" err="1">
+                <a:latin typeface="Times New Roman" panose="02020603050405020304" pitchFamily="18" charset="0"/>
+                <a:cs typeface="Times New Roman" panose="02020603050405020304" pitchFamily="18" charset="0"/>
+              </a:rPr>
+              <a:t>având</a:t>
+            </a:r>
+            <a:r>
+              <a:rPr lang="fr-FR" sz="2400" dirty="0">
+                <a:latin typeface="Times New Roman" panose="02020603050405020304" pitchFamily="18" charset="0"/>
+                <a:cs typeface="Times New Roman" panose="02020603050405020304" pitchFamily="18" charset="0"/>
+              </a:rPr>
+              <a:t> </a:t>
+            </a:r>
+            <a:r>
+              <a:rPr lang="fr-FR" sz="2400" dirty="0" err="1">
+                <a:latin typeface="Times New Roman" panose="02020603050405020304" pitchFamily="18" charset="0"/>
+                <a:cs typeface="Times New Roman" panose="02020603050405020304" pitchFamily="18" charset="0"/>
+              </a:rPr>
               <a:t>propriile</a:t>
             </a:r>
             <a:r>
-              <a:rPr lang="fr-FR" sz="2400" dirty="0"/>
-              <a:t> </a:t>
-            </a:r>
-            <a:r>
-              <a:rPr lang="fr-FR" sz="2400" dirty="0" err="1"/>
+              <a:rPr lang="fr-FR" sz="2400" dirty="0">
+                <a:latin typeface="Times New Roman" panose="02020603050405020304" pitchFamily="18" charset="0"/>
+                <a:cs typeface="Times New Roman" panose="02020603050405020304" pitchFamily="18" charset="0"/>
+              </a:rPr>
+              <a:t> </a:t>
+            </a:r>
+            <a:r>
+              <a:rPr lang="fr-FR" sz="2400" dirty="0" err="1">
+                <a:latin typeface="Times New Roman" panose="02020603050405020304" pitchFamily="18" charset="0"/>
+                <a:cs typeface="Times New Roman" panose="02020603050405020304" pitchFamily="18" charset="0"/>
+              </a:rPr>
               <a:t>atribute</a:t>
             </a:r>
             <a:r>
-              <a:rPr lang="fr-FR" sz="2400" dirty="0"/>
-              <a:t> si </a:t>
-            </a:r>
-            <a:r>
-              <a:rPr lang="fr-FR" sz="2400" dirty="0" err="1"/>
+              <a:rPr lang="fr-FR" sz="2400" dirty="0">
+                <a:latin typeface="Times New Roman" panose="02020603050405020304" pitchFamily="18" charset="0"/>
+                <a:cs typeface="Times New Roman" panose="02020603050405020304" pitchFamily="18" charset="0"/>
+              </a:rPr>
+              <a:t> </a:t>
+            </a:r>
+            <a:r>
+              <a:rPr lang="fr-FR" sz="2400" dirty="0" err="1">
+                <a:latin typeface="Times New Roman" panose="02020603050405020304" pitchFamily="18" charset="0"/>
+                <a:cs typeface="Times New Roman" panose="02020603050405020304" pitchFamily="18" charset="0"/>
+              </a:rPr>
+              <a:t>și</a:t>
+            </a:r>
+            <a:r>
+              <a:rPr lang="fr-FR" sz="2400" dirty="0">
+                <a:latin typeface="Times New Roman" panose="02020603050405020304" pitchFamily="18" charset="0"/>
+                <a:cs typeface="Times New Roman" panose="02020603050405020304" pitchFamily="18" charset="0"/>
+              </a:rPr>
+              <a:t> </a:t>
+            </a:r>
+            <a:r>
+              <a:rPr lang="fr-FR" sz="2400" dirty="0" err="1">
+                <a:latin typeface="Times New Roman" panose="02020603050405020304" pitchFamily="18" charset="0"/>
+                <a:cs typeface="Times New Roman" panose="02020603050405020304" pitchFamily="18" charset="0"/>
+              </a:rPr>
               <a:t>propriul</a:t>
             </a:r>
             <a:r>
-              <a:rPr lang="fr-FR" sz="2400" dirty="0"/>
-              <a:t> </a:t>
-            </a:r>
-            <a:r>
-              <a:rPr lang="fr-FR" sz="2400" dirty="0" err="1"/>
+              <a:rPr lang="fr-FR" sz="2400" dirty="0">
+                <a:latin typeface="Times New Roman" panose="02020603050405020304" pitchFamily="18" charset="0"/>
+                <a:cs typeface="Times New Roman" panose="02020603050405020304" pitchFamily="18" charset="0"/>
+              </a:rPr>
+              <a:t> </a:t>
+            </a:r>
+            <a:r>
+              <a:rPr lang="fr-FR" sz="2400" dirty="0" err="1">
+                <a:latin typeface="Times New Roman" panose="02020603050405020304" pitchFamily="18" charset="0"/>
+                <a:cs typeface="Times New Roman" panose="02020603050405020304" pitchFamily="18" charset="0"/>
+              </a:rPr>
               <a:t>comportament</a:t>
             </a:r>
             <a:r>
-              <a:rPr lang="fr-FR" sz="2400" dirty="0"/>
+              <a:rPr lang="fr-FR" sz="2400" dirty="0">
+                <a:latin typeface="Times New Roman" panose="02020603050405020304" pitchFamily="18" charset="0"/>
+                <a:cs typeface="Times New Roman" panose="02020603050405020304" pitchFamily="18" charset="0"/>
+              </a:rPr>
               <a:t>. </a:t>
             </a:r>
             <a:endParaRPr lang="en-GB" sz="2400" dirty="0">
-              <a:latin typeface="Times New Roman" pitchFamily="18" charset="0"/>
-              <a:cs typeface="Times New Roman" pitchFamily="18" charset="0"/>
+              <a:latin typeface="Times New Roman" panose="02020603050405020304" pitchFamily="18" charset="0"/>
+              <a:cs typeface="Times New Roman" panose="02020603050405020304" pitchFamily="18" charset="0"/>
             </a:endParaRPr>
           </a:p>
         </p:txBody>
@@ -16181,13 +16468,27 @@
                 <a:latin typeface="Times New Roman" pitchFamily="18" charset="0"/>
                 <a:cs typeface="Times New Roman" pitchFamily="18" charset="0"/>
               </a:rPr>
-              <a:t> in </a:t>
+              <a:t> </a:t>
             </a:r>
             <a:r>
               <a:rPr lang="en-GB" sz="2400" dirty="0" err="1">
                 <a:latin typeface="Times New Roman" pitchFamily="18" charset="0"/>
                 <a:cs typeface="Times New Roman" pitchFamily="18" charset="0"/>
               </a:rPr>
+              <a:t>în</a:t>
+            </a:r>
+            <a:r>
+              <a:rPr lang="en-GB" sz="2400" dirty="0">
+                <a:latin typeface="Times New Roman" pitchFamily="18" charset="0"/>
+                <a:cs typeface="Times New Roman" pitchFamily="18" charset="0"/>
+              </a:rPr>
+              <a:t> </a:t>
+            </a:r>
+            <a:r>
+              <a:rPr lang="en-GB" sz="2400" dirty="0" err="1">
+                <a:latin typeface="Times New Roman" pitchFamily="18" charset="0"/>
+                <a:cs typeface="Times New Roman" pitchFamily="18" charset="0"/>
+              </a:rPr>
               <a:t>ultimii</a:t>
             </a:r>
             <a:r>
@@ -16230,7 +16531,7 @@
                 <a:latin typeface="Times New Roman" pitchFamily="18" charset="0"/>
                 <a:cs typeface="Times New Roman" pitchFamily="18" charset="0"/>
               </a:rPr>
-              <a:t>patrunderea</a:t>
+              <a:t>pătrunderea</a:t>
             </a:r>
             <a:r>
               <a:rPr lang="en-GB" sz="2400" dirty="0">
@@ -16247,11 +16548,18 @@
               <a:t>BDOO </a:t>
             </a:r>
             <a:r>
+              <a:rPr lang="en-GB" sz="2400" dirty="0" err="1">
+                <a:latin typeface="Times New Roman" pitchFamily="18" charset="0"/>
+                <a:cs typeface="Times New Roman" pitchFamily="18" charset="0"/>
+              </a:rPr>
+              <a:t>în</a:t>
+            </a:r>
+            <a:r>
               <a:rPr lang="en-GB" sz="2400" dirty="0">
                 <a:latin typeface="Times New Roman" pitchFamily="18" charset="0"/>
                 <a:cs typeface="Times New Roman" pitchFamily="18" charset="0"/>
               </a:rPr>
-              <a:t>in tot </a:t>
+              <a:t> tot </a:t>
             </a:r>
             <a:r>
               <a:rPr lang="en-GB" sz="2400" dirty="0" err="1">
@@ -16314,7 +16622,7 @@
                 <a:latin typeface="Times New Roman" pitchFamily="18" charset="0"/>
                 <a:cs typeface="Times New Roman" pitchFamily="18" charset="0"/>
               </a:rPr>
-              <a:t>avand</a:t>
+              <a:t>avînd</a:t>
             </a:r>
             <a:r>
               <a:rPr lang="en-GB" sz="2400" dirty="0">
@@ -16384,7 +16692,7 @@
                 <a:latin typeface="Times New Roman" pitchFamily="18" charset="0"/>
                 <a:cs typeface="Times New Roman" pitchFamily="18" charset="0"/>
               </a:rPr>
-              <a:t>si</a:t>
+              <a:t>și</a:t>
             </a:r>
             <a:r>
               <a:rPr lang="en-GB" sz="2400" dirty="0">
@@ -16510,7 +16818,7 @@
                 <a:latin typeface="Times New Roman" pitchFamily="18" charset="0"/>
                 <a:cs typeface="Times New Roman" pitchFamily="18" charset="0"/>
               </a:rPr>
-              <a:t>si</a:t>
+              <a:t>și</a:t>
             </a:r>
             <a:r>
               <a:rPr lang="en-GB" sz="2400" dirty="0">
@@ -16608,7 +16916,7 @@
                 <a:latin typeface="Times New Roman" pitchFamily="18" charset="0"/>
                 <a:cs typeface="Times New Roman" pitchFamily="18" charset="0"/>
               </a:rPr>
-              <a:t>depaseste</a:t>
+              <a:t>depășeste</a:t>
             </a:r>
             <a:r>
               <a:rPr lang="en-GB" sz="2400" dirty="0">
@@ -16622,7 +16930,7 @@
                 <a:latin typeface="Times New Roman" pitchFamily="18" charset="0"/>
                 <a:cs typeface="Times New Roman" pitchFamily="18" charset="0"/>
               </a:rPr>
-              <a:t>posibilitatile</a:t>
+              <a:t>posibilitățile</a:t>
             </a:r>
             <a:r>
               <a:rPr lang="en-GB" sz="2400" dirty="0">
@@ -18234,13 +18542,27 @@
                 <a:latin typeface="Times New Roman" pitchFamily="18" charset="0"/>
                 <a:cs typeface="Times New Roman" pitchFamily="18" charset="0"/>
               </a:rPr>
-              <a:t> in </a:t>
+              <a:t> </a:t>
             </a:r>
             <a:r>
               <a:rPr lang="fr-FR" sz="2400" dirty="0" err="1">
                 <a:latin typeface="Times New Roman" pitchFamily="18" charset="0"/>
                 <a:cs typeface="Times New Roman" pitchFamily="18" charset="0"/>
               </a:rPr>
+              <a:t>în</a:t>
+            </a:r>
+            <a:r>
+              <a:rPr lang="fr-FR" sz="2400" dirty="0">
+                <a:latin typeface="Times New Roman" pitchFamily="18" charset="0"/>
+                <a:cs typeface="Times New Roman" pitchFamily="18" charset="0"/>
+              </a:rPr>
+              <a:t> </a:t>
+            </a:r>
+            <a:r>
+              <a:rPr lang="fr-FR" sz="2400" dirty="0" err="1">
+                <a:latin typeface="Times New Roman" pitchFamily="18" charset="0"/>
+                <a:cs typeface="Times New Roman" pitchFamily="18" charset="0"/>
+              </a:rPr>
               <a:t>mod</a:t>
             </a:r>
             <a:r>
@@ -18283,7 +18605,7 @@
                 <a:latin typeface="Times New Roman" pitchFamily="18" charset="0"/>
                 <a:cs typeface="Times New Roman" pitchFamily="18" charset="0"/>
               </a:rPr>
-              <a:t>orientata</a:t>
+              <a:t>orientată</a:t>
             </a:r>
             <a:r>
               <a:rPr lang="fr-FR" sz="2400" dirty="0">
@@ -18366,7 +18688,21 @@
                 <a:latin typeface="Times New Roman" pitchFamily="18" charset="0"/>
                 <a:cs typeface="Times New Roman" pitchFamily="18" charset="0"/>
               </a:rPr>
-              <a:t> (CAM) si </a:t>
+              <a:t> (CAM) </a:t>
+            </a:r>
+            <a:r>
+              <a:rPr lang="fr-FR" sz="2400" dirty="0" err="1">
+                <a:latin typeface="Times New Roman" pitchFamily="18" charset="0"/>
+                <a:cs typeface="Times New Roman" pitchFamily="18" charset="0"/>
+              </a:rPr>
+              <a:t>și</a:t>
+            </a:r>
+            <a:r>
+              <a:rPr lang="fr-FR" sz="2400" dirty="0">
+                <a:latin typeface="Times New Roman" pitchFamily="18" charset="0"/>
+                <a:cs typeface="Times New Roman" pitchFamily="18" charset="0"/>
+              </a:rPr>
+              <a:t> </a:t>
             </a:r>
             <a:r>
               <a:rPr lang="fr-FR" sz="2400" dirty="0" err="1">
@@ -18428,7 +18764,21 @@
                 <a:latin typeface="Times New Roman" pitchFamily="18" charset="0"/>
                 <a:cs typeface="Times New Roman" pitchFamily="18" charset="0"/>
               </a:rPr>
-              <a:t> si </a:t>
+              <a:t> </a:t>
+            </a:r>
+            <a:r>
+              <a:rPr lang="fr-FR" sz="2400" dirty="0" err="1">
+                <a:latin typeface="Times New Roman" pitchFamily="18" charset="0"/>
+                <a:cs typeface="Times New Roman" pitchFamily="18" charset="0"/>
+              </a:rPr>
+              <a:t>și</a:t>
+            </a:r>
+            <a:r>
+              <a:rPr lang="fr-FR" sz="2400" dirty="0">
+                <a:latin typeface="Times New Roman" pitchFamily="18" charset="0"/>
+                <a:cs typeface="Times New Roman" pitchFamily="18" charset="0"/>
+              </a:rPr>
+              <a:t> </a:t>
             </a:r>
             <a:r>
               <a:rPr lang="fr-FR" sz="2400" dirty="0" err="1">
@@ -18476,7 +18826,21 @@
                 <a:latin typeface="Times New Roman" pitchFamily="18" charset="0"/>
                 <a:cs typeface="Times New Roman" pitchFamily="18" charset="0"/>
               </a:rPr>
-              <a:t> spatiale (GIS);</a:t>
+              <a:t> </a:t>
+            </a:r>
+            <a:r>
+              <a:rPr lang="fr-FR" sz="2400" dirty="0" err="1">
+                <a:latin typeface="Times New Roman" pitchFamily="18" charset="0"/>
+                <a:cs typeface="Times New Roman" pitchFamily="18" charset="0"/>
+              </a:rPr>
+              <a:t>spațiale</a:t>
+            </a:r>
+            <a:r>
+              <a:rPr lang="fr-FR" sz="2400" dirty="0">
+                <a:latin typeface="Times New Roman" pitchFamily="18" charset="0"/>
+                <a:cs typeface="Times New Roman" pitchFamily="18" charset="0"/>
+              </a:rPr>
+              <a:t> (GIS);</a:t>
             </a:r>
           </a:p>
           <a:p>
@@ -18510,7 +18874,21 @@
                 <a:latin typeface="Times New Roman" pitchFamily="18" charset="0"/>
                 <a:cs typeface="Times New Roman" pitchFamily="18" charset="0"/>
               </a:rPr>
-              <a:t> si </a:t>
+              <a:t> </a:t>
+            </a:r>
+            <a:r>
+              <a:rPr lang="fr-FR" sz="2400" dirty="0" err="1">
+                <a:latin typeface="Times New Roman" pitchFamily="18" charset="0"/>
+                <a:cs typeface="Times New Roman" pitchFamily="18" charset="0"/>
+              </a:rPr>
+              <a:t>și</a:t>
+            </a:r>
+            <a:r>
+              <a:rPr lang="fr-FR" sz="2400" dirty="0">
+                <a:latin typeface="Times New Roman" pitchFamily="18" charset="0"/>
+                <a:cs typeface="Times New Roman" pitchFamily="18" charset="0"/>
+              </a:rPr>
+              <a:t> </a:t>
             </a:r>
             <a:r>
               <a:rPr lang="fr-FR" sz="2400" dirty="0" err="1">
@@ -18959,10 +19337,28 @@
               <a:buChar char="§"/>
             </a:pPr>
             <a:r>
+              <a:rPr lang="vi-VN" sz="2400" b="1" dirty="0">
+                <a:latin typeface="+mj-lt"/>
+              </a:rPr>
+              <a:t>Comunicaţia</a:t>
+            </a:r>
+            <a:r>
               <a:rPr lang="vi-VN" sz="2400" dirty="0">
                 <a:latin typeface="+mj-lt"/>
               </a:rPr>
-              <a:t>Comunicaţia şi distribuirea sunt asigurate atât între date, cât şi între programe.</a:t>
+              <a:t> şi </a:t>
+            </a:r>
+            <a:r>
+              <a:rPr lang="vi-VN" sz="2400" b="1" dirty="0">
+                <a:latin typeface="+mj-lt"/>
+              </a:rPr>
+              <a:t>distribuirea</a:t>
+            </a:r>
+            <a:r>
+              <a:rPr lang="vi-VN" sz="2400" dirty="0">
+                <a:latin typeface="+mj-lt"/>
+              </a:rPr>
+              <a:t> sunt asigurate atât între date, cât şi între programe.</a:t>
             </a:r>
             <a:endParaRPr lang="ro-RO" sz="2400" dirty="0">
               <a:latin typeface="+mj-lt"/>
@@ -18996,7 +19392,31 @@
               <a:rPr lang="vi-VN" sz="2400" dirty="0">
                 <a:latin typeface="+mj-lt"/>
               </a:rPr>
-              <a:t>rezultă uşurinţa în utilizare şi portabilitatea ridicată a sistemelor</a:t>
+              <a:t>rezultă </a:t>
+            </a:r>
+            <a:r>
+              <a:rPr lang="vi-VN" sz="2400" b="1" dirty="0">
+                <a:latin typeface="+mj-lt"/>
+              </a:rPr>
+              <a:t>uşurinţa în utilizare</a:t>
+            </a:r>
+            <a:r>
+              <a:rPr lang="vi-VN" sz="2400" dirty="0">
+                <a:latin typeface="+mj-lt"/>
+              </a:rPr>
+              <a:t> şi </a:t>
+            </a:r>
+            <a:r>
+              <a:rPr lang="vi-VN" sz="2400" b="1" dirty="0">
+                <a:latin typeface="+mj-lt"/>
+              </a:rPr>
+              <a:t>portabilitatea</a:t>
+            </a:r>
+            <a:r>
+              <a:rPr lang="vi-VN" sz="2400" dirty="0">
+                <a:latin typeface="+mj-lt"/>
+              </a:rPr>
+              <a:t> ridicată a sistemelor</a:t>
             </a:r>
             <a:r>
               <a:rPr lang="ro-RO" sz="2400" dirty="0">
@@ -19014,7 +19434,19 @@
               <a:rPr lang="vi-VN" sz="2400" dirty="0">
                 <a:latin typeface="+mj-lt"/>
               </a:rPr>
-              <a:t>Lucrul cu obiecte ne apropie firesc de lumea reală, în care se gasesc obiecte, care au </a:t>
+              <a:t>Lucrul cu obiecte ne apropie firesc de lumea reală, în care se g</a:t>
+            </a:r>
+            <a:r>
+              <a:rPr lang="en-US" sz="2400" dirty="0">
+                <a:latin typeface="+mj-lt"/>
+              </a:rPr>
+              <a:t>ă</a:t>
+            </a:r>
+            <a:r>
+              <a:rPr lang="vi-VN" sz="2400" dirty="0">
+                <a:latin typeface="+mj-lt"/>
+              </a:rPr>
+              <a:t>sesc obiecte, care au </a:t>
             </a:r>
             <a:r>
               <a:rPr lang="vi-VN" sz="2400" dirty="0">
@@ -19071,7 +19503,67 @@
               <a:rPr lang="vi-VN" sz="2400" dirty="0">
                 <a:latin typeface="+mj-lt"/>
               </a:rPr>
-              <a:t>Se asigură: accesul neprocedural, comunicaţia, portabilitatea, deschiderea aplicaţiilor cu baze de date. </a:t>
+              <a:t>Se asigură: </a:t>
+            </a:r>
+            <a:r>
+              <a:rPr lang="vi-VN" sz="2400" b="1" dirty="0">
+                <a:latin typeface="+mj-lt"/>
+              </a:rPr>
+              <a:t>accesul</a:t>
+            </a:r>
+            <a:r>
+              <a:rPr lang="vi-VN" sz="2400" dirty="0">
+                <a:latin typeface="+mj-lt"/>
+              </a:rPr>
+              <a:t> </a:t>
+            </a:r>
+            <a:r>
+              <a:rPr lang="vi-VN" sz="2400" b="1" dirty="0">
+                <a:latin typeface="+mj-lt"/>
+              </a:rPr>
+              <a:t>neprocedural</a:t>
+            </a:r>
+            <a:r>
+              <a:rPr lang="vi-VN" sz="2400" dirty="0">
+                <a:latin typeface="+mj-lt"/>
+              </a:rPr>
+              <a:t>, </a:t>
+            </a:r>
+            <a:r>
+              <a:rPr lang="vi-VN" sz="2400" b="1" dirty="0">
+                <a:latin typeface="+mj-lt"/>
+              </a:rPr>
+              <a:t>comunicaţia</a:t>
+            </a:r>
+            <a:r>
+              <a:rPr lang="vi-VN" sz="2400" dirty="0">
+                <a:latin typeface="+mj-lt"/>
+              </a:rPr>
+              <a:t>, </a:t>
+            </a:r>
+            <a:r>
+              <a:rPr lang="vi-VN" sz="2400" b="1" dirty="0">
+                <a:latin typeface="+mj-lt"/>
+              </a:rPr>
+              <a:t>portabilitatea</a:t>
+            </a:r>
+            <a:r>
+              <a:rPr lang="vi-VN" sz="2400" dirty="0">
+                <a:latin typeface="+mj-lt"/>
+              </a:rPr>
+              <a:t>, </a:t>
+            </a:r>
+            <a:r>
+              <a:rPr lang="vi-VN" sz="2400" b="1" dirty="0">
+                <a:latin typeface="+mj-lt"/>
+              </a:rPr>
+              <a:t>deschiderea aplicaţiilor cu baze de date</a:t>
+            </a:r>
+            <a:r>
+              <a:rPr lang="vi-VN" sz="2400" dirty="0">
+                <a:latin typeface="+mj-lt"/>
+              </a:rPr>
+              <a:t>. </a:t>
             </a:r>
             <a:endParaRPr lang="ro-RO" sz="2400" dirty="0">
               <a:latin typeface="+mj-lt"/>
@@ -19268,7 +19760,7 @@
                 <a:latin typeface="Times New Roman" pitchFamily="18" charset="0"/>
                 <a:cs typeface="Times New Roman" pitchFamily="18" charset="0"/>
               </a:rPr>
-              <a:t>superioara</a:t>
+              <a:t>superioară</a:t>
             </a:r>
             <a:r>
               <a:rPr lang="en-GB" sz="2400" dirty="0">
@@ -19302,7 +19794,7 @@
                 <a:latin typeface="Times New Roman" pitchFamily="18" charset="0"/>
                 <a:cs typeface="Times New Roman" pitchFamily="18" charset="0"/>
               </a:rPr>
-              <a:t>Posibilitati</a:t>
+              <a:t>Posibilități</a:t>
             </a:r>
             <a:r>
               <a:rPr lang="en-GB" sz="2400" dirty="0">
@@ -19316,7 +19808,7 @@
                 <a:latin typeface="Times New Roman" pitchFamily="18" charset="0"/>
                 <a:cs typeface="Times New Roman" pitchFamily="18" charset="0"/>
               </a:rPr>
-              <a:t>deductie</a:t>
+              <a:t>deducție</a:t>
             </a:r>
             <a:r>
               <a:rPr lang="en-GB" sz="2400" dirty="0">
@@ -19330,7 +19822,7 @@
                 <a:latin typeface="Times New Roman" pitchFamily="18" charset="0"/>
                 <a:cs typeface="Times New Roman" pitchFamily="18" charset="0"/>
               </a:rPr>
-              <a:t>superioara</a:t>
+              <a:t>superioară</a:t>
             </a:r>
             <a:r>
               <a:rPr lang="en-GB" sz="2400" dirty="0">
@@ -19372,7 +19864,7 @@
                 <a:latin typeface="Times New Roman" pitchFamily="18" charset="0"/>
                 <a:cs typeface="Times New Roman" pitchFamily="18" charset="0"/>
               </a:rPr>
-              <a:t>mostenire</a:t>
+              <a:t>moștenire</a:t>
             </a:r>
             <a:r>
               <a:rPr lang="en-GB" sz="2400" dirty="0">
@@ -19406,7 +19898,7 @@
                 <a:latin typeface="Times New Roman" pitchFamily="18" charset="0"/>
                 <a:cs typeface="Times New Roman" pitchFamily="18" charset="0"/>
               </a:rPr>
-              <a:t>interfetei</a:t>
+              <a:t>interfeței</a:t>
             </a:r>
             <a:r>
               <a:rPr lang="en-GB" sz="2400" dirty="0">
@@ -19447,13 +19939,27 @@
                 <a:latin typeface="Times New Roman" pitchFamily="18" charset="0"/>
                 <a:cs typeface="Times New Roman" pitchFamily="18" charset="0"/>
               </a:rPr>
-              <a:t> in </a:t>
+              <a:t> </a:t>
             </a:r>
             <a:r>
               <a:rPr lang="en-GB" sz="2400" dirty="0" err="1">
                 <a:latin typeface="Times New Roman" pitchFamily="18" charset="0"/>
                 <a:cs typeface="Times New Roman" pitchFamily="18" charset="0"/>
               </a:rPr>
+              <a:t>în</a:t>
+            </a:r>
+            <a:r>
+              <a:rPr lang="en-GB" sz="2400" dirty="0">
+                <a:latin typeface="Times New Roman" pitchFamily="18" charset="0"/>
+                <a:cs typeface="Times New Roman" pitchFamily="18" charset="0"/>
+              </a:rPr>
+              <a:t> </a:t>
+            </a:r>
+            <a:r>
+              <a:rPr lang="en-GB" sz="2400" dirty="0" err="1">
+                <a:latin typeface="Times New Roman" pitchFamily="18" charset="0"/>
+                <a:cs typeface="Times New Roman" pitchFamily="18" charset="0"/>
+              </a:rPr>
               <a:t>considerare</a:t>
             </a:r>
             <a:r>
@@ -19538,7 +20044,7 @@
                 <a:latin typeface="Times New Roman" pitchFamily="18" charset="0"/>
                 <a:cs typeface="Times New Roman" pitchFamily="18" charset="0"/>
               </a:rPr>
-              <a:t>si</a:t>
+              <a:t>și</a:t>
             </a:r>
             <a:r>
               <a:rPr lang="en-GB" sz="2400" dirty="0">
@@ -19716,7 +20222,7 @@
           <p:nvPr>
             <p:extLst>
               <p:ext uri="{D42A27DB-BD31-4B8C-83A1-F6EECF244321}">
-                <p14:modId xmlns:p14="http://schemas.microsoft.com/office/powerpoint/2010/main" val="736153706"/>
+                <p14:modId xmlns:p14="http://schemas.microsoft.com/office/powerpoint/2010/main" val="1547955926"/>
               </p:ext>
             </p:extLst>
           </p:nvPr>
@@ -19732,14 +20238,14 @@
                 <a:tableStyleId>{5940675A-B579-460E-94D1-54222C63F5DA}</a:tableStyleId>
               </a:tblPr>
               <a:tblGrid>
-                <a:gridCol w="1206500">
+                <a:gridCol w="1447800">
                   <a:extLst>
                     <a:ext uri="{9D8B030D-6E8A-4147-A177-3AD203B41FA5}">
                       <a16:colId xmlns:a16="http://schemas.microsoft.com/office/drawing/2014/main" val="20000"/>
                     </a:ext>
                   </a:extLst>
                 </a:gridCol>
-                <a:gridCol w="1206500">
+                <a:gridCol w="965200">
                   <a:extLst>
                     <a:ext uri="{9D8B030D-6E8A-4147-A177-3AD203B41FA5}">
                       <a16:colId xmlns:a16="http://schemas.microsoft.com/office/drawing/2014/main" val="20001"/>
@@ -19929,7 +20435,41 @@
                           <a:latin typeface="Times New Roman" pitchFamily="18" charset="0"/>
                           <a:cs typeface="Times New Roman" pitchFamily="18" charset="0"/>
                         </a:rPr>
-                        <a:t>Sistem neorientat</a:t>
+                        <a:t>Sistem </a:t>
+                      </a:r>
+                      <a:endParaRPr lang="en-US" b="1" dirty="0">
+                        <a:latin typeface="Times New Roman" pitchFamily="18" charset="0"/>
+                        <a:cs typeface="Times New Roman" pitchFamily="18" charset="0"/>
+                      </a:endParaRPr>
+                    </a:p>
+                    <a:p>
+                      <a:r>
+                        <a:rPr lang="ro-RO" b="1" dirty="0">
+                          <a:latin typeface="Times New Roman" pitchFamily="18" charset="0"/>
+                          <a:cs typeface="Times New Roman" pitchFamily="18" charset="0"/>
+                        </a:rPr>
+                        <a:t>neorientat</a:t>
+                      </a:r>
+                      <a:r>
+                        <a:rPr lang="en-US" b="1" dirty="0">
+                          <a:latin typeface="Times New Roman" pitchFamily="18" charset="0"/>
+                          <a:cs typeface="Times New Roman" pitchFamily="18" charset="0"/>
+                        </a:rPr>
+                        <a:t>  (</a:t>
+                      </a:r>
+                      <a:r>
+                        <a:rPr lang="en-US" b="1" dirty="0" err="1">
+                          <a:latin typeface="Times New Roman" pitchFamily="18" charset="0"/>
+                          <a:cs typeface="Times New Roman" pitchFamily="18" charset="0"/>
+                        </a:rPr>
+                        <a:t>relațional</a:t>
+                      </a:r>
+                      <a:r>
+                        <a:rPr lang="en-US" b="1" dirty="0">
+                          <a:latin typeface="Times New Roman" pitchFamily="18" charset="0"/>
+                          <a:cs typeface="Times New Roman" pitchFamily="18" charset="0"/>
+                        </a:rPr>
+                        <a:t>)</a:t>
                       </a:r>
                       <a:endParaRPr lang="en-GB" b="1" dirty="0">
                         <a:latin typeface="Times New Roman" pitchFamily="18" charset="0"/>

</xml_diff>